<commit_message>
random true order, selectable numbers of img, show comparison in finish page
</commit_message>
<xml_diff>
--- a/assets/Symbols.pptx
+++ b/assets/Symbols.pptx
@@ -11,7 +11,9 @@
     <p:sldId id="259" r:id="rId5"/>
     <p:sldId id="260" r:id="rId6"/>
     <p:sldId id="261" r:id="rId7"/>
-    <p:sldId id="262" r:id="rId8"/>
+    <p:sldId id="263" r:id="rId8"/>
+    <p:sldId id="264" r:id="rId9"/>
+    <p:sldId id="262" r:id="rId10"/>
   </p:sldIdLst>
   <p:sldSz cx="12192000" cy="6858000"/>
   <p:notesSz cx="6858000" cy="9144000"/>
@@ -110,6 +112,11 @@
       </a:defRPr>
     </a:lvl9pPr>
   </p:defaultTextStyle>
+  <p:extLst>
+    <p:ext uri="{EFAFB233-063F-42B5-8137-9DF3F51BA10A}">
+      <p15:sldGuideLst xmlns:p15="http://schemas.microsoft.com/office/powerpoint/2012/main"/>
+    </p:ext>
+  </p:extLst>
 </p:presentation>
 </file>
 
@@ -260,7 +267,7 @@
           <a:p>
             <a:fld id="{573B54DB-A8B2-4954-9DC1-E1741E23BC56}" type="datetimeFigureOut">
               <a:rPr lang="en-US" smtClean="0"/>
-              <a:t>7/29/2024</a:t>
+              <a:t>8/15/2024</a:t>
             </a:fld>
             <a:endParaRPr lang="en-US"/>
           </a:p>
@@ -458,7 +465,7 @@
           <a:p>
             <a:fld id="{573B54DB-A8B2-4954-9DC1-E1741E23BC56}" type="datetimeFigureOut">
               <a:rPr lang="en-US" smtClean="0"/>
-              <a:t>7/29/2024</a:t>
+              <a:t>8/15/2024</a:t>
             </a:fld>
             <a:endParaRPr lang="en-US"/>
           </a:p>
@@ -666,7 +673,7 @@
           <a:p>
             <a:fld id="{573B54DB-A8B2-4954-9DC1-E1741E23BC56}" type="datetimeFigureOut">
               <a:rPr lang="en-US" smtClean="0"/>
-              <a:t>7/29/2024</a:t>
+              <a:t>8/15/2024</a:t>
             </a:fld>
             <a:endParaRPr lang="en-US"/>
           </a:p>
@@ -864,7 +871,7 @@
           <a:p>
             <a:fld id="{573B54DB-A8B2-4954-9DC1-E1741E23BC56}" type="datetimeFigureOut">
               <a:rPr lang="en-US" smtClean="0"/>
-              <a:t>7/29/2024</a:t>
+              <a:t>8/15/2024</a:t>
             </a:fld>
             <a:endParaRPr lang="en-US"/>
           </a:p>
@@ -1139,7 +1146,7 @@
           <a:p>
             <a:fld id="{573B54DB-A8B2-4954-9DC1-E1741E23BC56}" type="datetimeFigureOut">
               <a:rPr lang="en-US" smtClean="0"/>
-              <a:t>7/29/2024</a:t>
+              <a:t>8/15/2024</a:t>
             </a:fld>
             <a:endParaRPr lang="en-US"/>
           </a:p>
@@ -1404,7 +1411,7 @@
           <a:p>
             <a:fld id="{573B54DB-A8B2-4954-9DC1-E1741E23BC56}" type="datetimeFigureOut">
               <a:rPr lang="en-US" smtClean="0"/>
-              <a:t>7/29/2024</a:t>
+              <a:t>8/15/2024</a:t>
             </a:fld>
             <a:endParaRPr lang="en-US"/>
           </a:p>
@@ -1816,7 +1823,7 @@
           <a:p>
             <a:fld id="{573B54DB-A8B2-4954-9DC1-E1741E23BC56}" type="datetimeFigureOut">
               <a:rPr lang="en-US" smtClean="0"/>
-              <a:t>7/29/2024</a:t>
+              <a:t>8/15/2024</a:t>
             </a:fld>
             <a:endParaRPr lang="en-US"/>
           </a:p>
@@ -1957,7 +1964,7 @@
           <a:p>
             <a:fld id="{573B54DB-A8B2-4954-9DC1-E1741E23BC56}" type="datetimeFigureOut">
               <a:rPr lang="en-US" smtClean="0"/>
-              <a:t>7/29/2024</a:t>
+              <a:t>8/15/2024</a:t>
             </a:fld>
             <a:endParaRPr lang="en-US"/>
           </a:p>
@@ -2070,7 +2077,7 @@
           <a:p>
             <a:fld id="{573B54DB-A8B2-4954-9DC1-E1741E23BC56}" type="datetimeFigureOut">
               <a:rPr lang="en-US" smtClean="0"/>
-              <a:t>7/29/2024</a:t>
+              <a:t>8/15/2024</a:t>
             </a:fld>
             <a:endParaRPr lang="en-US"/>
           </a:p>
@@ -2381,7 +2388,7 @@
           <a:p>
             <a:fld id="{573B54DB-A8B2-4954-9DC1-E1741E23BC56}" type="datetimeFigureOut">
               <a:rPr lang="en-US" smtClean="0"/>
-              <a:t>7/29/2024</a:t>
+              <a:t>8/15/2024</a:t>
             </a:fld>
             <a:endParaRPr lang="en-US"/>
           </a:p>
@@ -2669,7 +2676,7 @@
           <a:p>
             <a:fld id="{573B54DB-A8B2-4954-9DC1-E1741E23BC56}" type="datetimeFigureOut">
               <a:rPr lang="en-US" smtClean="0"/>
-              <a:t>7/29/2024</a:t>
+              <a:t>8/15/2024</a:t>
             </a:fld>
             <a:endParaRPr lang="en-US"/>
           </a:p>
@@ -2910,7 +2917,7 @@
           <a:p>
             <a:fld id="{573B54DB-A8B2-4954-9DC1-E1741E23BC56}" type="datetimeFigureOut">
               <a:rPr lang="en-US" smtClean="0"/>
-              <a:t>7/29/2024</a:t>
+              <a:t>8/15/2024</a:t>
             </a:fld>
             <a:endParaRPr lang="en-US"/>
           </a:p>
@@ -4550,6 +4557,508 @@
           <a:chExt cx="0" cy="0"/>
         </a:xfrm>
       </p:grpSpPr>
+      <p:grpSp>
+        <p:nvGrpSpPr>
+          <p:cNvPr id="5" name="Group 4">
+            <a:extLst>
+              <a:ext uri="{FF2B5EF4-FFF2-40B4-BE49-F238E27FC236}">
+                <a16:creationId xmlns:a16="http://schemas.microsoft.com/office/drawing/2014/main" id="{23F179EC-5B5A-721F-1747-AA8D2B91861B}"/>
+              </a:ext>
+            </a:extLst>
+          </p:cNvPr>
+          <p:cNvGrpSpPr/>
+          <p:nvPr/>
+        </p:nvGrpSpPr>
+        <p:grpSpPr>
+          <a:xfrm>
+            <a:off x="2183131" y="372640"/>
+            <a:ext cx="5943599" cy="5943599"/>
+            <a:chOff x="2183131" y="372640"/>
+            <a:chExt cx="5943599" cy="5943599"/>
+          </a:xfrm>
+        </p:grpSpPr>
+        <p:sp>
+          <p:nvSpPr>
+            <p:cNvPr id="2" name="Flowchart: Connector 1">
+              <a:extLst>
+                <a:ext uri="{FF2B5EF4-FFF2-40B4-BE49-F238E27FC236}">
+                  <a16:creationId xmlns:a16="http://schemas.microsoft.com/office/drawing/2014/main" id="{F8794A50-53B0-AFF4-2C7B-6D930BDB52C6}"/>
+                </a:ext>
+              </a:extLst>
+            </p:cNvPr>
+            <p:cNvSpPr/>
+            <p:nvPr/>
+          </p:nvSpPr>
+          <p:spPr>
+            <a:xfrm>
+              <a:off x="2183131" y="372640"/>
+              <a:ext cx="5943599" cy="5943599"/>
+            </a:xfrm>
+            <a:prstGeom prst="flowChartConnector">
+              <a:avLst/>
+            </a:prstGeom>
+            <a:solidFill>
+              <a:schemeClr val="accent1">
+                <a:lumMod val="50000"/>
+              </a:schemeClr>
+            </a:solidFill>
+            <a:ln>
+              <a:noFill/>
+            </a:ln>
+          </p:spPr>
+          <p:style>
+            <a:lnRef idx="2">
+              <a:schemeClr val="accent1">
+                <a:shade val="15000"/>
+              </a:schemeClr>
+            </a:lnRef>
+            <a:fillRef idx="1">
+              <a:schemeClr val="accent1"/>
+            </a:fillRef>
+            <a:effectRef idx="0">
+              <a:schemeClr val="accent1"/>
+            </a:effectRef>
+            <a:fontRef idx="minor">
+              <a:schemeClr val="lt1"/>
+            </a:fontRef>
+          </p:style>
+          <p:txBody>
+            <a:bodyPr rtlCol="0" anchor="ctr"/>
+            <a:lstStyle/>
+            <a:p>
+              <a:pPr algn="ctr"/>
+              <a:endParaRPr lang="en-US"/>
+            </a:p>
+          </p:txBody>
+        </p:sp>
+        <p:sp>
+          <p:nvSpPr>
+            <p:cNvPr id="4" name="Star: 5 Points 3">
+              <a:extLst>
+                <a:ext uri="{FF2B5EF4-FFF2-40B4-BE49-F238E27FC236}">
+                  <a16:creationId xmlns:a16="http://schemas.microsoft.com/office/drawing/2014/main" id="{A0823ACD-283A-626D-19B6-722FF0E4DFA0}"/>
+                </a:ext>
+              </a:extLst>
+            </p:cNvPr>
+            <p:cNvSpPr/>
+            <p:nvPr/>
+          </p:nvSpPr>
+          <p:spPr>
+            <a:xfrm>
+              <a:off x="2442602" y="372640"/>
+              <a:ext cx="5412094" cy="5412094"/>
+            </a:xfrm>
+            <a:prstGeom prst="star5">
+              <a:avLst/>
+            </a:prstGeom>
+            <a:solidFill>
+              <a:schemeClr val="bg1"/>
+            </a:solidFill>
+            <a:ln>
+              <a:noFill/>
+            </a:ln>
+          </p:spPr>
+          <p:style>
+            <a:lnRef idx="2">
+              <a:schemeClr val="accent1">
+                <a:shade val="15000"/>
+              </a:schemeClr>
+            </a:lnRef>
+            <a:fillRef idx="1">
+              <a:schemeClr val="accent1"/>
+            </a:fillRef>
+            <a:effectRef idx="0">
+              <a:schemeClr val="accent1"/>
+            </a:effectRef>
+            <a:fontRef idx="minor">
+              <a:schemeClr val="lt1"/>
+            </a:fontRef>
+          </p:style>
+          <p:txBody>
+            <a:bodyPr rtlCol="0" anchor="ctr"/>
+            <a:lstStyle/>
+            <a:p>
+              <a:pPr algn="ctr"/>
+              <a:endParaRPr lang="en-US"/>
+            </a:p>
+          </p:txBody>
+        </p:sp>
+      </p:grpSp>
+    </p:spTree>
+    <p:extLst>
+      <p:ext uri="{BB962C8B-B14F-4D97-AF65-F5344CB8AC3E}">
+        <p14:creationId xmlns:p14="http://schemas.microsoft.com/office/powerpoint/2010/main" val="2538085524"/>
+      </p:ext>
+    </p:extLst>
+  </p:cSld>
+  <p:clrMapOvr>
+    <a:masterClrMapping/>
+  </p:clrMapOvr>
+</p:sld>
+</file>
+
+<file path=ppt/slides/slide8.xml><?xml version="1.0" encoding="utf-8"?>
+<p:sld xmlns:a="http://schemas.openxmlformats.org/drawingml/2006/main" xmlns:r="http://schemas.openxmlformats.org/officeDocument/2006/relationships" xmlns:p="http://schemas.openxmlformats.org/presentationml/2006/main">
+  <p:cSld>
+    <p:spTree>
+      <p:nvGrpSpPr>
+        <p:cNvPr id="1" name=""/>
+        <p:cNvGrpSpPr/>
+        <p:nvPr/>
+      </p:nvGrpSpPr>
+      <p:grpSpPr>
+        <a:xfrm>
+          <a:off x="0" y="0"/>
+          <a:ext cx="0" cy="0"/>
+          <a:chOff x="0" y="0"/>
+          <a:chExt cx="0" cy="0"/>
+        </a:xfrm>
+      </p:grpSpPr>
+      <p:grpSp>
+        <p:nvGrpSpPr>
+          <p:cNvPr id="7" name="Group 6">
+            <a:extLst>
+              <a:ext uri="{FF2B5EF4-FFF2-40B4-BE49-F238E27FC236}">
+                <a16:creationId xmlns:a16="http://schemas.microsoft.com/office/drawing/2014/main" id="{76C67CAB-6082-E3F0-3EA6-3577CCEFDFC1}"/>
+              </a:ext>
+            </a:extLst>
+          </p:cNvPr>
+          <p:cNvGrpSpPr/>
+          <p:nvPr/>
+        </p:nvGrpSpPr>
+        <p:grpSpPr>
+          <a:xfrm>
+            <a:off x="285751" y="-1524740"/>
+            <a:ext cx="9738359" cy="9738360"/>
+            <a:chOff x="285751" y="-1524740"/>
+            <a:chExt cx="9738359" cy="9738360"/>
+          </a:xfrm>
+        </p:grpSpPr>
+        <p:sp>
+          <p:nvSpPr>
+            <p:cNvPr id="2" name="Flowchart: Connector 1">
+              <a:extLst>
+                <a:ext uri="{FF2B5EF4-FFF2-40B4-BE49-F238E27FC236}">
+                  <a16:creationId xmlns:a16="http://schemas.microsoft.com/office/drawing/2014/main" id="{808F427D-5A7C-0869-3E93-6CB46B94CACF}"/>
+                </a:ext>
+              </a:extLst>
+            </p:cNvPr>
+            <p:cNvSpPr/>
+            <p:nvPr/>
+          </p:nvSpPr>
+          <p:spPr>
+            <a:xfrm>
+              <a:off x="2183131" y="372640"/>
+              <a:ext cx="5943599" cy="5943599"/>
+            </a:xfrm>
+            <a:prstGeom prst="flowChartConnector">
+              <a:avLst/>
+            </a:prstGeom>
+            <a:solidFill>
+              <a:schemeClr val="accent1">
+                <a:lumMod val="50000"/>
+              </a:schemeClr>
+            </a:solidFill>
+            <a:ln>
+              <a:noFill/>
+            </a:ln>
+          </p:spPr>
+          <p:style>
+            <a:lnRef idx="2">
+              <a:schemeClr val="accent1">
+                <a:shade val="15000"/>
+              </a:schemeClr>
+            </a:lnRef>
+            <a:fillRef idx="1">
+              <a:schemeClr val="accent1"/>
+            </a:fillRef>
+            <a:effectRef idx="0">
+              <a:schemeClr val="accent1"/>
+            </a:effectRef>
+            <a:fontRef idx="minor">
+              <a:schemeClr val="lt1"/>
+            </a:fontRef>
+          </p:style>
+          <p:txBody>
+            <a:bodyPr rtlCol="0" anchor="ctr"/>
+            <a:lstStyle/>
+            <a:p>
+              <a:pPr algn="ctr"/>
+              <a:endParaRPr lang="en-US"/>
+            </a:p>
+          </p:txBody>
+        </p:sp>
+        <p:sp>
+          <p:nvSpPr>
+            <p:cNvPr id="3" name="Block Arc 2">
+              <a:extLst>
+                <a:ext uri="{FF2B5EF4-FFF2-40B4-BE49-F238E27FC236}">
+                  <a16:creationId xmlns:a16="http://schemas.microsoft.com/office/drawing/2014/main" id="{0FD0EDED-3CF4-64C8-2CC5-2D5EEA875D70}"/>
+                </a:ext>
+              </a:extLst>
+            </p:cNvPr>
+            <p:cNvSpPr/>
+            <p:nvPr/>
+          </p:nvSpPr>
+          <p:spPr>
+            <a:xfrm rot="16200000">
+              <a:off x="6229350" y="1531620"/>
+              <a:ext cx="3794760" cy="3794760"/>
+            </a:xfrm>
+            <a:prstGeom prst="blockArc">
+              <a:avLst>
+                <a:gd name="adj1" fmla="val 10800000"/>
+                <a:gd name="adj2" fmla="val 21446581"/>
+                <a:gd name="adj3" fmla="val 12191"/>
+              </a:avLst>
+            </a:prstGeom>
+            <a:solidFill>
+              <a:schemeClr val="bg1"/>
+            </a:solidFill>
+            <a:ln>
+              <a:noFill/>
+            </a:ln>
+          </p:spPr>
+          <p:style>
+            <a:lnRef idx="2">
+              <a:schemeClr val="accent1">
+                <a:shade val="15000"/>
+              </a:schemeClr>
+            </a:lnRef>
+            <a:fillRef idx="1">
+              <a:schemeClr val="accent1"/>
+            </a:fillRef>
+            <a:effectRef idx="0">
+              <a:schemeClr val="accent1"/>
+            </a:effectRef>
+            <a:fontRef idx="minor">
+              <a:schemeClr val="lt1"/>
+            </a:fontRef>
+          </p:style>
+          <p:txBody>
+            <a:bodyPr rtlCol="0" anchor="ctr"/>
+            <a:lstStyle/>
+            <a:p>
+              <a:pPr algn="ctr"/>
+              <a:endParaRPr lang="en-US">
+                <a:solidFill>
+                  <a:schemeClr val="tx1"/>
+                </a:solidFill>
+              </a:endParaRPr>
+            </a:p>
+          </p:txBody>
+        </p:sp>
+        <p:sp>
+          <p:nvSpPr>
+            <p:cNvPr id="4" name="Block Arc 3">
+              <a:extLst>
+                <a:ext uri="{FF2B5EF4-FFF2-40B4-BE49-F238E27FC236}">
+                  <a16:creationId xmlns:a16="http://schemas.microsoft.com/office/drawing/2014/main" id="{9A5491B2-FA53-C06E-1B9E-AEB3038EBD40}"/>
+                </a:ext>
+              </a:extLst>
+            </p:cNvPr>
+            <p:cNvSpPr/>
+            <p:nvPr/>
+          </p:nvSpPr>
+          <p:spPr>
+            <a:xfrm rot="5400000">
+              <a:off x="285751" y="1684020"/>
+              <a:ext cx="3794760" cy="3794760"/>
+            </a:xfrm>
+            <a:prstGeom prst="blockArc">
+              <a:avLst>
+                <a:gd name="adj1" fmla="val 10800000"/>
+                <a:gd name="adj2" fmla="val 21446581"/>
+                <a:gd name="adj3" fmla="val 12191"/>
+              </a:avLst>
+            </a:prstGeom>
+            <a:solidFill>
+              <a:schemeClr val="bg1"/>
+            </a:solidFill>
+            <a:ln>
+              <a:noFill/>
+            </a:ln>
+          </p:spPr>
+          <p:style>
+            <a:lnRef idx="2">
+              <a:schemeClr val="accent1">
+                <a:shade val="15000"/>
+              </a:schemeClr>
+            </a:lnRef>
+            <a:fillRef idx="1">
+              <a:schemeClr val="accent1"/>
+            </a:fillRef>
+            <a:effectRef idx="0">
+              <a:schemeClr val="accent1"/>
+            </a:effectRef>
+            <a:fontRef idx="minor">
+              <a:schemeClr val="lt1"/>
+            </a:fontRef>
+          </p:style>
+          <p:txBody>
+            <a:bodyPr rtlCol="0" anchor="ctr"/>
+            <a:lstStyle/>
+            <a:p>
+              <a:pPr algn="ctr"/>
+              <a:endParaRPr lang="en-US">
+                <a:solidFill>
+                  <a:schemeClr val="tx1"/>
+                </a:solidFill>
+              </a:endParaRPr>
+            </a:p>
+          </p:txBody>
+        </p:sp>
+        <p:sp>
+          <p:nvSpPr>
+            <p:cNvPr id="5" name="Block Arc 4">
+              <a:extLst>
+                <a:ext uri="{FF2B5EF4-FFF2-40B4-BE49-F238E27FC236}">
+                  <a16:creationId xmlns:a16="http://schemas.microsoft.com/office/drawing/2014/main" id="{98342B81-3F19-C3E5-43D1-EDA7B91CCE34}"/>
+                </a:ext>
+              </a:extLst>
+            </p:cNvPr>
+            <p:cNvSpPr/>
+            <p:nvPr/>
+          </p:nvSpPr>
+          <p:spPr>
+            <a:xfrm rot="10800000">
+              <a:off x="3257551" y="-1524740"/>
+              <a:ext cx="3794760" cy="3794760"/>
+            </a:xfrm>
+            <a:prstGeom prst="blockArc">
+              <a:avLst>
+                <a:gd name="adj1" fmla="val 10800000"/>
+                <a:gd name="adj2" fmla="val 21446581"/>
+                <a:gd name="adj3" fmla="val 12191"/>
+              </a:avLst>
+            </a:prstGeom>
+            <a:solidFill>
+              <a:schemeClr val="bg1"/>
+            </a:solidFill>
+            <a:ln>
+              <a:noFill/>
+            </a:ln>
+          </p:spPr>
+          <p:style>
+            <a:lnRef idx="2">
+              <a:schemeClr val="accent1">
+                <a:shade val="15000"/>
+              </a:schemeClr>
+            </a:lnRef>
+            <a:fillRef idx="1">
+              <a:schemeClr val="accent1"/>
+            </a:fillRef>
+            <a:effectRef idx="0">
+              <a:schemeClr val="accent1"/>
+            </a:effectRef>
+            <a:fontRef idx="minor">
+              <a:schemeClr val="lt1"/>
+            </a:fontRef>
+          </p:style>
+          <p:txBody>
+            <a:bodyPr rtlCol="0" anchor="ctr"/>
+            <a:lstStyle/>
+            <a:p>
+              <a:pPr algn="ctr"/>
+              <a:endParaRPr lang="en-US">
+                <a:solidFill>
+                  <a:schemeClr val="tx1"/>
+                </a:solidFill>
+              </a:endParaRPr>
+            </a:p>
+          </p:txBody>
+        </p:sp>
+        <p:sp>
+          <p:nvSpPr>
+            <p:cNvPr id="6" name="Block Arc 5">
+              <a:extLst>
+                <a:ext uri="{FF2B5EF4-FFF2-40B4-BE49-F238E27FC236}">
+                  <a16:creationId xmlns:a16="http://schemas.microsoft.com/office/drawing/2014/main" id="{29D7F097-F14F-D5E2-B838-BBA71CEFD41E}"/>
+                </a:ext>
+              </a:extLst>
+            </p:cNvPr>
+            <p:cNvSpPr/>
+            <p:nvPr/>
+          </p:nvSpPr>
+          <p:spPr>
+            <a:xfrm>
+              <a:off x="3257551" y="4418860"/>
+              <a:ext cx="3794760" cy="3794760"/>
+            </a:xfrm>
+            <a:prstGeom prst="blockArc">
+              <a:avLst>
+                <a:gd name="adj1" fmla="val 10800000"/>
+                <a:gd name="adj2" fmla="val 21446581"/>
+                <a:gd name="adj3" fmla="val 12191"/>
+              </a:avLst>
+            </a:prstGeom>
+            <a:solidFill>
+              <a:schemeClr val="bg1"/>
+            </a:solidFill>
+            <a:ln>
+              <a:noFill/>
+            </a:ln>
+          </p:spPr>
+          <p:style>
+            <a:lnRef idx="2">
+              <a:schemeClr val="accent1">
+                <a:shade val="15000"/>
+              </a:schemeClr>
+            </a:lnRef>
+            <a:fillRef idx="1">
+              <a:schemeClr val="accent1"/>
+            </a:fillRef>
+            <a:effectRef idx="0">
+              <a:schemeClr val="accent1"/>
+            </a:effectRef>
+            <a:fontRef idx="minor">
+              <a:schemeClr val="lt1"/>
+            </a:fontRef>
+          </p:style>
+          <p:txBody>
+            <a:bodyPr rtlCol="0" anchor="ctr"/>
+            <a:lstStyle/>
+            <a:p>
+              <a:pPr algn="ctr"/>
+              <a:endParaRPr lang="en-US">
+                <a:solidFill>
+                  <a:schemeClr val="tx1"/>
+                </a:solidFill>
+              </a:endParaRPr>
+            </a:p>
+          </p:txBody>
+        </p:sp>
+      </p:grpSp>
+    </p:spTree>
+    <p:extLst>
+      <p:ext uri="{BB962C8B-B14F-4D97-AF65-F5344CB8AC3E}">
+        <p14:creationId xmlns:p14="http://schemas.microsoft.com/office/powerpoint/2010/main" val="1168435779"/>
+      </p:ext>
+    </p:extLst>
+  </p:cSld>
+  <p:clrMapOvr>
+    <a:masterClrMapping/>
+  </p:clrMapOvr>
+</p:sld>
+</file>
+
+<file path=ppt/slides/slide9.xml><?xml version="1.0" encoding="utf-8"?>
+<p:sld xmlns:a="http://schemas.openxmlformats.org/drawingml/2006/main" xmlns:r="http://schemas.openxmlformats.org/officeDocument/2006/relationships" xmlns:p="http://schemas.openxmlformats.org/presentationml/2006/main">
+  <p:cSld>
+    <p:spTree>
+      <p:nvGrpSpPr>
+        <p:cNvPr id="1" name=""/>
+        <p:cNvGrpSpPr/>
+        <p:nvPr/>
+      </p:nvGrpSpPr>
+      <p:grpSpPr>
+        <a:xfrm>
+          <a:off x="0" y="0"/>
+          <a:ext cx="0" cy="0"/>
+          <a:chOff x="0" y="0"/>
+          <a:chExt cx="0" cy="0"/>
+        </a:xfrm>
+      </p:grpSpPr>
       <p:sp>
         <p:nvSpPr>
           <p:cNvPr id="40" name="Flowchart: Process 39">

</xml_diff>

<commit_message>
added visualization image on the right
</commit_message>
<xml_diff>
--- a/assets/Symbols.pptx
+++ b/assets/Symbols.pptx
@@ -14,6 +14,8 @@
     <p:sldId id="263" r:id="rId8"/>
     <p:sldId id="264" r:id="rId9"/>
     <p:sldId id="262" r:id="rId10"/>
+    <p:sldId id="265" r:id="rId11"/>
+    <p:sldId id="266" r:id="rId12"/>
   </p:sldIdLst>
   <p:sldSz cx="12192000" cy="6858000"/>
   <p:notesSz cx="6858000" cy="9144000"/>
@@ -113,6 +115,29 @@
     </a:lvl9pPr>
   </p:defaultTextStyle>
   <p:extLst>
+    <p:ext uri="{521415D9-36F7-43E2-AB2F-B90AF26B5E84}">
+      <p14:sectionLst xmlns:p14="http://schemas.microsoft.com/office/powerpoint/2010/main">
+        <p14:section name="Default Section" id="{38632366-32DF-48AF-9E0D-877BB898AE31}">
+          <p14:sldIdLst>
+            <p14:sldId id="256"/>
+            <p14:sldId id="257"/>
+            <p14:sldId id="258"/>
+            <p14:sldId id="259"/>
+            <p14:sldId id="260"/>
+            <p14:sldId id="261"/>
+            <p14:sldId id="263"/>
+            <p14:sldId id="264"/>
+            <p14:sldId id="262"/>
+          </p14:sldIdLst>
+        </p14:section>
+        <p14:section name="Visualization" id="{1F30AE69-C85B-4FAD-9417-D01F2C216FAF}">
+          <p14:sldIdLst>
+            <p14:sldId id="265"/>
+            <p14:sldId id="266"/>
+          </p14:sldIdLst>
+        </p14:section>
+      </p14:sectionLst>
+    </p:ext>
     <p:ext uri="{EFAFB233-063F-42B5-8137-9DF3F51BA10A}">
       <p15:sldGuideLst xmlns:p15="http://schemas.microsoft.com/office/powerpoint/2012/main"/>
     </p:ext>
@@ -267,7 +292,7 @@
           <a:p>
             <a:fld id="{573B54DB-A8B2-4954-9DC1-E1741E23BC56}" type="datetimeFigureOut">
               <a:rPr lang="en-US" smtClean="0"/>
-              <a:t>8/15/2024</a:t>
+              <a:t>10/6/2024</a:t>
             </a:fld>
             <a:endParaRPr lang="en-US"/>
           </a:p>
@@ -465,7 +490,7 @@
           <a:p>
             <a:fld id="{573B54DB-A8B2-4954-9DC1-E1741E23BC56}" type="datetimeFigureOut">
               <a:rPr lang="en-US" smtClean="0"/>
-              <a:t>8/15/2024</a:t>
+              <a:t>10/6/2024</a:t>
             </a:fld>
             <a:endParaRPr lang="en-US"/>
           </a:p>
@@ -673,7 +698,7 @@
           <a:p>
             <a:fld id="{573B54DB-A8B2-4954-9DC1-E1741E23BC56}" type="datetimeFigureOut">
               <a:rPr lang="en-US" smtClean="0"/>
-              <a:t>8/15/2024</a:t>
+              <a:t>10/6/2024</a:t>
             </a:fld>
             <a:endParaRPr lang="en-US"/>
           </a:p>
@@ -871,7 +896,7 @@
           <a:p>
             <a:fld id="{573B54DB-A8B2-4954-9DC1-E1741E23BC56}" type="datetimeFigureOut">
               <a:rPr lang="en-US" smtClean="0"/>
-              <a:t>8/15/2024</a:t>
+              <a:t>10/6/2024</a:t>
             </a:fld>
             <a:endParaRPr lang="en-US"/>
           </a:p>
@@ -1146,7 +1171,7 @@
           <a:p>
             <a:fld id="{573B54DB-A8B2-4954-9DC1-E1741E23BC56}" type="datetimeFigureOut">
               <a:rPr lang="en-US" smtClean="0"/>
-              <a:t>8/15/2024</a:t>
+              <a:t>10/6/2024</a:t>
             </a:fld>
             <a:endParaRPr lang="en-US"/>
           </a:p>
@@ -1411,7 +1436,7 @@
           <a:p>
             <a:fld id="{573B54DB-A8B2-4954-9DC1-E1741E23BC56}" type="datetimeFigureOut">
               <a:rPr lang="en-US" smtClean="0"/>
-              <a:t>8/15/2024</a:t>
+              <a:t>10/6/2024</a:t>
             </a:fld>
             <a:endParaRPr lang="en-US"/>
           </a:p>
@@ -1823,7 +1848,7 @@
           <a:p>
             <a:fld id="{573B54DB-A8B2-4954-9DC1-E1741E23BC56}" type="datetimeFigureOut">
               <a:rPr lang="en-US" smtClean="0"/>
-              <a:t>8/15/2024</a:t>
+              <a:t>10/6/2024</a:t>
             </a:fld>
             <a:endParaRPr lang="en-US"/>
           </a:p>
@@ -1964,7 +1989,7 @@
           <a:p>
             <a:fld id="{573B54DB-A8B2-4954-9DC1-E1741E23BC56}" type="datetimeFigureOut">
               <a:rPr lang="en-US" smtClean="0"/>
-              <a:t>8/15/2024</a:t>
+              <a:t>10/6/2024</a:t>
             </a:fld>
             <a:endParaRPr lang="en-US"/>
           </a:p>
@@ -2077,7 +2102,7 @@
           <a:p>
             <a:fld id="{573B54DB-A8B2-4954-9DC1-E1741E23BC56}" type="datetimeFigureOut">
               <a:rPr lang="en-US" smtClean="0"/>
-              <a:t>8/15/2024</a:t>
+              <a:t>10/6/2024</a:t>
             </a:fld>
             <a:endParaRPr lang="en-US"/>
           </a:p>
@@ -2388,7 +2413,7 @@
           <a:p>
             <a:fld id="{573B54DB-A8B2-4954-9DC1-E1741E23BC56}" type="datetimeFigureOut">
               <a:rPr lang="en-US" smtClean="0"/>
-              <a:t>8/15/2024</a:t>
+              <a:t>10/6/2024</a:t>
             </a:fld>
             <a:endParaRPr lang="en-US"/>
           </a:p>
@@ -2676,7 +2701,7 @@
           <a:p>
             <a:fld id="{573B54DB-A8B2-4954-9DC1-E1741E23BC56}" type="datetimeFigureOut">
               <a:rPr lang="en-US" smtClean="0"/>
-              <a:t>8/15/2024</a:t>
+              <a:t>10/6/2024</a:t>
             </a:fld>
             <a:endParaRPr lang="en-US"/>
           </a:p>
@@ -2917,7 +2942,7 @@
           <a:p>
             <a:fld id="{573B54DB-A8B2-4954-9DC1-E1741E23BC56}" type="datetimeFigureOut">
               <a:rPr lang="en-US" smtClean="0"/>
-              <a:t>8/15/2024</a:t>
+              <a:t>10/6/2024</a:t>
             </a:fld>
             <a:endParaRPr lang="en-US"/>
           </a:p>
@@ -3468,6 +3493,4410 @@
     <p:extLst>
       <p:ext uri="{BB962C8B-B14F-4D97-AF65-F5344CB8AC3E}">
         <p14:creationId xmlns:p14="http://schemas.microsoft.com/office/powerpoint/2010/main" val="238100706"/>
+      </p:ext>
+    </p:extLst>
+  </p:cSld>
+  <p:clrMapOvr>
+    <a:masterClrMapping/>
+  </p:clrMapOvr>
+</p:sld>
+</file>
+
+<file path=ppt/slides/slide10.xml><?xml version="1.0" encoding="utf-8"?>
+<p:sld xmlns:a="http://schemas.openxmlformats.org/drawingml/2006/main" xmlns:r="http://schemas.openxmlformats.org/officeDocument/2006/relationships" xmlns:p="http://schemas.openxmlformats.org/presentationml/2006/main">
+  <p:cSld>
+    <p:spTree>
+      <p:nvGrpSpPr>
+        <p:cNvPr id="1" name=""/>
+        <p:cNvGrpSpPr/>
+        <p:nvPr/>
+      </p:nvGrpSpPr>
+      <p:grpSpPr>
+        <a:xfrm>
+          <a:off x="0" y="0"/>
+          <a:ext cx="0" cy="0"/>
+          <a:chOff x="0" y="0"/>
+          <a:chExt cx="0" cy="0"/>
+        </a:xfrm>
+      </p:grpSpPr>
+      <p:grpSp>
+        <p:nvGrpSpPr>
+          <p:cNvPr id="21" name="Group 20">
+            <a:extLst>
+              <a:ext uri="{FF2B5EF4-FFF2-40B4-BE49-F238E27FC236}">
+                <a16:creationId xmlns:a16="http://schemas.microsoft.com/office/drawing/2014/main" id="{E07D8669-D19D-C073-5FCF-3B96BBDD4142}"/>
+              </a:ext>
+            </a:extLst>
+          </p:cNvPr>
+          <p:cNvGrpSpPr/>
+          <p:nvPr/>
+        </p:nvGrpSpPr>
+        <p:grpSpPr>
+          <a:xfrm>
+            <a:off x="691742" y="244788"/>
+            <a:ext cx="3657599" cy="5927834"/>
+            <a:chOff x="6808763" y="307850"/>
+            <a:chExt cx="3657599" cy="5927834"/>
+          </a:xfrm>
+        </p:grpSpPr>
+        <p:grpSp>
+          <p:nvGrpSpPr>
+            <p:cNvPr id="20" name="Group 19">
+              <a:extLst>
+                <a:ext uri="{FF2B5EF4-FFF2-40B4-BE49-F238E27FC236}">
+                  <a16:creationId xmlns:a16="http://schemas.microsoft.com/office/drawing/2014/main" id="{A14AEDEB-BE54-A19B-AB76-213E5F9DCC25}"/>
+                </a:ext>
+              </a:extLst>
+            </p:cNvPr>
+            <p:cNvGrpSpPr/>
+            <p:nvPr/>
+          </p:nvGrpSpPr>
+          <p:grpSpPr>
+            <a:xfrm>
+              <a:off x="6808763" y="307850"/>
+              <a:ext cx="3657599" cy="2194560"/>
+              <a:chOff x="6808763" y="307850"/>
+              <a:chExt cx="3657599" cy="2194560"/>
+            </a:xfrm>
+          </p:grpSpPr>
+          <p:sp>
+            <p:nvSpPr>
+              <p:cNvPr id="3" name="Rectangle 2">
+                <a:extLst>
+                  <a:ext uri="{FF2B5EF4-FFF2-40B4-BE49-F238E27FC236}">
+                    <a16:creationId xmlns:a16="http://schemas.microsoft.com/office/drawing/2014/main" id="{E9C6C8C9-9B28-20C1-1488-DA6B44237CBE}"/>
+                  </a:ext>
+                </a:extLst>
+              </p:cNvPr>
+              <p:cNvSpPr/>
+              <p:nvPr/>
+            </p:nvSpPr>
+            <p:spPr>
+              <a:xfrm>
+                <a:off x="6808763" y="307850"/>
+                <a:ext cx="731520" cy="731520"/>
+              </a:xfrm>
+              <a:prstGeom prst="rect">
+                <a:avLst/>
+              </a:prstGeom>
+              <a:solidFill>
+                <a:schemeClr val="accent2">
+                  <a:lumMod val="60000"/>
+                  <a:lumOff val="40000"/>
+                </a:schemeClr>
+              </a:solidFill>
+              <a:ln w="38100">
+                <a:solidFill>
+                  <a:schemeClr val="tx1"/>
+                </a:solidFill>
+              </a:ln>
+            </p:spPr>
+            <p:style>
+              <a:lnRef idx="2">
+                <a:schemeClr val="accent1">
+                  <a:shade val="15000"/>
+                </a:schemeClr>
+              </a:lnRef>
+              <a:fillRef idx="1">
+                <a:schemeClr val="accent1"/>
+              </a:fillRef>
+              <a:effectRef idx="0">
+                <a:schemeClr val="accent1"/>
+              </a:effectRef>
+              <a:fontRef idx="minor">
+                <a:schemeClr val="lt1"/>
+              </a:fontRef>
+            </p:style>
+            <p:txBody>
+              <a:bodyPr rtlCol="0" anchor="ctr"/>
+              <a:lstStyle/>
+              <a:p>
+                <a:pPr algn="ctr"/>
+                <a:r>
+                  <a:rPr lang="en-US" sz="2400" b="1" dirty="0">
+                    <a:solidFill>
+                      <a:schemeClr val="tx1"/>
+                    </a:solidFill>
+                  </a:rPr>
+                  <a:t>3</a:t>
+                </a:r>
+                <a:endParaRPr lang="en-US" b="1" dirty="0">
+                  <a:solidFill>
+                    <a:schemeClr val="tx1"/>
+                  </a:solidFill>
+                </a:endParaRPr>
+              </a:p>
+            </p:txBody>
+          </p:sp>
+          <p:sp>
+            <p:nvSpPr>
+              <p:cNvPr id="4" name="Rectangle 3">
+                <a:extLst>
+                  <a:ext uri="{FF2B5EF4-FFF2-40B4-BE49-F238E27FC236}">
+                    <a16:creationId xmlns:a16="http://schemas.microsoft.com/office/drawing/2014/main" id="{2C00CE87-2FC2-08E4-E89C-5147A75CC0E2}"/>
+                  </a:ext>
+                </a:extLst>
+              </p:cNvPr>
+              <p:cNvSpPr/>
+              <p:nvPr/>
+            </p:nvSpPr>
+            <p:spPr>
+              <a:xfrm>
+                <a:off x="7540283" y="307850"/>
+                <a:ext cx="731520" cy="731520"/>
+              </a:xfrm>
+              <a:prstGeom prst="rect">
+                <a:avLst/>
+              </a:prstGeom>
+              <a:solidFill>
+                <a:schemeClr val="accent2">
+                  <a:lumMod val="60000"/>
+                  <a:lumOff val="40000"/>
+                </a:schemeClr>
+              </a:solidFill>
+              <a:ln w="38100">
+                <a:solidFill>
+                  <a:schemeClr val="tx1"/>
+                </a:solidFill>
+              </a:ln>
+            </p:spPr>
+            <p:style>
+              <a:lnRef idx="2">
+                <a:schemeClr val="accent1">
+                  <a:shade val="15000"/>
+                </a:schemeClr>
+              </a:lnRef>
+              <a:fillRef idx="1">
+                <a:schemeClr val="accent1"/>
+              </a:fillRef>
+              <a:effectRef idx="0">
+                <a:schemeClr val="accent1"/>
+              </a:effectRef>
+              <a:fontRef idx="minor">
+                <a:schemeClr val="lt1"/>
+              </a:fontRef>
+            </p:style>
+            <p:txBody>
+              <a:bodyPr rtlCol="0" anchor="ctr"/>
+              <a:lstStyle/>
+              <a:p>
+                <a:pPr algn="ctr"/>
+                <a:r>
+                  <a:rPr lang="en-US" sz="2400" b="1" dirty="0">
+                    <a:solidFill>
+                      <a:schemeClr val="tx1"/>
+                    </a:solidFill>
+                  </a:rPr>
+                  <a:t>2</a:t>
+                </a:r>
+                <a:endParaRPr lang="en-US" b="1" dirty="0">
+                  <a:solidFill>
+                    <a:schemeClr val="tx1"/>
+                  </a:solidFill>
+                </a:endParaRPr>
+              </a:p>
+            </p:txBody>
+          </p:sp>
+          <p:sp>
+            <p:nvSpPr>
+              <p:cNvPr id="5" name="Rectangle 4">
+                <a:extLst>
+                  <a:ext uri="{FF2B5EF4-FFF2-40B4-BE49-F238E27FC236}">
+                    <a16:creationId xmlns:a16="http://schemas.microsoft.com/office/drawing/2014/main" id="{C1DE1765-5677-1DEB-2A6D-DC5DE4D8330D}"/>
+                  </a:ext>
+                </a:extLst>
+              </p:cNvPr>
+              <p:cNvSpPr/>
+              <p:nvPr/>
+            </p:nvSpPr>
+            <p:spPr>
+              <a:xfrm>
+                <a:off x="8271803" y="307850"/>
+                <a:ext cx="731520" cy="731520"/>
+              </a:xfrm>
+              <a:prstGeom prst="rect">
+                <a:avLst/>
+              </a:prstGeom>
+              <a:noFill/>
+              <a:ln w="38100">
+                <a:solidFill>
+                  <a:schemeClr val="tx1"/>
+                </a:solidFill>
+              </a:ln>
+            </p:spPr>
+            <p:style>
+              <a:lnRef idx="2">
+                <a:schemeClr val="accent1">
+                  <a:shade val="15000"/>
+                </a:schemeClr>
+              </a:lnRef>
+              <a:fillRef idx="1">
+                <a:schemeClr val="accent1"/>
+              </a:fillRef>
+              <a:effectRef idx="0">
+                <a:schemeClr val="accent1"/>
+              </a:effectRef>
+              <a:fontRef idx="minor">
+                <a:schemeClr val="lt1"/>
+              </a:fontRef>
+            </p:style>
+            <p:txBody>
+              <a:bodyPr rtlCol="0" anchor="ctr"/>
+              <a:lstStyle/>
+              <a:p>
+                <a:pPr algn="ctr"/>
+                <a:r>
+                  <a:rPr lang="en-US" sz="2400" b="1" dirty="0">
+                    <a:solidFill>
+                      <a:schemeClr val="tx1"/>
+                    </a:solidFill>
+                  </a:rPr>
+                  <a:t>4</a:t>
+                </a:r>
+                <a:endParaRPr lang="en-US" b="1" dirty="0">
+                  <a:solidFill>
+                    <a:schemeClr val="tx1"/>
+                  </a:solidFill>
+                </a:endParaRPr>
+              </a:p>
+            </p:txBody>
+          </p:sp>
+          <p:sp>
+            <p:nvSpPr>
+              <p:cNvPr id="6" name="Rectangle 5">
+                <a:extLst>
+                  <a:ext uri="{FF2B5EF4-FFF2-40B4-BE49-F238E27FC236}">
+                    <a16:creationId xmlns:a16="http://schemas.microsoft.com/office/drawing/2014/main" id="{9C4F9088-41F9-A857-1EA7-543881E222E9}"/>
+                  </a:ext>
+                </a:extLst>
+              </p:cNvPr>
+              <p:cNvSpPr/>
+              <p:nvPr/>
+            </p:nvSpPr>
+            <p:spPr>
+              <a:xfrm>
+                <a:off x="9003322" y="307850"/>
+                <a:ext cx="731520" cy="731520"/>
+              </a:xfrm>
+              <a:prstGeom prst="rect">
+                <a:avLst/>
+              </a:prstGeom>
+              <a:noFill/>
+              <a:ln w="38100">
+                <a:solidFill>
+                  <a:schemeClr val="tx1"/>
+                </a:solidFill>
+              </a:ln>
+            </p:spPr>
+            <p:style>
+              <a:lnRef idx="2">
+                <a:schemeClr val="accent1">
+                  <a:shade val="15000"/>
+                </a:schemeClr>
+              </a:lnRef>
+              <a:fillRef idx="1">
+                <a:schemeClr val="accent1"/>
+              </a:fillRef>
+              <a:effectRef idx="0">
+                <a:schemeClr val="accent1"/>
+              </a:effectRef>
+              <a:fontRef idx="minor">
+                <a:schemeClr val="lt1"/>
+              </a:fontRef>
+            </p:style>
+            <p:txBody>
+              <a:bodyPr rtlCol="0" anchor="ctr"/>
+              <a:lstStyle/>
+              <a:p>
+                <a:pPr algn="ctr"/>
+                <a:r>
+                  <a:rPr lang="en-US" sz="2400" b="1" dirty="0">
+                    <a:solidFill>
+                      <a:schemeClr val="tx1"/>
+                    </a:solidFill>
+                  </a:rPr>
+                  <a:t>1</a:t>
+                </a:r>
+                <a:endParaRPr lang="en-US" b="1" dirty="0">
+                  <a:solidFill>
+                    <a:schemeClr val="tx1"/>
+                  </a:solidFill>
+                </a:endParaRPr>
+              </a:p>
+            </p:txBody>
+          </p:sp>
+          <p:sp>
+            <p:nvSpPr>
+              <p:cNvPr id="7" name="Rectangle 6">
+                <a:extLst>
+                  <a:ext uri="{FF2B5EF4-FFF2-40B4-BE49-F238E27FC236}">
+                    <a16:creationId xmlns:a16="http://schemas.microsoft.com/office/drawing/2014/main" id="{BBABD0BF-4CB5-8D50-D648-96D3B50D3878}"/>
+                  </a:ext>
+                </a:extLst>
+              </p:cNvPr>
+              <p:cNvSpPr/>
+              <p:nvPr/>
+            </p:nvSpPr>
+            <p:spPr>
+              <a:xfrm>
+                <a:off x="9734842" y="307850"/>
+                <a:ext cx="731520" cy="731520"/>
+              </a:xfrm>
+              <a:prstGeom prst="rect">
+                <a:avLst/>
+              </a:prstGeom>
+              <a:noFill/>
+              <a:ln w="38100">
+                <a:solidFill>
+                  <a:schemeClr val="tx1"/>
+                </a:solidFill>
+              </a:ln>
+            </p:spPr>
+            <p:style>
+              <a:lnRef idx="2">
+                <a:schemeClr val="accent1">
+                  <a:shade val="15000"/>
+                </a:schemeClr>
+              </a:lnRef>
+              <a:fillRef idx="1">
+                <a:schemeClr val="accent1"/>
+              </a:fillRef>
+              <a:effectRef idx="0">
+                <a:schemeClr val="accent1"/>
+              </a:effectRef>
+              <a:fontRef idx="minor">
+                <a:schemeClr val="lt1"/>
+              </a:fontRef>
+            </p:style>
+            <p:txBody>
+              <a:bodyPr rtlCol="0" anchor="ctr"/>
+              <a:lstStyle/>
+              <a:p>
+                <a:pPr algn="ctr"/>
+                <a:r>
+                  <a:rPr lang="en-US" sz="2400" b="1" dirty="0">
+                    <a:solidFill>
+                      <a:schemeClr val="tx1"/>
+                    </a:solidFill>
+                  </a:rPr>
+                  <a:t>5</a:t>
+                </a:r>
+                <a:endParaRPr lang="en-US" b="1" dirty="0">
+                  <a:solidFill>
+                    <a:schemeClr val="tx1"/>
+                  </a:solidFill>
+                </a:endParaRPr>
+              </a:p>
+            </p:txBody>
+          </p:sp>
+          <p:sp>
+            <p:nvSpPr>
+              <p:cNvPr id="9" name="Rectangle 8">
+                <a:extLst>
+                  <a:ext uri="{FF2B5EF4-FFF2-40B4-BE49-F238E27FC236}">
+                    <a16:creationId xmlns:a16="http://schemas.microsoft.com/office/drawing/2014/main" id="{FBE82AE9-4161-58A8-85C9-C037D623A1B3}"/>
+                  </a:ext>
+                </a:extLst>
+              </p:cNvPr>
+              <p:cNvSpPr/>
+              <p:nvPr/>
+            </p:nvSpPr>
+            <p:spPr>
+              <a:xfrm>
+                <a:off x="6808763" y="1039370"/>
+                <a:ext cx="731520" cy="731520"/>
+              </a:xfrm>
+              <a:prstGeom prst="rect">
+                <a:avLst/>
+              </a:prstGeom>
+              <a:noFill/>
+              <a:ln w="38100">
+                <a:solidFill>
+                  <a:schemeClr val="tx1"/>
+                </a:solidFill>
+              </a:ln>
+            </p:spPr>
+            <p:style>
+              <a:lnRef idx="2">
+                <a:schemeClr val="accent1">
+                  <a:shade val="15000"/>
+                </a:schemeClr>
+              </a:lnRef>
+              <a:fillRef idx="1">
+                <a:schemeClr val="accent1"/>
+              </a:fillRef>
+              <a:effectRef idx="0">
+                <a:schemeClr val="accent1"/>
+              </a:effectRef>
+              <a:fontRef idx="minor">
+                <a:schemeClr val="lt1"/>
+              </a:fontRef>
+            </p:style>
+            <p:txBody>
+              <a:bodyPr rtlCol="0" anchor="ctr"/>
+              <a:lstStyle/>
+              <a:p>
+                <a:pPr algn="ctr"/>
+                <a:r>
+                  <a:rPr lang="en-US" sz="2400" b="1" dirty="0">
+                    <a:solidFill>
+                      <a:schemeClr val="tx1"/>
+                    </a:solidFill>
+                  </a:rPr>
+                  <a:t>2</a:t>
+                </a:r>
+                <a:endParaRPr lang="en-US" b="1" dirty="0">
+                  <a:solidFill>
+                    <a:schemeClr val="tx1"/>
+                  </a:solidFill>
+                </a:endParaRPr>
+              </a:p>
+            </p:txBody>
+          </p:sp>
+          <p:sp>
+            <p:nvSpPr>
+              <p:cNvPr id="10" name="Rectangle 9">
+                <a:extLst>
+                  <a:ext uri="{FF2B5EF4-FFF2-40B4-BE49-F238E27FC236}">
+                    <a16:creationId xmlns:a16="http://schemas.microsoft.com/office/drawing/2014/main" id="{A30CBD1E-2B19-9DB3-DC83-91DE1D200754}"/>
+                  </a:ext>
+                </a:extLst>
+              </p:cNvPr>
+              <p:cNvSpPr/>
+              <p:nvPr/>
+            </p:nvSpPr>
+            <p:spPr>
+              <a:xfrm>
+                <a:off x="7540283" y="1039370"/>
+                <a:ext cx="731520" cy="731520"/>
+              </a:xfrm>
+              <a:prstGeom prst="rect">
+                <a:avLst/>
+              </a:prstGeom>
+              <a:solidFill>
+                <a:schemeClr val="accent2">
+                  <a:lumMod val="20000"/>
+                  <a:lumOff val="80000"/>
+                </a:schemeClr>
+              </a:solidFill>
+              <a:ln w="38100">
+                <a:solidFill>
+                  <a:schemeClr val="tx1"/>
+                </a:solidFill>
+              </a:ln>
+            </p:spPr>
+            <p:style>
+              <a:lnRef idx="2">
+                <a:schemeClr val="accent1">
+                  <a:shade val="15000"/>
+                </a:schemeClr>
+              </a:lnRef>
+              <a:fillRef idx="1">
+                <a:schemeClr val="accent1"/>
+              </a:fillRef>
+              <a:effectRef idx="0">
+                <a:schemeClr val="accent1"/>
+              </a:effectRef>
+              <a:fontRef idx="minor">
+                <a:schemeClr val="lt1"/>
+              </a:fontRef>
+            </p:style>
+            <p:txBody>
+              <a:bodyPr rtlCol="0" anchor="ctr"/>
+              <a:lstStyle/>
+              <a:p>
+                <a:pPr algn="ctr"/>
+                <a:r>
+                  <a:rPr lang="en-US" sz="2400" b="1" dirty="0">
+                    <a:solidFill>
+                      <a:schemeClr val="tx1"/>
+                    </a:solidFill>
+                  </a:rPr>
+                  <a:t>3</a:t>
+                </a:r>
+                <a:endParaRPr lang="en-US" b="1" dirty="0">
+                  <a:solidFill>
+                    <a:schemeClr val="tx1"/>
+                  </a:solidFill>
+                </a:endParaRPr>
+              </a:p>
+            </p:txBody>
+          </p:sp>
+          <p:sp>
+            <p:nvSpPr>
+              <p:cNvPr id="11" name="Rectangle 10">
+                <a:extLst>
+                  <a:ext uri="{FF2B5EF4-FFF2-40B4-BE49-F238E27FC236}">
+                    <a16:creationId xmlns:a16="http://schemas.microsoft.com/office/drawing/2014/main" id="{E156B53E-5BA5-149A-33B8-3311351684EC}"/>
+                  </a:ext>
+                </a:extLst>
+              </p:cNvPr>
+              <p:cNvSpPr/>
+              <p:nvPr/>
+            </p:nvSpPr>
+            <p:spPr>
+              <a:xfrm>
+                <a:off x="8271803" y="1039370"/>
+                <a:ext cx="731520" cy="731520"/>
+              </a:xfrm>
+              <a:prstGeom prst="rect">
+                <a:avLst/>
+              </a:prstGeom>
+              <a:solidFill>
+                <a:schemeClr val="accent2">
+                  <a:lumMod val="20000"/>
+                  <a:lumOff val="80000"/>
+                </a:schemeClr>
+              </a:solidFill>
+              <a:ln w="38100">
+                <a:solidFill>
+                  <a:schemeClr val="tx1"/>
+                </a:solidFill>
+              </a:ln>
+            </p:spPr>
+            <p:style>
+              <a:lnRef idx="2">
+                <a:schemeClr val="accent1">
+                  <a:shade val="15000"/>
+                </a:schemeClr>
+              </a:lnRef>
+              <a:fillRef idx="1">
+                <a:schemeClr val="accent1"/>
+              </a:fillRef>
+              <a:effectRef idx="0">
+                <a:schemeClr val="accent1"/>
+              </a:effectRef>
+              <a:fontRef idx="minor">
+                <a:schemeClr val="lt1"/>
+              </a:fontRef>
+            </p:style>
+            <p:txBody>
+              <a:bodyPr rtlCol="0" anchor="ctr"/>
+              <a:lstStyle/>
+              <a:p>
+                <a:pPr algn="ctr"/>
+                <a:r>
+                  <a:rPr lang="en-US" sz="2400" b="1" dirty="0">
+                    <a:solidFill>
+                      <a:schemeClr val="tx1"/>
+                    </a:solidFill>
+                  </a:rPr>
+                  <a:t>4</a:t>
+                </a:r>
+                <a:endParaRPr lang="en-US" b="1" dirty="0">
+                  <a:solidFill>
+                    <a:schemeClr val="tx1"/>
+                  </a:solidFill>
+                </a:endParaRPr>
+              </a:p>
+            </p:txBody>
+          </p:sp>
+          <p:sp>
+            <p:nvSpPr>
+              <p:cNvPr id="12" name="Rectangle 11">
+                <a:extLst>
+                  <a:ext uri="{FF2B5EF4-FFF2-40B4-BE49-F238E27FC236}">
+                    <a16:creationId xmlns:a16="http://schemas.microsoft.com/office/drawing/2014/main" id="{077FAB8F-66BF-0E86-4667-7B0970D4B7FA}"/>
+                  </a:ext>
+                </a:extLst>
+              </p:cNvPr>
+              <p:cNvSpPr/>
+              <p:nvPr/>
+            </p:nvSpPr>
+            <p:spPr>
+              <a:xfrm>
+                <a:off x="9003322" y="1039370"/>
+                <a:ext cx="731520" cy="731520"/>
+              </a:xfrm>
+              <a:prstGeom prst="rect">
+                <a:avLst/>
+              </a:prstGeom>
+              <a:noFill/>
+              <a:ln w="38100">
+                <a:solidFill>
+                  <a:schemeClr val="tx1"/>
+                </a:solidFill>
+              </a:ln>
+            </p:spPr>
+            <p:style>
+              <a:lnRef idx="2">
+                <a:schemeClr val="accent1">
+                  <a:shade val="15000"/>
+                </a:schemeClr>
+              </a:lnRef>
+              <a:fillRef idx="1">
+                <a:schemeClr val="accent1"/>
+              </a:fillRef>
+              <a:effectRef idx="0">
+                <a:schemeClr val="accent1"/>
+              </a:effectRef>
+              <a:fontRef idx="minor">
+                <a:schemeClr val="lt1"/>
+              </a:fontRef>
+            </p:style>
+            <p:txBody>
+              <a:bodyPr rtlCol="0" anchor="ctr"/>
+              <a:lstStyle/>
+              <a:p>
+                <a:pPr algn="ctr"/>
+                <a:r>
+                  <a:rPr lang="en-US" sz="2400" b="1" dirty="0">
+                    <a:solidFill>
+                      <a:schemeClr val="tx1"/>
+                    </a:solidFill>
+                  </a:rPr>
+                  <a:t>1</a:t>
+                </a:r>
+                <a:endParaRPr lang="en-US" b="1" dirty="0">
+                  <a:solidFill>
+                    <a:schemeClr val="tx1"/>
+                  </a:solidFill>
+                </a:endParaRPr>
+              </a:p>
+            </p:txBody>
+          </p:sp>
+          <p:sp>
+            <p:nvSpPr>
+              <p:cNvPr id="13" name="Rectangle 12">
+                <a:extLst>
+                  <a:ext uri="{FF2B5EF4-FFF2-40B4-BE49-F238E27FC236}">
+                    <a16:creationId xmlns:a16="http://schemas.microsoft.com/office/drawing/2014/main" id="{621C7678-4579-B762-284A-CB495D6477EB}"/>
+                  </a:ext>
+                </a:extLst>
+              </p:cNvPr>
+              <p:cNvSpPr/>
+              <p:nvPr/>
+            </p:nvSpPr>
+            <p:spPr>
+              <a:xfrm>
+                <a:off x="9734842" y="1039370"/>
+                <a:ext cx="731520" cy="731520"/>
+              </a:xfrm>
+              <a:prstGeom prst="rect">
+                <a:avLst/>
+              </a:prstGeom>
+              <a:noFill/>
+              <a:ln w="38100">
+                <a:solidFill>
+                  <a:schemeClr val="tx1"/>
+                </a:solidFill>
+              </a:ln>
+            </p:spPr>
+            <p:style>
+              <a:lnRef idx="2">
+                <a:schemeClr val="accent1">
+                  <a:shade val="15000"/>
+                </a:schemeClr>
+              </a:lnRef>
+              <a:fillRef idx="1">
+                <a:schemeClr val="accent1"/>
+              </a:fillRef>
+              <a:effectRef idx="0">
+                <a:schemeClr val="accent1"/>
+              </a:effectRef>
+              <a:fontRef idx="minor">
+                <a:schemeClr val="lt1"/>
+              </a:fontRef>
+            </p:style>
+            <p:txBody>
+              <a:bodyPr rtlCol="0" anchor="ctr"/>
+              <a:lstStyle/>
+              <a:p>
+                <a:pPr algn="ctr"/>
+                <a:r>
+                  <a:rPr lang="en-US" sz="2400" b="1" dirty="0">
+                    <a:solidFill>
+                      <a:schemeClr val="tx1"/>
+                    </a:solidFill>
+                  </a:rPr>
+                  <a:t>5</a:t>
+                </a:r>
+                <a:endParaRPr lang="en-US" b="1" dirty="0">
+                  <a:solidFill>
+                    <a:schemeClr val="tx1"/>
+                  </a:solidFill>
+                </a:endParaRPr>
+              </a:p>
+            </p:txBody>
+          </p:sp>
+          <p:sp>
+            <p:nvSpPr>
+              <p:cNvPr id="14" name="Rectangle 13">
+                <a:extLst>
+                  <a:ext uri="{FF2B5EF4-FFF2-40B4-BE49-F238E27FC236}">
+                    <a16:creationId xmlns:a16="http://schemas.microsoft.com/office/drawing/2014/main" id="{D354A083-1A92-D7FB-2C6A-86B3BEC2F274}"/>
+                  </a:ext>
+                </a:extLst>
+              </p:cNvPr>
+              <p:cNvSpPr/>
+              <p:nvPr/>
+            </p:nvSpPr>
+            <p:spPr>
+              <a:xfrm>
+                <a:off x="6808763" y="1770890"/>
+                <a:ext cx="731520" cy="731520"/>
+              </a:xfrm>
+              <a:prstGeom prst="rect">
+                <a:avLst/>
+              </a:prstGeom>
+              <a:noFill/>
+              <a:ln w="38100">
+                <a:solidFill>
+                  <a:schemeClr val="tx1"/>
+                </a:solidFill>
+              </a:ln>
+            </p:spPr>
+            <p:style>
+              <a:lnRef idx="2">
+                <a:schemeClr val="accent1">
+                  <a:shade val="15000"/>
+                </a:schemeClr>
+              </a:lnRef>
+              <a:fillRef idx="1">
+                <a:schemeClr val="accent1"/>
+              </a:fillRef>
+              <a:effectRef idx="0">
+                <a:schemeClr val="accent1"/>
+              </a:effectRef>
+              <a:fontRef idx="minor">
+                <a:schemeClr val="lt1"/>
+              </a:fontRef>
+            </p:style>
+            <p:txBody>
+              <a:bodyPr rtlCol="0" anchor="ctr"/>
+              <a:lstStyle/>
+              <a:p>
+                <a:pPr algn="ctr"/>
+                <a:r>
+                  <a:rPr lang="en-US" sz="2400" b="1" dirty="0">
+                    <a:solidFill>
+                      <a:schemeClr val="tx1"/>
+                    </a:solidFill>
+                  </a:rPr>
+                  <a:t>2</a:t>
+                </a:r>
+                <a:endParaRPr lang="en-US" b="1" dirty="0">
+                  <a:solidFill>
+                    <a:schemeClr val="tx1"/>
+                  </a:solidFill>
+                </a:endParaRPr>
+              </a:p>
+            </p:txBody>
+          </p:sp>
+          <p:sp>
+            <p:nvSpPr>
+              <p:cNvPr id="15" name="Rectangle 14">
+                <a:extLst>
+                  <a:ext uri="{FF2B5EF4-FFF2-40B4-BE49-F238E27FC236}">
+                    <a16:creationId xmlns:a16="http://schemas.microsoft.com/office/drawing/2014/main" id="{61B56399-A1E0-75B4-CE31-7C3C43633AB5}"/>
+                  </a:ext>
+                </a:extLst>
+              </p:cNvPr>
+              <p:cNvSpPr/>
+              <p:nvPr/>
+            </p:nvSpPr>
+            <p:spPr>
+              <a:xfrm>
+                <a:off x="7540283" y="1770890"/>
+                <a:ext cx="731520" cy="731520"/>
+              </a:xfrm>
+              <a:prstGeom prst="rect">
+                <a:avLst/>
+              </a:prstGeom>
+              <a:noFill/>
+              <a:ln w="38100">
+                <a:solidFill>
+                  <a:schemeClr val="tx1"/>
+                </a:solidFill>
+              </a:ln>
+            </p:spPr>
+            <p:style>
+              <a:lnRef idx="2">
+                <a:schemeClr val="accent1">
+                  <a:shade val="15000"/>
+                </a:schemeClr>
+              </a:lnRef>
+              <a:fillRef idx="1">
+                <a:schemeClr val="accent1"/>
+              </a:fillRef>
+              <a:effectRef idx="0">
+                <a:schemeClr val="accent1"/>
+              </a:effectRef>
+              <a:fontRef idx="minor">
+                <a:schemeClr val="lt1"/>
+              </a:fontRef>
+            </p:style>
+            <p:txBody>
+              <a:bodyPr rtlCol="0" anchor="ctr"/>
+              <a:lstStyle/>
+              <a:p>
+                <a:pPr algn="ctr"/>
+                <a:r>
+                  <a:rPr lang="en-US" sz="2400" b="1" dirty="0">
+                    <a:solidFill>
+                      <a:schemeClr val="tx1"/>
+                    </a:solidFill>
+                  </a:rPr>
+                  <a:t>3</a:t>
+                </a:r>
+                <a:endParaRPr lang="en-US" b="1" dirty="0">
+                  <a:solidFill>
+                    <a:schemeClr val="tx1"/>
+                  </a:solidFill>
+                </a:endParaRPr>
+              </a:p>
+            </p:txBody>
+          </p:sp>
+          <p:sp>
+            <p:nvSpPr>
+              <p:cNvPr id="16" name="Rectangle 15">
+                <a:extLst>
+                  <a:ext uri="{FF2B5EF4-FFF2-40B4-BE49-F238E27FC236}">
+                    <a16:creationId xmlns:a16="http://schemas.microsoft.com/office/drawing/2014/main" id="{8EA7D209-CEAA-3878-BC18-D86332D49E69}"/>
+                  </a:ext>
+                </a:extLst>
+              </p:cNvPr>
+              <p:cNvSpPr/>
+              <p:nvPr/>
+            </p:nvSpPr>
+            <p:spPr>
+              <a:xfrm>
+                <a:off x="8271803" y="1770890"/>
+                <a:ext cx="731520" cy="731520"/>
+              </a:xfrm>
+              <a:prstGeom prst="rect">
+                <a:avLst/>
+              </a:prstGeom>
+              <a:solidFill>
+                <a:schemeClr val="accent2">
+                  <a:lumMod val="60000"/>
+                  <a:lumOff val="40000"/>
+                </a:schemeClr>
+              </a:solidFill>
+              <a:ln w="38100">
+                <a:solidFill>
+                  <a:schemeClr val="tx1"/>
+                </a:solidFill>
+              </a:ln>
+            </p:spPr>
+            <p:style>
+              <a:lnRef idx="2">
+                <a:schemeClr val="accent1">
+                  <a:shade val="15000"/>
+                </a:schemeClr>
+              </a:lnRef>
+              <a:fillRef idx="1">
+                <a:schemeClr val="accent1"/>
+              </a:fillRef>
+              <a:effectRef idx="0">
+                <a:schemeClr val="accent1"/>
+              </a:effectRef>
+              <a:fontRef idx="minor">
+                <a:schemeClr val="lt1"/>
+              </a:fontRef>
+            </p:style>
+            <p:txBody>
+              <a:bodyPr rtlCol="0" anchor="ctr"/>
+              <a:lstStyle/>
+              <a:p>
+                <a:pPr algn="ctr"/>
+                <a:r>
+                  <a:rPr lang="en-US" sz="2400" b="1" dirty="0">
+                    <a:solidFill>
+                      <a:schemeClr val="tx1"/>
+                    </a:solidFill>
+                  </a:rPr>
+                  <a:t>4</a:t>
+                </a:r>
+                <a:endParaRPr lang="en-US" b="1" dirty="0">
+                  <a:solidFill>
+                    <a:schemeClr val="tx1"/>
+                  </a:solidFill>
+                </a:endParaRPr>
+              </a:p>
+            </p:txBody>
+          </p:sp>
+          <p:sp>
+            <p:nvSpPr>
+              <p:cNvPr id="17" name="Rectangle 16">
+                <a:extLst>
+                  <a:ext uri="{FF2B5EF4-FFF2-40B4-BE49-F238E27FC236}">
+                    <a16:creationId xmlns:a16="http://schemas.microsoft.com/office/drawing/2014/main" id="{C7BF3452-9BA2-9E2C-BA09-1B274A13E99E}"/>
+                  </a:ext>
+                </a:extLst>
+              </p:cNvPr>
+              <p:cNvSpPr/>
+              <p:nvPr/>
+            </p:nvSpPr>
+            <p:spPr>
+              <a:xfrm>
+                <a:off x="9003322" y="1770890"/>
+                <a:ext cx="731520" cy="731520"/>
+              </a:xfrm>
+              <a:prstGeom prst="rect">
+                <a:avLst/>
+              </a:prstGeom>
+              <a:solidFill>
+                <a:schemeClr val="accent2">
+                  <a:lumMod val="60000"/>
+                  <a:lumOff val="40000"/>
+                </a:schemeClr>
+              </a:solidFill>
+              <a:ln w="38100">
+                <a:solidFill>
+                  <a:schemeClr val="tx1"/>
+                </a:solidFill>
+              </a:ln>
+            </p:spPr>
+            <p:style>
+              <a:lnRef idx="2">
+                <a:schemeClr val="accent1">
+                  <a:shade val="15000"/>
+                </a:schemeClr>
+              </a:lnRef>
+              <a:fillRef idx="1">
+                <a:schemeClr val="accent1"/>
+              </a:fillRef>
+              <a:effectRef idx="0">
+                <a:schemeClr val="accent1"/>
+              </a:effectRef>
+              <a:fontRef idx="minor">
+                <a:schemeClr val="lt1"/>
+              </a:fontRef>
+            </p:style>
+            <p:txBody>
+              <a:bodyPr rtlCol="0" anchor="ctr"/>
+              <a:lstStyle/>
+              <a:p>
+                <a:pPr algn="ctr"/>
+                <a:r>
+                  <a:rPr lang="en-US" sz="2400" b="1" dirty="0">
+                    <a:solidFill>
+                      <a:schemeClr val="tx1"/>
+                    </a:solidFill>
+                  </a:rPr>
+                  <a:t>1</a:t>
+                </a:r>
+                <a:endParaRPr lang="en-US" b="1" dirty="0">
+                  <a:solidFill>
+                    <a:schemeClr val="tx1"/>
+                  </a:solidFill>
+                </a:endParaRPr>
+              </a:p>
+            </p:txBody>
+          </p:sp>
+          <p:sp>
+            <p:nvSpPr>
+              <p:cNvPr id="18" name="Rectangle 17">
+                <a:extLst>
+                  <a:ext uri="{FF2B5EF4-FFF2-40B4-BE49-F238E27FC236}">
+                    <a16:creationId xmlns:a16="http://schemas.microsoft.com/office/drawing/2014/main" id="{4CCC6559-9B1D-4200-DE4B-4263A2A36A26}"/>
+                  </a:ext>
+                </a:extLst>
+              </p:cNvPr>
+              <p:cNvSpPr/>
+              <p:nvPr/>
+            </p:nvSpPr>
+            <p:spPr>
+              <a:xfrm>
+                <a:off x="9734842" y="1770890"/>
+                <a:ext cx="731520" cy="731520"/>
+              </a:xfrm>
+              <a:prstGeom prst="rect">
+                <a:avLst/>
+              </a:prstGeom>
+              <a:noFill/>
+              <a:ln w="38100">
+                <a:solidFill>
+                  <a:schemeClr val="tx1"/>
+                </a:solidFill>
+              </a:ln>
+            </p:spPr>
+            <p:style>
+              <a:lnRef idx="2">
+                <a:schemeClr val="accent1">
+                  <a:shade val="15000"/>
+                </a:schemeClr>
+              </a:lnRef>
+              <a:fillRef idx="1">
+                <a:schemeClr val="accent1"/>
+              </a:fillRef>
+              <a:effectRef idx="0">
+                <a:schemeClr val="accent1"/>
+              </a:effectRef>
+              <a:fontRef idx="minor">
+                <a:schemeClr val="lt1"/>
+              </a:fontRef>
+            </p:style>
+            <p:txBody>
+              <a:bodyPr rtlCol="0" anchor="ctr"/>
+              <a:lstStyle/>
+              <a:p>
+                <a:pPr algn="ctr"/>
+                <a:r>
+                  <a:rPr lang="en-US" sz="2400" b="1" dirty="0">
+                    <a:solidFill>
+                      <a:schemeClr val="tx1"/>
+                    </a:solidFill>
+                  </a:rPr>
+                  <a:t>5</a:t>
+                </a:r>
+                <a:endParaRPr lang="en-US" b="1" dirty="0">
+                  <a:solidFill>
+                    <a:schemeClr val="tx1"/>
+                  </a:solidFill>
+                </a:endParaRPr>
+              </a:p>
+            </p:txBody>
+          </p:sp>
+        </p:grpSp>
+        <p:sp>
+          <p:nvSpPr>
+            <p:cNvPr id="19" name="Rectangle 18">
+              <a:extLst>
+                <a:ext uri="{FF2B5EF4-FFF2-40B4-BE49-F238E27FC236}">
+                  <a16:creationId xmlns:a16="http://schemas.microsoft.com/office/drawing/2014/main" id="{0F37C781-9595-3C6C-B5D6-F0DF46180D50}"/>
+                </a:ext>
+              </a:extLst>
+            </p:cNvPr>
+            <p:cNvSpPr/>
+            <p:nvPr/>
+          </p:nvSpPr>
+          <p:spPr>
+            <a:xfrm>
+              <a:off x="6808763" y="1065808"/>
+              <a:ext cx="3657599" cy="5169876"/>
+            </a:xfrm>
+            <a:prstGeom prst="rect">
+              <a:avLst/>
+            </a:prstGeom>
+            <a:solidFill>
+              <a:schemeClr val="bg1"/>
+            </a:solidFill>
+            <a:ln w="38100">
+              <a:solidFill>
+                <a:schemeClr val="bg1"/>
+              </a:solidFill>
+            </a:ln>
+          </p:spPr>
+          <p:style>
+            <a:lnRef idx="2">
+              <a:schemeClr val="accent1">
+                <a:shade val="15000"/>
+              </a:schemeClr>
+            </a:lnRef>
+            <a:fillRef idx="1">
+              <a:schemeClr val="accent1"/>
+            </a:fillRef>
+            <a:effectRef idx="0">
+              <a:schemeClr val="accent1"/>
+            </a:effectRef>
+            <a:fontRef idx="minor">
+              <a:schemeClr val="lt1"/>
+            </a:fontRef>
+          </p:style>
+          <p:txBody>
+            <a:bodyPr rtlCol="0" anchor="ctr"/>
+            <a:lstStyle/>
+            <a:p>
+              <a:pPr algn="ctr"/>
+              <a:endParaRPr lang="en-US"/>
+            </a:p>
+          </p:txBody>
+        </p:sp>
+      </p:grpSp>
+      <p:grpSp>
+        <p:nvGrpSpPr>
+          <p:cNvPr id="22" name="Group 21">
+            <a:extLst>
+              <a:ext uri="{FF2B5EF4-FFF2-40B4-BE49-F238E27FC236}">
+                <a16:creationId xmlns:a16="http://schemas.microsoft.com/office/drawing/2014/main" id="{B894CA2C-DA8C-6125-C4AF-B818B4FB017A}"/>
+              </a:ext>
+            </a:extLst>
+          </p:cNvPr>
+          <p:cNvGrpSpPr/>
+          <p:nvPr/>
+        </p:nvGrpSpPr>
+        <p:grpSpPr>
+          <a:xfrm>
+            <a:off x="4485976" y="244788"/>
+            <a:ext cx="3657599" cy="5927834"/>
+            <a:chOff x="6808763" y="307850"/>
+            <a:chExt cx="3657599" cy="5927834"/>
+          </a:xfrm>
+        </p:grpSpPr>
+        <p:grpSp>
+          <p:nvGrpSpPr>
+            <p:cNvPr id="23" name="Group 22">
+              <a:extLst>
+                <a:ext uri="{FF2B5EF4-FFF2-40B4-BE49-F238E27FC236}">
+                  <a16:creationId xmlns:a16="http://schemas.microsoft.com/office/drawing/2014/main" id="{992E412D-95C8-895A-332A-81EB6DDEB27F}"/>
+                </a:ext>
+              </a:extLst>
+            </p:cNvPr>
+            <p:cNvGrpSpPr/>
+            <p:nvPr/>
+          </p:nvGrpSpPr>
+          <p:grpSpPr>
+            <a:xfrm>
+              <a:off x="6808763" y="307850"/>
+              <a:ext cx="3657599" cy="2194560"/>
+              <a:chOff x="6808763" y="307850"/>
+              <a:chExt cx="3657599" cy="2194560"/>
+            </a:xfrm>
+          </p:grpSpPr>
+          <p:sp>
+            <p:nvSpPr>
+              <p:cNvPr id="25" name="Rectangle 24">
+                <a:extLst>
+                  <a:ext uri="{FF2B5EF4-FFF2-40B4-BE49-F238E27FC236}">
+                    <a16:creationId xmlns:a16="http://schemas.microsoft.com/office/drawing/2014/main" id="{FD381D9F-602D-26BF-F927-CE5DF89FF419}"/>
+                  </a:ext>
+                </a:extLst>
+              </p:cNvPr>
+              <p:cNvSpPr/>
+              <p:nvPr/>
+            </p:nvSpPr>
+            <p:spPr>
+              <a:xfrm>
+                <a:off x="6808763" y="307850"/>
+                <a:ext cx="731520" cy="731520"/>
+              </a:xfrm>
+              <a:prstGeom prst="rect">
+                <a:avLst/>
+              </a:prstGeom>
+              <a:solidFill>
+                <a:schemeClr val="accent2">
+                  <a:lumMod val="60000"/>
+                  <a:lumOff val="40000"/>
+                </a:schemeClr>
+              </a:solidFill>
+              <a:ln w="38100">
+                <a:solidFill>
+                  <a:schemeClr val="tx1"/>
+                </a:solidFill>
+              </a:ln>
+            </p:spPr>
+            <p:style>
+              <a:lnRef idx="2">
+                <a:schemeClr val="accent1">
+                  <a:shade val="15000"/>
+                </a:schemeClr>
+              </a:lnRef>
+              <a:fillRef idx="1">
+                <a:schemeClr val="accent1"/>
+              </a:fillRef>
+              <a:effectRef idx="0">
+                <a:schemeClr val="accent1"/>
+              </a:effectRef>
+              <a:fontRef idx="minor">
+                <a:schemeClr val="lt1"/>
+              </a:fontRef>
+            </p:style>
+            <p:txBody>
+              <a:bodyPr rtlCol="0" anchor="ctr"/>
+              <a:lstStyle/>
+              <a:p>
+                <a:pPr algn="ctr"/>
+                <a:r>
+                  <a:rPr lang="en-US" sz="2400" b="1" dirty="0">
+                    <a:solidFill>
+                      <a:schemeClr val="tx1"/>
+                    </a:solidFill>
+                  </a:rPr>
+                  <a:t>3</a:t>
+                </a:r>
+                <a:endParaRPr lang="en-US" b="1" dirty="0">
+                  <a:solidFill>
+                    <a:schemeClr val="tx1"/>
+                  </a:solidFill>
+                </a:endParaRPr>
+              </a:p>
+            </p:txBody>
+          </p:sp>
+          <p:sp>
+            <p:nvSpPr>
+              <p:cNvPr id="26" name="Rectangle 25">
+                <a:extLst>
+                  <a:ext uri="{FF2B5EF4-FFF2-40B4-BE49-F238E27FC236}">
+                    <a16:creationId xmlns:a16="http://schemas.microsoft.com/office/drawing/2014/main" id="{207371EB-4C35-899A-82A0-691A8AE4AC43}"/>
+                  </a:ext>
+                </a:extLst>
+              </p:cNvPr>
+              <p:cNvSpPr/>
+              <p:nvPr/>
+            </p:nvSpPr>
+            <p:spPr>
+              <a:xfrm>
+                <a:off x="7540283" y="307850"/>
+                <a:ext cx="731520" cy="731520"/>
+              </a:xfrm>
+              <a:prstGeom prst="rect">
+                <a:avLst/>
+              </a:prstGeom>
+              <a:solidFill>
+                <a:schemeClr val="accent2">
+                  <a:lumMod val="60000"/>
+                  <a:lumOff val="40000"/>
+                </a:schemeClr>
+              </a:solidFill>
+              <a:ln w="38100">
+                <a:solidFill>
+                  <a:schemeClr val="tx1"/>
+                </a:solidFill>
+              </a:ln>
+            </p:spPr>
+            <p:style>
+              <a:lnRef idx="2">
+                <a:schemeClr val="accent1">
+                  <a:shade val="15000"/>
+                </a:schemeClr>
+              </a:lnRef>
+              <a:fillRef idx="1">
+                <a:schemeClr val="accent1"/>
+              </a:fillRef>
+              <a:effectRef idx="0">
+                <a:schemeClr val="accent1"/>
+              </a:effectRef>
+              <a:fontRef idx="minor">
+                <a:schemeClr val="lt1"/>
+              </a:fontRef>
+            </p:style>
+            <p:txBody>
+              <a:bodyPr rtlCol="0" anchor="ctr"/>
+              <a:lstStyle/>
+              <a:p>
+                <a:pPr algn="ctr"/>
+                <a:r>
+                  <a:rPr lang="en-US" sz="2400" b="1" dirty="0">
+                    <a:solidFill>
+                      <a:schemeClr val="tx1"/>
+                    </a:solidFill>
+                  </a:rPr>
+                  <a:t>2</a:t>
+                </a:r>
+                <a:endParaRPr lang="en-US" b="1" dirty="0">
+                  <a:solidFill>
+                    <a:schemeClr val="tx1"/>
+                  </a:solidFill>
+                </a:endParaRPr>
+              </a:p>
+            </p:txBody>
+          </p:sp>
+          <p:sp>
+            <p:nvSpPr>
+              <p:cNvPr id="27" name="Rectangle 26">
+                <a:extLst>
+                  <a:ext uri="{FF2B5EF4-FFF2-40B4-BE49-F238E27FC236}">
+                    <a16:creationId xmlns:a16="http://schemas.microsoft.com/office/drawing/2014/main" id="{802F55AE-B755-20FD-2764-520CEC86D82C}"/>
+                  </a:ext>
+                </a:extLst>
+              </p:cNvPr>
+              <p:cNvSpPr/>
+              <p:nvPr/>
+            </p:nvSpPr>
+            <p:spPr>
+              <a:xfrm>
+                <a:off x="8271803" y="307850"/>
+                <a:ext cx="731520" cy="731520"/>
+              </a:xfrm>
+              <a:prstGeom prst="rect">
+                <a:avLst/>
+              </a:prstGeom>
+              <a:noFill/>
+              <a:ln w="38100">
+                <a:solidFill>
+                  <a:schemeClr val="tx1"/>
+                </a:solidFill>
+              </a:ln>
+            </p:spPr>
+            <p:style>
+              <a:lnRef idx="2">
+                <a:schemeClr val="accent1">
+                  <a:shade val="15000"/>
+                </a:schemeClr>
+              </a:lnRef>
+              <a:fillRef idx="1">
+                <a:schemeClr val="accent1"/>
+              </a:fillRef>
+              <a:effectRef idx="0">
+                <a:schemeClr val="accent1"/>
+              </a:effectRef>
+              <a:fontRef idx="minor">
+                <a:schemeClr val="lt1"/>
+              </a:fontRef>
+            </p:style>
+            <p:txBody>
+              <a:bodyPr rtlCol="0" anchor="ctr"/>
+              <a:lstStyle/>
+              <a:p>
+                <a:pPr algn="ctr"/>
+                <a:r>
+                  <a:rPr lang="en-US" sz="2400" b="1" dirty="0">
+                    <a:solidFill>
+                      <a:schemeClr val="tx1"/>
+                    </a:solidFill>
+                  </a:rPr>
+                  <a:t>4</a:t>
+                </a:r>
+                <a:endParaRPr lang="en-US" b="1" dirty="0">
+                  <a:solidFill>
+                    <a:schemeClr val="tx1"/>
+                  </a:solidFill>
+                </a:endParaRPr>
+              </a:p>
+            </p:txBody>
+          </p:sp>
+          <p:sp>
+            <p:nvSpPr>
+              <p:cNvPr id="28" name="Rectangle 27">
+                <a:extLst>
+                  <a:ext uri="{FF2B5EF4-FFF2-40B4-BE49-F238E27FC236}">
+                    <a16:creationId xmlns:a16="http://schemas.microsoft.com/office/drawing/2014/main" id="{D3D6AE26-7A0D-AB53-6FFF-C46CF6158510}"/>
+                  </a:ext>
+                </a:extLst>
+              </p:cNvPr>
+              <p:cNvSpPr/>
+              <p:nvPr/>
+            </p:nvSpPr>
+            <p:spPr>
+              <a:xfrm>
+                <a:off x="9003322" y="307850"/>
+                <a:ext cx="731520" cy="731520"/>
+              </a:xfrm>
+              <a:prstGeom prst="rect">
+                <a:avLst/>
+              </a:prstGeom>
+              <a:noFill/>
+              <a:ln w="38100">
+                <a:solidFill>
+                  <a:schemeClr val="tx1"/>
+                </a:solidFill>
+              </a:ln>
+            </p:spPr>
+            <p:style>
+              <a:lnRef idx="2">
+                <a:schemeClr val="accent1">
+                  <a:shade val="15000"/>
+                </a:schemeClr>
+              </a:lnRef>
+              <a:fillRef idx="1">
+                <a:schemeClr val="accent1"/>
+              </a:fillRef>
+              <a:effectRef idx="0">
+                <a:schemeClr val="accent1"/>
+              </a:effectRef>
+              <a:fontRef idx="minor">
+                <a:schemeClr val="lt1"/>
+              </a:fontRef>
+            </p:style>
+            <p:txBody>
+              <a:bodyPr rtlCol="0" anchor="ctr"/>
+              <a:lstStyle/>
+              <a:p>
+                <a:pPr algn="ctr"/>
+                <a:r>
+                  <a:rPr lang="en-US" sz="2400" b="1" dirty="0">
+                    <a:solidFill>
+                      <a:schemeClr val="tx1"/>
+                    </a:solidFill>
+                  </a:rPr>
+                  <a:t>1</a:t>
+                </a:r>
+                <a:endParaRPr lang="en-US" b="1" dirty="0">
+                  <a:solidFill>
+                    <a:schemeClr val="tx1"/>
+                  </a:solidFill>
+                </a:endParaRPr>
+              </a:p>
+            </p:txBody>
+          </p:sp>
+          <p:sp>
+            <p:nvSpPr>
+              <p:cNvPr id="29" name="Rectangle 28">
+                <a:extLst>
+                  <a:ext uri="{FF2B5EF4-FFF2-40B4-BE49-F238E27FC236}">
+                    <a16:creationId xmlns:a16="http://schemas.microsoft.com/office/drawing/2014/main" id="{B747B9F5-63C5-3B96-40CE-89DA35F69856}"/>
+                  </a:ext>
+                </a:extLst>
+              </p:cNvPr>
+              <p:cNvSpPr/>
+              <p:nvPr/>
+            </p:nvSpPr>
+            <p:spPr>
+              <a:xfrm>
+                <a:off x="9734842" y="307850"/>
+                <a:ext cx="731520" cy="731520"/>
+              </a:xfrm>
+              <a:prstGeom prst="rect">
+                <a:avLst/>
+              </a:prstGeom>
+              <a:noFill/>
+              <a:ln w="38100">
+                <a:solidFill>
+                  <a:schemeClr val="tx1"/>
+                </a:solidFill>
+              </a:ln>
+            </p:spPr>
+            <p:style>
+              <a:lnRef idx="2">
+                <a:schemeClr val="accent1">
+                  <a:shade val="15000"/>
+                </a:schemeClr>
+              </a:lnRef>
+              <a:fillRef idx="1">
+                <a:schemeClr val="accent1"/>
+              </a:fillRef>
+              <a:effectRef idx="0">
+                <a:schemeClr val="accent1"/>
+              </a:effectRef>
+              <a:fontRef idx="minor">
+                <a:schemeClr val="lt1"/>
+              </a:fontRef>
+            </p:style>
+            <p:txBody>
+              <a:bodyPr rtlCol="0" anchor="ctr"/>
+              <a:lstStyle/>
+              <a:p>
+                <a:pPr algn="ctr"/>
+                <a:r>
+                  <a:rPr lang="en-US" sz="2400" b="1" dirty="0">
+                    <a:solidFill>
+                      <a:schemeClr val="tx1"/>
+                    </a:solidFill>
+                  </a:rPr>
+                  <a:t>5</a:t>
+                </a:r>
+                <a:endParaRPr lang="en-US" b="1" dirty="0">
+                  <a:solidFill>
+                    <a:schemeClr val="tx1"/>
+                  </a:solidFill>
+                </a:endParaRPr>
+              </a:p>
+            </p:txBody>
+          </p:sp>
+          <p:sp>
+            <p:nvSpPr>
+              <p:cNvPr id="30" name="Rectangle 29">
+                <a:extLst>
+                  <a:ext uri="{FF2B5EF4-FFF2-40B4-BE49-F238E27FC236}">
+                    <a16:creationId xmlns:a16="http://schemas.microsoft.com/office/drawing/2014/main" id="{09CCEE6E-EDDD-F705-6E21-2B80E4CA4F7F}"/>
+                  </a:ext>
+                </a:extLst>
+              </p:cNvPr>
+              <p:cNvSpPr/>
+              <p:nvPr/>
+            </p:nvSpPr>
+            <p:spPr>
+              <a:xfrm>
+                <a:off x="6808763" y="1039370"/>
+                <a:ext cx="731520" cy="731520"/>
+              </a:xfrm>
+              <a:prstGeom prst="rect">
+                <a:avLst/>
+              </a:prstGeom>
+              <a:noFill/>
+              <a:ln w="38100">
+                <a:solidFill>
+                  <a:schemeClr val="tx1"/>
+                </a:solidFill>
+              </a:ln>
+            </p:spPr>
+            <p:style>
+              <a:lnRef idx="2">
+                <a:schemeClr val="accent1">
+                  <a:shade val="15000"/>
+                </a:schemeClr>
+              </a:lnRef>
+              <a:fillRef idx="1">
+                <a:schemeClr val="accent1"/>
+              </a:fillRef>
+              <a:effectRef idx="0">
+                <a:schemeClr val="accent1"/>
+              </a:effectRef>
+              <a:fontRef idx="minor">
+                <a:schemeClr val="lt1"/>
+              </a:fontRef>
+            </p:style>
+            <p:txBody>
+              <a:bodyPr rtlCol="0" anchor="ctr"/>
+              <a:lstStyle/>
+              <a:p>
+                <a:pPr algn="ctr"/>
+                <a:r>
+                  <a:rPr lang="en-US" sz="2400" b="1" dirty="0">
+                    <a:solidFill>
+                      <a:schemeClr val="tx1"/>
+                    </a:solidFill>
+                  </a:rPr>
+                  <a:t>2</a:t>
+                </a:r>
+                <a:endParaRPr lang="en-US" b="1" dirty="0">
+                  <a:solidFill>
+                    <a:schemeClr val="tx1"/>
+                  </a:solidFill>
+                </a:endParaRPr>
+              </a:p>
+            </p:txBody>
+          </p:sp>
+          <p:sp>
+            <p:nvSpPr>
+              <p:cNvPr id="31" name="Rectangle 30">
+                <a:extLst>
+                  <a:ext uri="{FF2B5EF4-FFF2-40B4-BE49-F238E27FC236}">
+                    <a16:creationId xmlns:a16="http://schemas.microsoft.com/office/drawing/2014/main" id="{46098AC4-703D-6213-F88B-AA8927926FA2}"/>
+                  </a:ext>
+                </a:extLst>
+              </p:cNvPr>
+              <p:cNvSpPr/>
+              <p:nvPr/>
+            </p:nvSpPr>
+            <p:spPr>
+              <a:xfrm>
+                <a:off x="7540283" y="1039370"/>
+                <a:ext cx="731520" cy="731520"/>
+              </a:xfrm>
+              <a:prstGeom prst="rect">
+                <a:avLst/>
+              </a:prstGeom>
+              <a:solidFill>
+                <a:schemeClr val="accent2">
+                  <a:lumMod val="20000"/>
+                  <a:lumOff val="80000"/>
+                </a:schemeClr>
+              </a:solidFill>
+              <a:ln w="38100">
+                <a:solidFill>
+                  <a:schemeClr val="tx1"/>
+                </a:solidFill>
+              </a:ln>
+            </p:spPr>
+            <p:style>
+              <a:lnRef idx="2">
+                <a:schemeClr val="accent1">
+                  <a:shade val="15000"/>
+                </a:schemeClr>
+              </a:lnRef>
+              <a:fillRef idx="1">
+                <a:schemeClr val="accent1"/>
+              </a:fillRef>
+              <a:effectRef idx="0">
+                <a:schemeClr val="accent1"/>
+              </a:effectRef>
+              <a:fontRef idx="minor">
+                <a:schemeClr val="lt1"/>
+              </a:fontRef>
+            </p:style>
+            <p:txBody>
+              <a:bodyPr rtlCol="0" anchor="ctr"/>
+              <a:lstStyle/>
+              <a:p>
+                <a:pPr algn="ctr"/>
+                <a:r>
+                  <a:rPr lang="en-US" sz="2400" b="1" dirty="0">
+                    <a:solidFill>
+                      <a:schemeClr val="tx1"/>
+                    </a:solidFill>
+                  </a:rPr>
+                  <a:t>3</a:t>
+                </a:r>
+                <a:endParaRPr lang="en-US" b="1" dirty="0">
+                  <a:solidFill>
+                    <a:schemeClr val="tx1"/>
+                  </a:solidFill>
+                </a:endParaRPr>
+              </a:p>
+            </p:txBody>
+          </p:sp>
+          <p:sp>
+            <p:nvSpPr>
+              <p:cNvPr id="32" name="Rectangle 31">
+                <a:extLst>
+                  <a:ext uri="{FF2B5EF4-FFF2-40B4-BE49-F238E27FC236}">
+                    <a16:creationId xmlns:a16="http://schemas.microsoft.com/office/drawing/2014/main" id="{F65E227F-FBB5-AB3D-EC53-826390776EB7}"/>
+                  </a:ext>
+                </a:extLst>
+              </p:cNvPr>
+              <p:cNvSpPr/>
+              <p:nvPr/>
+            </p:nvSpPr>
+            <p:spPr>
+              <a:xfrm>
+                <a:off x="8271803" y="1039370"/>
+                <a:ext cx="731520" cy="731520"/>
+              </a:xfrm>
+              <a:prstGeom prst="rect">
+                <a:avLst/>
+              </a:prstGeom>
+              <a:solidFill>
+                <a:schemeClr val="accent2">
+                  <a:lumMod val="20000"/>
+                  <a:lumOff val="80000"/>
+                </a:schemeClr>
+              </a:solidFill>
+              <a:ln w="38100">
+                <a:solidFill>
+                  <a:schemeClr val="tx1"/>
+                </a:solidFill>
+              </a:ln>
+            </p:spPr>
+            <p:style>
+              <a:lnRef idx="2">
+                <a:schemeClr val="accent1">
+                  <a:shade val="15000"/>
+                </a:schemeClr>
+              </a:lnRef>
+              <a:fillRef idx="1">
+                <a:schemeClr val="accent1"/>
+              </a:fillRef>
+              <a:effectRef idx="0">
+                <a:schemeClr val="accent1"/>
+              </a:effectRef>
+              <a:fontRef idx="minor">
+                <a:schemeClr val="lt1"/>
+              </a:fontRef>
+            </p:style>
+            <p:txBody>
+              <a:bodyPr rtlCol="0" anchor="ctr"/>
+              <a:lstStyle/>
+              <a:p>
+                <a:pPr algn="ctr"/>
+                <a:r>
+                  <a:rPr lang="en-US" sz="2400" b="1" dirty="0">
+                    <a:solidFill>
+                      <a:schemeClr val="tx1"/>
+                    </a:solidFill>
+                  </a:rPr>
+                  <a:t>4</a:t>
+                </a:r>
+                <a:endParaRPr lang="en-US" b="1" dirty="0">
+                  <a:solidFill>
+                    <a:schemeClr val="tx1"/>
+                  </a:solidFill>
+                </a:endParaRPr>
+              </a:p>
+            </p:txBody>
+          </p:sp>
+          <p:sp>
+            <p:nvSpPr>
+              <p:cNvPr id="33" name="Rectangle 32">
+                <a:extLst>
+                  <a:ext uri="{FF2B5EF4-FFF2-40B4-BE49-F238E27FC236}">
+                    <a16:creationId xmlns:a16="http://schemas.microsoft.com/office/drawing/2014/main" id="{86805DBA-D7CF-29CF-89BB-B5A07D1F1CCD}"/>
+                  </a:ext>
+                </a:extLst>
+              </p:cNvPr>
+              <p:cNvSpPr/>
+              <p:nvPr/>
+            </p:nvSpPr>
+            <p:spPr>
+              <a:xfrm>
+                <a:off x="9003322" y="1039370"/>
+                <a:ext cx="731520" cy="731520"/>
+              </a:xfrm>
+              <a:prstGeom prst="rect">
+                <a:avLst/>
+              </a:prstGeom>
+              <a:noFill/>
+              <a:ln w="38100">
+                <a:solidFill>
+                  <a:schemeClr val="tx1"/>
+                </a:solidFill>
+              </a:ln>
+            </p:spPr>
+            <p:style>
+              <a:lnRef idx="2">
+                <a:schemeClr val="accent1">
+                  <a:shade val="15000"/>
+                </a:schemeClr>
+              </a:lnRef>
+              <a:fillRef idx="1">
+                <a:schemeClr val="accent1"/>
+              </a:fillRef>
+              <a:effectRef idx="0">
+                <a:schemeClr val="accent1"/>
+              </a:effectRef>
+              <a:fontRef idx="minor">
+                <a:schemeClr val="lt1"/>
+              </a:fontRef>
+            </p:style>
+            <p:txBody>
+              <a:bodyPr rtlCol="0" anchor="ctr"/>
+              <a:lstStyle/>
+              <a:p>
+                <a:pPr algn="ctr"/>
+                <a:r>
+                  <a:rPr lang="en-US" sz="2400" b="1" dirty="0">
+                    <a:solidFill>
+                      <a:schemeClr val="tx1"/>
+                    </a:solidFill>
+                  </a:rPr>
+                  <a:t>1</a:t>
+                </a:r>
+                <a:endParaRPr lang="en-US" b="1" dirty="0">
+                  <a:solidFill>
+                    <a:schemeClr val="tx1"/>
+                  </a:solidFill>
+                </a:endParaRPr>
+              </a:p>
+            </p:txBody>
+          </p:sp>
+          <p:sp>
+            <p:nvSpPr>
+              <p:cNvPr id="34" name="Rectangle 33">
+                <a:extLst>
+                  <a:ext uri="{FF2B5EF4-FFF2-40B4-BE49-F238E27FC236}">
+                    <a16:creationId xmlns:a16="http://schemas.microsoft.com/office/drawing/2014/main" id="{158AA851-0DEA-97FB-BC8B-44E48BA56D61}"/>
+                  </a:ext>
+                </a:extLst>
+              </p:cNvPr>
+              <p:cNvSpPr/>
+              <p:nvPr/>
+            </p:nvSpPr>
+            <p:spPr>
+              <a:xfrm>
+                <a:off x="9734842" y="1039370"/>
+                <a:ext cx="731520" cy="731520"/>
+              </a:xfrm>
+              <a:prstGeom prst="rect">
+                <a:avLst/>
+              </a:prstGeom>
+              <a:noFill/>
+              <a:ln w="38100">
+                <a:solidFill>
+                  <a:schemeClr val="tx1"/>
+                </a:solidFill>
+              </a:ln>
+            </p:spPr>
+            <p:style>
+              <a:lnRef idx="2">
+                <a:schemeClr val="accent1">
+                  <a:shade val="15000"/>
+                </a:schemeClr>
+              </a:lnRef>
+              <a:fillRef idx="1">
+                <a:schemeClr val="accent1"/>
+              </a:fillRef>
+              <a:effectRef idx="0">
+                <a:schemeClr val="accent1"/>
+              </a:effectRef>
+              <a:fontRef idx="minor">
+                <a:schemeClr val="lt1"/>
+              </a:fontRef>
+            </p:style>
+            <p:txBody>
+              <a:bodyPr rtlCol="0" anchor="ctr"/>
+              <a:lstStyle/>
+              <a:p>
+                <a:pPr algn="ctr"/>
+                <a:r>
+                  <a:rPr lang="en-US" sz="2400" b="1" dirty="0">
+                    <a:solidFill>
+                      <a:schemeClr val="tx1"/>
+                    </a:solidFill>
+                  </a:rPr>
+                  <a:t>5</a:t>
+                </a:r>
+                <a:endParaRPr lang="en-US" b="1" dirty="0">
+                  <a:solidFill>
+                    <a:schemeClr val="tx1"/>
+                  </a:solidFill>
+                </a:endParaRPr>
+              </a:p>
+            </p:txBody>
+          </p:sp>
+          <p:sp>
+            <p:nvSpPr>
+              <p:cNvPr id="35" name="Rectangle 34">
+                <a:extLst>
+                  <a:ext uri="{FF2B5EF4-FFF2-40B4-BE49-F238E27FC236}">
+                    <a16:creationId xmlns:a16="http://schemas.microsoft.com/office/drawing/2014/main" id="{015FB6FC-C07D-66D6-B606-04F43BB827EF}"/>
+                  </a:ext>
+                </a:extLst>
+              </p:cNvPr>
+              <p:cNvSpPr/>
+              <p:nvPr/>
+            </p:nvSpPr>
+            <p:spPr>
+              <a:xfrm>
+                <a:off x="6808763" y="1770890"/>
+                <a:ext cx="731520" cy="731520"/>
+              </a:xfrm>
+              <a:prstGeom prst="rect">
+                <a:avLst/>
+              </a:prstGeom>
+              <a:noFill/>
+              <a:ln w="38100">
+                <a:solidFill>
+                  <a:schemeClr val="tx1"/>
+                </a:solidFill>
+              </a:ln>
+            </p:spPr>
+            <p:style>
+              <a:lnRef idx="2">
+                <a:schemeClr val="accent1">
+                  <a:shade val="15000"/>
+                </a:schemeClr>
+              </a:lnRef>
+              <a:fillRef idx="1">
+                <a:schemeClr val="accent1"/>
+              </a:fillRef>
+              <a:effectRef idx="0">
+                <a:schemeClr val="accent1"/>
+              </a:effectRef>
+              <a:fontRef idx="minor">
+                <a:schemeClr val="lt1"/>
+              </a:fontRef>
+            </p:style>
+            <p:txBody>
+              <a:bodyPr rtlCol="0" anchor="ctr"/>
+              <a:lstStyle/>
+              <a:p>
+                <a:pPr algn="ctr"/>
+                <a:r>
+                  <a:rPr lang="en-US" sz="2400" b="1" dirty="0">
+                    <a:solidFill>
+                      <a:schemeClr val="tx1"/>
+                    </a:solidFill>
+                  </a:rPr>
+                  <a:t>2</a:t>
+                </a:r>
+                <a:endParaRPr lang="en-US" b="1" dirty="0">
+                  <a:solidFill>
+                    <a:schemeClr val="tx1"/>
+                  </a:solidFill>
+                </a:endParaRPr>
+              </a:p>
+            </p:txBody>
+          </p:sp>
+          <p:sp>
+            <p:nvSpPr>
+              <p:cNvPr id="36" name="Rectangle 35">
+                <a:extLst>
+                  <a:ext uri="{FF2B5EF4-FFF2-40B4-BE49-F238E27FC236}">
+                    <a16:creationId xmlns:a16="http://schemas.microsoft.com/office/drawing/2014/main" id="{24A367CD-A6BC-799E-68D8-4491C19A6D21}"/>
+                  </a:ext>
+                </a:extLst>
+              </p:cNvPr>
+              <p:cNvSpPr/>
+              <p:nvPr/>
+            </p:nvSpPr>
+            <p:spPr>
+              <a:xfrm>
+                <a:off x="7540283" y="1770890"/>
+                <a:ext cx="731520" cy="731520"/>
+              </a:xfrm>
+              <a:prstGeom prst="rect">
+                <a:avLst/>
+              </a:prstGeom>
+              <a:noFill/>
+              <a:ln w="38100">
+                <a:solidFill>
+                  <a:schemeClr val="tx1"/>
+                </a:solidFill>
+              </a:ln>
+            </p:spPr>
+            <p:style>
+              <a:lnRef idx="2">
+                <a:schemeClr val="accent1">
+                  <a:shade val="15000"/>
+                </a:schemeClr>
+              </a:lnRef>
+              <a:fillRef idx="1">
+                <a:schemeClr val="accent1"/>
+              </a:fillRef>
+              <a:effectRef idx="0">
+                <a:schemeClr val="accent1"/>
+              </a:effectRef>
+              <a:fontRef idx="minor">
+                <a:schemeClr val="lt1"/>
+              </a:fontRef>
+            </p:style>
+            <p:txBody>
+              <a:bodyPr rtlCol="0" anchor="ctr"/>
+              <a:lstStyle/>
+              <a:p>
+                <a:pPr algn="ctr"/>
+                <a:r>
+                  <a:rPr lang="en-US" sz="2400" b="1" dirty="0">
+                    <a:solidFill>
+                      <a:schemeClr val="tx1"/>
+                    </a:solidFill>
+                  </a:rPr>
+                  <a:t>3</a:t>
+                </a:r>
+                <a:endParaRPr lang="en-US" b="1" dirty="0">
+                  <a:solidFill>
+                    <a:schemeClr val="tx1"/>
+                  </a:solidFill>
+                </a:endParaRPr>
+              </a:p>
+            </p:txBody>
+          </p:sp>
+          <p:sp>
+            <p:nvSpPr>
+              <p:cNvPr id="37" name="Rectangle 36">
+                <a:extLst>
+                  <a:ext uri="{FF2B5EF4-FFF2-40B4-BE49-F238E27FC236}">
+                    <a16:creationId xmlns:a16="http://schemas.microsoft.com/office/drawing/2014/main" id="{132FBD6F-A166-BA2D-FAA9-3CE2E9E05709}"/>
+                  </a:ext>
+                </a:extLst>
+              </p:cNvPr>
+              <p:cNvSpPr/>
+              <p:nvPr/>
+            </p:nvSpPr>
+            <p:spPr>
+              <a:xfrm>
+                <a:off x="8271803" y="1770890"/>
+                <a:ext cx="731520" cy="731520"/>
+              </a:xfrm>
+              <a:prstGeom prst="rect">
+                <a:avLst/>
+              </a:prstGeom>
+              <a:solidFill>
+                <a:schemeClr val="accent2">
+                  <a:lumMod val="60000"/>
+                  <a:lumOff val="40000"/>
+                </a:schemeClr>
+              </a:solidFill>
+              <a:ln w="38100">
+                <a:solidFill>
+                  <a:schemeClr val="tx1"/>
+                </a:solidFill>
+              </a:ln>
+            </p:spPr>
+            <p:style>
+              <a:lnRef idx="2">
+                <a:schemeClr val="accent1">
+                  <a:shade val="15000"/>
+                </a:schemeClr>
+              </a:lnRef>
+              <a:fillRef idx="1">
+                <a:schemeClr val="accent1"/>
+              </a:fillRef>
+              <a:effectRef idx="0">
+                <a:schemeClr val="accent1"/>
+              </a:effectRef>
+              <a:fontRef idx="minor">
+                <a:schemeClr val="lt1"/>
+              </a:fontRef>
+            </p:style>
+            <p:txBody>
+              <a:bodyPr rtlCol="0" anchor="ctr"/>
+              <a:lstStyle/>
+              <a:p>
+                <a:pPr algn="ctr"/>
+                <a:r>
+                  <a:rPr lang="en-US" sz="2400" b="1" dirty="0">
+                    <a:solidFill>
+                      <a:schemeClr val="tx1"/>
+                    </a:solidFill>
+                  </a:rPr>
+                  <a:t>4</a:t>
+                </a:r>
+                <a:endParaRPr lang="en-US" b="1" dirty="0">
+                  <a:solidFill>
+                    <a:schemeClr val="tx1"/>
+                  </a:solidFill>
+                </a:endParaRPr>
+              </a:p>
+            </p:txBody>
+          </p:sp>
+          <p:sp>
+            <p:nvSpPr>
+              <p:cNvPr id="38" name="Rectangle 37">
+                <a:extLst>
+                  <a:ext uri="{FF2B5EF4-FFF2-40B4-BE49-F238E27FC236}">
+                    <a16:creationId xmlns:a16="http://schemas.microsoft.com/office/drawing/2014/main" id="{A4E0E800-8D75-8415-7198-997909D4F1CE}"/>
+                  </a:ext>
+                </a:extLst>
+              </p:cNvPr>
+              <p:cNvSpPr/>
+              <p:nvPr/>
+            </p:nvSpPr>
+            <p:spPr>
+              <a:xfrm>
+                <a:off x="9003322" y="1770890"/>
+                <a:ext cx="731520" cy="731520"/>
+              </a:xfrm>
+              <a:prstGeom prst="rect">
+                <a:avLst/>
+              </a:prstGeom>
+              <a:solidFill>
+                <a:schemeClr val="accent2">
+                  <a:lumMod val="60000"/>
+                  <a:lumOff val="40000"/>
+                </a:schemeClr>
+              </a:solidFill>
+              <a:ln w="38100">
+                <a:solidFill>
+                  <a:schemeClr val="tx1"/>
+                </a:solidFill>
+              </a:ln>
+            </p:spPr>
+            <p:style>
+              <a:lnRef idx="2">
+                <a:schemeClr val="accent1">
+                  <a:shade val="15000"/>
+                </a:schemeClr>
+              </a:lnRef>
+              <a:fillRef idx="1">
+                <a:schemeClr val="accent1"/>
+              </a:fillRef>
+              <a:effectRef idx="0">
+                <a:schemeClr val="accent1"/>
+              </a:effectRef>
+              <a:fontRef idx="minor">
+                <a:schemeClr val="lt1"/>
+              </a:fontRef>
+            </p:style>
+            <p:txBody>
+              <a:bodyPr rtlCol="0" anchor="ctr"/>
+              <a:lstStyle/>
+              <a:p>
+                <a:pPr algn="ctr"/>
+                <a:r>
+                  <a:rPr lang="en-US" sz="2400" b="1" dirty="0">
+                    <a:solidFill>
+                      <a:schemeClr val="tx1"/>
+                    </a:solidFill>
+                  </a:rPr>
+                  <a:t>1</a:t>
+                </a:r>
+                <a:endParaRPr lang="en-US" b="1" dirty="0">
+                  <a:solidFill>
+                    <a:schemeClr val="tx1"/>
+                  </a:solidFill>
+                </a:endParaRPr>
+              </a:p>
+            </p:txBody>
+          </p:sp>
+          <p:sp>
+            <p:nvSpPr>
+              <p:cNvPr id="39" name="Rectangle 38">
+                <a:extLst>
+                  <a:ext uri="{FF2B5EF4-FFF2-40B4-BE49-F238E27FC236}">
+                    <a16:creationId xmlns:a16="http://schemas.microsoft.com/office/drawing/2014/main" id="{4D1B634F-234D-189F-C7B2-0709FA6FA66E}"/>
+                  </a:ext>
+                </a:extLst>
+              </p:cNvPr>
+              <p:cNvSpPr/>
+              <p:nvPr/>
+            </p:nvSpPr>
+            <p:spPr>
+              <a:xfrm>
+                <a:off x="9734842" y="1770890"/>
+                <a:ext cx="731520" cy="731520"/>
+              </a:xfrm>
+              <a:prstGeom prst="rect">
+                <a:avLst/>
+              </a:prstGeom>
+              <a:noFill/>
+              <a:ln w="38100">
+                <a:solidFill>
+                  <a:schemeClr val="tx1"/>
+                </a:solidFill>
+              </a:ln>
+            </p:spPr>
+            <p:style>
+              <a:lnRef idx="2">
+                <a:schemeClr val="accent1">
+                  <a:shade val="15000"/>
+                </a:schemeClr>
+              </a:lnRef>
+              <a:fillRef idx="1">
+                <a:schemeClr val="accent1"/>
+              </a:fillRef>
+              <a:effectRef idx="0">
+                <a:schemeClr val="accent1"/>
+              </a:effectRef>
+              <a:fontRef idx="minor">
+                <a:schemeClr val="lt1"/>
+              </a:fontRef>
+            </p:style>
+            <p:txBody>
+              <a:bodyPr rtlCol="0" anchor="ctr"/>
+              <a:lstStyle/>
+              <a:p>
+                <a:pPr algn="ctr"/>
+                <a:r>
+                  <a:rPr lang="en-US" sz="2400" b="1" dirty="0">
+                    <a:solidFill>
+                      <a:schemeClr val="tx1"/>
+                    </a:solidFill>
+                  </a:rPr>
+                  <a:t>5</a:t>
+                </a:r>
+                <a:endParaRPr lang="en-US" b="1" dirty="0">
+                  <a:solidFill>
+                    <a:schemeClr val="tx1"/>
+                  </a:solidFill>
+                </a:endParaRPr>
+              </a:p>
+            </p:txBody>
+          </p:sp>
+        </p:grpSp>
+        <p:sp>
+          <p:nvSpPr>
+            <p:cNvPr id="24" name="Rectangle 23">
+              <a:extLst>
+                <a:ext uri="{FF2B5EF4-FFF2-40B4-BE49-F238E27FC236}">
+                  <a16:creationId xmlns:a16="http://schemas.microsoft.com/office/drawing/2014/main" id="{A18FF719-3D6F-D0E6-2AF7-1E65DAAD6BC0}"/>
+                </a:ext>
+              </a:extLst>
+            </p:cNvPr>
+            <p:cNvSpPr/>
+            <p:nvPr/>
+          </p:nvSpPr>
+          <p:spPr>
+            <a:xfrm>
+              <a:off x="6808763" y="1791028"/>
+              <a:ext cx="3657599" cy="4444656"/>
+            </a:xfrm>
+            <a:prstGeom prst="rect">
+              <a:avLst/>
+            </a:prstGeom>
+            <a:solidFill>
+              <a:schemeClr val="bg1"/>
+            </a:solidFill>
+            <a:ln w="38100">
+              <a:solidFill>
+                <a:schemeClr val="bg1"/>
+              </a:solidFill>
+            </a:ln>
+          </p:spPr>
+          <p:style>
+            <a:lnRef idx="2">
+              <a:schemeClr val="accent1">
+                <a:shade val="15000"/>
+              </a:schemeClr>
+            </a:lnRef>
+            <a:fillRef idx="1">
+              <a:schemeClr val="accent1"/>
+            </a:fillRef>
+            <a:effectRef idx="0">
+              <a:schemeClr val="accent1"/>
+            </a:effectRef>
+            <a:fontRef idx="minor">
+              <a:schemeClr val="lt1"/>
+            </a:fontRef>
+          </p:style>
+          <p:txBody>
+            <a:bodyPr rtlCol="0" anchor="ctr"/>
+            <a:lstStyle/>
+            <a:p>
+              <a:pPr algn="ctr"/>
+              <a:endParaRPr lang="en-US"/>
+            </a:p>
+          </p:txBody>
+        </p:sp>
+      </p:grpSp>
+      <p:grpSp>
+        <p:nvGrpSpPr>
+          <p:cNvPr id="40" name="Group 39">
+            <a:extLst>
+              <a:ext uri="{FF2B5EF4-FFF2-40B4-BE49-F238E27FC236}">
+                <a16:creationId xmlns:a16="http://schemas.microsoft.com/office/drawing/2014/main" id="{BB1B560B-2DB9-FB0F-9A32-F985DD15E66D}"/>
+              </a:ext>
+            </a:extLst>
+          </p:cNvPr>
+          <p:cNvGrpSpPr/>
+          <p:nvPr/>
+        </p:nvGrpSpPr>
+        <p:grpSpPr>
+          <a:xfrm>
+            <a:off x="8324513" y="244788"/>
+            <a:ext cx="3657599" cy="5927834"/>
+            <a:chOff x="6808763" y="307850"/>
+            <a:chExt cx="3657599" cy="5927834"/>
+          </a:xfrm>
+        </p:grpSpPr>
+        <p:grpSp>
+          <p:nvGrpSpPr>
+            <p:cNvPr id="41" name="Group 40">
+              <a:extLst>
+                <a:ext uri="{FF2B5EF4-FFF2-40B4-BE49-F238E27FC236}">
+                  <a16:creationId xmlns:a16="http://schemas.microsoft.com/office/drawing/2014/main" id="{84C6D469-7A40-A336-3B05-841041D42A4B}"/>
+                </a:ext>
+              </a:extLst>
+            </p:cNvPr>
+            <p:cNvGrpSpPr/>
+            <p:nvPr/>
+          </p:nvGrpSpPr>
+          <p:grpSpPr>
+            <a:xfrm>
+              <a:off x="6808763" y="307850"/>
+              <a:ext cx="3657599" cy="2194560"/>
+              <a:chOff x="6808763" y="307850"/>
+              <a:chExt cx="3657599" cy="2194560"/>
+            </a:xfrm>
+          </p:grpSpPr>
+          <p:sp>
+            <p:nvSpPr>
+              <p:cNvPr id="43" name="Rectangle 42">
+                <a:extLst>
+                  <a:ext uri="{FF2B5EF4-FFF2-40B4-BE49-F238E27FC236}">
+                    <a16:creationId xmlns:a16="http://schemas.microsoft.com/office/drawing/2014/main" id="{8D10E4D8-D9E2-2ED8-42C1-D7B5974EF0F7}"/>
+                  </a:ext>
+                </a:extLst>
+              </p:cNvPr>
+              <p:cNvSpPr/>
+              <p:nvPr/>
+            </p:nvSpPr>
+            <p:spPr>
+              <a:xfrm>
+                <a:off x="6808763" y="307850"/>
+                <a:ext cx="731520" cy="731520"/>
+              </a:xfrm>
+              <a:prstGeom prst="rect">
+                <a:avLst/>
+              </a:prstGeom>
+              <a:solidFill>
+                <a:schemeClr val="accent2">
+                  <a:lumMod val="60000"/>
+                  <a:lumOff val="40000"/>
+                </a:schemeClr>
+              </a:solidFill>
+              <a:ln w="38100">
+                <a:solidFill>
+                  <a:schemeClr val="tx1"/>
+                </a:solidFill>
+              </a:ln>
+            </p:spPr>
+            <p:style>
+              <a:lnRef idx="2">
+                <a:schemeClr val="accent1">
+                  <a:shade val="15000"/>
+                </a:schemeClr>
+              </a:lnRef>
+              <a:fillRef idx="1">
+                <a:schemeClr val="accent1"/>
+              </a:fillRef>
+              <a:effectRef idx="0">
+                <a:schemeClr val="accent1"/>
+              </a:effectRef>
+              <a:fontRef idx="minor">
+                <a:schemeClr val="lt1"/>
+              </a:fontRef>
+            </p:style>
+            <p:txBody>
+              <a:bodyPr rtlCol="0" anchor="ctr"/>
+              <a:lstStyle/>
+              <a:p>
+                <a:pPr algn="ctr"/>
+                <a:r>
+                  <a:rPr lang="en-US" sz="2400" b="1" dirty="0">
+                    <a:solidFill>
+                      <a:schemeClr val="tx1"/>
+                    </a:solidFill>
+                  </a:rPr>
+                  <a:t>3</a:t>
+                </a:r>
+                <a:endParaRPr lang="en-US" b="1" dirty="0">
+                  <a:solidFill>
+                    <a:schemeClr val="tx1"/>
+                  </a:solidFill>
+                </a:endParaRPr>
+              </a:p>
+            </p:txBody>
+          </p:sp>
+          <p:sp>
+            <p:nvSpPr>
+              <p:cNvPr id="44" name="Rectangle 43">
+                <a:extLst>
+                  <a:ext uri="{FF2B5EF4-FFF2-40B4-BE49-F238E27FC236}">
+                    <a16:creationId xmlns:a16="http://schemas.microsoft.com/office/drawing/2014/main" id="{09A83B04-E9D8-3E3F-0C84-D47A19F79ECF}"/>
+                  </a:ext>
+                </a:extLst>
+              </p:cNvPr>
+              <p:cNvSpPr/>
+              <p:nvPr/>
+            </p:nvSpPr>
+            <p:spPr>
+              <a:xfrm>
+                <a:off x="7540283" y="307850"/>
+                <a:ext cx="731520" cy="731520"/>
+              </a:xfrm>
+              <a:prstGeom prst="rect">
+                <a:avLst/>
+              </a:prstGeom>
+              <a:solidFill>
+                <a:schemeClr val="accent2">
+                  <a:lumMod val="60000"/>
+                  <a:lumOff val="40000"/>
+                </a:schemeClr>
+              </a:solidFill>
+              <a:ln w="38100">
+                <a:solidFill>
+                  <a:schemeClr val="tx1"/>
+                </a:solidFill>
+              </a:ln>
+            </p:spPr>
+            <p:style>
+              <a:lnRef idx="2">
+                <a:schemeClr val="accent1">
+                  <a:shade val="15000"/>
+                </a:schemeClr>
+              </a:lnRef>
+              <a:fillRef idx="1">
+                <a:schemeClr val="accent1"/>
+              </a:fillRef>
+              <a:effectRef idx="0">
+                <a:schemeClr val="accent1"/>
+              </a:effectRef>
+              <a:fontRef idx="minor">
+                <a:schemeClr val="lt1"/>
+              </a:fontRef>
+            </p:style>
+            <p:txBody>
+              <a:bodyPr rtlCol="0" anchor="ctr"/>
+              <a:lstStyle/>
+              <a:p>
+                <a:pPr algn="ctr"/>
+                <a:r>
+                  <a:rPr lang="en-US" sz="2400" b="1" dirty="0">
+                    <a:solidFill>
+                      <a:schemeClr val="tx1"/>
+                    </a:solidFill>
+                  </a:rPr>
+                  <a:t>2</a:t>
+                </a:r>
+                <a:endParaRPr lang="en-US" b="1" dirty="0">
+                  <a:solidFill>
+                    <a:schemeClr val="tx1"/>
+                  </a:solidFill>
+                </a:endParaRPr>
+              </a:p>
+            </p:txBody>
+          </p:sp>
+          <p:sp>
+            <p:nvSpPr>
+              <p:cNvPr id="45" name="Rectangle 44">
+                <a:extLst>
+                  <a:ext uri="{FF2B5EF4-FFF2-40B4-BE49-F238E27FC236}">
+                    <a16:creationId xmlns:a16="http://schemas.microsoft.com/office/drawing/2014/main" id="{655DB789-EB76-7DCE-F317-EAF150512E01}"/>
+                  </a:ext>
+                </a:extLst>
+              </p:cNvPr>
+              <p:cNvSpPr/>
+              <p:nvPr/>
+            </p:nvSpPr>
+            <p:spPr>
+              <a:xfrm>
+                <a:off x="8271803" y="307850"/>
+                <a:ext cx="731520" cy="731520"/>
+              </a:xfrm>
+              <a:prstGeom prst="rect">
+                <a:avLst/>
+              </a:prstGeom>
+              <a:noFill/>
+              <a:ln w="38100">
+                <a:solidFill>
+                  <a:schemeClr val="tx1"/>
+                </a:solidFill>
+              </a:ln>
+            </p:spPr>
+            <p:style>
+              <a:lnRef idx="2">
+                <a:schemeClr val="accent1">
+                  <a:shade val="15000"/>
+                </a:schemeClr>
+              </a:lnRef>
+              <a:fillRef idx="1">
+                <a:schemeClr val="accent1"/>
+              </a:fillRef>
+              <a:effectRef idx="0">
+                <a:schemeClr val="accent1"/>
+              </a:effectRef>
+              <a:fontRef idx="minor">
+                <a:schemeClr val="lt1"/>
+              </a:fontRef>
+            </p:style>
+            <p:txBody>
+              <a:bodyPr rtlCol="0" anchor="ctr"/>
+              <a:lstStyle/>
+              <a:p>
+                <a:pPr algn="ctr"/>
+                <a:r>
+                  <a:rPr lang="en-US" sz="2400" b="1" dirty="0">
+                    <a:solidFill>
+                      <a:schemeClr val="tx1"/>
+                    </a:solidFill>
+                  </a:rPr>
+                  <a:t>4</a:t>
+                </a:r>
+                <a:endParaRPr lang="en-US" b="1" dirty="0">
+                  <a:solidFill>
+                    <a:schemeClr val="tx1"/>
+                  </a:solidFill>
+                </a:endParaRPr>
+              </a:p>
+            </p:txBody>
+          </p:sp>
+          <p:sp>
+            <p:nvSpPr>
+              <p:cNvPr id="46" name="Rectangle 45">
+                <a:extLst>
+                  <a:ext uri="{FF2B5EF4-FFF2-40B4-BE49-F238E27FC236}">
+                    <a16:creationId xmlns:a16="http://schemas.microsoft.com/office/drawing/2014/main" id="{776ED051-C378-6C07-3405-E885837DD293}"/>
+                  </a:ext>
+                </a:extLst>
+              </p:cNvPr>
+              <p:cNvSpPr/>
+              <p:nvPr/>
+            </p:nvSpPr>
+            <p:spPr>
+              <a:xfrm>
+                <a:off x="9003322" y="307850"/>
+                <a:ext cx="731520" cy="731520"/>
+              </a:xfrm>
+              <a:prstGeom prst="rect">
+                <a:avLst/>
+              </a:prstGeom>
+              <a:noFill/>
+              <a:ln w="38100">
+                <a:solidFill>
+                  <a:schemeClr val="tx1"/>
+                </a:solidFill>
+              </a:ln>
+            </p:spPr>
+            <p:style>
+              <a:lnRef idx="2">
+                <a:schemeClr val="accent1">
+                  <a:shade val="15000"/>
+                </a:schemeClr>
+              </a:lnRef>
+              <a:fillRef idx="1">
+                <a:schemeClr val="accent1"/>
+              </a:fillRef>
+              <a:effectRef idx="0">
+                <a:schemeClr val="accent1"/>
+              </a:effectRef>
+              <a:fontRef idx="minor">
+                <a:schemeClr val="lt1"/>
+              </a:fontRef>
+            </p:style>
+            <p:txBody>
+              <a:bodyPr rtlCol="0" anchor="ctr"/>
+              <a:lstStyle/>
+              <a:p>
+                <a:pPr algn="ctr"/>
+                <a:r>
+                  <a:rPr lang="en-US" sz="2400" b="1" dirty="0">
+                    <a:solidFill>
+                      <a:schemeClr val="tx1"/>
+                    </a:solidFill>
+                  </a:rPr>
+                  <a:t>1</a:t>
+                </a:r>
+                <a:endParaRPr lang="en-US" b="1" dirty="0">
+                  <a:solidFill>
+                    <a:schemeClr val="tx1"/>
+                  </a:solidFill>
+                </a:endParaRPr>
+              </a:p>
+            </p:txBody>
+          </p:sp>
+          <p:sp>
+            <p:nvSpPr>
+              <p:cNvPr id="47" name="Rectangle 46">
+                <a:extLst>
+                  <a:ext uri="{FF2B5EF4-FFF2-40B4-BE49-F238E27FC236}">
+                    <a16:creationId xmlns:a16="http://schemas.microsoft.com/office/drawing/2014/main" id="{C5FAC33B-4500-145B-0CCE-704C3B027127}"/>
+                  </a:ext>
+                </a:extLst>
+              </p:cNvPr>
+              <p:cNvSpPr/>
+              <p:nvPr/>
+            </p:nvSpPr>
+            <p:spPr>
+              <a:xfrm>
+                <a:off x="9734842" y="307850"/>
+                <a:ext cx="731520" cy="731520"/>
+              </a:xfrm>
+              <a:prstGeom prst="rect">
+                <a:avLst/>
+              </a:prstGeom>
+              <a:noFill/>
+              <a:ln w="38100">
+                <a:solidFill>
+                  <a:schemeClr val="tx1"/>
+                </a:solidFill>
+              </a:ln>
+            </p:spPr>
+            <p:style>
+              <a:lnRef idx="2">
+                <a:schemeClr val="accent1">
+                  <a:shade val="15000"/>
+                </a:schemeClr>
+              </a:lnRef>
+              <a:fillRef idx="1">
+                <a:schemeClr val="accent1"/>
+              </a:fillRef>
+              <a:effectRef idx="0">
+                <a:schemeClr val="accent1"/>
+              </a:effectRef>
+              <a:fontRef idx="minor">
+                <a:schemeClr val="lt1"/>
+              </a:fontRef>
+            </p:style>
+            <p:txBody>
+              <a:bodyPr rtlCol="0" anchor="ctr"/>
+              <a:lstStyle/>
+              <a:p>
+                <a:pPr algn="ctr"/>
+                <a:r>
+                  <a:rPr lang="en-US" sz="2400" b="1" dirty="0">
+                    <a:solidFill>
+                      <a:schemeClr val="tx1"/>
+                    </a:solidFill>
+                  </a:rPr>
+                  <a:t>5</a:t>
+                </a:r>
+                <a:endParaRPr lang="en-US" b="1" dirty="0">
+                  <a:solidFill>
+                    <a:schemeClr val="tx1"/>
+                  </a:solidFill>
+                </a:endParaRPr>
+              </a:p>
+            </p:txBody>
+          </p:sp>
+          <p:sp>
+            <p:nvSpPr>
+              <p:cNvPr id="48" name="Rectangle 47">
+                <a:extLst>
+                  <a:ext uri="{FF2B5EF4-FFF2-40B4-BE49-F238E27FC236}">
+                    <a16:creationId xmlns:a16="http://schemas.microsoft.com/office/drawing/2014/main" id="{BBA93EB9-0FAC-E890-FDE4-E23638A1E584}"/>
+                  </a:ext>
+                </a:extLst>
+              </p:cNvPr>
+              <p:cNvSpPr/>
+              <p:nvPr/>
+            </p:nvSpPr>
+            <p:spPr>
+              <a:xfrm>
+                <a:off x="6808763" y="1039370"/>
+                <a:ext cx="731520" cy="731520"/>
+              </a:xfrm>
+              <a:prstGeom prst="rect">
+                <a:avLst/>
+              </a:prstGeom>
+              <a:noFill/>
+              <a:ln w="38100">
+                <a:solidFill>
+                  <a:schemeClr val="tx1"/>
+                </a:solidFill>
+              </a:ln>
+            </p:spPr>
+            <p:style>
+              <a:lnRef idx="2">
+                <a:schemeClr val="accent1">
+                  <a:shade val="15000"/>
+                </a:schemeClr>
+              </a:lnRef>
+              <a:fillRef idx="1">
+                <a:schemeClr val="accent1"/>
+              </a:fillRef>
+              <a:effectRef idx="0">
+                <a:schemeClr val="accent1"/>
+              </a:effectRef>
+              <a:fontRef idx="minor">
+                <a:schemeClr val="lt1"/>
+              </a:fontRef>
+            </p:style>
+            <p:txBody>
+              <a:bodyPr rtlCol="0" anchor="ctr"/>
+              <a:lstStyle/>
+              <a:p>
+                <a:pPr algn="ctr"/>
+                <a:r>
+                  <a:rPr lang="en-US" sz="2400" b="1" dirty="0">
+                    <a:solidFill>
+                      <a:schemeClr val="tx1"/>
+                    </a:solidFill>
+                  </a:rPr>
+                  <a:t>2</a:t>
+                </a:r>
+                <a:endParaRPr lang="en-US" b="1" dirty="0">
+                  <a:solidFill>
+                    <a:schemeClr val="tx1"/>
+                  </a:solidFill>
+                </a:endParaRPr>
+              </a:p>
+            </p:txBody>
+          </p:sp>
+          <p:sp>
+            <p:nvSpPr>
+              <p:cNvPr id="49" name="Rectangle 48">
+                <a:extLst>
+                  <a:ext uri="{FF2B5EF4-FFF2-40B4-BE49-F238E27FC236}">
+                    <a16:creationId xmlns:a16="http://schemas.microsoft.com/office/drawing/2014/main" id="{EEC9B98E-0EFB-E014-57EB-CDCBBB1BD110}"/>
+                  </a:ext>
+                </a:extLst>
+              </p:cNvPr>
+              <p:cNvSpPr/>
+              <p:nvPr/>
+            </p:nvSpPr>
+            <p:spPr>
+              <a:xfrm>
+                <a:off x="7540283" y="1039370"/>
+                <a:ext cx="731520" cy="731520"/>
+              </a:xfrm>
+              <a:prstGeom prst="rect">
+                <a:avLst/>
+              </a:prstGeom>
+              <a:solidFill>
+                <a:schemeClr val="accent2">
+                  <a:lumMod val="20000"/>
+                  <a:lumOff val="80000"/>
+                </a:schemeClr>
+              </a:solidFill>
+              <a:ln w="38100">
+                <a:solidFill>
+                  <a:schemeClr val="tx1"/>
+                </a:solidFill>
+              </a:ln>
+            </p:spPr>
+            <p:style>
+              <a:lnRef idx="2">
+                <a:schemeClr val="accent1">
+                  <a:shade val="15000"/>
+                </a:schemeClr>
+              </a:lnRef>
+              <a:fillRef idx="1">
+                <a:schemeClr val="accent1"/>
+              </a:fillRef>
+              <a:effectRef idx="0">
+                <a:schemeClr val="accent1"/>
+              </a:effectRef>
+              <a:fontRef idx="minor">
+                <a:schemeClr val="lt1"/>
+              </a:fontRef>
+            </p:style>
+            <p:txBody>
+              <a:bodyPr rtlCol="0" anchor="ctr"/>
+              <a:lstStyle/>
+              <a:p>
+                <a:pPr algn="ctr"/>
+                <a:r>
+                  <a:rPr lang="en-US" sz="2400" b="1" dirty="0">
+                    <a:solidFill>
+                      <a:schemeClr val="tx1"/>
+                    </a:solidFill>
+                  </a:rPr>
+                  <a:t>3</a:t>
+                </a:r>
+                <a:endParaRPr lang="en-US" b="1" dirty="0">
+                  <a:solidFill>
+                    <a:schemeClr val="tx1"/>
+                  </a:solidFill>
+                </a:endParaRPr>
+              </a:p>
+            </p:txBody>
+          </p:sp>
+          <p:sp>
+            <p:nvSpPr>
+              <p:cNvPr id="50" name="Rectangle 49">
+                <a:extLst>
+                  <a:ext uri="{FF2B5EF4-FFF2-40B4-BE49-F238E27FC236}">
+                    <a16:creationId xmlns:a16="http://schemas.microsoft.com/office/drawing/2014/main" id="{2A335237-B89B-65A1-79B8-A86ACD8FDCE0}"/>
+                  </a:ext>
+                </a:extLst>
+              </p:cNvPr>
+              <p:cNvSpPr/>
+              <p:nvPr/>
+            </p:nvSpPr>
+            <p:spPr>
+              <a:xfrm>
+                <a:off x="8271803" y="1039370"/>
+                <a:ext cx="731520" cy="731520"/>
+              </a:xfrm>
+              <a:prstGeom prst="rect">
+                <a:avLst/>
+              </a:prstGeom>
+              <a:solidFill>
+                <a:schemeClr val="accent2">
+                  <a:lumMod val="20000"/>
+                  <a:lumOff val="80000"/>
+                </a:schemeClr>
+              </a:solidFill>
+              <a:ln w="38100">
+                <a:solidFill>
+                  <a:schemeClr val="tx1"/>
+                </a:solidFill>
+              </a:ln>
+            </p:spPr>
+            <p:style>
+              <a:lnRef idx="2">
+                <a:schemeClr val="accent1">
+                  <a:shade val="15000"/>
+                </a:schemeClr>
+              </a:lnRef>
+              <a:fillRef idx="1">
+                <a:schemeClr val="accent1"/>
+              </a:fillRef>
+              <a:effectRef idx="0">
+                <a:schemeClr val="accent1"/>
+              </a:effectRef>
+              <a:fontRef idx="minor">
+                <a:schemeClr val="lt1"/>
+              </a:fontRef>
+            </p:style>
+            <p:txBody>
+              <a:bodyPr rtlCol="0" anchor="ctr"/>
+              <a:lstStyle/>
+              <a:p>
+                <a:pPr algn="ctr"/>
+                <a:r>
+                  <a:rPr lang="en-US" sz="2400" b="1" dirty="0">
+                    <a:solidFill>
+                      <a:schemeClr val="tx1"/>
+                    </a:solidFill>
+                  </a:rPr>
+                  <a:t>4</a:t>
+                </a:r>
+                <a:endParaRPr lang="en-US" b="1" dirty="0">
+                  <a:solidFill>
+                    <a:schemeClr val="tx1"/>
+                  </a:solidFill>
+                </a:endParaRPr>
+              </a:p>
+            </p:txBody>
+          </p:sp>
+          <p:sp>
+            <p:nvSpPr>
+              <p:cNvPr id="51" name="Rectangle 50">
+                <a:extLst>
+                  <a:ext uri="{FF2B5EF4-FFF2-40B4-BE49-F238E27FC236}">
+                    <a16:creationId xmlns:a16="http://schemas.microsoft.com/office/drawing/2014/main" id="{080BB4E1-313D-1A75-423A-4C11489A1894}"/>
+                  </a:ext>
+                </a:extLst>
+              </p:cNvPr>
+              <p:cNvSpPr/>
+              <p:nvPr/>
+            </p:nvSpPr>
+            <p:spPr>
+              <a:xfrm>
+                <a:off x="9003322" y="1039370"/>
+                <a:ext cx="731520" cy="731520"/>
+              </a:xfrm>
+              <a:prstGeom prst="rect">
+                <a:avLst/>
+              </a:prstGeom>
+              <a:noFill/>
+              <a:ln w="38100">
+                <a:solidFill>
+                  <a:schemeClr val="tx1"/>
+                </a:solidFill>
+              </a:ln>
+            </p:spPr>
+            <p:style>
+              <a:lnRef idx="2">
+                <a:schemeClr val="accent1">
+                  <a:shade val="15000"/>
+                </a:schemeClr>
+              </a:lnRef>
+              <a:fillRef idx="1">
+                <a:schemeClr val="accent1"/>
+              </a:fillRef>
+              <a:effectRef idx="0">
+                <a:schemeClr val="accent1"/>
+              </a:effectRef>
+              <a:fontRef idx="minor">
+                <a:schemeClr val="lt1"/>
+              </a:fontRef>
+            </p:style>
+            <p:txBody>
+              <a:bodyPr rtlCol="0" anchor="ctr"/>
+              <a:lstStyle/>
+              <a:p>
+                <a:pPr algn="ctr"/>
+                <a:r>
+                  <a:rPr lang="en-US" sz="2400" b="1" dirty="0">
+                    <a:solidFill>
+                      <a:schemeClr val="tx1"/>
+                    </a:solidFill>
+                  </a:rPr>
+                  <a:t>1</a:t>
+                </a:r>
+                <a:endParaRPr lang="en-US" b="1" dirty="0">
+                  <a:solidFill>
+                    <a:schemeClr val="tx1"/>
+                  </a:solidFill>
+                </a:endParaRPr>
+              </a:p>
+            </p:txBody>
+          </p:sp>
+          <p:sp>
+            <p:nvSpPr>
+              <p:cNvPr id="52" name="Rectangle 51">
+                <a:extLst>
+                  <a:ext uri="{FF2B5EF4-FFF2-40B4-BE49-F238E27FC236}">
+                    <a16:creationId xmlns:a16="http://schemas.microsoft.com/office/drawing/2014/main" id="{E55A190D-FD5E-5AE7-8BFC-79A8DDB14555}"/>
+                  </a:ext>
+                </a:extLst>
+              </p:cNvPr>
+              <p:cNvSpPr/>
+              <p:nvPr/>
+            </p:nvSpPr>
+            <p:spPr>
+              <a:xfrm>
+                <a:off x="9734842" y="1039370"/>
+                <a:ext cx="731520" cy="731520"/>
+              </a:xfrm>
+              <a:prstGeom prst="rect">
+                <a:avLst/>
+              </a:prstGeom>
+              <a:noFill/>
+              <a:ln w="38100">
+                <a:solidFill>
+                  <a:schemeClr val="tx1"/>
+                </a:solidFill>
+              </a:ln>
+            </p:spPr>
+            <p:style>
+              <a:lnRef idx="2">
+                <a:schemeClr val="accent1">
+                  <a:shade val="15000"/>
+                </a:schemeClr>
+              </a:lnRef>
+              <a:fillRef idx="1">
+                <a:schemeClr val="accent1"/>
+              </a:fillRef>
+              <a:effectRef idx="0">
+                <a:schemeClr val="accent1"/>
+              </a:effectRef>
+              <a:fontRef idx="minor">
+                <a:schemeClr val="lt1"/>
+              </a:fontRef>
+            </p:style>
+            <p:txBody>
+              <a:bodyPr rtlCol="0" anchor="ctr"/>
+              <a:lstStyle/>
+              <a:p>
+                <a:pPr algn="ctr"/>
+                <a:r>
+                  <a:rPr lang="en-US" sz="2400" b="1" dirty="0">
+                    <a:solidFill>
+                      <a:schemeClr val="tx1"/>
+                    </a:solidFill>
+                  </a:rPr>
+                  <a:t>5</a:t>
+                </a:r>
+                <a:endParaRPr lang="en-US" b="1" dirty="0">
+                  <a:solidFill>
+                    <a:schemeClr val="tx1"/>
+                  </a:solidFill>
+                </a:endParaRPr>
+              </a:p>
+            </p:txBody>
+          </p:sp>
+          <p:sp>
+            <p:nvSpPr>
+              <p:cNvPr id="53" name="Rectangle 52">
+                <a:extLst>
+                  <a:ext uri="{FF2B5EF4-FFF2-40B4-BE49-F238E27FC236}">
+                    <a16:creationId xmlns:a16="http://schemas.microsoft.com/office/drawing/2014/main" id="{567A2580-9A99-1E25-76E2-53CB8880B1AC}"/>
+                  </a:ext>
+                </a:extLst>
+              </p:cNvPr>
+              <p:cNvSpPr/>
+              <p:nvPr/>
+            </p:nvSpPr>
+            <p:spPr>
+              <a:xfrm>
+                <a:off x="6808763" y="1770890"/>
+                <a:ext cx="731520" cy="731520"/>
+              </a:xfrm>
+              <a:prstGeom prst="rect">
+                <a:avLst/>
+              </a:prstGeom>
+              <a:noFill/>
+              <a:ln w="38100">
+                <a:solidFill>
+                  <a:schemeClr val="tx1"/>
+                </a:solidFill>
+              </a:ln>
+            </p:spPr>
+            <p:style>
+              <a:lnRef idx="2">
+                <a:schemeClr val="accent1">
+                  <a:shade val="15000"/>
+                </a:schemeClr>
+              </a:lnRef>
+              <a:fillRef idx="1">
+                <a:schemeClr val="accent1"/>
+              </a:fillRef>
+              <a:effectRef idx="0">
+                <a:schemeClr val="accent1"/>
+              </a:effectRef>
+              <a:fontRef idx="minor">
+                <a:schemeClr val="lt1"/>
+              </a:fontRef>
+            </p:style>
+            <p:txBody>
+              <a:bodyPr rtlCol="0" anchor="ctr"/>
+              <a:lstStyle/>
+              <a:p>
+                <a:pPr algn="ctr"/>
+                <a:r>
+                  <a:rPr lang="en-US" sz="2400" b="1" dirty="0">
+                    <a:solidFill>
+                      <a:schemeClr val="tx1"/>
+                    </a:solidFill>
+                  </a:rPr>
+                  <a:t>2</a:t>
+                </a:r>
+                <a:endParaRPr lang="en-US" b="1" dirty="0">
+                  <a:solidFill>
+                    <a:schemeClr val="tx1"/>
+                  </a:solidFill>
+                </a:endParaRPr>
+              </a:p>
+            </p:txBody>
+          </p:sp>
+          <p:sp>
+            <p:nvSpPr>
+              <p:cNvPr id="54" name="Rectangle 53">
+                <a:extLst>
+                  <a:ext uri="{FF2B5EF4-FFF2-40B4-BE49-F238E27FC236}">
+                    <a16:creationId xmlns:a16="http://schemas.microsoft.com/office/drawing/2014/main" id="{B1959E6B-8361-4D0D-575A-1A4CCF20FF6F}"/>
+                  </a:ext>
+                </a:extLst>
+              </p:cNvPr>
+              <p:cNvSpPr/>
+              <p:nvPr/>
+            </p:nvSpPr>
+            <p:spPr>
+              <a:xfrm>
+                <a:off x="7540283" y="1770890"/>
+                <a:ext cx="731520" cy="731520"/>
+              </a:xfrm>
+              <a:prstGeom prst="rect">
+                <a:avLst/>
+              </a:prstGeom>
+              <a:noFill/>
+              <a:ln w="38100">
+                <a:solidFill>
+                  <a:schemeClr val="tx1"/>
+                </a:solidFill>
+              </a:ln>
+            </p:spPr>
+            <p:style>
+              <a:lnRef idx="2">
+                <a:schemeClr val="accent1">
+                  <a:shade val="15000"/>
+                </a:schemeClr>
+              </a:lnRef>
+              <a:fillRef idx="1">
+                <a:schemeClr val="accent1"/>
+              </a:fillRef>
+              <a:effectRef idx="0">
+                <a:schemeClr val="accent1"/>
+              </a:effectRef>
+              <a:fontRef idx="minor">
+                <a:schemeClr val="lt1"/>
+              </a:fontRef>
+            </p:style>
+            <p:txBody>
+              <a:bodyPr rtlCol="0" anchor="ctr"/>
+              <a:lstStyle/>
+              <a:p>
+                <a:pPr algn="ctr"/>
+                <a:r>
+                  <a:rPr lang="en-US" sz="2400" b="1" dirty="0">
+                    <a:solidFill>
+                      <a:schemeClr val="tx1"/>
+                    </a:solidFill>
+                  </a:rPr>
+                  <a:t>3</a:t>
+                </a:r>
+                <a:endParaRPr lang="en-US" b="1" dirty="0">
+                  <a:solidFill>
+                    <a:schemeClr val="tx1"/>
+                  </a:solidFill>
+                </a:endParaRPr>
+              </a:p>
+            </p:txBody>
+          </p:sp>
+          <p:sp>
+            <p:nvSpPr>
+              <p:cNvPr id="55" name="Rectangle 54">
+                <a:extLst>
+                  <a:ext uri="{FF2B5EF4-FFF2-40B4-BE49-F238E27FC236}">
+                    <a16:creationId xmlns:a16="http://schemas.microsoft.com/office/drawing/2014/main" id="{81288112-2FA9-CA7A-185C-DE66E2195337}"/>
+                  </a:ext>
+                </a:extLst>
+              </p:cNvPr>
+              <p:cNvSpPr/>
+              <p:nvPr/>
+            </p:nvSpPr>
+            <p:spPr>
+              <a:xfrm>
+                <a:off x="8271803" y="1770890"/>
+                <a:ext cx="731520" cy="731520"/>
+              </a:xfrm>
+              <a:prstGeom prst="rect">
+                <a:avLst/>
+              </a:prstGeom>
+              <a:solidFill>
+                <a:schemeClr val="accent2">
+                  <a:lumMod val="60000"/>
+                  <a:lumOff val="40000"/>
+                </a:schemeClr>
+              </a:solidFill>
+              <a:ln w="38100">
+                <a:solidFill>
+                  <a:schemeClr val="tx1"/>
+                </a:solidFill>
+              </a:ln>
+            </p:spPr>
+            <p:style>
+              <a:lnRef idx="2">
+                <a:schemeClr val="accent1">
+                  <a:shade val="15000"/>
+                </a:schemeClr>
+              </a:lnRef>
+              <a:fillRef idx="1">
+                <a:schemeClr val="accent1"/>
+              </a:fillRef>
+              <a:effectRef idx="0">
+                <a:schemeClr val="accent1"/>
+              </a:effectRef>
+              <a:fontRef idx="minor">
+                <a:schemeClr val="lt1"/>
+              </a:fontRef>
+            </p:style>
+            <p:txBody>
+              <a:bodyPr rtlCol="0" anchor="ctr"/>
+              <a:lstStyle/>
+              <a:p>
+                <a:pPr algn="ctr"/>
+                <a:r>
+                  <a:rPr lang="en-US" sz="2400" b="1" dirty="0">
+                    <a:solidFill>
+                      <a:schemeClr val="tx1"/>
+                    </a:solidFill>
+                  </a:rPr>
+                  <a:t>4</a:t>
+                </a:r>
+                <a:endParaRPr lang="en-US" b="1" dirty="0">
+                  <a:solidFill>
+                    <a:schemeClr val="tx1"/>
+                  </a:solidFill>
+                </a:endParaRPr>
+              </a:p>
+            </p:txBody>
+          </p:sp>
+          <p:sp>
+            <p:nvSpPr>
+              <p:cNvPr id="56" name="Rectangle 55">
+                <a:extLst>
+                  <a:ext uri="{FF2B5EF4-FFF2-40B4-BE49-F238E27FC236}">
+                    <a16:creationId xmlns:a16="http://schemas.microsoft.com/office/drawing/2014/main" id="{018D6D57-15C2-E315-A2B2-F08A72D30AFD}"/>
+                  </a:ext>
+                </a:extLst>
+              </p:cNvPr>
+              <p:cNvSpPr/>
+              <p:nvPr/>
+            </p:nvSpPr>
+            <p:spPr>
+              <a:xfrm>
+                <a:off x="9003322" y="1770890"/>
+                <a:ext cx="731520" cy="731520"/>
+              </a:xfrm>
+              <a:prstGeom prst="rect">
+                <a:avLst/>
+              </a:prstGeom>
+              <a:solidFill>
+                <a:schemeClr val="accent2">
+                  <a:lumMod val="60000"/>
+                  <a:lumOff val="40000"/>
+                </a:schemeClr>
+              </a:solidFill>
+              <a:ln w="38100">
+                <a:solidFill>
+                  <a:schemeClr val="tx1"/>
+                </a:solidFill>
+              </a:ln>
+            </p:spPr>
+            <p:style>
+              <a:lnRef idx="2">
+                <a:schemeClr val="accent1">
+                  <a:shade val="15000"/>
+                </a:schemeClr>
+              </a:lnRef>
+              <a:fillRef idx="1">
+                <a:schemeClr val="accent1"/>
+              </a:fillRef>
+              <a:effectRef idx="0">
+                <a:schemeClr val="accent1"/>
+              </a:effectRef>
+              <a:fontRef idx="minor">
+                <a:schemeClr val="lt1"/>
+              </a:fontRef>
+            </p:style>
+            <p:txBody>
+              <a:bodyPr rtlCol="0" anchor="ctr"/>
+              <a:lstStyle/>
+              <a:p>
+                <a:pPr algn="ctr"/>
+                <a:r>
+                  <a:rPr lang="en-US" sz="2400" b="1" dirty="0">
+                    <a:solidFill>
+                      <a:schemeClr val="tx1"/>
+                    </a:solidFill>
+                  </a:rPr>
+                  <a:t>1</a:t>
+                </a:r>
+                <a:endParaRPr lang="en-US" b="1" dirty="0">
+                  <a:solidFill>
+                    <a:schemeClr val="tx1"/>
+                  </a:solidFill>
+                </a:endParaRPr>
+              </a:p>
+            </p:txBody>
+          </p:sp>
+          <p:sp>
+            <p:nvSpPr>
+              <p:cNvPr id="57" name="Rectangle 56">
+                <a:extLst>
+                  <a:ext uri="{FF2B5EF4-FFF2-40B4-BE49-F238E27FC236}">
+                    <a16:creationId xmlns:a16="http://schemas.microsoft.com/office/drawing/2014/main" id="{1B53543C-7EB7-2E3F-79C4-6EED60570E79}"/>
+                  </a:ext>
+                </a:extLst>
+              </p:cNvPr>
+              <p:cNvSpPr/>
+              <p:nvPr/>
+            </p:nvSpPr>
+            <p:spPr>
+              <a:xfrm>
+                <a:off x="9734842" y="1770890"/>
+                <a:ext cx="731520" cy="731520"/>
+              </a:xfrm>
+              <a:prstGeom prst="rect">
+                <a:avLst/>
+              </a:prstGeom>
+              <a:noFill/>
+              <a:ln w="38100">
+                <a:solidFill>
+                  <a:schemeClr val="tx1"/>
+                </a:solidFill>
+              </a:ln>
+            </p:spPr>
+            <p:style>
+              <a:lnRef idx="2">
+                <a:schemeClr val="accent1">
+                  <a:shade val="15000"/>
+                </a:schemeClr>
+              </a:lnRef>
+              <a:fillRef idx="1">
+                <a:schemeClr val="accent1"/>
+              </a:fillRef>
+              <a:effectRef idx="0">
+                <a:schemeClr val="accent1"/>
+              </a:effectRef>
+              <a:fontRef idx="minor">
+                <a:schemeClr val="lt1"/>
+              </a:fontRef>
+            </p:style>
+            <p:txBody>
+              <a:bodyPr rtlCol="0" anchor="ctr"/>
+              <a:lstStyle/>
+              <a:p>
+                <a:pPr algn="ctr"/>
+                <a:r>
+                  <a:rPr lang="en-US" sz="2400" b="1" dirty="0">
+                    <a:solidFill>
+                      <a:schemeClr val="tx1"/>
+                    </a:solidFill>
+                  </a:rPr>
+                  <a:t>5</a:t>
+                </a:r>
+                <a:endParaRPr lang="en-US" b="1" dirty="0">
+                  <a:solidFill>
+                    <a:schemeClr val="tx1"/>
+                  </a:solidFill>
+                </a:endParaRPr>
+              </a:p>
+            </p:txBody>
+          </p:sp>
+        </p:grpSp>
+        <p:sp>
+          <p:nvSpPr>
+            <p:cNvPr id="42" name="Rectangle 41">
+              <a:extLst>
+                <a:ext uri="{FF2B5EF4-FFF2-40B4-BE49-F238E27FC236}">
+                  <a16:creationId xmlns:a16="http://schemas.microsoft.com/office/drawing/2014/main" id="{AF6F84F3-4411-D8F7-B834-0386D586A34C}"/>
+                </a:ext>
+              </a:extLst>
+            </p:cNvPr>
+            <p:cNvSpPr/>
+            <p:nvPr/>
+          </p:nvSpPr>
+          <p:spPr>
+            <a:xfrm>
+              <a:off x="6808763" y="2533942"/>
+              <a:ext cx="3657599" cy="3701742"/>
+            </a:xfrm>
+            <a:prstGeom prst="rect">
+              <a:avLst/>
+            </a:prstGeom>
+            <a:solidFill>
+              <a:schemeClr val="bg1"/>
+            </a:solidFill>
+            <a:ln w="38100">
+              <a:solidFill>
+                <a:schemeClr val="bg1"/>
+              </a:solidFill>
+            </a:ln>
+          </p:spPr>
+          <p:style>
+            <a:lnRef idx="2">
+              <a:schemeClr val="accent1">
+                <a:shade val="15000"/>
+              </a:schemeClr>
+            </a:lnRef>
+            <a:fillRef idx="1">
+              <a:schemeClr val="accent1"/>
+            </a:fillRef>
+            <a:effectRef idx="0">
+              <a:schemeClr val="accent1"/>
+            </a:effectRef>
+            <a:fontRef idx="minor">
+              <a:schemeClr val="lt1"/>
+            </a:fontRef>
+          </p:style>
+          <p:txBody>
+            <a:bodyPr rtlCol="0" anchor="ctr"/>
+            <a:lstStyle/>
+            <a:p>
+              <a:pPr algn="ctr"/>
+              <a:endParaRPr lang="en-US"/>
+            </a:p>
+          </p:txBody>
+        </p:sp>
+      </p:grpSp>
+    </p:spTree>
+    <p:extLst>
+      <p:ext uri="{BB962C8B-B14F-4D97-AF65-F5344CB8AC3E}">
+        <p14:creationId xmlns:p14="http://schemas.microsoft.com/office/powerpoint/2010/main" val="1853134759"/>
+      </p:ext>
+    </p:extLst>
+  </p:cSld>
+  <p:clrMapOvr>
+    <a:masterClrMapping/>
+  </p:clrMapOvr>
+</p:sld>
+</file>
+
+<file path=ppt/slides/slide11.xml><?xml version="1.0" encoding="utf-8"?>
+<p:sld xmlns:a="http://schemas.openxmlformats.org/drawingml/2006/main" xmlns:r="http://schemas.openxmlformats.org/officeDocument/2006/relationships" xmlns:p="http://schemas.openxmlformats.org/presentationml/2006/main">
+  <p:cSld>
+    <p:spTree>
+      <p:nvGrpSpPr>
+        <p:cNvPr id="1" name=""/>
+        <p:cNvGrpSpPr/>
+        <p:nvPr/>
+      </p:nvGrpSpPr>
+      <p:grpSpPr>
+        <a:xfrm>
+          <a:off x="0" y="0"/>
+          <a:ext cx="0" cy="0"/>
+          <a:chOff x="0" y="0"/>
+          <a:chExt cx="0" cy="0"/>
+        </a:xfrm>
+      </p:grpSpPr>
+      <p:grpSp>
+        <p:nvGrpSpPr>
+          <p:cNvPr id="2" name="Group 1">
+            <a:extLst>
+              <a:ext uri="{FF2B5EF4-FFF2-40B4-BE49-F238E27FC236}">
+                <a16:creationId xmlns:a16="http://schemas.microsoft.com/office/drawing/2014/main" id="{92F7D8C6-1BE0-EBEE-E330-A4EEBA5A71E6}"/>
+              </a:ext>
+            </a:extLst>
+          </p:cNvPr>
+          <p:cNvGrpSpPr/>
+          <p:nvPr/>
+        </p:nvGrpSpPr>
+        <p:grpSpPr>
+          <a:xfrm>
+            <a:off x="9995658" y="213257"/>
+            <a:ext cx="3657599" cy="5927834"/>
+            <a:chOff x="6808763" y="307850"/>
+            <a:chExt cx="3657599" cy="5927834"/>
+          </a:xfrm>
+        </p:grpSpPr>
+        <p:grpSp>
+          <p:nvGrpSpPr>
+            <p:cNvPr id="3" name="Group 2">
+              <a:extLst>
+                <a:ext uri="{FF2B5EF4-FFF2-40B4-BE49-F238E27FC236}">
+                  <a16:creationId xmlns:a16="http://schemas.microsoft.com/office/drawing/2014/main" id="{7231D3DD-51A4-A833-C258-2E81A5399F53}"/>
+                </a:ext>
+              </a:extLst>
+            </p:cNvPr>
+            <p:cNvGrpSpPr/>
+            <p:nvPr/>
+          </p:nvGrpSpPr>
+          <p:grpSpPr>
+            <a:xfrm>
+              <a:off x="6808763" y="307850"/>
+              <a:ext cx="3657599" cy="2194560"/>
+              <a:chOff x="6808763" y="307850"/>
+              <a:chExt cx="3657599" cy="2194560"/>
+            </a:xfrm>
+          </p:grpSpPr>
+          <p:sp>
+            <p:nvSpPr>
+              <p:cNvPr id="5" name="Rectangle 4">
+                <a:extLst>
+                  <a:ext uri="{FF2B5EF4-FFF2-40B4-BE49-F238E27FC236}">
+                    <a16:creationId xmlns:a16="http://schemas.microsoft.com/office/drawing/2014/main" id="{A3A93BF5-843C-90D6-8720-C760748A3D62}"/>
+                  </a:ext>
+                </a:extLst>
+              </p:cNvPr>
+              <p:cNvSpPr/>
+              <p:nvPr/>
+            </p:nvSpPr>
+            <p:spPr>
+              <a:xfrm>
+                <a:off x="6808763" y="307850"/>
+                <a:ext cx="731520" cy="731520"/>
+              </a:xfrm>
+              <a:prstGeom prst="rect">
+                <a:avLst/>
+              </a:prstGeom>
+              <a:solidFill>
+                <a:schemeClr val="accent2">
+                  <a:lumMod val="60000"/>
+                  <a:lumOff val="40000"/>
+                </a:schemeClr>
+              </a:solidFill>
+              <a:ln w="38100">
+                <a:solidFill>
+                  <a:schemeClr val="tx1"/>
+                </a:solidFill>
+              </a:ln>
+            </p:spPr>
+            <p:style>
+              <a:lnRef idx="2">
+                <a:schemeClr val="accent1">
+                  <a:shade val="15000"/>
+                </a:schemeClr>
+              </a:lnRef>
+              <a:fillRef idx="1">
+                <a:schemeClr val="accent1"/>
+              </a:fillRef>
+              <a:effectRef idx="0">
+                <a:schemeClr val="accent1"/>
+              </a:effectRef>
+              <a:fontRef idx="minor">
+                <a:schemeClr val="lt1"/>
+              </a:fontRef>
+            </p:style>
+            <p:txBody>
+              <a:bodyPr rtlCol="0" anchor="ctr"/>
+              <a:lstStyle/>
+              <a:p>
+                <a:pPr algn="ctr"/>
+                <a:r>
+                  <a:rPr lang="en-US" sz="2400" b="1" dirty="0">
+                    <a:solidFill>
+                      <a:schemeClr val="tx1"/>
+                    </a:solidFill>
+                  </a:rPr>
+                  <a:t>3</a:t>
+                </a:r>
+                <a:endParaRPr lang="en-US" b="1" dirty="0">
+                  <a:solidFill>
+                    <a:schemeClr val="tx1"/>
+                  </a:solidFill>
+                </a:endParaRPr>
+              </a:p>
+            </p:txBody>
+          </p:sp>
+          <p:sp>
+            <p:nvSpPr>
+              <p:cNvPr id="6" name="Rectangle 5">
+                <a:extLst>
+                  <a:ext uri="{FF2B5EF4-FFF2-40B4-BE49-F238E27FC236}">
+                    <a16:creationId xmlns:a16="http://schemas.microsoft.com/office/drawing/2014/main" id="{B22D3126-B82B-0D31-8CE9-C393A578F615}"/>
+                  </a:ext>
+                </a:extLst>
+              </p:cNvPr>
+              <p:cNvSpPr/>
+              <p:nvPr/>
+            </p:nvSpPr>
+            <p:spPr>
+              <a:xfrm>
+                <a:off x="7540283" y="307850"/>
+                <a:ext cx="731520" cy="731520"/>
+              </a:xfrm>
+              <a:prstGeom prst="rect">
+                <a:avLst/>
+              </a:prstGeom>
+              <a:solidFill>
+                <a:schemeClr val="accent2">
+                  <a:lumMod val="60000"/>
+                  <a:lumOff val="40000"/>
+                </a:schemeClr>
+              </a:solidFill>
+              <a:ln w="38100">
+                <a:solidFill>
+                  <a:schemeClr val="tx1"/>
+                </a:solidFill>
+              </a:ln>
+            </p:spPr>
+            <p:style>
+              <a:lnRef idx="2">
+                <a:schemeClr val="accent1">
+                  <a:shade val="15000"/>
+                </a:schemeClr>
+              </a:lnRef>
+              <a:fillRef idx="1">
+                <a:schemeClr val="accent1"/>
+              </a:fillRef>
+              <a:effectRef idx="0">
+                <a:schemeClr val="accent1"/>
+              </a:effectRef>
+              <a:fontRef idx="minor">
+                <a:schemeClr val="lt1"/>
+              </a:fontRef>
+            </p:style>
+            <p:txBody>
+              <a:bodyPr rtlCol="0" anchor="ctr"/>
+              <a:lstStyle/>
+              <a:p>
+                <a:pPr algn="ctr"/>
+                <a:r>
+                  <a:rPr lang="en-US" sz="2400" b="1" dirty="0">
+                    <a:solidFill>
+                      <a:schemeClr val="tx1"/>
+                    </a:solidFill>
+                  </a:rPr>
+                  <a:t>2</a:t>
+                </a:r>
+                <a:endParaRPr lang="en-US" b="1" dirty="0">
+                  <a:solidFill>
+                    <a:schemeClr val="tx1"/>
+                  </a:solidFill>
+                </a:endParaRPr>
+              </a:p>
+            </p:txBody>
+          </p:sp>
+          <p:sp>
+            <p:nvSpPr>
+              <p:cNvPr id="7" name="Rectangle 6">
+                <a:extLst>
+                  <a:ext uri="{FF2B5EF4-FFF2-40B4-BE49-F238E27FC236}">
+                    <a16:creationId xmlns:a16="http://schemas.microsoft.com/office/drawing/2014/main" id="{5391E55B-B241-7C79-9680-FCD585D53C6E}"/>
+                  </a:ext>
+                </a:extLst>
+              </p:cNvPr>
+              <p:cNvSpPr/>
+              <p:nvPr/>
+            </p:nvSpPr>
+            <p:spPr>
+              <a:xfrm>
+                <a:off x="8271803" y="307850"/>
+                <a:ext cx="731520" cy="731520"/>
+              </a:xfrm>
+              <a:prstGeom prst="rect">
+                <a:avLst/>
+              </a:prstGeom>
+              <a:noFill/>
+              <a:ln w="38100">
+                <a:solidFill>
+                  <a:schemeClr val="tx1"/>
+                </a:solidFill>
+              </a:ln>
+            </p:spPr>
+            <p:style>
+              <a:lnRef idx="2">
+                <a:schemeClr val="accent1">
+                  <a:shade val="15000"/>
+                </a:schemeClr>
+              </a:lnRef>
+              <a:fillRef idx="1">
+                <a:schemeClr val="accent1"/>
+              </a:fillRef>
+              <a:effectRef idx="0">
+                <a:schemeClr val="accent1"/>
+              </a:effectRef>
+              <a:fontRef idx="minor">
+                <a:schemeClr val="lt1"/>
+              </a:fontRef>
+            </p:style>
+            <p:txBody>
+              <a:bodyPr rtlCol="0" anchor="ctr"/>
+              <a:lstStyle/>
+              <a:p>
+                <a:pPr algn="ctr"/>
+                <a:r>
+                  <a:rPr lang="en-US" sz="2400" b="1" dirty="0">
+                    <a:solidFill>
+                      <a:schemeClr val="tx1"/>
+                    </a:solidFill>
+                  </a:rPr>
+                  <a:t>4</a:t>
+                </a:r>
+                <a:endParaRPr lang="en-US" b="1" dirty="0">
+                  <a:solidFill>
+                    <a:schemeClr val="tx1"/>
+                  </a:solidFill>
+                </a:endParaRPr>
+              </a:p>
+            </p:txBody>
+          </p:sp>
+          <p:sp>
+            <p:nvSpPr>
+              <p:cNvPr id="8" name="Rectangle 7">
+                <a:extLst>
+                  <a:ext uri="{FF2B5EF4-FFF2-40B4-BE49-F238E27FC236}">
+                    <a16:creationId xmlns:a16="http://schemas.microsoft.com/office/drawing/2014/main" id="{B7EE299C-96BC-A289-2D75-9CDFBB278EAB}"/>
+                  </a:ext>
+                </a:extLst>
+              </p:cNvPr>
+              <p:cNvSpPr/>
+              <p:nvPr/>
+            </p:nvSpPr>
+            <p:spPr>
+              <a:xfrm>
+                <a:off x="9003322" y="307850"/>
+                <a:ext cx="731520" cy="731520"/>
+              </a:xfrm>
+              <a:prstGeom prst="rect">
+                <a:avLst/>
+              </a:prstGeom>
+              <a:noFill/>
+              <a:ln w="38100">
+                <a:solidFill>
+                  <a:schemeClr val="tx1"/>
+                </a:solidFill>
+              </a:ln>
+            </p:spPr>
+            <p:style>
+              <a:lnRef idx="2">
+                <a:schemeClr val="accent1">
+                  <a:shade val="15000"/>
+                </a:schemeClr>
+              </a:lnRef>
+              <a:fillRef idx="1">
+                <a:schemeClr val="accent1"/>
+              </a:fillRef>
+              <a:effectRef idx="0">
+                <a:schemeClr val="accent1"/>
+              </a:effectRef>
+              <a:fontRef idx="minor">
+                <a:schemeClr val="lt1"/>
+              </a:fontRef>
+            </p:style>
+            <p:txBody>
+              <a:bodyPr rtlCol="0" anchor="ctr"/>
+              <a:lstStyle/>
+              <a:p>
+                <a:pPr algn="ctr"/>
+                <a:r>
+                  <a:rPr lang="en-US" sz="2400" b="1" dirty="0">
+                    <a:solidFill>
+                      <a:schemeClr val="tx1"/>
+                    </a:solidFill>
+                  </a:rPr>
+                  <a:t>1</a:t>
+                </a:r>
+                <a:endParaRPr lang="en-US" b="1" dirty="0">
+                  <a:solidFill>
+                    <a:schemeClr val="tx1"/>
+                  </a:solidFill>
+                </a:endParaRPr>
+              </a:p>
+            </p:txBody>
+          </p:sp>
+          <p:sp>
+            <p:nvSpPr>
+              <p:cNvPr id="9" name="Rectangle 8">
+                <a:extLst>
+                  <a:ext uri="{FF2B5EF4-FFF2-40B4-BE49-F238E27FC236}">
+                    <a16:creationId xmlns:a16="http://schemas.microsoft.com/office/drawing/2014/main" id="{B5A72DE7-0D09-5BBC-D874-5F321354855E}"/>
+                  </a:ext>
+                </a:extLst>
+              </p:cNvPr>
+              <p:cNvSpPr/>
+              <p:nvPr/>
+            </p:nvSpPr>
+            <p:spPr>
+              <a:xfrm>
+                <a:off x="9734842" y="307850"/>
+                <a:ext cx="731520" cy="731520"/>
+              </a:xfrm>
+              <a:prstGeom prst="rect">
+                <a:avLst/>
+              </a:prstGeom>
+              <a:noFill/>
+              <a:ln w="38100">
+                <a:solidFill>
+                  <a:schemeClr val="tx1"/>
+                </a:solidFill>
+              </a:ln>
+            </p:spPr>
+            <p:style>
+              <a:lnRef idx="2">
+                <a:schemeClr val="accent1">
+                  <a:shade val="15000"/>
+                </a:schemeClr>
+              </a:lnRef>
+              <a:fillRef idx="1">
+                <a:schemeClr val="accent1"/>
+              </a:fillRef>
+              <a:effectRef idx="0">
+                <a:schemeClr val="accent1"/>
+              </a:effectRef>
+              <a:fontRef idx="minor">
+                <a:schemeClr val="lt1"/>
+              </a:fontRef>
+            </p:style>
+            <p:txBody>
+              <a:bodyPr rtlCol="0" anchor="ctr"/>
+              <a:lstStyle/>
+              <a:p>
+                <a:pPr algn="ctr"/>
+                <a:r>
+                  <a:rPr lang="en-US" sz="2400" b="1" dirty="0">
+                    <a:solidFill>
+                      <a:schemeClr val="tx1"/>
+                    </a:solidFill>
+                  </a:rPr>
+                  <a:t>5</a:t>
+                </a:r>
+                <a:endParaRPr lang="en-US" b="1" dirty="0">
+                  <a:solidFill>
+                    <a:schemeClr val="tx1"/>
+                  </a:solidFill>
+                </a:endParaRPr>
+              </a:p>
+            </p:txBody>
+          </p:sp>
+          <p:sp>
+            <p:nvSpPr>
+              <p:cNvPr id="10" name="Rectangle 9">
+                <a:extLst>
+                  <a:ext uri="{FF2B5EF4-FFF2-40B4-BE49-F238E27FC236}">
+                    <a16:creationId xmlns:a16="http://schemas.microsoft.com/office/drawing/2014/main" id="{C47C3443-A529-BAC7-F0DB-B11581F22E46}"/>
+                  </a:ext>
+                </a:extLst>
+              </p:cNvPr>
+              <p:cNvSpPr/>
+              <p:nvPr/>
+            </p:nvSpPr>
+            <p:spPr>
+              <a:xfrm>
+                <a:off x="6808763" y="1039370"/>
+                <a:ext cx="731520" cy="731520"/>
+              </a:xfrm>
+              <a:prstGeom prst="rect">
+                <a:avLst/>
+              </a:prstGeom>
+              <a:noFill/>
+              <a:ln w="38100">
+                <a:solidFill>
+                  <a:schemeClr val="tx1"/>
+                </a:solidFill>
+              </a:ln>
+            </p:spPr>
+            <p:style>
+              <a:lnRef idx="2">
+                <a:schemeClr val="accent1">
+                  <a:shade val="15000"/>
+                </a:schemeClr>
+              </a:lnRef>
+              <a:fillRef idx="1">
+                <a:schemeClr val="accent1"/>
+              </a:fillRef>
+              <a:effectRef idx="0">
+                <a:schemeClr val="accent1"/>
+              </a:effectRef>
+              <a:fontRef idx="minor">
+                <a:schemeClr val="lt1"/>
+              </a:fontRef>
+            </p:style>
+            <p:txBody>
+              <a:bodyPr rtlCol="0" anchor="ctr"/>
+              <a:lstStyle/>
+              <a:p>
+                <a:pPr algn="ctr"/>
+                <a:r>
+                  <a:rPr lang="en-US" sz="2400" b="1" dirty="0">
+                    <a:solidFill>
+                      <a:schemeClr val="tx1"/>
+                    </a:solidFill>
+                  </a:rPr>
+                  <a:t>2</a:t>
+                </a:r>
+                <a:endParaRPr lang="en-US" b="1" dirty="0">
+                  <a:solidFill>
+                    <a:schemeClr val="tx1"/>
+                  </a:solidFill>
+                </a:endParaRPr>
+              </a:p>
+            </p:txBody>
+          </p:sp>
+          <p:sp>
+            <p:nvSpPr>
+              <p:cNvPr id="11" name="Rectangle 10">
+                <a:extLst>
+                  <a:ext uri="{FF2B5EF4-FFF2-40B4-BE49-F238E27FC236}">
+                    <a16:creationId xmlns:a16="http://schemas.microsoft.com/office/drawing/2014/main" id="{848E75F0-3712-8276-BFC5-651E250D0D52}"/>
+                  </a:ext>
+                </a:extLst>
+              </p:cNvPr>
+              <p:cNvSpPr/>
+              <p:nvPr/>
+            </p:nvSpPr>
+            <p:spPr>
+              <a:xfrm>
+                <a:off x="7540283" y="1039370"/>
+                <a:ext cx="731520" cy="731520"/>
+              </a:xfrm>
+              <a:prstGeom prst="rect">
+                <a:avLst/>
+              </a:prstGeom>
+              <a:solidFill>
+                <a:schemeClr val="accent2">
+                  <a:lumMod val="20000"/>
+                  <a:lumOff val="80000"/>
+                </a:schemeClr>
+              </a:solidFill>
+              <a:ln w="38100">
+                <a:solidFill>
+                  <a:schemeClr val="tx1"/>
+                </a:solidFill>
+              </a:ln>
+            </p:spPr>
+            <p:style>
+              <a:lnRef idx="2">
+                <a:schemeClr val="accent1">
+                  <a:shade val="15000"/>
+                </a:schemeClr>
+              </a:lnRef>
+              <a:fillRef idx="1">
+                <a:schemeClr val="accent1"/>
+              </a:fillRef>
+              <a:effectRef idx="0">
+                <a:schemeClr val="accent1"/>
+              </a:effectRef>
+              <a:fontRef idx="minor">
+                <a:schemeClr val="lt1"/>
+              </a:fontRef>
+            </p:style>
+            <p:txBody>
+              <a:bodyPr rtlCol="0" anchor="ctr"/>
+              <a:lstStyle/>
+              <a:p>
+                <a:pPr algn="ctr"/>
+                <a:r>
+                  <a:rPr lang="en-US" sz="2400" b="1" dirty="0">
+                    <a:solidFill>
+                      <a:schemeClr val="tx1"/>
+                    </a:solidFill>
+                  </a:rPr>
+                  <a:t>3</a:t>
+                </a:r>
+                <a:endParaRPr lang="en-US" b="1" dirty="0">
+                  <a:solidFill>
+                    <a:schemeClr val="tx1"/>
+                  </a:solidFill>
+                </a:endParaRPr>
+              </a:p>
+            </p:txBody>
+          </p:sp>
+          <p:sp>
+            <p:nvSpPr>
+              <p:cNvPr id="12" name="Rectangle 11">
+                <a:extLst>
+                  <a:ext uri="{FF2B5EF4-FFF2-40B4-BE49-F238E27FC236}">
+                    <a16:creationId xmlns:a16="http://schemas.microsoft.com/office/drawing/2014/main" id="{F20D40E6-1C9C-6AD0-049C-C133D1F9D70E}"/>
+                  </a:ext>
+                </a:extLst>
+              </p:cNvPr>
+              <p:cNvSpPr/>
+              <p:nvPr/>
+            </p:nvSpPr>
+            <p:spPr>
+              <a:xfrm>
+                <a:off x="8271803" y="1039370"/>
+                <a:ext cx="731520" cy="731520"/>
+              </a:xfrm>
+              <a:prstGeom prst="rect">
+                <a:avLst/>
+              </a:prstGeom>
+              <a:solidFill>
+                <a:schemeClr val="accent2">
+                  <a:lumMod val="20000"/>
+                  <a:lumOff val="80000"/>
+                </a:schemeClr>
+              </a:solidFill>
+              <a:ln w="38100">
+                <a:solidFill>
+                  <a:schemeClr val="tx1"/>
+                </a:solidFill>
+              </a:ln>
+            </p:spPr>
+            <p:style>
+              <a:lnRef idx="2">
+                <a:schemeClr val="accent1">
+                  <a:shade val="15000"/>
+                </a:schemeClr>
+              </a:lnRef>
+              <a:fillRef idx="1">
+                <a:schemeClr val="accent1"/>
+              </a:fillRef>
+              <a:effectRef idx="0">
+                <a:schemeClr val="accent1"/>
+              </a:effectRef>
+              <a:fontRef idx="minor">
+                <a:schemeClr val="lt1"/>
+              </a:fontRef>
+            </p:style>
+            <p:txBody>
+              <a:bodyPr rtlCol="0" anchor="ctr"/>
+              <a:lstStyle/>
+              <a:p>
+                <a:pPr algn="ctr"/>
+                <a:r>
+                  <a:rPr lang="en-US" sz="2400" b="1" dirty="0">
+                    <a:solidFill>
+                      <a:schemeClr val="tx1"/>
+                    </a:solidFill>
+                  </a:rPr>
+                  <a:t>4</a:t>
+                </a:r>
+                <a:endParaRPr lang="en-US" b="1" dirty="0">
+                  <a:solidFill>
+                    <a:schemeClr val="tx1"/>
+                  </a:solidFill>
+                </a:endParaRPr>
+              </a:p>
+            </p:txBody>
+          </p:sp>
+          <p:sp>
+            <p:nvSpPr>
+              <p:cNvPr id="13" name="Rectangle 12">
+                <a:extLst>
+                  <a:ext uri="{FF2B5EF4-FFF2-40B4-BE49-F238E27FC236}">
+                    <a16:creationId xmlns:a16="http://schemas.microsoft.com/office/drawing/2014/main" id="{7F625579-E662-0FFB-4C10-B1C02B03B404}"/>
+                  </a:ext>
+                </a:extLst>
+              </p:cNvPr>
+              <p:cNvSpPr/>
+              <p:nvPr/>
+            </p:nvSpPr>
+            <p:spPr>
+              <a:xfrm>
+                <a:off x="9003322" y="1039370"/>
+                <a:ext cx="731520" cy="731520"/>
+              </a:xfrm>
+              <a:prstGeom prst="rect">
+                <a:avLst/>
+              </a:prstGeom>
+              <a:noFill/>
+              <a:ln w="38100">
+                <a:solidFill>
+                  <a:schemeClr val="tx1"/>
+                </a:solidFill>
+              </a:ln>
+            </p:spPr>
+            <p:style>
+              <a:lnRef idx="2">
+                <a:schemeClr val="accent1">
+                  <a:shade val="15000"/>
+                </a:schemeClr>
+              </a:lnRef>
+              <a:fillRef idx="1">
+                <a:schemeClr val="accent1"/>
+              </a:fillRef>
+              <a:effectRef idx="0">
+                <a:schemeClr val="accent1"/>
+              </a:effectRef>
+              <a:fontRef idx="minor">
+                <a:schemeClr val="lt1"/>
+              </a:fontRef>
+            </p:style>
+            <p:txBody>
+              <a:bodyPr rtlCol="0" anchor="ctr"/>
+              <a:lstStyle/>
+              <a:p>
+                <a:pPr algn="ctr"/>
+                <a:r>
+                  <a:rPr lang="en-US" sz="2400" b="1" dirty="0">
+                    <a:solidFill>
+                      <a:schemeClr val="tx1"/>
+                    </a:solidFill>
+                  </a:rPr>
+                  <a:t>1</a:t>
+                </a:r>
+                <a:endParaRPr lang="en-US" b="1" dirty="0">
+                  <a:solidFill>
+                    <a:schemeClr val="tx1"/>
+                  </a:solidFill>
+                </a:endParaRPr>
+              </a:p>
+            </p:txBody>
+          </p:sp>
+          <p:sp>
+            <p:nvSpPr>
+              <p:cNvPr id="14" name="Rectangle 13">
+                <a:extLst>
+                  <a:ext uri="{FF2B5EF4-FFF2-40B4-BE49-F238E27FC236}">
+                    <a16:creationId xmlns:a16="http://schemas.microsoft.com/office/drawing/2014/main" id="{2E5A6CEA-4291-6EB3-EDA6-8801BB100CEB}"/>
+                  </a:ext>
+                </a:extLst>
+              </p:cNvPr>
+              <p:cNvSpPr/>
+              <p:nvPr/>
+            </p:nvSpPr>
+            <p:spPr>
+              <a:xfrm>
+                <a:off x="9734842" y="1039370"/>
+                <a:ext cx="731520" cy="731520"/>
+              </a:xfrm>
+              <a:prstGeom prst="rect">
+                <a:avLst/>
+              </a:prstGeom>
+              <a:noFill/>
+              <a:ln w="38100">
+                <a:solidFill>
+                  <a:schemeClr val="tx1"/>
+                </a:solidFill>
+              </a:ln>
+            </p:spPr>
+            <p:style>
+              <a:lnRef idx="2">
+                <a:schemeClr val="accent1">
+                  <a:shade val="15000"/>
+                </a:schemeClr>
+              </a:lnRef>
+              <a:fillRef idx="1">
+                <a:schemeClr val="accent1"/>
+              </a:fillRef>
+              <a:effectRef idx="0">
+                <a:schemeClr val="accent1"/>
+              </a:effectRef>
+              <a:fontRef idx="minor">
+                <a:schemeClr val="lt1"/>
+              </a:fontRef>
+            </p:style>
+            <p:txBody>
+              <a:bodyPr rtlCol="0" anchor="ctr"/>
+              <a:lstStyle/>
+              <a:p>
+                <a:pPr algn="ctr"/>
+                <a:r>
+                  <a:rPr lang="en-US" sz="2400" b="1" dirty="0">
+                    <a:solidFill>
+                      <a:schemeClr val="tx1"/>
+                    </a:solidFill>
+                  </a:rPr>
+                  <a:t>5</a:t>
+                </a:r>
+                <a:endParaRPr lang="en-US" b="1" dirty="0">
+                  <a:solidFill>
+                    <a:schemeClr val="tx1"/>
+                  </a:solidFill>
+                </a:endParaRPr>
+              </a:p>
+            </p:txBody>
+          </p:sp>
+          <p:sp>
+            <p:nvSpPr>
+              <p:cNvPr id="15" name="Rectangle 14">
+                <a:extLst>
+                  <a:ext uri="{FF2B5EF4-FFF2-40B4-BE49-F238E27FC236}">
+                    <a16:creationId xmlns:a16="http://schemas.microsoft.com/office/drawing/2014/main" id="{C6D28170-2474-3CE5-7CAC-A34C79DC8FDB}"/>
+                  </a:ext>
+                </a:extLst>
+              </p:cNvPr>
+              <p:cNvSpPr/>
+              <p:nvPr/>
+            </p:nvSpPr>
+            <p:spPr>
+              <a:xfrm>
+                <a:off x="6808763" y="1770890"/>
+                <a:ext cx="731520" cy="731520"/>
+              </a:xfrm>
+              <a:prstGeom prst="rect">
+                <a:avLst/>
+              </a:prstGeom>
+              <a:noFill/>
+              <a:ln w="38100">
+                <a:solidFill>
+                  <a:schemeClr val="tx1"/>
+                </a:solidFill>
+              </a:ln>
+            </p:spPr>
+            <p:style>
+              <a:lnRef idx="2">
+                <a:schemeClr val="accent1">
+                  <a:shade val="15000"/>
+                </a:schemeClr>
+              </a:lnRef>
+              <a:fillRef idx="1">
+                <a:schemeClr val="accent1"/>
+              </a:fillRef>
+              <a:effectRef idx="0">
+                <a:schemeClr val="accent1"/>
+              </a:effectRef>
+              <a:fontRef idx="minor">
+                <a:schemeClr val="lt1"/>
+              </a:fontRef>
+            </p:style>
+            <p:txBody>
+              <a:bodyPr rtlCol="0" anchor="ctr"/>
+              <a:lstStyle/>
+              <a:p>
+                <a:pPr algn="ctr"/>
+                <a:r>
+                  <a:rPr lang="en-US" sz="2400" b="1" dirty="0">
+                    <a:solidFill>
+                      <a:schemeClr val="tx1"/>
+                    </a:solidFill>
+                  </a:rPr>
+                  <a:t>2</a:t>
+                </a:r>
+                <a:endParaRPr lang="en-US" b="1" dirty="0">
+                  <a:solidFill>
+                    <a:schemeClr val="tx1"/>
+                  </a:solidFill>
+                </a:endParaRPr>
+              </a:p>
+            </p:txBody>
+          </p:sp>
+          <p:sp>
+            <p:nvSpPr>
+              <p:cNvPr id="16" name="Rectangle 15">
+                <a:extLst>
+                  <a:ext uri="{FF2B5EF4-FFF2-40B4-BE49-F238E27FC236}">
+                    <a16:creationId xmlns:a16="http://schemas.microsoft.com/office/drawing/2014/main" id="{34D5539F-F56D-951B-19A1-81E3B23E14ED}"/>
+                  </a:ext>
+                </a:extLst>
+              </p:cNvPr>
+              <p:cNvSpPr/>
+              <p:nvPr/>
+            </p:nvSpPr>
+            <p:spPr>
+              <a:xfrm>
+                <a:off x="7540283" y="1770890"/>
+                <a:ext cx="731520" cy="731520"/>
+              </a:xfrm>
+              <a:prstGeom prst="rect">
+                <a:avLst/>
+              </a:prstGeom>
+              <a:noFill/>
+              <a:ln w="38100">
+                <a:solidFill>
+                  <a:schemeClr val="tx1"/>
+                </a:solidFill>
+              </a:ln>
+            </p:spPr>
+            <p:style>
+              <a:lnRef idx="2">
+                <a:schemeClr val="accent1">
+                  <a:shade val="15000"/>
+                </a:schemeClr>
+              </a:lnRef>
+              <a:fillRef idx="1">
+                <a:schemeClr val="accent1"/>
+              </a:fillRef>
+              <a:effectRef idx="0">
+                <a:schemeClr val="accent1"/>
+              </a:effectRef>
+              <a:fontRef idx="minor">
+                <a:schemeClr val="lt1"/>
+              </a:fontRef>
+            </p:style>
+            <p:txBody>
+              <a:bodyPr rtlCol="0" anchor="ctr"/>
+              <a:lstStyle/>
+              <a:p>
+                <a:pPr algn="ctr"/>
+                <a:r>
+                  <a:rPr lang="en-US" sz="2400" b="1" dirty="0">
+                    <a:solidFill>
+                      <a:schemeClr val="tx1"/>
+                    </a:solidFill>
+                  </a:rPr>
+                  <a:t>3</a:t>
+                </a:r>
+                <a:endParaRPr lang="en-US" b="1" dirty="0">
+                  <a:solidFill>
+                    <a:schemeClr val="tx1"/>
+                  </a:solidFill>
+                </a:endParaRPr>
+              </a:p>
+            </p:txBody>
+          </p:sp>
+          <p:sp>
+            <p:nvSpPr>
+              <p:cNvPr id="17" name="Rectangle 16">
+                <a:extLst>
+                  <a:ext uri="{FF2B5EF4-FFF2-40B4-BE49-F238E27FC236}">
+                    <a16:creationId xmlns:a16="http://schemas.microsoft.com/office/drawing/2014/main" id="{3B6C5D95-46E0-452A-DCEF-A2F2476BB423}"/>
+                  </a:ext>
+                </a:extLst>
+              </p:cNvPr>
+              <p:cNvSpPr/>
+              <p:nvPr/>
+            </p:nvSpPr>
+            <p:spPr>
+              <a:xfrm>
+                <a:off x="8271803" y="1770890"/>
+                <a:ext cx="731520" cy="731520"/>
+              </a:xfrm>
+              <a:prstGeom prst="rect">
+                <a:avLst/>
+              </a:prstGeom>
+              <a:solidFill>
+                <a:schemeClr val="accent2">
+                  <a:lumMod val="60000"/>
+                  <a:lumOff val="40000"/>
+                </a:schemeClr>
+              </a:solidFill>
+              <a:ln w="38100">
+                <a:solidFill>
+                  <a:schemeClr val="tx1"/>
+                </a:solidFill>
+              </a:ln>
+            </p:spPr>
+            <p:style>
+              <a:lnRef idx="2">
+                <a:schemeClr val="accent1">
+                  <a:shade val="15000"/>
+                </a:schemeClr>
+              </a:lnRef>
+              <a:fillRef idx="1">
+                <a:schemeClr val="accent1"/>
+              </a:fillRef>
+              <a:effectRef idx="0">
+                <a:schemeClr val="accent1"/>
+              </a:effectRef>
+              <a:fontRef idx="minor">
+                <a:schemeClr val="lt1"/>
+              </a:fontRef>
+            </p:style>
+            <p:txBody>
+              <a:bodyPr rtlCol="0" anchor="ctr"/>
+              <a:lstStyle/>
+              <a:p>
+                <a:pPr algn="ctr"/>
+                <a:r>
+                  <a:rPr lang="en-US" sz="2400" b="1" dirty="0">
+                    <a:solidFill>
+                      <a:schemeClr val="tx1"/>
+                    </a:solidFill>
+                  </a:rPr>
+                  <a:t>4</a:t>
+                </a:r>
+                <a:endParaRPr lang="en-US" b="1" dirty="0">
+                  <a:solidFill>
+                    <a:schemeClr val="tx1"/>
+                  </a:solidFill>
+                </a:endParaRPr>
+              </a:p>
+            </p:txBody>
+          </p:sp>
+          <p:sp>
+            <p:nvSpPr>
+              <p:cNvPr id="18" name="Rectangle 17">
+                <a:extLst>
+                  <a:ext uri="{FF2B5EF4-FFF2-40B4-BE49-F238E27FC236}">
+                    <a16:creationId xmlns:a16="http://schemas.microsoft.com/office/drawing/2014/main" id="{C1CB5F45-BF74-E62A-8EAC-7B2DF8C993B6}"/>
+                  </a:ext>
+                </a:extLst>
+              </p:cNvPr>
+              <p:cNvSpPr/>
+              <p:nvPr/>
+            </p:nvSpPr>
+            <p:spPr>
+              <a:xfrm>
+                <a:off x="9003322" y="1770890"/>
+                <a:ext cx="731520" cy="731520"/>
+              </a:xfrm>
+              <a:prstGeom prst="rect">
+                <a:avLst/>
+              </a:prstGeom>
+              <a:solidFill>
+                <a:schemeClr val="accent2">
+                  <a:lumMod val="60000"/>
+                  <a:lumOff val="40000"/>
+                </a:schemeClr>
+              </a:solidFill>
+              <a:ln w="38100">
+                <a:solidFill>
+                  <a:schemeClr val="tx1"/>
+                </a:solidFill>
+              </a:ln>
+            </p:spPr>
+            <p:style>
+              <a:lnRef idx="2">
+                <a:schemeClr val="accent1">
+                  <a:shade val="15000"/>
+                </a:schemeClr>
+              </a:lnRef>
+              <a:fillRef idx="1">
+                <a:schemeClr val="accent1"/>
+              </a:fillRef>
+              <a:effectRef idx="0">
+                <a:schemeClr val="accent1"/>
+              </a:effectRef>
+              <a:fontRef idx="minor">
+                <a:schemeClr val="lt1"/>
+              </a:fontRef>
+            </p:style>
+            <p:txBody>
+              <a:bodyPr rtlCol="0" anchor="ctr"/>
+              <a:lstStyle/>
+              <a:p>
+                <a:pPr algn="ctr"/>
+                <a:r>
+                  <a:rPr lang="en-US" sz="2400" b="1" dirty="0">
+                    <a:solidFill>
+                      <a:schemeClr val="tx1"/>
+                    </a:solidFill>
+                  </a:rPr>
+                  <a:t>1</a:t>
+                </a:r>
+                <a:endParaRPr lang="en-US" b="1" dirty="0">
+                  <a:solidFill>
+                    <a:schemeClr val="tx1"/>
+                  </a:solidFill>
+                </a:endParaRPr>
+              </a:p>
+            </p:txBody>
+          </p:sp>
+          <p:sp>
+            <p:nvSpPr>
+              <p:cNvPr id="19" name="Rectangle 18">
+                <a:extLst>
+                  <a:ext uri="{FF2B5EF4-FFF2-40B4-BE49-F238E27FC236}">
+                    <a16:creationId xmlns:a16="http://schemas.microsoft.com/office/drawing/2014/main" id="{BD480A11-3A10-E735-DF44-EAB4B2F8F36E}"/>
+                  </a:ext>
+                </a:extLst>
+              </p:cNvPr>
+              <p:cNvSpPr/>
+              <p:nvPr/>
+            </p:nvSpPr>
+            <p:spPr>
+              <a:xfrm>
+                <a:off x="9734842" y="1770890"/>
+                <a:ext cx="731520" cy="731520"/>
+              </a:xfrm>
+              <a:prstGeom prst="rect">
+                <a:avLst/>
+              </a:prstGeom>
+              <a:noFill/>
+              <a:ln w="38100">
+                <a:solidFill>
+                  <a:schemeClr val="tx1"/>
+                </a:solidFill>
+              </a:ln>
+            </p:spPr>
+            <p:style>
+              <a:lnRef idx="2">
+                <a:schemeClr val="accent1">
+                  <a:shade val="15000"/>
+                </a:schemeClr>
+              </a:lnRef>
+              <a:fillRef idx="1">
+                <a:schemeClr val="accent1"/>
+              </a:fillRef>
+              <a:effectRef idx="0">
+                <a:schemeClr val="accent1"/>
+              </a:effectRef>
+              <a:fontRef idx="minor">
+                <a:schemeClr val="lt1"/>
+              </a:fontRef>
+            </p:style>
+            <p:txBody>
+              <a:bodyPr rtlCol="0" anchor="ctr"/>
+              <a:lstStyle/>
+              <a:p>
+                <a:pPr algn="ctr"/>
+                <a:r>
+                  <a:rPr lang="en-US" sz="2400" b="1" dirty="0">
+                    <a:solidFill>
+                      <a:schemeClr val="tx1"/>
+                    </a:solidFill>
+                  </a:rPr>
+                  <a:t>5</a:t>
+                </a:r>
+                <a:endParaRPr lang="en-US" b="1" dirty="0">
+                  <a:solidFill>
+                    <a:schemeClr val="tx1"/>
+                  </a:solidFill>
+                </a:endParaRPr>
+              </a:p>
+            </p:txBody>
+          </p:sp>
+        </p:grpSp>
+        <p:sp>
+          <p:nvSpPr>
+            <p:cNvPr id="4" name="Rectangle 3">
+              <a:extLst>
+                <a:ext uri="{FF2B5EF4-FFF2-40B4-BE49-F238E27FC236}">
+                  <a16:creationId xmlns:a16="http://schemas.microsoft.com/office/drawing/2014/main" id="{9991218D-4D06-9F7B-7697-F08CE77481CC}"/>
+                </a:ext>
+              </a:extLst>
+            </p:cNvPr>
+            <p:cNvSpPr/>
+            <p:nvPr/>
+          </p:nvSpPr>
+          <p:spPr>
+            <a:xfrm>
+              <a:off x="6808763" y="307850"/>
+              <a:ext cx="3657599" cy="5927834"/>
+            </a:xfrm>
+            <a:prstGeom prst="rect">
+              <a:avLst/>
+            </a:prstGeom>
+            <a:solidFill>
+              <a:schemeClr val="bg1"/>
+            </a:solidFill>
+            <a:ln w="38100">
+              <a:solidFill>
+                <a:schemeClr val="bg1"/>
+              </a:solidFill>
+            </a:ln>
+          </p:spPr>
+          <p:style>
+            <a:lnRef idx="2">
+              <a:schemeClr val="accent1">
+                <a:shade val="15000"/>
+              </a:schemeClr>
+            </a:lnRef>
+            <a:fillRef idx="1">
+              <a:schemeClr val="accent1"/>
+            </a:fillRef>
+            <a:effectRef idx="0">
+              <a:schemeClr val="accent1"/>
+            </a:effectRef>
+            <a:fontRef idx="minor">
+              <a:schemeClr val="lt1"/>
+            </a:fontRef>
+          </p:style>
+          <p:txBody>
+            <a:bodyPr rtlCol="0" anchor="ctr"/>
+            <a:lstStyle/>
+            <a:p>
+              <a:pPr algn="ctr"/>
+              <a:endParaRPr lang="en-US"/>
+            </a:p>
+          </p:txBody>
+        </p:sp>
+      </p:grpSp>
+    </p:spTree>
+    <p:extLst>
+      <p:ext uri="{BB962C8B-B14F-4D97-AF65-F5344CB8AC3E}">
+        <p14:creationId xmlns:p14="http://schemas.microsoft.com/office/powerpoint/2010/main" val="3635734078"/>
       </p:ext>
     </p:extLst>
   </p:cSld>

</xml_diff>

<commit_message>
finished introduction and learning block, also added alternative finish page look
</commit_message>
<xml_diff>
--- a/assets/Symbols.pptx
+++ b/assets/Symbols.pptx
@@ -4,6 +4,9 @@
   <p:sldMasterIdLst>
     <p:sldMasterId id="2147483648" r:id="rId1"/>
   </p:sldMasterIdLst>
+  <p:notesMasterIdLst>
+    <p:notesMasterId r:id="rId24"/>
+  </p:notesMasterIdLst>
   <p:sldIdLst>
     <p:sldId id="256" r:id="rId2"/>
     <p:sldId id="257" r:id="rId3"/>
@@ -17,7 +20,16 @@
     <p:sldId id="265" r:id="rId11"/>
     <p:sldId id="267" r:id="rId12"/>
     <p:sldId id="268" r:id="rId13"/>
-    <p:sldId id="266" r:id="rId14"/>
+    <p:sldId id="275" r:id="rId14"/>
+    <p:sldId id="266" r:id="rId15"/>
+    <p:sldId id="277" r:id="rId16"/>
+    <p:sldId id="269" r:id="rId17"/>
+    <p:sldId id="270" r:id="rId18"/>
+    <p:sldId id="271" r:id="rId19"/>
+    <p:sldId id="272" r:id="rId20"/>
+    <p:sldId id="273" r:id="rId21"/>
+    <p:sldId id="274" r:id="rId22"/>
+    <p:sldId id="276" r:id="rId23"/>
   </p:sldIdLst>
   <p:sldSz cx="12192000" cy="6858000"/>
   <p:notesSz cx="6858000" cy="9144000"/>
@@ -137,7 +149,20 @@
             <p14:sldId id="265"/>
             <p14:sldId id="267"/>
             <p14:sldId id="268"/>
+            <p14:sldId id="275"/>
             <p14:sldId id="266"/>
+          </p14:sldIdLst>
+        </p14:section>
+        <p14:section name="Gold" id="{5BEF7307-E53E-46E8-A0AF-390BC7659F63}">
+          <p14:sldIdLst>
+            <p14:sldId id="277"/>
+            <p14:sldId id="269"/>
+            <p14:sldId id="270"/>
+            <p14:sldId id="271"/>
+            <p14:sldId id="272"/>
+            <p14:sldId id="273"/>
+            <p14:sldId id="274"/>
+            <p14:sldId id="276"/>
           </p14:sldIdLst>
         </p14:section>
       </p14:sectionLst>
@@ -147,6 +172,439 @@
     </p:ext>
   </p:extLst>
 </p:presentation>
+</file>
+
+<file path=ppt/notesMasters/notesMaster1.xml><?xml version="1.0" encoding="utf-8"?>
+<p:notesMaster xmlns:a="http://schemas.openxmlformats.org/drawingml/2006/main" xmlns:r="http://schemas.openxmlformats.org/officeDocument/2006/relationships" xmlns:p="http://schemas.openxmlformats.org/presentationml/2006/main">
+  <p:cSld>
+    <p:bg>
+      <p:bgRef idx="1001">
+        <a:schemeClr val="bg1"/>
+      </p:bgRef>
+    </p:bg>
+    <p:spTree>
+      <p:nvGrpSpPr>
+        <p:cNvPr id="1" name=""/>
+        <p:cNvGrpSpPr/>
+        <p:nvPr/>
+      </p:nvGrpSpPr>
+      <p:grpSpPr>
+        <a:xfrm>
+          <a:off x="0" y="0"/>
+          <a:ext cx="0" cy="0"/>
+          <a:chOff x="0" y="0"/>
+          <a:chExt cx="0" cy="0"/>
+        </a:xfrm>
+      </p:grpSpPr>
+      <p:sp>
+        <p:nvSpPr>
+          <p:cNvPr id="2" name="Header Placeholder 1"/>
+          <p:cNvSpPr>
+            <a:spLocks noGrp="1"/>
+          </p:cNvSpPr>
+          <p:nvPr>
+            <p:ph type="hdr" sz="quarter"/>
+          </p:nvPr>
+        </p:nvSpPr>
+        <p:spPr>
+          <a:xfrm>
+            <a:off x="0" y="0"/>
+            <a:ext cx="2971800" cy="458788"/>
+          </a:xfrm>
+          <a:prstGeom prst="rect">
+            <a:avLst/>
+          </a:prstGeom>
+        </p:spPr>
+        <p:txBody>
+          <a:bodyPr vert="horz" lIns="91440" tIns="45720" rIns="91440" bIns="45720" rtlCol="0"/>
+          <a:lstStyle>
+            <a:lvl1pPr algn="l">
+              <a:defRPr sz="1200"/>
+            </a:lvl1pPr>
+          </a:lstStyle>
+          <a:p>
+            <a:endParaRPr lang="en-US"/>
+          </a:p>
+        </p:txBody>
+      </p:sp>
+      <p:sp>
+        <p:nvSpPr>
+          <p:cNvPr id="3" name="Date Placeholder 2"/>
+          <p:cNvSpPr>
+            <a:spLocks noGrp="1"/>
+          </p:cNvSpPr>
+          <p:nvPr>
+            <p:ph type="dt" idx="1"/>
+          </p:nvPr>
+        </p:nvSpPr>
+        <p:spPr>
+          <a:xfrm>
+            <a:off x="3884613" y="0"/>
+            <a:ext cx="2971800" cy="458788"/>
+          </a:xfrm>
+          <a:prstGeom prst="rect">
+            <a:avLst/>
+          </a:prstGeom>
+        </p:spPr>
+        <p:txBody>
+          <a:bodyPr vert="horz" lIns="91440" tIns="45720" rIns="91440" bIns="45720" rtlCol="0"/>
+          <a:lstStyle>
+            <a:lvl1pPr algn="r">
+              <a:defRPr sz="1200"/>
+            </a:lvl1pPr>
+          </a:lstStyle>
+          <a:p>
+            <a:fld id="{4CE80203-1554-4B47-9518-27150A8A6789}" type="datetimeFigureOut">
+              <a:rPr lang="en-US" smtClean="0"/>
+              <a:t>10/29/2024</a:t>
+            </a:fld>
+            <a:endParaRPr lang="en-US"/>
+          </a:p>
+        </p:txBody>
+      </p:sp>
+      <p:sp>
+        <p:nvSpPr>
+          <p:cNvPr id="4" name="Slide Image Placeholder 3"/>
+          <p:cNvSpPr>
+            <a:spLocks noGrp="1" noRot="1" noChangeAspect="1"/>
+          </p:cNvSpPr>
+          <p:nvPr>
+            <p:ph type="sldImg" idx="2"/>
+          </p:nvPr>
+        </p:nvSpPr>
+        <p:spPr>
+          <a:xfrm>
+            <a:off x="685800" y="1143000"/>
+            <a:ext cx="5486400" cy="3086100"/>
+          </a:xfrm>
+          <a:prstGeom prst="rect">
+            <a:avLst/>
+          </a:prstGeom>
+          <a:noFill/>
+          <a:ln w="12700">
+            <a:solidFill>
+              <a:prstClr val="black"/>
+            </a:solidFill>
+          </a:ln>
+        </p:spPr>
+        <p:txBody>
+          <a:bodyPr vert="horz" lIns="91440" tIns="45720" rIns="91440" bIns="45720" rtlCol="0" anchor="ctr"/>
+          <a:lstStyle/>
+          <a:p>
+            <a:endParaRPr lang="en-US"/>
+          </a:p>
+        </p:txBody>
+      </p:sp>
+      <p:sp>
+        <p:nvSpPr>
+          <p:cNvPr id="5" name="Notes Placeholder 4"/>
+          <p:cNvSpPr>
+            <a:spLocks noGrp="1"/>
+          </p:cNvSpPr>
+          <p:nvPr>
+            <p:ph type="body" sz="quarter" idx="3"/>
+          </p:nvPr>
+        </p:nvSpPr>
+        <p:spPr>
+          <a:xfrm>
+            <a:off x="685800" y="4400550"/>
+            <a:ext cx="5486400" cy="3600450"/>
+          </a:xfrm>
+          <a:prstGeom prst="rect">
+            <a:avLst/>
+          </a:prstGeom>
+        </p:spPr>
+        <p:txBody>
+          <a:bodyPr vert="horz" lIns="91440" tIns="45720" rIns="91440" bIns="45720" rtlCol="0"/>
+          <a:lstStyle/>
+          <a:p>
+            <a:pPr lvl="0"/>
+            <a:r>
+              <a:rPr lang="en-US"/>
+              <a:t>Click to edit Master text styles</a:t>
+            </a:r>
+          </a:p>
+          <a:p>
+            <a:pPr lvl="1"/>
+            <a:r>
+              <a:rPr lang="en-US"/>
+              <a:t>Second level</a:t>
+            </a:r>
+          </a:p>
+          <a:p>
+            <a:pPr lvl="2"/>
+            <a:r>
+              <a:rPr lang="en-US"/>
+              <a:t>Third level</a:t>
+            </a:r>
+          </a:p>
+          <a:p>
+            <a:pPr lvl="3"/>
+            <a:r>
+              <a:rPr lang="en-US"/>
+              <a:t>Fourth level</a:t>
+            </a:r>
+          </a:p>
+          <a:p>
+            <a:pPr lvl="4"/>
+            <a:r>
+              <a:rPr lang="en-US"/>
+              <a:t>Fifth level</a:t>
+            </a:r>
+          </a:p>
+        </p:txBody>
+      </p:sp>
+      <p:sp>
+        <p:nvSpPr>
+          <p:cNvPr id="6" name="Footer Placeholder 5"/>
+          <p:cNvSpPr>
+            <a:spLocks noGrp="1"/>
+          </p:cNvSpPr>
+          <p:nvPr>
+            <p:ph type="ftr" sz="quarter" idx="4"/>
+          </p:nvPr>
+        </p:nvSpPr>
+        <p:spPr>
+          <a:xfrm>
+            <a:off x="0" y="8685213"/>
+            <a:ext cx="2971800" cy="458787"/>
+          </a:xfrm>
+          <a:prstGeom prst="rect">
+            <a:avLst/>
+          </a:prstGeom>
+        </p:spPr>
+        <p:txBody>
+          <a:bodyPr vert="horz" lIns="91440" tIns="45720" rIns="91440" bIns="45720" rtlCol="0" anchor="b"/>
+          <a:lstStyle>
+            <a:lvl1pPr algn="l">
+              <a:defRPr sz="1200"/>
+            </a:lvl1pPr>
+          </a:lstStyle>
+          <a:p>
+            <a:endParaRPr lang="en-US"/>
+          </a:p>
+        </p:txBody>
+      </p:sp>
+      <p:sp>
+        <p:nvSpPr>
+          <p:cNvPr id="7" name="Slide Number Placeholder 6"/>
+          <p:cNvSpPr>
+            <a:spLocks noGrp="1"/>
+          </p:cNvSpPr>
+          <p:nvPr>
+            <p:ph type="sldNum" sz="quarter" idx="5"/>
+          </p:nvPr>
+        </p:nvSpPr>
+        <p:spPr>
+          <a:xfrm>
+            <a:off x="3884613" y="8685213"/>
+            <a:ext cx="2971800" cy="458787"/>
+          </a:xfrm>
+          <a:prstGeom prst="rect">
+            <a:avLst/>
+          </a:prstGeom>
+        </p:spPr>
+        <p:txBody>
+          <a:bodyPr vert="horz" lIns="91440" tIns="45720" rIns="91440" bIns="45720" rtlCol="0" anchor="b"/>
+          <a:lstStyle>
+            <a:lvl1pPr algn="r">
+              <a:defRPr sz="1200"/>
+            </a:lvl1pPr>
+          </a:lstStyle>
+          <a:p>
+            <a:fld id="{81F5EC15-3DE6-4FF5-A1BC-711E74F64827}" type="slidenum">
+              <a:rPr lang="en-US" smtClean="0"/>
+              <a:t>‹#›</a:t>
+            </a:fld>
+            <a:endParaRPr lang="en-US"/>
+          </a:p>
+        </p:txBody>
+      </p:sp>
+    </p:spTree>
+    <p:extLst>
+      <p:ext uri="{BB962C8B-B14F-4D97-AF65-F5344CB8AC3E}">
+        <p14:creationId xmlns:p14="http://schemas.microsoft.com/office/powerpoint/2010/main" val="3575808842"/>
+      </p:ext>
+    </p:extLst>
+  </p:cSld>
+  <p:clrMap bg1="lt1" tx1="dk1" bg2="lt2" tx2="dk2" accent1="accent1" accent2="accent2" accent3="accent3" accent4="accent4" accent5="accent5" accent6="accent6" hlink="hlink" folHlink="folHlink"/>
+  <p:notesStyle>
+    <a:lvl1pPr marL="0" algn="l" defTabSz="914400" rtl="0" eaLnBrk="1" latinLnBrk="0" hangingPunct="1">
+      <a:defRPr sz="1200" kern="1200">
+        <a:solidFill>
+          <a:schemeClr val="tx1"/>
+        </a:solidFill>
+        <a:latin typeface="+mn-lt"/>
+        <a:ea typeface="+mn-ea"/>
+        <a:cs typeface="+mn-cs"/>
+      </a:defRPr>
+    </a:lvl1pPr>
+    <a:lvl2pPr marL="457200" algn="l" defTabSz="914400" rtl="0" eaLnBrk="1" latinLnBrk="0" hangingPunct="1">
+      <a:defRPr sz="1200" kern="1200">
+        <a:solidFill>
+          <a:schemeClr val="tx1"/>
+        </a:solidFill>
+        <a:latin typeface="+mn-lt"/>
+        <a:ea typeface="+mn-ea"/>
+        <a:cs typeface="+mn-cs"/>
+      </a:defRPr>
+    </a:lvl2pPr>
+    <a:lvl3pPr marL="914400" algn="l" defTabSz="914400" rtl="0" eaLnBrk="1" latinLnBrk="0" hangingPunct="1">
+      <a:defRPr sz="1200" kern="1200">
+        <a:solidFill>
+          <a:schemeClr val="tx1"/>
+        </a:solidFill>
+        <a:latin typeface="+mn-lt"/>
+        <a:ea typeface="+mn-ea"/>
+        <a:cs typeface="+mn-cs"/>
+      </a:defRPr>
+    </a:lvl3pPr>
+    <a:lvl4pPr marL="1371600" algn="l" defTabSz="914400" rtl="0" eaLnBrk="1" latinLnBrk="0" hangingPunct="1">
+      <a:defRPr sz="1200" kern="1200">
+        <a:solidFill>
+          <a:schemeClr val="tx1"/>
+        </a:solidFill>
+        <a:latin typeface="+mn-lt"/>
+        <a:ea typeface="+mn-ea"/>
+        <a:cs typeface="+mn-cs"/>
+      </a:defRPr>
+    </a:lvl4pPr>
+    <a:lvl5pPr marL="1828800" algn="l" defTabSz="914400" rtl="0" eaLnBrk="1" latinLnBrk="0" hangingPunct="1">
+      <a:defRPr sz="1200" kern="1200">
+        <a:solidFill>
+          <a:schemeClr val="tx1"/>
+        </a:solidFill>
+        <a:latin typeface="+mn-lt"/>
+        <a:ea typeface="+mn-ea"/>
+        <a:cs typeface="+mn-cs"/>
+      </a:defRPr>
+    </a:lvl5pPr>
+    <a:lvl6pPr marL="2286000" algn="l" defTabSz="914400" rtl="0" eaLnBrk="1" latinLnBrk="0" hangingPunct="1">
+      <a:defRPr sz="1200" kern="1200">
+        <a:solidFill>
+          <a:schemeClr val="tx1"/>
+        </a:solidFill>
+        <a:latin typeface="+mn-lt"/>
+        <a:ea typeface="+mn-ea"/>
+        <a:cs typeface="+mn-cs"/>
+      </a:defRPr>
+    </a:lvl6pPr>
+    <a:lvl7pPr marL="2743200" algn="l" defTabSz="914400" rtl="0" eaLnBrk="1" latinLnBrk="0" hangingPunct="1">
+      <a:defRPr sz="1200" kern="1200">
+        <a:solidFill>
+          <a:schemeClr val="tx1"/>
+        </a:solidFill>
+        <a:latin typeface="+mn-lt"/>
+        <a:ea typeface="+mn-ea"/>
+        <a:cs typeface="+mn-cs"/>
+      </a:defRPr>
+    </a:lvl7pPr>
+    <a:lvl8pPr marL="3200400" algn="l" defTabSz="914400" rtl="0" eaLnBrk="1" latinLnBrk="0" hangingPunct="1">
+      <a:defRPr sz="1200" kern="1200">
+        <a:solidFill>
+          <a:schemeClr val="tx1"/>
+        </a:solidFill>
+        <a:latin typeface="+mn-lt"/>
+        <a:ea typeface="+mn-ea"/>
+        <a:cs typeface="+mn-cs"/>
+      </a:defRPr>
+    </a:lvl8pPr>
+    <a:lvl9pPr marL="3657600" algn="l" defTabSz="914400" rtl="0" eaLnBrk="1" latinLnBrk="0" hangingPunct="1">
+      <a:defRPr sz="1200" kern="1200">
+        <a:solidFill>
+          <a:schemeClr val="tx1"/>
+        </a:solidFill>
+        <a:latin typeface="+mn-lt"/>
+        <a:ea typeface="+mn-ea"/>
+        <a:cs typeface="+mn-cs"/>
+      </a:defRPr>
+    </a:lvl9pPr>
+  </p:notesStyle>
+</p:notesMaster>
+</file>
+
+<file path=ppt/notesSlides/notesSlide1.xml><?xml version="1.0" encoding="utf-8"?>
+<p:notes xmlns:a="http://schemas.openxmlformats.org/drawingml/2006/main" xmlns:r="http://schemas.openxmlformats.org/officeDocument/2006/relationships" xmlns:p="http://schemas.openxmlformats.org/presentationml/2006/main">
+  <p:cSld>
+    <p:spTree>
+      <p:nvGrpSpPr>
+        <p:cNvPr id="1" name=""/>
+        <p:cNvGrpSpPr/>
+        <p:nvPr/>
+      </p:nvGrpSpPr>
+      <p:grpSpPr>
+        <a:xfrm>
+          <a:off x="0" y="0"/>
+          <a:ext cx="0" cy="0"/>
+          <a:chOff x="0" y="0"/>
+          <a:chExt cx="0" cy="0"/>
+        </a:xfrm>
+      </p:grpSpPr>
+      <p:sp>
+        <p:nvSpPr>
+          <p:cNvPr id="2" name="Slide Image Placeholder 1"/>
+          <p:cNvSpPr>
+            <a:spLocks noGrp="1" noRot="1" noChangeAspect="1"/>
+          </p:cNvSpPr>
+          <p:nvPr>
+            <p:ph type="sldImg"/>
+          </p:nvPr>
+        </p:nvSpPr>
+        <p:spPr/>
+      </p:sp>
+      <p:sp>
+        <p:nvSpPr>
+          <p:cNvPr id="3" name="Notes Placeholder 2"/>
+          <p:cNvSpPr>
+            <a:spLocks noGrp="1"/>
+          </p:cNvSpPr>
+          <p:nvPr>
+            <p:ph type="body" idx="1"/>
+          </p:nvPr>
+        </p:nvSpPr>
+        <p:spPr/>
+        <p:txBody>
+          <a:bodyPr/>
+          <a:lstStyle/>
+          <a:p>
+            <a:endParaRPr lang="en-US" dirty="0"/>
+          </a:p>
+        </p:txBody>
+      </p:sp>
+      <p:sp>
+        <p:nvSpPr>
+          <p:cNvPr id="4" name="Slide Number Placeholder 3"/>
+          <p:cNvSpPr>
+            <a:spLocks noGrp="1"/>
+          </p:cNvSpPr>
+          <p:nvPr>
+            <p:ph type="sldNum" sz="quarter" idx="5"/>
+          </p:nvPr>
+        </p:nvSpPr>
+        <p:spPr/>
+        <p:txBody>
+          <a:bodyPr/>
+          <a:lstStyle/>
+          <a:p>
+            <a:fld id="{81F5EC15-3DE6-4FF5-A1BC-711E74F64827}" type="slidenum">
+              <a:rPr lang="en-US" smtClean="0"/>
+              <a:t>17</a:t>
+            </a:fld>
+            <a:endParaRPr lang="en-US"/>
+          </a:p>
+        </p:txBody>
+      </p:sp>
+    </p:spTree>
+    <p:extLst>
+      <p:ext uri="{BB962C8B-B14F-4D97-AF65-F5344CB8AC3E}">
+        <p14:creationId xmlns:p14="http://schemas.microsoft.com/office/powerpoint/2010/main" val="2412581164"/>
+      </p:ext>
+    </p:extLst>
+  </p:cSld>
+  <p:clrMapOvr>
+    <a:masterClrMapping/>
+  </p:clrMapOvr>
+</p:notes>
 </file>
 
 <file path=ppt/slideLayouts/slideLayout1.xml><?xml version="1.0" encoding="utf-8"?>
@@ -296,7 +754,7 @@
           <a:p>
             <a:fld id="{573B54DB-A8B2-4954-9DC1-E1741E23BC56}" type="datetimeFigureOut">
               <a:rPr lang="en-US" smtClean="0"/>
-              <a:t>10/12/2024</a:t>
+              <a:t>10/29/2024</a:t>
             </a:fld>
             <a:endParaRPr lang="en-US"/>
           </a:p>
@@ -494,7 +952,7 @@
           <a:p>
             <a:fld id="{573B54DB-A8B2-4954-9DC1-E1741E23BC56}" type="datetimeFigureOut">
               <a:rPr lang="en-US" smtClean="0"/>
-              <a:t>10/12/2024</a:t>
+              <a:t>10/29/2024</a:t>
             </a:fld>
             <a:endParaRPr lang="en-US"/>
           </a:p>
@@ -702,7 +1160,7 @@
           <a:p>
             <a:fld id="{573B54DB-A8B2-4954-9DC1-E1741E23BC56}" type="datetimeFigureOut">
               <a:rPr lang="en-US" smtClean="0"/>
-              <a:t>10/12/2024</a:t>
+              <a:t>10/29/2024</a:t>
             </a:fld>
             <a:endParaRPr lang="en-US"/>
           </a:p>
@@ -900,7 +1358,7 @@
           <a:p>
             <a:fld id="{573B54DB-A8B2-4954-9DC1-E1741E23BC56}" type="datetimeFigureOut">
               <a:rPr lang="en-US" smtClean="0"/>
-              <a:t>10/12/2024</a:t>
+              <a:t>10/29/2024</a:t>
             </a:fld>
             <a:endParaRPr lang="en-US"/>
           </a:p>
@@ -1175,7 +1633,7 @@
           <a:p>
             <a:fld id="{573B54DB-A8B2-4954-9DC1-E1741E23BC56}" type="datetimeFigureOut">
               <a:rPr lang="en-US" smtClean="0"/>
-              <a:t>10/12/2024</a:t>
+              <a:t>10/29/2024</a:t>
             </a:fld>
             <a:endParaRPr lang="en-US"/>
           </a:p>
@@ -1440,7 +1898,7 @@
           <a:p>
             <a:fld id="{573B54DB-A8B2-4954-9DC1-E1741E23BC56}" type="datetimeFigureOut">
               <a:rPr lang="en-US" smtClean="0"/>
-              <a:t>10/12/2024</a:t>
+              <a:t>10/29/2024</a:t>
             </a:fld>
             <a:endParaRPr lang="en-US"/>
           </a:p>
@@ -1852,7 +2310,7 @@
           <a:p>
             <a:fld id="{573B54DB-A8B2-4954-9DC1-E1741E23BC56}" type="datetimeFigureOut">
               <a:rPr lang="en-US" smtClean="0"/>
-              <a:t>10/12/2024</a:t>
+              <a:t>10/29/2024</a:t>
             </a:fld>
             <a:endParaRPr lang="en-US"/>
           </a:p>
@@ -1993,7 +2451,7 @@
           <a:p>
             <a:fld id="{573B54DB-A8B2-4954-9DC1-E1741E23BC56}" type="datetimeFigureOut">
               <a:rPr lang="en-US" smtClean="0"/>
-              <a:t>10/12/2024</a:t>
+              <a:t>10/29/2024</a:t>
             </a:fld>
             <a:endParaRPr lang="en-US"/>
           </a:p>
@@ -2106,7 +2564,7 @@
           <a:p>
             <a:fld id="{573B54DB-A8B2-4954-9DC1-E1741E23BC56}" type="datetimeFigureOut">
               <a:rPr lang="en-US" smtClean="0"/>
-              <a:t>10/12/2024</a:t>
+              <a:t>10/29/2024</a:t>
             </a:fld>
             <a:endParaRPr lang="en-US"/>
           </a:p>
@@ -2417,7 +2875,7 @@
           <a:p>
             <a:fld id="{573B54DB-A8B2-4954-9DC1-E1741E23BC56}" type="datetimeFigureOut">
               <a:rPr lang="en-US" smtClean="0"/>
-              <a:t>10/12/2024</a:t>
+              <a:t>10/29/2024</a:t>
             </a:fld>
             <a:endParaRPr lang="en-US"/>
           </a:p>
@@ -2705,7 +3163,7 @@
           <a:p>
             <a:fld id="{573B54DB-A8B2-4954-9DC1-E1741E23BC56}" type="datetimeFigureOut">
               <a:rPr lang="en-US" smtClean="0"/>
-              <a:t>10/12/2024</a:t>
+              <a:t>10/29/2024</a:t>
             </a:fld>
             <a:endParaRPr lang="en-US"/>
           </a:p>
@@ -2946,7 +3404,7 @@
           <a:p>
             <a:fld id="{573B54DB-A8B2-4954-9DC1-E1741E23BC56}" type="datetimeFigureOut">
               <a:rPr lang="en-US" smtClean="0"/>
-              <a:t>10/12/2024</a:t>
+              <a:t>10/29/2024</a:t>
             </a:fld>
             <a:endParaRPr lang="en-US"/>
           </a:p>
@@ -21871,6 +22329,2489 @@
           <a:chExt cx="0" cy="0"/>
         </a:xfrm>
       </p:grpSpPr>
+      <p:graphicFrame>
+        <p:nvGraphicFramePr>
+          <p:cNvPr id="2" name="Table 1">
+            <a:extLst>
+              <a:ext uri="{FF2B5EF4-FFF2-40B4-BE49-F238E27FC236}">
+                <a16:creationId xmlns:a16="http://schemas.microsoft.com/office/drawing/2014/main" id="{B32E3789-3C2C-EAB6-875F-F7413FA83D35}"/>
+              </a:ext>
+            </a:extLst>
+          </p:cNvPr>
+          <p:cNvGraphicFramePr>
+            <a:graphicFrameLocks noGrp="1"/>
+          </p:cNvGraphicFramePr>
+          <p:nvPr>
+            <p:extLst>
+              <p:ext uri="{D42A27DB-BD31-4B8C-83A1-F6EECF244321}">
+                <p14:modId xmlns:p14="http://schemas.microsoft.com/office/powerpoint/2010/main" val="1473764171"/>
+              </p:ext>
+            </p:extLst>
+          </p:nvPr>
+        </p:nvGraphicFramePr>
+        <p:xfrm>
+          <a:off x="2032000" y="719666"/>
+          <a:ext cx="3657600" cy="5943600"/>
+        </p:xfrm>
+        <a:graphic>
+          <a:graphicData uri="http://schemas.openxmlformats.org/drawingml/2006/table">
+            <a:tbl>
+              <a:tblPr firstRow="1" bandRow="1">
+                <a:tableStyleId>{5940675A-B579-460E-94D1-54222C63F5DA}</a:tableStyleId>
+              </a:tblPr>
+              <a:tblGrid>
+                <a:gridCol w="457200">
+                  <a:extLst>
+                    <a:ext uri="{9D8B030D-6E8A-4147-A177-3AD203B41FA5}">
+                      <a16:colId xmlns:a16="http://schemas.microsoft.com/office/drawing/2014/main" val="2479946024"/>
+                    </a:ext>
+                  </a:extLst>
+                </a:gridCol>
+                <a:gridCol w="457200">
+                  <a:extLst>
+                    <a:ext uri="{9D8B030D-6E8A-4147-A177-3AD203B41FA5}">
+                      <a16:colId xmlns:a16="http://schemas.microsoft.com/office/drawing/2014/main" val="3397108830"/>
+                    </a:ext>
+                  </a:extLst>
+                </a:gridCol>
+                <a:gridCol w="457200">
+                  <a:extLst>
+                    <a:ext uri="{9D8B030D-6E8A-4147-A177-3AD203B41FA5}">
+                      <a16:colId xmlns:a16="http://schemas.microsoft.com/office/drawing/2014/main" val="2676441972"/>
+                    </a:ext>
+                  </a:extLst>
+                </a:gridCol>
+                <a:gridCol w="457200">
+                  <a:extLst>
+                    <a:ext uri="{9D8B030D-6E8A-4147-A177-3AD203B41FA5}">
+                      <a16:colId xmlns:a16="http://schemas.microsoft.com/office/drawing/2014/main" val="1730131506"/>
+                    </a:ext>
+                  </a:extLst>
+                </a:gridCol>
+                <a:gridCol w="457200">
+                  <a:extLst>
+                    <a:ext uri="{9D8B030D-6E8A-4147-A177-3AD203B41FA5}">
+                      <a16:colId xmlns:a16="http://schemas.microsoft.com/office/drawing/2014/main" val="2115244283"/>
+                    </a:ext>
+                  </a:extLst>
+                </a:gridCol>
+                <a:gridCol w="457200">
+                  <a:extLst>
+                    <a:ext uri="{9D8B030D-6E8A-4147-A177-3AD203B41FA5}">
+                      <a16:colId xmlns:a16="http://schemas.microsoft.com/office/drawing/2014/main" val="2801826943"/>
+                    </a:ext>
+                  </a:extLst>
+                </a:gridCol>
+                <a:gridCol w="457200">
+                  <a:extLst>
+                    <a:ext uri="{9D8B030D-6E8A-4147-A177-3AD203B41FA5}">
+                      <a16:colId xmlns:a16="http://schemas.microsoft.com/office/drawing/2014/main" val="421786395"/>
+                    </a:ext>
+                  </a:extLst>
+                </a:gridCol>
+                <a:gridCol w="457200">
+                  <a:extLst>
+                    <a:ext uri="{9D8B030D-6E8A-4147-A177-3AD203B41FA5}">
+                      <a16:colId xmlns:a16="http://schemas.microsoft.com/office/drawing/2014/main" val="698851693"/>
+                    </a:ext>
+                  </a:extLst>
+                </a:gridCol>
+              </a:tblGrid>
+              <a:tr h="457200">
+                <a:tc>
+                  <a:txBody>
+                    <a:bodyPr/>
+                    <a:lstStyle/>
+                    <a:p>
+                      <a:endParaRPr lang="en-US" dirty="0"/>
+                    </a:p>
+                  </a:txBody>
+                  <a:tcPr>
+                    <a:solidFill>
+                      <a:schemeClr val="accent2">
+                        <a:lumMod val="20000"/>
+                        <a:lumOff val="80000"/>
+                      </a:schemeClr>
+                    </a:solidFill>
+                  </a:tcPr>
+                </a:tc>
+                <a:tc>
+                  <a:txBody>
+                    <a:bodyPr/>
+                    <a:lstStyle/>
+                    <a:p>
+                      <a:endParaRPr lang="en-US" dirty="0"/>
+                    </a:p>
+                  </a:txBody>
+                  <a:tcPr>
+                    <a:solidFill>
+                      <a:schemeClr val="accent2">
+                        <a:lumMod val="20000"/>
+                        <a:lumOff val="80000"/>
+                      </a:schemeClr>
+                    </a:solidFill>
+                  </a:tcPr>
+                </a:tc>
+                <a:tc>
+                  <a:txBody>
+                    <a:bodyPr/>
+                    <a:lstStyle/>
+                    <a:p>
+                      <a:endParaRPr lang="en-US" dirty="0"/>
+                    </a:p>
+                  </a:txBody>
+                  <a:tcPr/>
+                </a:tc>
+                <a:tc>
+                  <a:txBody>
+                    <a:bodyPr/>
+                    <a:lstStyle/>
+                    <a:p>
+                      <a:endParaRPr lang="en-US" dirty="0"/>
+                    </a:p>
+                  </a:txBody>
+                  <a:tcPr/>
+                </a:tc>
+                <a:tc>
+                  <a:txBody>
+                    <a:bodyPr/>
+                    <a:lstStyle/>
+                    <a:p>
+                      <a:endParaRPr lang="en-US" dirty="0"/>
+                    </a:p>
+                  </a:txBody>
+                  <a:tcPr/>
+                </a:tc>
+                <a:tc>
+                  <a:txBody>
+                    <a:bodyPr/>
+                    <a:lstStyle/>
+                    <a:p>
+                      <a:endParaRPr lang="en-US"/>
+                    </a:p>
+                  </a:txBody>
+                  <a:tcPr/>
+                </a:tc>
+                <a:tc>
+                  <a:txBody>
+                    <a:bodyPr/>
+                    <a:lstStyle/>
+                    <a:p>
+                      <a:endParaRPr lang="en-US"/>
+                    </a:p>
+                  </a:txBody>
+                  <a:tcPr/>
+                </a:tc>
+                <a:tc>
+                  <a:txBody>
+                    <a:bodyPr/>
+                    <a:lstStyle/>
+                    <a:p>
+                      <a:endParaRPr lang="en-US"/>
+                    </a:p>
+                  </a:txBody>
+                  <a:tcPr/>
+                </a:tc>
+                <a:extLst>
+                  <a:ext uri="{0D108BD9-81ED-4DB2-BD59-A6C34878D82A}">
+                    <a16:rowId xmlns:a16="http://schemas.microsoft.com/office/drawing/2014/main" val="3386046887"/>
+                  </a:ext>
+                </a:extLst>
+              </a:tr>
+              <a:tr h="457200">
+                <a:tc>
+                  <a:txBody>
+                    <a:bodyPr/>
+                    <a:lstStyle/>
+                    <a:p>
+                      <a:endParaRPr lang="en-US"/>
+                    </a:p>
+                  </a:txBody>
+                  <a:tcPr/>
+                </a:tc>
+                <a:tc>
+                  <a:txBody>
+                    <a:bodyPr/>
+                    <a:lstStyle/>
+                    <a:p>
+                      <a:endParaRPr lang="en-US" dirty="0"/>
+                    </a:p>
+                  </a:txBody>
+                  <a:tcPr>
+                    <a:solidFill>
+                      <a:schemeClr val="accent2">
+                        <a:lumMod val="20000"/>
+                        <a:lumOff val="80000"/>
+                      </a:schemeClr>
+                    </a:solidFill>
+                  </a:tcPr>
+                </a:tc>
+                <a:tc>
+                  <a:txBody>
+                    <a:bodyPr/>
+                    <a:lstStyle/>
+                    <a:p>
+                      <a:endParaRPr lang="en-US" dirty="0"/>
+                    </a:p>
+                  </a:txBody>
+                  <a:tcPr>
+                    <a:solidFill>
+                      <a:schemeClr val="accent2">
+                        <a:lumMod val="20000"/>
+                        <a:lumOff val="80000"/>
+                      </a:schemeClr>
+                    </a:solidFill>
+                  </a:tcPr>
+                </a:tc>
+                <a:tc>
+                  <a:txBody>
+                    <a:bodyPr/>
+                    <a:lstStyle/>
+                    <a:p>
+                      <a:endParaRPr lang="en-US"/>
+                    </a:p>
+                  </a:txBody>
+                  <a:tcPr/>
+                </a:tc>
+                <a:tc>
+                  <a:txBody>
+                    <a:bodyPr/>
+                    <a:lstStyle/>
+                    <a:p>
+                      <a:endParaRPr lang="en-US"/>
+                    </a:p>
+                  </a:txBody>
+                  <a:tcPr/>
+                </a:tc>
+                <a:tc>
+                  <a:txBody>
+                    <a:bodyPr/>
+                    <a:lstStyle/>
+                    <a:p>
+                      <a:endParaRPr lang="en-US"/>
+                    </a:p>
+                  </a:txBody>
+                  <a:tcPr/>
+                </a:tc>
+                <a:tc>
+                  <a:txBody>
+                    <a:bodyPr/>
+                    <a:lstStyle/>
+                    <a:p>
+                      <a:endParaRPr lang="en-US"/>
+                    </a:p>
+                  </a:txBody>
+                  <a:tcPr/>
+                </a:tc>
+                <a:tc>
+                  <a:txBody>
+                    <a:bodyPr/>
+                    <a:lstStyle/>
+                    <a:p>
+                      <a:endParaRPr lang="en-US"/>
+                    </a:p>
+                  </a:txBody>
+                  <a:tcPr/>
+                </a:tc>
+                <a:extLst>
+                  <a:ext uri="{0D108BD9-81ED-4DB2-BD59-A6C34878D82A}">
+                    <a16:rowId xmlns:a16="http://schemas.microsoft.com/office/drawing/2014/main" val="2595256893"/>
+                  </a:ext>
+                </a:extLst>
+              </a:tr>
+              <a:tr h="457200">
+                <a:tc>
+                  <a:txBody>
+                    <a:bodyPr/>
+                    <a:lstStyle/>
+                    <a:p>
+                      <a:endParaRPr lang="en-US"/>
+                    </a:p>
+                  </a:txBody>
+                  <a:tcPr/>
+                </a:tc>
+                <a:tc>
+                  <a:txBody>
+                    <a:bodyPr/>
+                    <a:lstStyle/>
+                    <a:p>
+                      <a:endParaRPr lang="en-US"/>
+                    </a:p>
+                  </a:txBody>
+                  <a:tcPr/>
+                </a:tc>
+                <a:tc>
+                  <a:txBody>
+                    <a:bodyPr/>
+                    <a:lstStyle/>
+                    <a:p>
+                      <a:endParaRPr lang="en-US" dirty="0"/>
+                    </a:p>
+                  </a:txBody>
+                  <a:tcPr>
+                    <a:solidFill>
+                      <a:schemeClr val="accent2">
+                        <a:lumMod val="20000"/>
+                        <a:lumOff val="80000"/>
+                      </a:schemeClr>
+                    </a:solidFill>
+                  </a:tcPr>
+                </a:tc>
+                <a:tc>
+                  <a:txBody>
+                    <a:bodyPr/>
+                    <a:lstStyle/>
+                    <a:p>
+                      <a:endParaRPr lang="en-US" dirty="0"/>
+                    </a:p>
+                  </a:txBody>
+                  <a:tcPr>
+                    <a:solidFill>
+                      <a:schemeClr val="accent2">
+                        <a:lumMod val="20000"/>
+                        <a:lumOff val="80000"/>
+                      </a:schemeClr>
+                    </a:solidFill>
+                  </a:tcPr>
+                </a:tc>
+                <a:tc>
+                  <a:txBody>
+                    <a:bodyPr/>
+                    <a:lstStyle/>
+                    <a:p>
+                      <a:endParaRPr lang="en-US"/>
+                    </a:p>
+                  </a:txBody>
+                  <a:tcPr/>
+                </a:tc>
+                <a:tc>
+                  <a:txBody>
+                    <a:bodyPr/>
+                    <a:lstStyle/>
+                    <a:p>
+                      <a:endParaRPr lang="en-US"/>
+                    </a:p>
+                  </a:txBody>
+                  <a:tcPr/>
+                </a:tc>
+                <a:tc>
+                  <a:txBody>
+                    <a:bodyPr/>
+                    <a:lstStyle/>
+                    <a:p>
+                      <a:endParaRPr lang="en-US"/>
+                    </a:p>
+                  </a:txBody>
+                  <a:tcPr/>
+                </a:tc>
+                <a:tc>
+                  <a:txBody>
+                    <a:bodyPr/>
+                    <a:lstStyle/>
+                    <a:p>
+                      <a:endParaRPr lang="en-US"/>
+                    </a:p>
+                  </a:txBody>
+                  <a:tcPr/>
+                </a:tc>
+                <a:extLst>
+                  <a:ext uri="{0D108BD9-81ED-4DB2-BD59-A6C34878D82A}">
+                    <a16:rowId xmlns:a16="http://schemas.microsoft.com/office/drawing/2014/main" val="428341698"/>
+                  </a:ext>
+                </a:extLst>
+              </a:tr>
+              <a:tr h="457200">
+                <a:tc>
+                  <a:txBody>
+                    <a:bodyPr/>
+                    <a:lstStyle/>
+                    <a:p>
+                      <a:endParaRPr lang="en-US"/>
+                    </a:p>
+                  </a:txBody>
+                  <a:tcPr/>
+                </a:tc>
+                <a:tc>
+                  <a:txBody>
+                    <a:bodyPr/>
+                    <a:lstStyle/>
+                    <a:p>
+                      <a:endParaRPr lang="en-US"/>
+                    </a:p>
+                  </a:txBody>
+                  <a:tcPr/>
+                </a:tc>
+                <a:tc>
+                  <a:txBody>
+                    <a:bodyPr/>
+                    <a:lstStyle/>
+                    <a:p>
+                      <a:endParaRPr lang="en-US"/>
+                    </a:p>
+                  </a:txBody>
+                  <a:tcPr/>
+                </a:tc>
+                <a:tc>
+                  <a:txBody>
+                    <a:bodyPr/>
+                    <a:lstStyle/>
+                    <a:p>
+                      <a:endParaRPr lang="en-US" dirty="0"/>
+                    </a:p>
+                  </a:txBody>
+                  <a:tcPr>
+                    <a:solidFill>
+                      <a:schemeClr val="accent2">
+                        <a:lumMod val="20000"/>
+                        <a:lumOff val="80000"/>
+                      </a:schemeClr>
+                    </a:solidFill>
+                  </a:tcPr>
+                </a:tc>
+                <a:tc>
+                  <a:txBody>
+                    <a:bodyPr/>
+                    <a:lstStyle/>
+                    <a:p>
+                      <a:endParaRPr lang="en-US" dirty="0"/>
+                    </a:p>
+                  </a:txBody>
+                  <a:tcPr>
+                    <a:solidFill>
+                      <a:schemeClr val="accent2">
+                        <a:lumMod val="20000"/>
+                        <a:lumOff val="80000"/>
+                      </a:schemeClr>
+                    </a:solidFill>
+                  </a:tcPr>
+                </a:tc>
+                <a:tc>
+                  <a:txBody>
+                    <a:bodyPr/>
+                    <a:lstStyle/>
+                    <a:p>
+                      <a:endParaRPr lang="en-US"/>
+                    </a:p>
+                  </a:txBody>
+                  <a:tcPr/>
+                </a:tc>
+                <a:tc>
+                  <a:txBody>
+                    <a:bodyPr/>
+                    <a:lstStyle/>
+                    <a:p>
+                      <a:endParaRPr lang="en-US"/>
+                    </a:p>
+                  </a:txBody>
+                  <a:tcPr/>
+                </a:tc>
+                <a:tc>
+                  <a:txBody>
+                    <a:bodyPr/>
+                    <a:lstStyle/>
+                    <a:p>
+                      <a:endParaRPr lang="en-US"/>
+                    </a:p>
+                  </a:txBody>
+                  <a:tcPr/>
+                </a:tc>
+                <a:extLst>
+                  <a:ext uri="{0D108BD9-81ED-4DB2-BD59-A6C34878D82A}">
+                    <a16:rowId xmlns:a16="http://schemas.microsoft.com/office/drawing/2014/main" val="3926941555"/>
+                  </a:ext>
+                </a:extLst>
+              </a:tr>
+              <a:tr h="457200">
+                <a:tc>
+                  <a:txBody>
+                    <a:bodyPr/>
+                    <a:lstStyle/>
+                    <a:p>
+                      <a:endParaRPr lang="en-US"/>
+                    </a:p>
+                  </a:txBody>
+                  <a:tcPr/>
+                </a:tc>
+                <a:tc>
+                  <a:txBody>
+                    <a:bodyPr/>
+                    <a:lstStyle/>
+                    <a:p>
+                      <a:endParaRPr lang="en-US"/>
+                    </a:p>
+                  </a:txBody>
+                  <a:tcPr/>
+                </a:tc>
+                <a:tc>
+                  <a:txBody>
+                    <a:bodyPr/>
+                    <a:lstStyle/>
+                    <a:p>
+                      <a:endParaRPr lang="en-US"/>
+                    </a:p>
+                  </a:txBody>
+                  <a:tcPr/>
+                </a:tc>
+                <a:tc>
+                  <a:txBody>
+                    <a:bodyPr/>
+                    <a:lstStyle/>
+                    <a:p>
+                      <a:endParaRPr lang="en-US"/>
+                    </a:p>
+                  </a:txBody>
+                  <a:tcPr/>
+                </a:tc>
+                <a:tc>
+                  <a:txBody>
+                    <a:bodyPr/>
+                    <a:lstStyle/>
+                    <a:p>
+                      <a:endParaRPr lang="en-US" dirty="0"/>
+                    </a:p>
+                  </a:txBody>
+                  <a:tcPr>
+                    <a:solidFill>
+                      <a:schemeClr val="accent2">
+                        <a:lumMod val="20000"/>
+                        <a:lumOff val="80000"/>
+                      </a:schemeClr>
+                    </a:solidFill>
+                  </a:tcPr>
+                </a:tc>
+                <a:tc>
+                  <a:txBody>
+                    <a:bodyPr/>
+                    <a:lstStyle/>
+                    <a:p>
+                      <a:endParaRPr lang="en-US" dirty="0"/>
+                    </a:p>
+                  </a:txBody>
+                  <a:tcPr>
+                    <a:solidFill>
+                      <a:schemeClr val="accent2">
+                        <a:lumMod val="20000"/>
+                        <a:lumOff val="80000"/>
+                      </a:schemeClr>
+                    </a:solidFill>
+                  </a:tcPr>
+                </a:tc>
+                <a:tc>
+                  <a:txBody>
+                    <a:bodyPr/>
+                    <a:lstStyle/>
+                    <a:p>
+                      <a:endParaRPr lang="en-US"/>
+                    </a:p>
+                  </a:txBody>
+                  <a:tcPr/>
+                </a:tc>
+                <a:tc>
+                  <a:txBody>
+                    <a:bodyPr/>
+                    <a:lstStyle/>
+                    <a:p>
+                      <a:endParaRPr lang="en-US"/>
+                    </a:p>
+                  </a:txBody>
+                  <a:tcPr/>
+                </a:tc>
+                <a:extLst>
+                  <a:ext uri="{0D108BD9-81ED-4DB2-BD59-A6C34878D82A}">
+                    <a16:rowId xmlns:a16="http://schemas.microsoft.com/office/drawing/2014/main" val="1296976817"/>
+                  </a:ext>
+                </a:extLst>
+              </a:tr>
+              <a:tr h="457200">
+                <a:tc>
+                  <a:txBody>
+                    <a:bodyPr/>
+                    <a:lstStyle/>
+                    <a:p>
+                      <a:endParaRPr lang="en-US"/>
+                    </a:p>
+                  </a:txBody>
+                  <a:tcPr/>
+                </a:tc>
+                <a:tc>
+                  <a:txBody>
+                    <a:bodyPr/>
+                    <a:lstStyle/>
+                    <a:p>
+                      <a:endParaRPr lang="en-US"/>
+                    </a:p>
+                  </a:txBody>
+                  <a:tcPr/>
+                </a:tc>
+                <a:tc>
+                  <a:txBody>
+                    <a:bodyPr/>
+                    <a:lstStyle/>
+                    <a:p>
+                      <a:endParaRPr lang="en-US"/>
+                    </a:p>
+                  </a:txBody>
+                  <a:tcPr/>
+                </a:tc>
+                <a:tc>
+                  <a:txBody>
+                    <a:bodyPr/>
+                    <a:lstStyle/>
+                    <a:p>
+                      <a:endParaRPr lang="en-US" dirty="0"/>
+                    </a:p>
+                  </a:txBody>
+                  <a:tcPr>
+                    <a:solidFill>
+                      <a:schemeClr val="accent2">
+                        <a:lumMod val="20000"/>
+                        <a:lumOff val="80000"/>
+                      </a:schemeClr>
+                    </a:solidFill>
+                  </a:tcPr>
+                </a:tc>
+                <a:tc>
+                  <a:txBody>
+                    <a:bodyPr/>
+                    <a:lstStyle/>
+                    <a:p>
+                      <a:endParaRPr lang="en-US" dirty="0"/>
+                    </a:p>
+                  </a:txBody>
+                  <a:tcPr>
+                    <a:solidFill>
+                      <a:schemeClr val="accent2">
+                        <a:lumMod val="20000"/>
+                        <a:lumOff val="80000"/>
+                      </a:schemeClr>
+                    </a:solidFill>
+                  </a:tcPr>
+                </a:tc>
+                <a:tc>
+                  <a:txBody>
+                    <a:bodyPr/>
+                    <a:lstStyle/>
+                    <a:p>
+                      <a:endParaRPr lang="en-US"/>
+                    </a:p>
+                  </a:txBody>
+                  <a:tcPr/>
+                </a:tc>
+                <a:tc>
+                  <a:txBody>
+                    <a:bodyPr/>
+                    <a:lstStyle/>
+                    <a:p>
+                      <a:endParaRPr lang="en-US"/>
+                    </a:p>
+                  </a:txBody>
+                  <a:tcPr/>
+                </a:tc>
+                <a:tc>
+                  <a:txBody>
+                    <a:bodyPr/>
+                    <a:lstStyle/>
+                    <a:p>
+                      <a:endParaRPr lang="en-US"/>
+                    </a:p>
+                  </a:txBody>
+                  <a:tcPr/>
+                </a:tc>
+                <a:extLst>
+                  <a:ext uri="{0D108BD9-81ED-4DB2-BD59-A6C34878D82A}">
+                    <a16:rowId xmlns:a16="http://schemas.microsoft.com/office/drawing/2014/main" val="2142014805"/>
+                  </a:ext>
+                </a:extLst>
+              </a:tr>
+              <a:tr h="457200">
+                <a:tc>
+                  <a:txBody>
+                    <a:bodyPr/>
+                    <a:lstStyle/>
+                    <a:p>
+                      <a:endParaRPr lang="en-US"/>
+                    </a:p>
+                  </a:txBody>
+                  <a:tcPr/>
+                </a:tc>
+                <a:tc>
+                  <a:txBody>
+                    <a:bodyPr/>
+                    <a:lstStyle/>
+                    <a:p>
+                      <a:endParaRPr lang="en-US"/>
+                    </a:p>
+                  </a:txBody>
+                  <a:tcPr/>
+                </a:tc>
+                <a:tc>
+                  <a:txBody>
+                    <a:bodyPr/>
+                    <a:lstStyle/>
+                    <a:p>
+                      <a:endParaRPr lang="en-US"/>
+                    </a:p>
+                  </a:txBody>
+                  <a:tcPr/>
+                </a:tc>
+                <a:tc>
+                  <a:txBody>
+                    <a:bodyPr/>
+                    <a:lstStyle/>
+                    <a:p>
+                      <a:endParaRPr lang="en-US"/>
+                    </a:p>
+                  </a:txBody>
+                  <a:tcPr/>
+                </a:tc>
+                <a:tc>
+                  <a:txBody>
+                    <a:bodyPr/>
+                    <a:lstStyle/>
+                    <a:p>
+                      <a:endParaRPr lang="en-US"/>
+                    </a:p>
+                  </a:txBody>
+                  <a:tcPr/>
+                </a:tc>
+                <a:tc>
+                  <a:txBody>
+                    <a:bodyPr/>
+                    <a:lstStyle/>
+                    <a:p>
+                      <a:endParaRPr lang="en-US" dirty="0"/>
+                    </a:p>
+                  </a:txBody>
+                  <a:tcPr>
+                    <a:solidFill>
+                      <a:schemeClr val="accent2">
+                        <a:lumMod val="20000"/>
+                        <a:lumOff val="80000"/>
+                      </a:schemeClr>
+                    </a:solidFill>
+                  </a:tcPr>
+                </a:tc>
+                <a:tc>
+                  <a:txBody>
+                    <a:bodyPr/>
+                    <a:lstStyle/>
+                    <a:p>
+                      <a:endParaRPr lang="en-US" dirty="0"/>
+                    </a:p>
+                  </a:txBody>
+                  <a:tcPr>
+                    <a:solidFill>
+                      <a:schemeClr val="accent2">
+                        <a:lumMod val="20000"/>
+                        <a:lumOff val="80000"/>
+                      </a:schemeClr>
+                    </a:solidFill>
+                  </a:tcPr>
+                </a:tc>
+                <a:tc>
+                  <a:txBody>
+                    <a:bodyPr/>
+                    <a:lstStyle/>
+                    <a:p>
+                      <a:endParaRPr lang="en-US"/>
+                    </a:p>
+                  </a:txBody>
+                  <a:tcPr/>
+                </a:tc>
+                <a:extLst>
+                  <a:ext uri="{0D108BD9-81ED-4DB2-BD59-A6C34878D82A}">
+                    <a16:rowId xmlns:a16="http://schemas.microsoft.com/office/drawing/2014/main" val="3332184279"/>
+                  </a:ext>
+                </a:extLst>
+              </a:tr>
+              <a:tr h="457200">
+                <a:tc>
+                  <a:txBody>
+                    <a:bodyPr/>
+                    <a:lstStyle/>
+                    <a:p>
+                      <a:endParaRPr lang="en-US" dirty="0"/>
+                    </a:p>
+                  </a:txBody>
+                  <a:tcPr/>
+                </a:tc>
+                <a:tc>
+                  <a:txBody>
+                    <a:bodyPr/>
+                    <a:lstStyle/>
+                    <a:p>
+                      <a:endParaRPr lang="en-US" dirty="0"/>
+                    </a:p>
+                  </a:txBody>
+                  <a:tcPr/>
+                </a:tc>
+                <a:tc>
+                  <a:txBody>
+                    <a:bodyPr/>
+                    <a:lstStyle/>
+                    <a:p>
+                      <a:endParaRPr lang="en-US" dirty="0"/>
+                    </a:p>
+                  </a:txBody>
+                  <a:tcPr/>
+                </a:tc>
+                <a:tc>
+                  <a:txBody>
+                    <a:bodyPr/>
+                    <a:lstStyle/>
+                    <a:p>
+                      <a:endParaRPr lang="en-US" dirty="0"/>
+                    </a:p>
+                  </a:txBody>
+                  <a:tcPr/>
+                </a:tc>
+                <a:tc>
+                  <a:txBody>
+                    <a:bodyPr/>
+                    <a:lstStyle/>
+                    <a:p>
+                      <a:endParaRPr lang="en-US" dirty="0"/>
+                    </a:p>
+                  </a:txBody>
+                  <a:tcPr>
+                    <a:solidFill>
+                      <a:schemeClr val="accent2">
+                        <a:lumMod val="20000"/>
+                        <a:lumOff val="80000"/>
+                      </a:schemeClr>
+                    </a:solidFill>
+                  </a:tcPr>
+                </a:tc>
+                <a:tc>
+                  <a:txBody>
+                    <a:bodyPr/>
+                    <a:lstStyle/>
+                    <a:p>
+                      <a:endParaRPr lang="en-US" dirty="0"/>
+                    </a:p>
+                  </a:txBody>
+                  <a:tcPr>
+                    <a:solidFill>
+                      <a:schemeClr val="accent2">
+                        <a:lumMod val="20000"/>
+                        <a:lumOff val="80000"/>
+                      </a:schemeClr>
+                    </a:solidFill>
+                  </a:tcPr>
+                </a:tc>
+                <a:tc>
+                  <a:txBody>
+                    <a:bodyPr/>
+                    <a:lstStyle/>
+                    <a:p>
+                      <a:endParaRPr lang="en-US" dirty="0"/>
+                    </a:p>
+                  </a:txBody>
+                  <a:tcPr/>
+                </a:tc>
+                <a:tc>
+                  <a:txBody>
+                    <a:bodyPr/>
+                    <a:lstStyle/>
+                    <a:p>
+                      <a:endParaRPr lang="en-US" dirty="0"/>
+                    </a:p>
+                  </a:txBody>
+                  <a:tcPr/>
+                </a:tc>
+                <a:extLst>
+                  <a:ext uri="{0D108BD9-81ED-4DB2-BD59-A6C34878D82A}">
+                    <a16:rowId xmlns:a16="http://schemas.microsoft.com/office/drawing/2014/main" val="4166535201"/>
+                  </a:ext>
+                </a:extLst>
+              </a:tr>
+              <a:tr h="457200">
+                <a:tc>
+                  <a:txBody>
+                    <a:bodyPr/>
+                    <a:lstStyle/>
+                    <a:p>
+                      <a:endParaRPr lang="en-US" dirty="0"/>
+                    </a:p>
+                  </a:txBody>
+                  <a:tcPr/>
+                </a:tc>
+                <a:tc>
+                  <a:txBody>
+                    <a:bodyPr/>
+                    <a:lstStyle/>
+                    <a:p>
+                      <a:endParaRPr lang="en-US" dirty="0"/>
+                    </a:p>
+                  </a:txBody>
+                  <a:tcPr/>
+                </a:tc>
+                <a:tc>
+                  <a:txBody>
+                    <a:bodyPr/>
+                    <a:lstStyle/>
+                    <a:p>
+                      <a:endParaRPr lang="en-US" dirty="0"/>
+                    </a:p>
+                  </a:txBody>
+                  <a:tcPr/>
+                </a:tc>
+                <a:tc>
+                  <a:txBody>
+                    <a:bodyPr/>
+                    <a:lstStyle/>
+                    <a:p>
+                      <a:endParaRPr lang="en-US" dirty="0"/>
+                    </a:p>
+                  </a:txBody>
+                  <a:tcPr>
+                    <a:solidFill>
+                      <a:schemeClr val="accent2">
+                        <a:lumMod val="20000"/>
+                        <a:lumOff val="80000"/>
+                      </a:schemeClr>
+                    </a:solidFill>
+                  </a:tcPr>
+                </a:tc>
+                <a:tc>
+                  <a:txBody>
+                    <a:bodyPr/>
+                    <a:lstStyle/>
+                    <a:p>
+                      <a:endParaRPr lang="en-US" dirty="0"/>
+                    </a:p>
+                  </a:txBody>
+                  <a:tcPr>
+                    <a:solidFill>
+                      <a:schemeClr val="accent2">
+                        <a:lumMod val="20000"/>
+                        <a:lumOff val="80000"/>
+                      </a:schemeClr>
+                    </a:solidFill>
+                  </a:tcPr>
+                </a:tc>
+                <a:tc>
+                  <a:txBody>
+                    <a:bodyPr/>
+                    <a:lstStyle/>
+                    <a:p>
+                      <a:endParaRPr lang="en-US" dirty="0"/>
+                    </a:p>
+                  </a:txBody>
+                  <a:tcPr/>
+                </a:tc>
+                <a:tc>
+                  <a:txBody>
+                    <a:bodyPr/>
+                    <a:lstStyle/>
+                    <a:p>
+                      <a:endParaRPr lang="en-US" dirty="0"/>
+                    </a:p>
+                  </a:txBody>
+                  <a:tcPr/>
+                </a:tc>
+                <a:tc>
+                  <a:txBody>
+                    <a:bodyPr/>
+                    <a:lstStyle/>
+                    <a:p>
+                      <a:endParaRPr lang="en-US" dirty="0"/>
+                    </a:p>
+                  </a:txBody>
+                  <a:tcPr/>
+                </a:tc>
+                <a:extLst>
+                  <a:ext uri="{0D108BD9-81ED-4DB2-BD59-A6C34878D82A}">
+                    <a16:rowId xmlns:a16="http://schemas.microsoft.com/office/drawing/2014/main" val="1632332396"/>
+                  </a:ext>
+                </a:extLst>
+              </a:tr>
+              <a:tr h="457200">
+                <a:tc>
+                  <a:txBody>
+                    <a:bodyPr/>
+                    <a:lstStyle/>
+                    <a:p>
+                      <a:endParaRPr lang="en-US" dirty="0"/>
+                    </a:p>
+                  </a:txBody>
+                  <a:tcPr/>
+                </a:tc>
+                <a:tc>
+                  <a:txBody>
+                    <a:bodyPr/>
+                    <a:lstStyle/>
+                    <a:p>
+                      <a:endParaRPr lang="en-US" dirty="0"/>
+                    </a:p>
+                  </a:txBody>
+                  <a:tcPr/>
+                </a:tc>
+                <a:tc>
+                  <a:txBody>
+                    <a:bodyPr/>
+                    <a:lstStyle/>
+                    <a:p>
+                      <a:endParaRPr lang="en-US" dirty="0"/>
+                    </a:p>
+                  </a:txBody>
+                  <a:tcPr/>
+                </a:tc>
+                <a:tc>
+                  <a:txBody>
+                    <a:bodyPr/>
+                    <a:lstStyle/>
+                    <a:p>
+                      <a:endParaRPr lang="en-US" dirty="0"/>
+                    </a:p>
+                  </a:txBody>
+                  <a:tcPr/>
+                </a:tc>
+                <a:tc>
+                  <a:txBody>
+                    <a:bodyPr/>
+                    <a:lstStyle/>
+                    <a:p>
+                      <a:endParaRPr lang="en-US" dirty="0"/>
+                    </a:p>
+                  </a:txBody>
+                  <a:tcPr/>
+                </a:tc>
+                <a:tc>
+                  <a:txBody>
+                    <a:bodyPr/>
+                    <a:lstStyle/>
+                    <a:p>
+                      <a:endParaRPr lang="en-US" dirty="0"/>
+                    </a:p>
+                  </a:txBody>
+                  <a:tcPr/>
+                </a:tc>
+                <a:tc>
+                  <a:txBody>
+                    <a:bodyPr/>
+                    <a:lstStyle/>
+                    <a:p>
+                      <a:endParaRPr lang="en-US" dirty="0"/>
+                    </a:p>
+                  </a:txBody>
+                  <a:tcPr>
+                    <a:solidFill>
+                      <a:schemeClr val="accent2">
+                        <a:lumMod val="20000"/>
+                        <a:lumOff val="80000"/>
+                      </a:schemeClr>
+                    </a:solidFill>
+                  </a:tcPr>
+                </a:tc>
+                <a:tc>
+                  <a:txBody>
+                    <a:bodyPr/>
+                    <a:lstStyle/>
+                    <a:p>
+                      <a:endParaRPr lang="en-US" dirty="0"/>
+                    </a:p>
+                  </a:txBody>
+                  <a:tcPr>
+                    <a:solidFill>
+                      <a:schemeClr val="accent2">
+                        <a:lumMod val="20000"/>
+                        <a:lumOff val="80000"/>
+                      </a:schemeClr>
+                    </a:solidFill>
+                  </a:tcPr>
+                </a:tc>
+                <a:extLst>
+                  <a:ext uri="{0D108BD9-81ED-4DB2-BD59-A6C34878D82A}">
+                    <a16:rowId xmlns:a16="http://schemas.microsoft.com/office/drawing/2014/main" val="1108389959"/>
+                  </a:ext>
+                </a:extLst>
+              </a:tr>
+              <a:tr h="457200">
+                <a:tc>
+                  <a:txBody>
+                    <a:bodyPr/>
+                    <a:lstStyle/>
+                    <a:p>
+                      <a:endParaRPr lang="en-US" dirty="0"/>
+                    </a:p>
+                  </a:txBody>
+                  <a:tcPr/>
+                </a:tc>
+                <a:tc>
+                  <a:txBody>
+                    <a:bodyPr/>
+                    <a:lstStyle/>
+                    <a:p>
+                      <a:endParaRPr lang="en-US" dirty="0"/>
+                    </a:p>
+                  </a:txBody>
+                  <a:tcPr/>
+                </a:tc>
+                <a:tc>
+                  <a:txBody>
+                    <a:bodyPr/>
+                    <a:lstStyle/>
+                    <a:p>
+                      <a:endParaRPr lang="en-US" dirty="0"/>
+                    </a:p>
+                  </a:txBody>
+                  <a:tcPr/>
+                </a:tc>
+                <a:tc>
+                  <a:txBody>
+                    <a:bodyPr/>
+                    <a:lstStyle/>
+                    <a:p>
+                      <a:endParaRPr lang="en-US" dirty="0"/>
+                    </a:p>
+                  </a:txBody>
+                  <a:tcPr/>
+                </a:tc>
+                <a:tc>
+                  <a:txBody>
+                    <a:bodyPr/>
+                    <a:lstStyle/>
+                    <a:p>
+                      <a:endParaRPr lang="en-US" dirty="0"/>
+                    </a:p>
+                  </a:txBody>
+                  <a:tcPr/>
+                </a:tc>
+                <a:tc>
+                  <a:txBody>
+                    <a:bodyPr/>
+                    <a:lstStyle/>
+                    <a:p>
+                      <a:endParaRPr lang="en-US" dirty="0"/>
+                    </a:p>
+                  </a:txBody>
+                  <a:tcPr>
+                    <a:solidFill>
+                      <a:schemeClr val="accent2">
+                        <a:lumMod val="20000"/>
+                        <a:lumOff val="80000"/>
+                      </a:schemeClr>
+                    </a:solidFill>
+                  </a:tcPr>
+                </a:tc>
+                <a:tc>
+                  <a:txBody>
+                    <a:bodyPr/>
+                    <a:lstStyle/>
+                    <a:p>
+                      <a:endParaRPr lang="en-US" dirty="0"/>
+                    </a:p>
+                  </a:txBody>
+                  <a:tcPr>
+                    <a:solidFill>
+                      <a:schemeClr val="accent2">
+                        <a:lumMod val="20000"/>
+                        <a:lumOff val="80000"/>
+                      </a:schemeClr>
+                    </a:solidFill>
+                  </a:tcPr>
+                </a:tc>
+                <a:tc>
+                  <a:txBody>
+                    <a:bodyPr/>
+                    <a:lstStyle/>
+                    <a:p>
+                      <a:endParaRPr lang="en-US" dirty="0"/>
+                    </a:p>
+                  </a:txBody>
+                  <a:tcPr/>
+                </a:tc>
+                <a:extLst>
+                  <a:ext uri="{0D108BD9-81ED-4DB2-BD59-A6C34878D82A}">
+                    <a16:rowId xmlns:a16="http://schemas.microsoft.com/office/drawing/2014/main" val="2090325568"/>
+                  </a:ext>
+                </a:extLst>
+              </a:tr>
+              <a:tr h="457200">
+                <a:tc>
+                  <a:txBody>
+                    <a:bodyPr/>
+                    <a:lstStyle/>
+                    <a:p>
+                      <a:endParaRPr lang="en-US" dirty="0"/>
+                    </a:p>
+                  </a:txBody>
+                  <a:tcPr/>
+                </a:tc>
+                <a:tc>
+                  <a:txBody>
+                    <a:bodyPr/>
+                    <a:lstStyle/>
+                    <a:p>
+                      <a:endParaRPr lang="en-US" dirty="0"/>
+                    </a:p>
+                  </a:txBody>
+                  <a:tcPr/>
+                </a:tc>
+                <a:tc>
+                  <a:txBody>
+                    <a:bodyPr/>
+                    <a:lstStyle/>
+                    <a:p>
+                      <a:endParaRPr lang="en-US" dirty="0"/>
+                    </a:p>
+                  </a:txBody>
+                  <a:tcPr/>
+                </a:tc>
+                <a:tc>
+                  <a:txBody>
+                    <a:bodyPr/>
+                    <a:lstStyle/>
+                    <a:p>
+                      <a:endParaRPr lang="en-US" dirty="0"/>
+                    </a:p>
+                  </a:txBody>
+                  <a:tcPr/>
+                </a:tc>
+                <a:tc>
+                  <a:txBody>
+                    <a:bodyPr/>
+                    <a:lstStyle/>
+                    <a:p>
+                      <a:endParaRPr lang="en-US" dirty="0"/>
+                    </a:p>
+                  </a:txBody>
+                  <a:tcPr>
+                    <a:solidFill>
+                      <a:schemeClr val="accent2">
+                        <a:lumMod val="20000"/>
+                        <a:lumOff val="80000"/>
+                      </a:schemeClr>
+                    </a:solidFill>
+                  </a:tcPr>
+                </a:tc>
+                <a:tc>
+                  <a:txBody>
+                    <a:bodyPr/>
+                    <a:lstStyle/>
+                    <a:p>
+                      <a:endParaRPr lang="en-US" dirty="0"/>
+                    </a:p>
+                  </a:txBody>
+                  <a:tcPr>
+                    <a:solidFill>
+                      <a:schemeClr val="accent2">
+                        <a:lumMod val="20000"/>
+                        <a:lumOff val="80000"/>
+                      </a:schemeClr>
+                    </a:solidFill>
+                  </a:tcPr>
+                </a:tc>
+                <a:tc>
+                  <a:txBody>
+                    <a:bodyPr/>
+                    <a:lstStyle/>
+                    <a:p>
+                      <a:endParaRPr lang="en-US" dirty="0"/>
+                    </a:p>
+                  </a:txBody>
+                  <a:tcPr/>
+                </a:tc>
+                <a:tc>
+                  <a:txBody>
+                    <a:bodyPr/>
+                    <a:lstStyle/>
+                    <a:p>
+                      <a:endParaRPr lang="en-US" dirty="0"/>
+                    </a:p>
+                  </a:txBody>
+                  <a:tcPr/>
+                </a:tc>
+                <a:extLst>
+                  <a:ext uri="{0D108BD9-81ED-4DB2-BD59-A6C34878D82A}">
+                    <a16:rowId xmlns:a16="http://schemas.microsoft.com/office/drawing/2014/main" val="2147718336"/>
+                  </a:ext>
+                </a:extLst>
+              </a:tr>
+              <a:tr h="457200">
+                <a:tc>
+                  <a:txBody>
+                    <a:bodyPr/>
+                    <a:lstStyle/>
+                    <a:p>
+                      <a:endParaRPr lang="en-US" dirty="0"/>
+                    </a:p>
+                  </a:txBody>
+                  <a:tcPr/>
+                </a:tc>
+                <a:tc>
+                  <a:txBody>
+                    <a:bodyPr/>
+                    <a:lstStyle/>
+                    <a:p>
+                      <a:endParaRPr lang="en-US" dirty="0"/>
+                    </a:p>
+                  </a:txBody>
+                  <a:tcPr/>
+                </a:tc>
+                <a:tc>
+                  <a:txBody>
+                    <a:bodyPr/>
+                    <a:lstStyle/>
+                    <a:p>
+                      <a:endParaRPr lang="en-US" dirty="0"/>
+                    </a:p>
+                  </a:txBody>
+                  <a:tcPr/>
+                </a:tc>
+                <a:tc>
+                  <a:txBody>
+                    <a:bodyPr/>
+                    <a:lstStyle/>
+                    <a:p>
+                      <a:endParaRPr lang="en-US" dirty="0"/>
+                    </a:p>
+                  </a:txBody>
+                  <a:tcPr>
+                    <a:solidFill>
+                      <a:schemeClr val="accent2">
+                        <a:lumMod val="20000"/>
+                        <a:lumOff val="80000"/>
+                      </a:schemeClr>
+                    </a:solidFill>
+                  </a:tcPr>
+                </a:tc>
+                <a:tc>
+                  <a:txBody>
+                    <a:bodyPr/>
+                    <a:lstStyle/>
+                    <a:p>
+                      <a:endParaRPr lang="en-US" dirty="0"/>
+                    </a:p>
+                  </a:txBody>
+                  <a:tcPr>
+                    <a:solidFill>
+                      <a:schemeClr val="accent2">
+                        <a:lumMod val="20000"/>
+                        <a:lumOff val="80000"/>
+                      </a:schemeClr>
+                    </a:solidFill>
+                  </a:tcPr>
+                </a:tc>
+                <a:tc>
+                  <a:txBody>
+                    <a:bodyPr/>
+                    <a:lstStyle/>
+                    <a:p>
+                      <a:endParaRPr lang="en-US" dirty="0"/>
+                    </a:p>
+                  </a:txBody>
+                  <a:tcPr/>
+                </a:tc>
+                <a:tc>
+                  <a:txBody>
+                    <a:bodyPr/>
+                    <a:lstStyle/>
+                    <a:p>
+                      <a:endParaRPr lang="en-US" dirty="0"/>
+                    </a:p>
+                  </a:txBody>
+                  <a:tcPr/>
+                </a:tc>
+                <a:tc>
+                  <a:txBody>
+                    <a:bodyPr/>
+                    <a:lstStyle/>
+                    <a:p>
+                      <a:endParaRPr lang="en-US" dirty="0"/>
+                    </a:p>
+                  </a:txBody>
+                  <a:tcPr/>
+                </a:tc>
+                <a:extLst>
+                  <a:ext uri="{0D108BD9-81ED-4DB2-BD59-A6C34878D82A}">
+                    <a16:rowId xmlns:a16="http://schemas.microsoft.com/office/drawing/2014/main" val="1146915689"/>
+                  </a:ext>
+                </a:extLst>
+              </a:tr>
+            </a:tbl>
+          </a:graphicData>
+        </a:graphic>
+      </p:graphicFrame>
+      <p:sp>
+        <p:nvSpPr>
+          <p:cNvPr id="4" name="Arrow: Left-Right 3">
+            <a:extLst>
+              <a:ext uri="{FF2B5EF4-FFF2-40B4-BE49-F238E27FC236}">
+                <a16:creationId xmlns:a16="http://schemas.microsoft.com/office/drawing/2014/main" id="{E429A8F9-4431-DCE6-F96E-EA781EB1C7C1}"/>
+              </a:ext>
+            </a:extLst>
+          </p:cNvPr>
+          <p:cNvSpPr/>
+          <p:nvPr/>
+        </p:nvSpPr>
+        <p:spPr>
+          <a:xfrm>
+            <a:off x="4017317" y="2662989"/>
+            <a:ext cx="618851" cy="240632"/>
+          </a:xfrm>
+          <a:prstGeom prst="leftRightArrow">
+            <a:avLst/>
+          </a:prstGeom>
+          <a:solidFill>
+            <a:schemeClr val="accent2"/>
+          </a:solidFill>
+          <a:ln>
+            <a:noFill/>
+          </a:ln>
+        </p:spPr>
+        <p:style>
+          <a:lnRef idx="2">
+            <a:schemeClr val="accent1">
+              <a:shade val="15000"/>
+            </a:schemeClr>
+          </a:lnRef>
+          <a:fillRef idx="1">
+            <a:schemeClr val="accent1"/>
+          </a:fillRef>
+          <a:effectRef idx="0">
+            <a:schemeClr val="accent1"/>
+          </a:effectRef>
+          <a:fontRef idx="minor">
+            <a:schemeClr val="lt1"/>
+          </a:fontRef>
+        </p:style>
+        <p:txBody>
+          <a:bodyPr rtlCol="0" anchor="ctr"/>
+          <a:lstStyle>
+            <a:defPPr>
+              <a:defRPr lang="en-US"/>
+            </a:defPPr>
+            <a:lvl1pPr marL="0" algn="l" defTabSz="914400" rtl="0" eaLnBrk="1" latinLnBrk="0" hangingPunct="1">
+              <a:defRPr sz="1800" kern="1200">
+                <a:solidFill>
+                  <a:schemeClr val="lt1"/>
+                </a:solidFill>
+                <a:latin typeface="+mn-lt"/>
+                <a:ea typeface="+mn-ea"/>
+                <a:cs typeface="+mn-cs"/>
+              </a:defRPr>
+            </a:lvl1pPr>
+            <a:lvl2pPr marL="457200" algn="l" defTabSz="914400" rtl="0" eaLnBrk="1" latinLnBrk="0" hangingPunct="1">
+              <a:defRPr sz="1800" kern="1200">
+                <a:solidFill>
+                  <a:schemeClr val="lt1"/>
+                </a:solidFill>
+                <a:latin typeface="+mn-lt"/>
+                <a:ea typeface="+mn-ea"/>
+                <a:cs typeface="+mn-cs"/>
+              </a:defRPr>
+            </a:lvl2pPr>
+            <a:lvl3pPr marL="914400" algn="l" defTabSz="914400" rtl="0" eaLnBrk="1" latinLnBrk="0" hangingPunct="1">
+              <a:defRPr sz="1800" kern="1200">
+                <a:solidFill>
+                  <a:schemeClr val="lt1"/>
+                </a:solidFill>
+                <a:latin typeface="+mn-lt"/>
+                <a:ea typeface="+mn-ea"/>
+                <a:cs typeface="+mn-cs"/>
+              </a:defRPr>
+            </a:lvl3pPr>
+            <a:lvl4pPr marL="1371600" algn="l" defTabSz="914400" rtl="0" eaLnBrk="1" latinLnBrk="0" hangingPunct="1">
+              <a:defRPr sz="1800" kern="1200">
+                <a:solidFill>
+                  <a:schemeClr val="lt1"/>
+                </a:solidFill>
+                <a:latin typeface="+mn-lt"/>
+                <a:ea typeface="+mn-ea"/>
+                <a:cs typeface="+mn-cs"/>
+              </a:defRPr>
+            </a:lvl4pPr>
+            <a:lvl5pPr marL="1828800" algn="l" defTabSz="914400" rtl="0" eaLnBrk="1" latinLnBrk="0" hangingPunct="1">
+              <a:defRPr sz="1800" kern="1200">
+                <a:solidFill>
+                  <a:schemeClr val="lt1"/>
+                </a:solidFill>
+                <a:latin typeface="+mn-lt"/>
+                <a:ea typeface="+mn-ea"/>
+                <a:cs typeface="+mn-cs"/>
+              </a:defRPr>
+            </a:lvl5pPr>
+            <a:lvl6pPr marL="2286000" algn="l" defTabSz="914400" rtl="0" eaLnBrk="1" latinLnBrk="0" hangingPunct="1">
+              <a:defRPr sz="1800" kern="1200">
+                <a:solidFill>
+                  <a:schemeClr val="lt1"/>
+                </a:solidFill>
+                <a:latin typeface="+mn-lt"/>
+                <a:ea typeface="+mn-ea"/>
+                <a:cs typeface="+mn-cs"/>
+              </a:defRPr>
+            </a:lvl6pPr>
+            <a:lvl7pPr marL="2743200" algn="l" defTabSz="914400" rtl="0" eaLnBrk="1" latinLnBrk="0" hangingPunct="1">
+              <a:defRPr sz="1800" kern="1200">
+                <a:solidFill>
+                  <a:schemeClr val="lt1"/>
+                </a:solidFill>
+                <a:latin typeface="+mn-lt"/>
+                <a:ea typeface="+mn-ea"/>
+                <a:cs typeface="+mn-cs"/>
+              </a:defRPr>
+            </a:lvl7pPr>
+            <a:lvl8pPr marL="3200400" algn="l" defTabSz="914400" rtl="0" eaLnBrk="1" latinLnBrk="0" hangingPunct="1">
+              <a:defRPr sz="1800" kern="1200">
+                <a:solidFill>
+                  <a:schemeClr val="lt1"/>
+                </a:solidFill>
+                <a:latin typeface="+mn-lt"/>
+                <a:ea typeface="+mn-ea"/>
+                <a:cs typeface="+mn-cs"/>
+              </a:defRPr>
+            </a:lvl8pPr>
+            <a:lvl9pPr marL="3657600" algn="l" defTabSz="914400" rtl="0" eaLnBrk="1" latinLnBrk="0" hangingPunct="1">
+              <a:defRPr sz="1800" kern="1200">
+                <a:solidFill>
+                  <a:schemeClr val="lt1"/>
+                </a:solidFill>
+                <a:latin typeface="+mn-lt"/>
+                <a:ea typeface="+mn-ea"/>
+                <a:cs typeface="+mn-cs"/>
+              </a:defRPr>
+            </a:lvl9pPr>
+          </a:lstStyle>
+          <a:p>
+            <a:pPr algn="ctr"/>
+            <a:endParaRPr lang="en-US"/>
+          </a:p>
+        </p:txBody>
+      </p:sp>
+      <p:sp>
+        <p:nvSpPr>
+          <p:cNvPr id="5" name="Arrow: Left-Right 4">
+            <a:extLst>
+              <a:ext uri="{FF2B5EF4-FFF2-40B4-BE49-F238E27FC236}">
+                <a16:creationId xmlns:a16="http://schemas.microsoft.com/office/drawing/2014/main" id="{67C4AA86-8B43-EE60-B6C4-D97FE23B0E8E}"/>
+              </a:ext>
+            </a:extLst>
+          </p:cNvPr>
+          <p:cNvSpPr/>
+          <p:nvPr/>
+        </p:nvSpPr>
+        <p:spPr>
+          <a:xfrm>
+            <a:off x="4458475" y="3571150"/>
+            <a:ext cx="618851" cy="240632"/>
+          </a:xfrm>
+          <a:prstGeom prst="leftRightArrow">
+            <a:avLst/>
+          </a:prstGeom>
+          <a:solidFill>
+            <a:schemeClr val="accent2"/>
+          </a:solidFill>
+          <a:ln>
+            <a:noFill/>
+          </a:ln>
+        </p:spPr>
+        <p:style>
+          <a:lnRef idx="2">
+            <a:schemeClr val="accent1">
+              <a:shade val="15000"/>
+            </a:schemeClr>
+          </a:lnRef>
+          <a:fillRef idx="1">
+            <a:schemeClr val="accent1"/>
+          </a:fillRef>
+          <a:effectRef idx="0">
+            <a:schemeClr val="accent1"/>
+          </a:effectRef>
+          <a:fontRef idx="minor">
+            <a:schemeClr val="lt1"/>
+          </a:fontRef>
+        </p:style>
+        <p:txBody>
+          <a:bodyPr rtlCol="0" anchor="ctr"/>
+          <a:lstStyle>
+            <a:defPPr>
+              <a:defRPr lang="en-US"/>
+            </a:defPPr>
+            <a:lvl1pPr marL="0" algn="l" defTabSz="914400" rtl="0" eaLnBrk="1" latinLnBrk="0" hangingPunct="1">
+              <a:defRPr sz="1800" kern="1200">
+                <a:solidFill>
+                  <a:schemeClr val="lt1"/>
+                </a:solidFill>
+                <a:latin typeface="+mn-lt"/>
+                <a:ea typeface="+mn-ea"/>
+                <a:cs typeface="+mn-cs"/>
+              </a:defRPr>
+            </a:lvl1pPr>
+            <a:lvl2pPr marL="457200" algn="l" defTabSz="914400" rtl="0" eaLnBrk="1" latinLnBrk="0" hangingPunct="1">
+              <a:defRPr sz="1800" kern="1200">
+                <a:solidFill>
+                  <a:schemeClr val="lt1"/>
+                </a:solidFill>
+                <a:latin typeface="+mn-lt"/>
+                <a:ea typeface="+mn-ea"/>
+                <a:cs typeface="+mn-cs"/>
+              </a:defRPr>
+            </a:lvl2pPr>
+            <a:lvl3pPr marL="914400" algn="l" defTabSz="914400" rtl="0" eaLnBrk="1" latinLnBrk="0" hangingPunct="1">
+              <a:defRPr sz="1800" kern="1200">
+                <a:solidFill>
+                  <a:schemeClr val="lt1"/>
+                </a:solidFill>
+                <a:latin typeface="+mn-lt"/>
+                <a:ea typeface="+mn-ea"/>
+                <a:cs typeface="+mn-cs"/>
+              </a:defRPr>
+            </a:lvl3pPr>
+            <a:lvl4pPr marL="1371600" algn="l" defTabSz="914400" rtl="0" eaLnBrk="1" latinLnBrk="0" hangingPunct="1">
+              <a:defRPr sz="1800" kern="1200">
+                <a:solidFill>
+                  <a:schemeClr val="lt1"/>
+                </a:solidFill>
+                <a:latin typeface="+mn-lt"/>
+                <a:ea typeface="+mn-ea"/>
+                <a:cs typeface="+mn-cs"/>
+              </a:defRPr>
+            </a:lvl4pPr>
+            <a:lvl5pPr marL="1828800" algn="l" defTabSz="914400" rtl="0" eaLnBrk="1" latinLnBrk="0" hangingPunct="1">
+              <a:defRPr sz="1800" kern="1200">
+                <a:solidFill>
+                  <a:schemeClr val="lt1"/>
+                </a:solidFill>
+                <a:latin typeface="+mn-lt"/>
+                <a:ea typeface="+mn-ea"/>
+                <a:cs typeface="+mn-cs"/>
+              </a:defRPr>
+            </a:lvl5pPr>
+            <a:lvl6pPr marL="2286000" algn="l" defTabSz="914400" rtl="0" eaLnBrk="1" latinLnBrk="0" hangingPunct="1">
+              <a:defRPr sz="1800" kern="1200">
+                <a:solidFill>
+                  <a:schemeClr val="lt1"/>
+                </a:solidFill>
+                <a:latin typeface="+mn-lt"/>
+                <a:ea typeface="+mn-ea"/>
+                <a:cs typeface="+mn-cs"/>
+              </a:defRPr>
+            </a:lvl6pPr>
+            <a:lvl7pPr marL="2743200" algn="l" defTabSz="914400" rtl="0" eaLnBrk="1" latinLnBrk="0" hangingPunct="1">
+              <a:defRPr sz="1800" kern="1200">
+                <a:solidFill>
+                  <a:schemeClr val="lt1"/>
+                </a:solidFill>
+                <a:latin typeface="+mn-lt"/>
+                <a:ea typeface="+mn-ea"/>
+                <a:cs typeface="+mn-cs"/>
+              </a:defRPr>
+            </a:lvl7pPr>
+            <a:lvl8pPr marL="3200400" algn="l" defTabSz="914400" rtl="0" eaLnBrk="1" latinLnBrk="0" hangingPunct="1">
+              <a:defRPr sz="1800" kern="1200">
+                <a:solidFill>
+                  <a:schemeClr val="lt1"/>
+                </a:solidFill>
+                <a:latin typeface="+mn-lt"/>
+                <a:ea typeface="+mn-ea"/>
+                <a:cs typeface="+mn-cs"/>
+              </a:defRPr>
+            </a:lvl8pPr>
+            <a:lvl9pPr marL="3657600" algn="l" defTabSz="914400" rtl="0" eaLnBrk="1" latinLnBrk="0" hangingPunct="1">
+              <a:defRPr sz="1800" kern="1200">
+                <a:solidFill>
+                  <a:schemeClr val="lt1"/>
+                </a:solidFill>
+                <a:latin typeface="+mn-lt"/>
+                <a:ea typeface="+mn-ea"/>
+                <a:cs typeface="+mn-cs"/>
+              </a:defRPr>
+            </a:lvl9pPr>
+          </a:lstStyle>
+          <a:p>
+            <a:pPr algn="ctr"/>
+            <a:endParaRPr lang="en-US"/>
+          </a:p>
+        </p:txBody>
+      </p:sp>
+      <p:sp>
+        <p:nvSpPr>
+          <p:cNvPr id="6" name="Arrow: Left-Right 5">
+            <a:extLst>
+              <a:ext uri="{FF2B5EF4-FFF2-40B4-BE49-F238E27FC236}">
+                <a16:creationId xmlns:a16="http://schemas.microsoft.com/office/drawing/2014/main" id="{0853BFB7-AD78-36FF-18B0-92FD2A93C537}"/>
+              </a:ext>
+            </a:extLst>
+          </p:cNvPr>
+          <p:cNvSpPr/>
+          <p:nvPr/>
+        </p:nvSpPr>
+        <p:spPr>
+          <a:xfrm>
+            <a:off x="4017316" y="4022557"/>
+            <a:ext cx="618851" cy="240632"/>
+          </a:xfrm>
+          <a:prstGeom prst="leftRightArrow">
+            <a:avLst/>
+          </a:prstGeom>
+          <a:solidFill>
+            <a:schemeClr val="accent2"/>
+          </a:solidFill>
+          <a:ln>
+            <a:noFill/>
+          </a:ln>
+        </p:spPr>
+        <p:style>
+          <a:lnRef idx="2">
+            <a:schemeClr val="accent1">
+              <a:shade val="15000"/>
+            </a:schemeClr>
+          </a:lnRef>
+          <a:fillRef idx="1">
+            <a:schemeClr val="accent1"/>
+          </a:fillRef>
+          <a:effectRef idx="0">
+            <a:schemeClr val="accent1"/>
+          </a:effectRef>
+          <a:fontRef idx="minor">
+            <a:schemeClr val="lt1"/>
+          </a:fontRef>
+        </p:style>
+        <p:txBody>
+          <a:bodyPr rtlCol="0" anchor="ctr"/>
+          <a:lstStyle>
+            <a:defPPr>
+              <a:defRPr lang="en-US"/>
+            </a:defPPr>
+            <a:lvl1pPr marL="0" algn="l" defTabSz="914400" rtl="0" eaLnBrk="1" latinLnBrk="0" hangingPunct="1">
+              <a:defRPr sz="1800" kern="1200">
+                <a:solidFill>
+                  <a:schemeClr val="lt1"/>
+                </a:solidFill>
+                <a:latin typeface="+mn-lt"/>
+                <a:ea typeface="+mn-ea"/>
+                <a:cs typeface="+mn-cs"/>
+              </a:defRPr>
+            </a:lvl1pPr>
+            <a:lvl2pPr marL="457200" algn="l" defTabSz="914400" rtl="0" eaLnBrk="1" latinLnBrk="0" hangingPunct="1">
+              <a:defRPr sz="1800" kern="1200">
+                <a:solidFill>
+                  <a:schemeClr val="lt1"/>
+                </a:solidFill>
+                <a:latin typeface="+mn-lt"/>
+                <a:ea typeface="+mn-ea"/>
+                <a:cs typeface="+mn-cs"/>
+              </a:defRPr>
+            </a:lvl2pPr>
+            <a:lvl3pPr marL="914400" algn="l" defTabSz="914400" rtl="0" eaLnBrk="1" latinLnBrk="0" hangingPunct="1">
+              <a:defRPr sz="1800" kern="1200">
+                <a:solidFill>
+                  <a:schemeClr val="lt1"/>
+                </a:solidFill>
+                <a:latin typeface="+mn-lt"/>
+                <a:ea typeface="+mn-ea"/>
+                <a:cs typeface="+mn-cs"/>
+              </a:defRPr>
+            </a:lvl3pPr>
+            <a:lvl4pPr marL="1371600" algn="l" defTabSz="914400" rtl="0" eaLnBrk="1" latinLnBrk="0" hangingPunct="1">
+              <a:defRPr sz="1800" kern="1200">
+                <a:solidFill>
+                  <a:schemeClr val="lt1"/>
+                </a:solidFill>
+                <a:latin typeface="+mn-lt"/>
+                <a:ea typeface="+mn-ea"/>
+                <a:cs typeface="+mn-cs"/>
+              </a:defRPr>
+            </a:lvl4pPr>
+            <a:lvl5pPr marL="1828800" algn="l" defTabSz="914400" rtl="0" eaLnBrk="1" latinLnBrk="0" hangingPunct="1">
+              <a:defRPr sz="1800" kern="1200">
+                <a:solidFill>
+                  <a:schemeClr val="lt1"/>
+                </a:solidFill>
+                <a:latin typeface="+mn-lt"/>
+                <a:ea typeface="+mn-ea"/>
+                <a:cs typeface="+mn-cs"/>
+              </a:defRPr>
+            </a:lvl5pPr>
+            <a:lvl6pPr marL="2286000" algn="l" defTabSz="914400" rtl="0" eaLnBrk="1" latinLnBrk="0" hangingPunct="1">
+              <a:defRPr sz="1800" kern="1200">
+                <a:solidFill>
+                  <a:schemeClr val="lt1"/>
+                </a:solidFill>
+                <a:latin typeface="+mn-lt"/>
+                <a:ea typeface="+mn-ea"/>
+                <a:cs typeface="+mn-cs"/>
+              </a:defRPr>
+            </a:lvl6pPr>
+            <a:lvl7pPr marL="2743200" algn="l" defTabSz="914400" rtl="0" eaLnBrk="1" latinLnBrk="0" hangingPunct="1">
+              <a:defRPr sz="1800" kern="1200">
+                <a:solidFill>
+                  <a:schemeClr val="lt1"/>
+                </a:solidFill>
+                <a:latin typeface="+mn-lt"/>
+                <a:ea typeface="+mn-ea"/>
+                <a:cs typeface="+mn-cs"/>
+              </a:defRPr>
+            </a:lvl7pPr>
+            <a:lvl8pPr marL="3200400" algn="l" defTabSz="914400" rtl="0" eaLnBrk="1" latinLnBrk="0" hangingPunct="1">
+              <a:defRPr sz="1800" kern="1200">
+                <a:solidFill>
+                  <a:schemeClr val="lt1"/>
+                </a:solidFill>
+                <a:latin typeface="+mn-lt"/>
+                <a:ea typeface="+mn-ea"/>
+                <a:cs typeface="+mn-cs"/>
+              </a:defRPr>
+            </a:lvl8pPr>
+            <a:lvl9pPr marL="3657600" algn="l" defTabSz="914400" rtl="0" eaLnBrk="1" latinLnBrk="0" hangingPunct="1">
+              <a:defRPr sz="1800" kern="1200">
+                <a:solidFill>
+                  <a:schemeClr val="lt1"/>
+                </a:solidFill>
+                <a:latin typeface="+mn-lt"/>
+                <a:ea typeface="+mn-ea"/>
+                <a:cs typeface="+mn-cs"/>
+              </a:defRPr>
+            </a:lvl9pPr>
+          </a:lstStyle>
+          <a:p>
+            <a:pPr algn="ctr"/>
+            <a:endParaRPr lang="en-US"/>
+          </a:p>
+        </p:txBody>
+      </p:sp>
+      <p:sp>
+        <p:nvSpPr>
+          <p:cNvPr id="7" name="Arrow: Left-Right 6">
+            <a:extLst>
+              <a:ext uri="{FF2B5EF4-FFF2-40B4-BE49-F238E27FC236}">
+                <a16:creationId xmlns:a16="http://schemas.microsoft.com/office/drawing/2014/main" id="{96ED9AD6-A713-0A5A-A0EE-D102F113CE29}"/>
+              </a:ext>
+            </a:extLst>
+          </p:cNvPr>
+          <p:cNvSpPr/>
+          <p:nvPr/>
+        </p:nvSpPr>
+        <p:spPr>
+          <a:xfrm>
+            <a:off x="4926369" y="4948766"/>
+            <a:ext cx="618851" cy="240632"/>
+          </a:xfrm>
+          <a:prstGeom prst="leftRightArrow">
+            <a:avLst/>
+          </a:prstGeom>
+          <a:solidFill>
+            <a:schemeClr val="accent2"/>
+          </a:solidFill>
+          <a:ln>
+            <a:noFill/>
+          </a:ln>
+        </p:spPr>
+        <p:style>
+          <a:lnRef idx="2">
+            <a:schemeClr val="accent1">
+              <a:shade val="15000"/>
+            </a:schemeClr>
+          </a:lnRef>
+          <a:fillRef idx="1">
+            <a:schemeClr val="accent1"/>
+          </a:fillRef>
+          <a:effectRef idx="0">
+            <a:schemeClr val="accent1"/>
+          </a:effectRef>
+          <a:fontRef idx="minor">
+            <a:schemeClr val="lt1"/>
+          </a:fontRef>
+        </p:style>
+        <p:txBody>
+          <a:bodyPr rtlCol="0" anchor="ctr"/>
+          <a:lstStyle>
+            <a:defPPr>
+              <a:defRPr lang="en-US"/>
+            </a:defPPr>
+            <a:lvl1pPr marL="0" algn="l" defTabSz="914400" rtl="0" eaLnBrk="1" latinLnBrk="0" hangingPunct="1">
+              <a:defRPr sz="1800" kern="1200">
+                <a:solidFill>
+                  <a:schemeClr val="lt1"/>
+                </a:solidFill>
+                <a:latin typeface="+mn-lt"/>
+                <a:ea typeface="+mn-ea"/>
+                <a:cs typeface="+mn-cs"/>
+              </a:defRPr>
+            </a:lvl1pPr>
+            <a:lvl2pPr marL="457200" algn="l" defTabSz="914400" rtl="0" eaLnBrk="1" latinLnBrk="0" hangingPunct="1">
+              <a:defRPr sz="1800" kern="1200">
+                <a:solidFill>
+                  <a:schemeClr val="lt1"/>
+                </a:solidFill>
+                <a:latin typeface="+mn-lt"/>
+                <a:ea typeface="+mn-ea"/>
+                <a:cs typeface="+mn-cs"/>
+              </a:defRPr>
+            </a:lvl2pPr>
+            <a:lvl3pPr marL="914400" algn="l" defTabSz="914400" rtl="0" eaLnBrk="1" latinLnBrk="0" hangingPunct="1">
+              <a:defRPr sz="1800" kern="1200">
+                <a:solidFill>
+                  <a:schemeClr val="lt1"/>
+                </a:solidFill>
+                <a:latin typeface="+mn-lt"/>
+                <a:ea typeface="+mn-ea"/>
+                <a:cs typeface="+mn-cs"/>
+              </a:defRPr>
+            </a:lvl3pPr>
+            <a:lvl4pPr marL="1371600" algn="l" defTabSz="914400" rtl="0" eaLnBrk="1" latinLnBrk="0" hangingPunct="1">
+              <a:defRPr sz="1800" kern="1200">
+                <a:solidFill>
+                  <a:schemeClr val="lt1"/>
+                </a:solidFill>
+                <a:latin typeface="+mn-lt"/>
+                <a:ea typeface="+mn-ea"/>
+                <a:cs typeface="+mn-cs"/>
+              </a:defRPr>
+            </a:lvl4pPr>
+            <a:lvl5pPr marL="1828800" algn="l" defTabSz="914400" rtl="0" eaLnBrk="1" latinLnBrk="0" hangingPunct="1">
+              <a:defRPr sz="1800" kern="1200">
+                <a:solidFill>
+                  <a:schemeClr val="lt1"/>
+                </a:solidFill>
+                <a:latin typeface="+mn-lt"/>
+                <a:ea typeface="+mn-ea"/>
+                <a:cs typeface="+mn-cs"/>
+              </a:defRPr>
+            </a:lvl5pPr>
+            <a:lvl6pPr marL="2286000" algn="l" defTabSz="914400" rtl="0" eaLnBrk="1" latinLnBrk="0" hangingPunct="1">
+              <a:defRPr sz="1800" kern="1200">
+                <a:solidFill>
+                  <a:schemeClr val="lt1"/>
+                </a:solidFill>
+                <a:latin typeface="+mn-lt"/>
+                <a:ea typeface="+mn-ea"/>
+                <a:cs typeface="+mn-cs"/>
+              </a:defRPr>
+            </a:lvl6pPr>
+            <a:lvl7pPr marL="2743200" algn="l" defTabSz="914400" rtl="0" eaLnBrk="1" latinLnBrk="0" hangingPunct="1">
+              <a:defRPr sz="1800" kern="1200">
+                <a:solidFill>
+                  <a:schemeClr val="lt1"/>
+                </a:solidFill>
+                <a:latin typeface="+mn-lt"/>
+                <a:ea typeface="+mn-ea"/>
+                <a:cs typeface="+mn-cs"/>
+              </a:defRPr>
+            </a:lvl7pPr>
+            <a:lvl8pPr marL="3200400" algn="l" defTabSz="914400" rtl="0" eaLnBrk="1" latinLnBrk="0" hangingPunct="1">
+              <a:defRPr sz="1800" kern="1200">
+                <a:solidFill>
+                  <a:schemeClr val="lt1"/>
+                </a:solidFill>
+                <a:latin typeface="+mn-lt"/>
+                <a:ea typeface="+mn-ea"/>
+                <a:cs typeface="+mn-cs"/>
+              </a:defRPr>
+            </a:lvl8pPr>
+            <a:lvl9pPr marL="3657600" algn="l" defTabSz="914400" rtl="0" eaLnBrk="1" latinLnBrk="0" hangingPunct="1">
+              <a:defRPr sz="1800" kern="1200">
+                <a:solidFill>
+                  <a:schemeClr val="lt1"/>
+                </a:solidFill>
+                <a:latin typeface="+mn-lt"/>
+                <a:ea typeface="+mn-ea"/>
+                <a:cs typeface="+mn-cs"/>
+              </a:defRPr>
+            </a:lvl9pPr>
+          </a:lstStyle>
+          <a:p>
+            <a:pPr algn="ctr"/>
+            <a:endParaRPr lang="en-US"/>
+          </a:p>
+        </p:txBody>
+      </p:sp>
+      <p:sp>
+        <p:nvSpPr>
+          <p:cNvPr id="8" name="Arrow: Left-Right 7">
+            <a:extLst>
+              <a:ext uri="{FF2B5EF4-FFF2-40B4-BE49-F238E27FC236}">
+                <a16:creationId xmlns:a16="http://schemas.microsoft.com/office/drawing/2014/main" id="{DE5E8EAB-C739-FF3B-4664-6D4617FA4311}"/>
+              </a:ext>
+            </a:extLst>
+          </p:cNvPr>
+          <p:cNvSpPr/>
+          <p:nvPr/>
+        </p:nvSpPr>
+        <p:spPr>
+          <a:xfrm>
+            <a:off x="4458474" y="5385913"/>
+            <a:ext cx="618851" cy="240632"/>
+          </a:xfrm>
+          <a:prstGeom prst="leftRightArrow">
+            <a:avLst/>
+          </a:prstGeom>
+          <a:solidFill>
+            <a:schemeClr val="accent2"/>
+          </a:solidFill>
+          <a:ln>
+            <a:noFill/>
+          </a:ln>
+        </p:spPr>
+        <p:style>
+          <a:lnRef idx="2">
+            <a:schemeClr val="accent1">
+              <a:shade val="15000"/>
+            </a:schemeClr>
+          </a:lnRef>
+          <a:fillRef idx="1">
+            <a:schemeClr val="accent1"/>
+          </a:fillRef>
+          <a:effectRef idx="0">
+            <a:schemeClr val="accent1"/>
+          </a:effectRef>
+          <a:fontRef idx="minor">
+            <a:schemeClr val="lt1"/>
+          </a:fontRef>
+        </p:style>
+        <p:txBody>
+          <a:bodyPr rtlCol="0" anchor="ctr"/>
+          <a:lstStyle>
+            <a:defPPr>
+              <a:defRPr lang="en-US"/>
+            </a:defPPr>
+            <a:lvl1pPr marL="0" algn="l" defTabSz="914400" rtl="0" eaLnBrk="1" latinLnBrk="0" hangingPunct="1">
+              <a:defRPr sz="1800" kern="1200">
+                <a:solidFill>
+                  <a:schemeClr val="lt1"/>
+                </a:solidFill>
+                <a:latin typeface="+mn-lt"/>
+                <a:ea typeface="+mn-ea"/>
+                <a:cs typeface="+mn-cs"/>
+              </a:defRPr>
+            </a:lvl1pPr>
+            <a:lvl2pPr marL="457200" algn="l" defTabSz="914400" rtl="0" eaLnBrk="1" latinLnBrk="0" hangingPunct="1">
+              <a:defRPr sz="1800" kern="1200">
+                <a:solidFill>
+                  <a:schemeClr val="lt1"/>
+                </a:solidFill>
+                <a:latin typeface="+mn-lt"/>
+                <a:ea typeface="+mn-ea"/>
+                <a:cs typeface="+mn-cs"/>
+              </a:defRPr>
+            </a:lvl2pPr>
+            <a:lvl3pPr marL="914400" algn="l" defTabSz="914400" rtl="0" eaLnBrk="1" latinLnBrk="0" hangingPunct="1">
+              <a:defRPr sz="1800" kern="1200">
+                <a:solidFill>
+                  <a:schemeClr val="lt1"/>
+                </a:solidFill>
+                <a:latin typeface="+mn-lt"/>
+                <a:ea typeface="+mn-ea"/>
+                <a:cs typeface="+mn-cs"/>
+              </a:defRPr>
+            </a:lvl3pPr>
+            <a:lvl4pPr marL="1371600" algn="l" defTabSz="914400" rtl="0" eaLnBrk="1" latinLnBrk="0" hangingPunct="1">
+              <a:defRPr sz="1800" kern="1200">
+                <a:solidFill>
+                  <a:schemeClr val="lt1"/>
+                </a:solidFill>
+                <a:latin typeface="+mn-lt"/>
+                <a:ea typeface="+mn-ea"/>
+                <a:cs typeface="+mn-cs"/>
+              </a:defRPr>
+            </a:lvl4pPr>
+            <a:lvl5pPr marL="1828800" algn="l" defTabSz="914400" rtl="0" eaLnBrk="1" latinLnBrk="0" hangingPunct="1">
+              <a:defRPr sz="1800" kern="1200">
+                <a:solidFill>
+                  <a:schemeClr val="lt1"/>
+                </a:solidFill>
+                <a:latin typeface="+mn-lt"/>
+                <a:ea typeface="+mn-ea"/>
+                <a:cs typeface="+mn-cs"/>
+              </a:defRPr>
+            </a:lvl5pPr>
+            <a:lvl6pPr marL="2286000" algn="l" defTabSz="914400" rtl="0" eaLnBrk="1" latinLnBrk="0" hangingPunct="1">
+              <a:defRPr sz="1800" kern="1200">
+                <a:solidFill>
+                  <a:schemeClr val="lt1"/>
+                </a:solidFill>
+                <a:latin typeface="+mn-lt"/>
+                <a:ea typeface="+mn-ea"/>
+                <a:cs typeface="+mn-cs"/>
+              </a:defRPr>
+            </a:lvl6pPr>
+            <a:lvl7pPr marL="2743200" algn="l" defTabSz="914400" rtl="0" eaLnBrk="1" latinLnBrk="0" hangingPunct="1">
+              <a:defRPr sz="1800" kern="1200">
+                <a:solidFill>
+                  <a:schemeClr val="lt1"/>
+                </a:solidFill>
+                <a:latin typeface="+mn-lt"/>
+                <a:ea typeface="+mn-ea"/>
+                <a:cs typeface="+mn-cs"/>
+              </a:defRPr>
+            </a:lvl7pPr>
+            <a:lvl8pPr marL="3200400" algn="l" defTabSz="914400" rtl="0" eaLnBrk="1" latinLnBrk="0" hangingPunct="1">
+              <a:defRPr sz="1800" kern="1200">
+                <a:solidFill>
+                  <a:schemeClr val="lt1"/>
+                </a:solidFill>
+                <a:latin typeface="+mn-lt"/>
+                <a:ea typeface="+mn-ea"/>
+                <a:cs typeface="+mn-cs"/>
+              </a:defRPr>
+            </a:lvl8pPr>
+            <a:lvl9pPr marL="3657600" algn="l" defTabSz="914400" rtl="0" eaLnBrk="1" latinLnBrk="0" hangingPunct="1">
+              <a:defRPr sz="1800" kern="1200">
+                <a:solidFill>
+                  <a:schemeClr val="lt1"/>
+                </a:solidFill>
+                <a:latin typeface="+mn-lt"/>
+                <a:ea typeface="+mn-ea"/>
+                <a:cs typeface="+mn-cs"/>
+              </a:defRPr>
+            </a:lvl9pPr>
+          </a:lstStyle>
+          <a:p>
+            <a:pPr algn="ctr"/>
+            <a:endParaRPr lang="en-US"/>
+          </a:p>
+        </p:txBody>
+      </p:sp>
+      <p:sp>
+        <p:nvSpPr>
+          <p:cNvPr id="9" name="Arrow: Left-Right 8">
+            <a:extLst>
+              <a:ext uri="{FF2B5EF4-FFF2-40B4-BE49-F238E27FC236}">
+                <a16:creationId xmlns:a16="http://schemas.microsoft.com/office/drawing/2014/main" id="{E69E9D4D-F3F3-2F06-3E28-1605308CB3D8}"/>
+              </a:ext>
+            </a:extLst>
+          </p:cNvPr>
+          <p:cNvSpPr/>
+          <p:nvPr/>
+        </p:nvSpPr>
+        <p:spPr>
+          <a:xfrm>
+            <a:off x="4017315" y="5880989"/>
+            <a:ext cx="618851" cy="240632"/>
+          </a:xfrm>
+          <a:prstGeom prst="leftRightArrow">
+            <a:avLst/>
+          </a:prstGeom>
+          <a:solidFill>
+            <a:schemeClr val="accent2"/>
+          </a:solidFill>
+          <a:ln>
+            <a:noFill/>
+          </a:ln>
+        </p:spPr>
+        <p:style>
+          <a:lnRef idx="2">
+            <a:schemeClr val="accent1">
+              <a:shade val="15000"/>
+            </a:schemeClr>
+          </a:lnRef>
+          <a:fillRef idx="1">
+            <a:schemeClr val="accent1"/>
+          </a:fillRef>
+          <a:effectRef idx="0">
+            <a:schemeClr val="accent1"/>
+          </a:effectRef>
+          <a:fontRef idx="minor">
+            <a:schemeClr val="lt1"/>
+          </a:fontRef>
+        </p:style>
+        <p:txBody>
+          <a:bodyPr rtlCol="0" anchor="ctr"/>
+          <a:lstStyle>
+            <a:defPPr>
+              <a:defRPr lang="en-US"/>
+            </a:defPPr>
+            <a:lvl1pPr marL="0" algn="l" defTabSz="914400" rtl="0" eaLnBrk="1" latinLnBrk="0" hangingPunct="1">
+              <a:defRPr sz="1800" kern="1200">
+                <a:solidFill>
+                  <a:schemeClr val="lt1"/>
+                </a:solidFill>
+                <a:latin typeface="+mn-lt"/>
+                <a:ea typeface="+mn-ea"/>
+                <a:cs typeface="+mn-cs"/>
+              </a:defRPr>
+            </a:lvl1pPr>
+            <a:lvl2pPr marL="457200" algn="l" defTabSz="914400" rtl="0" eaLnBrk="1" latinLnBrk="0" hangingPunct="1">
+              <a:defRPr sz="1800" kern="1200">
+                <a:solidFill>
+                  <a:schemeClr val="lt1"/>
+                </a:solidFill>
+                <a:latin typeface="+mn-lt"/>
+                <a:ea typeface="+mn-ea"/>
+                <a:cs typeface="+mn-cs"/>
+              </a:defRPr>
+            </a:lvl2pPr>
+            <a:lvl3pPr marL="914400" algn="l" defTabSz="914400" rtl="0" eaLnBrk="1" latinLnBrk="0" hangingPunct="1">
+              <a:defRPr sz="1800" kern="1200">
+                <a:solidFill>
+                  <a:schemeClr val="lt1"/>
+                </a:solidFill>
+                <a:latin typeface="+mn-lt"/>
+                <a:ea typeface="+mn-ea"/>
+                <a:cs typeface="+mn-cs"/>
+              </a:defRPr>
+            </a:lvl3pPr>
+            <a:lvl4pPr marL="1371600" algn="l" defTabSz="914400" rtl="0" eaLnBrk="1" latinLnBrk="0" hangingPunct="1">
+              <a:defRPr sz="1800" kern="1200">
+                <a:solidFill>
+                  <a:schemeClr val="lt1"/>
+                </a:solidFill>
+                <a:latin typeface="+mn-lt"/>
+                <a:ea typeface="+mn-ea"/>
+                <a:cs typeface="+mn-cs"/>
+              </a:defRPr>
+            </a:lvl4pPr>
+            <a:lvl5pPr marL="1828800" algn="l" defTabSz="914400" rtl="0" eaLnBrk="1" latinLnBrk="0" hangingPunct="1">
+              <a:defRPr sz="1800" kern="1200">
+                <a:solidFill>
+                  <a:schemeClr val="lt1"/>
+                </a:solidFill>
+                <a:latin typeface="+mn-lt"/>
+                <a:ea typeface="+mn-ea"/>
+                <a:cs typeface="+mn-cs"/>
+              </a:defRPr>
+            </a:lvl5pPr>
+            <a:lvl6pPr marL="2286000" algn="l" defTabSz="914400" rtl="0" eaLnBrk="1" latinLnBrk="0" hangingPunct="1">
+              <a:defRPr sz="1800" kern="1200">
+                <a:solidFill>
+                  <a:schemeClr val="lt1"/>
+                </a:solidFill>
+                <a:latin typeface="+mn-lt"/>
+                <a:ea typeface="+mn-ea"/>
+                <a:cs typeface="+mn-cs"/>
+              </a:defRPr>
+            </a:lvl6pPr>
+            <a:lvl7pPr marL="2743200" algn="l" defTabSz="914400" rtl="0" eaLnBrk="1" latinLnBrk="0" hangingPunct="1">
+              <a:defRPr sz="1800" kern="1200">
+                <a:solidFill>
+                  <a:schemeClr val="lt1"/>
+                </a:solidFill>
+                <a:latin typeface="+mn-lt"/>
+                <a:ea typeface="+mn-ea"/>
+                <a:cs typeface="+mn-cs"/>
+              </a:defRPr>
+            </a:lvl7pPr>
+            <a:lvl8pPr marL="3200400" algn="l" defTabSz="914400" rtl="0" eaLnBrk="1" latinLnBrk="0" hangingPunct="1">
+              <a:defRPr sz="1800" kern="1200">
+                <a:solidFill>
+                  <a:schemeClr val="lt1"/>
+                </a:solidFill>
+                <a:latin typeface="+mn-lt"/>
+                <a:ea typeface="+mn-ea"/>
+                <a:cs typeface="+mn-cs"/>
+              </a:defRPr>
+            </a:lvl8pPr>
+            <a:lvl9pPr marL="3657600" algn="l" defTabSz="914400" rtl="0" eaLnBrk="1" latinLnBrk="0" hangingPunct="1">
+              <a:defRPr sz="1800" kern="1200">
+                <a:solidFill>
+                  <a:schemeClr val="lt1"/>
+                </a:solidFill>
+                <a:latin typeface="+mn-lt"/>
+                <a:ea typeface="+mn-ea"/>
+                <a:cs typeface="+mn-cs"/>
+              </a:defRPr>
+            </a:lvl9pPr>
+          </a:lstStyle>
+          <a:p>
+            <a:pPr algn="ctr"/>
+            <a:endParaRPr lang="en-US"/>
+          </a:p>
+        </p:txBody>
+      </p:sp>
+      <p:sp>
+        <p:nvSpPr>
+          <p:cNvPr id="10" name="TextBox 9">
+            <a:extLst>
+              <a:ext uri="{FF2B5EF4-FFF2-40B4-BE49-F238E27FC236}">
+                <a16:creationId xmlns:a16="http://schemas.microsoft.com/office/drawing/2014/main" id="{D53C66C6-EFA0-52F2-D483-1C5B0B5443B6}"/>
+              </a:ext>
+            </a:extLst>
+          </p:cNvPr>
+          <p:cNvSpPr txBox="1"/>
+          <p:nvPr/>
+        </p:nvSpPr>
+        <p:spPr>
+          <a:xfrm>
+            <a:off x="1556084" y="671540"/>
+            <a:ext cx="444352" cy="6046271"/>
+          </a:xfrm>
+          <a:prstGeom prst="rect">
+            <a:avLst/>
+          </a:prstGeom>
+          <a:noFill/>
+        </p:spPr>
+        <p:txBody>
+          <a:bodyPr wrap="none" rtlCol="0">
+            <a:spAutoFit/>
+          </a:bodyPr>
+          <a:lstStyle/>
+          <a:p>
+            <a:pPr>
+              <a:lnSpc>
+                <a:spcPct val="150000"/>
+              </a:lnSpc>
+            </a:pPr>
+            <a:r>
+              <a:rPr lang="en-US" sz="2000" dirty="0"/>
+              <a:t>1</a:t>
+            </a:r>
+          </a:p>
+          <a:p>
+            <a:pPr>
+              <a:lnSpc>
+                <a:spcPct val="150000"/>
+              </a:lnSpc>
+            </a:pPr>
+            <a:r>
+              <a:rPr lang="en-US" sz="2000" dirty="0"/>
+              <a:t>2</a:t>
+            </a:r>
+          </a:p>
+          <a:p>
+            <a:pPr>
+              <a:lnSpc>
+                <a:spcPct val="150000"/>
+              </a:lnSpc>
+            </a:pPr>
+            <a:r>
+              <a:rPr lang="en-US" sz="2000" dirty="0"/>
+              <a:t>3</a:t>
+            </a:r>
+          </a:p>
+          <a:p>
+            <a:pPr>
+              <a:lnSpc>
+                <a:spcPct val="150000"/>
+              </a:lnSpc>
+            </a:pPr>
+            <a:r>
+              <a:rPr lang="en-US" sz="2000" dirty="0"/>
+              <a:t>4</a:t>
+            </a:r>
+          </a:p>
+          <a:p>
+            <a:pPr>
+              <a:lnSpc>
+                <a:spcPct val="150000"/>
+              </a:lnSpc>
+            </a:pPr>
+            <a:r>
+              <a:rPr lang="en-US" sz="2000" dirty="0"/>
+              <a:t>5</a:t>
+            </a:r>
+          </a:p>
+          <a:p>
+            <a:pPr>
+              <a:lnSpc>
+                <a:spcPct val="150000"/>
+              </a:lnSpc>
+            </a:pPr>
+            <a:r>
+              <a:rPr lang="en-US" sz="2000" dirty="0"/>
+              <a:t>6</a:t>
+            </a:r>
+          </a:p>
+          <a:p>
+            <a:pPr>
+              <a:lnSpc>
+                <a:spcPct val="150000"/>
+              </a:lnSpc>
+            </a:pPr>
+            <a:r>
+              <a:rPr lang="en-US" sz="2000" dirty="0"/>
+              <a:t>7</a:t>
+            </a:r>
+          </a:p>
+          <a:p>
+            <a:pPr>
+              <a:lnSpc>
+                <a:spcPct val="150000"/>
+              </a:lnSpc>
+            </a:pPr>
+            <a:r>
+              <a:rPr lang="en-US" sz="2000" dirty="0"/>
+              <a:t>8</a:t>
+            </a:r>
+          </a:p>
+          <a:p>
+            <a:pPr>
+              <a:lnSpc>
+                <a:spcPct val="150000"/>
+              </a:lnSpc>
+            </a:pPr>
+            <a:r>
+              <a:rPr lang="en-US" sz="2000" dirty="0"/>
+              <a:t>9</a:t>
+            </a:r>
+          </a:p>
+          <a:p>
+            <a:pPr>
+              <a:lnSpc>
+                <a:spcPct val="150000"/>
+              </a:lnSpc>
+            </a:pPr>
+            <a:r>
+              <a:rPr lang="en-US" sz="2000" dirty="0"/>
+              <a:t>10</a:t>
+            </a:r>
+          </a:p>
+          <a:p>
+            <a:pPr>
+              <a:lnSpc>
+                <a:spcPct val="150000"/>
+              </a:lnSpc>
+            </a:pPr>
+            <a:r>
+              <a:rPr lang="en-US" sz="2000" dirty="0"/>
+              <a:t>11</a:t>
+            </a:r>
+          </a:p>
+          <a:p>
+            <a:pPr>
+              <a:lnSpc>
+                <a:spcPct val="150000"/>
+              </a:lnSpc>
+            </a:pPr>
+            <a:r>
+              <a:rPr lang="en-US" sz="2000" dirty="0"/>
+              <a:t>12</a:t>
+            </a:r>
+          </a:p>
+          <a:p>
+            <a:pPr>
+              <a:lnSpc>
+                <a:spcPct val="150000"/>
+              </a:lnSpc>
+            </a:pPr>
+            <a:r>
+              <a:rPr lang="en-US" sz="2000" dirty="0"/>
+              <a:t>13</a:t>
+            </a:r>
+          </a:p>
+        </p:txBody>
+      </p:sp>
+    </p:spTree>
+    <p:extLst>
+      <p:ext uri="{BB962C8B-B14F-4D97-AF65-F5344CB8AC3E}">
+        <p14:creationId xmlns:p14="http://schemas.microsoft.com/office/powerpoint/2010/main" val="2715674161"/>
+      </p:ext>
+    </p:extLst>
+  </p:cSld>
+  <p:clrMapOvr>
+    <a:masterClrMapping/>
+  </p:clrMapOvr>
+</p:sld>
+</file>
+
+<file path=ppt/slides/slide14.xml><?xml version="1.0" encoding="utf-8"?>
+<p:sld xmlns:a="http://schemas.openxmlformats.org/drawingml/2006/main" xmlns:r="http://schemas.openxmlformats.org/officeDocument/2006/relationships" xmlns:p="http://schemas.openxmlformats.org/presentationml/2006/main">
+  <p:cSld>
+    <p:spTree>
+      <p:nvGrpSpPr>
+        <p:cNvPr id="1" name=""/>
+        <p:cNvGrpSpPr/>
+        <p:nvPr/>
+      </p:nvGrpSpPr>
+      <p:grpSpPr>
+        <a:xfrm>
+          <a:off x="0" y="0"/>
+          <a:ext cx="0" cy="0"/>
+          <a:chOff x="0" y="0"/>
+          <a:chExt cx="0" cy="0"/>
+        </a:xfrm>
+      </p:grpSpPr>
       <p:grpSp>
         <p:nvGrpSpPr>
           <p:cNvPr id="2" name="Group 1">
@@ -22961,6 +25902,1162 @@
     <p:extLst>
       <p:ext uri="{BB962C8B-B14F-4D97-AF65-F5344CB8AC3E}">
         <p14:creationId xmlns:p14="http://schemas.microsoft.com/office/powerpoint/2010/main" val="3635734078"/>
+      </p:ext>
+    </p:extLst>
+  </p:cSld>
+  <p:clrMapOvr>
+    <a:masterClrMapping/>
+  </p:clrMapOvr>
+</p:sld>
+</file>
+
+<file path=ppt/slides/slide15.xml><?xml version="1.0" encoding="utf-8"?>
+<p:sld xmlns:a="http://schemas.openxmlformats.org/drawingml/2006/main" xmlns:r="http://schemas.openxmlformats.org/officeDocument/2006/relationships" xmlns:p="http://schemas.openxmlformats.org/presentationml/2006/main">
+  <p:cSld>
+    <p:spTree>
+      <p:nvGrpSpPr>
+        <p:cNvPr id="1" name=""/>
+        <p:cNvGrpSpPr/>
+        <p:nvPr/>
+      </p:nvGrpSpPr>
+      <p:grpSpPr>
+        <a:xfrm>
+          <a:off x="0" y="0"/>
+          <a:ext cx="0" cy="0"/>
+          <a:chOff x="0" y="0"/>
+          <a:chExt cx="0" cy="0"/>
+        </a:xfrm>
+      </p:grpSpPr>
+      <p:grpSp>
+        <p:nvGrpSpPr>
+          <p:cNvPr id="17" name="Group 16">
+            <a:extLst>
+              <a:ext uri="{FF2B5EF4-FFF2-40B4-BE49-F238E27FC236}">
+                <a16:creationId xmlns:a16="http://schemas.microsoft.com/office/drawing/2014/main" id="{73BF9AE2-D1F2-F6E9-1754-FA0CB5754825}"/>
+              </a:ext>
+            </a:extLst>
+          </p:cNvPr>
+          <p:cNvGrpSpPr/>
+          <p:nvPr/>
+        </p:nvGrpSpPr>
+        <p:grpSpPr>
+          <a:xfrm>
+            <a:off x="618238" y="2514597"/>
+            <a:ext cx="10542337" cy="1828801"/>
+            <a:chOff x="618238" y="2514597"/>
+            <a:chExt cx="10542337" cy="1828801"/>
+          </a:xfrm>
+        </p:grpSpPr>
+        <p:grpSp>
+          <p:nvGrpSpPr>
+            <p:cNvPr id="2" name="Group 1">
+              <a:extLst>
+                <a:ext uri="{FF2B5EF4-FFF2-40B4-BE49-F238E27FC236}">
+                  <a16:creationId xmlns:a16="http://schemas.microsoft.com/office/drawing/2014/main" id="{3C6E6363-5C14-9C4A-5037-EC4429954EB8}"/>
+                </a:ext>
+              </a:extLst>
+            </p:cNvPr>
+            <p:cNvGrpSpPr/>
+            <p:nvPr/>
+          </p:nvGrpSpPr>
+          <p:grpSpPr>
+            <a:xfrm>
+              <a:off x="618238" y="2514598"/>
+              <a:ext cx="1828800" cy="1828800"/>
+              <a:chOff x="3385825" y="267657"/>
+              <a:chExt cx="5943600" cy="5943600"/>
+            </a:xfrm>
+          </p:grpSpPr>
+          <p:sp>
+            <p:nvSpPr>
+              <p:cNvPr id="3" name="Rectangle: Rounded Corners 2">
+                <a:extLst>
+                  <a:ext uri="{FF2B5EF4-FFF2-40B4-BE49-F238E27FC236}">
+                    <a16:creationId xmlns:a16="http://schemas.microsoft.com/office/drawing/2014/main" id="{E19079F4-ECDA-7207-5A5F-F9681AC0488F}"/>
+                  </a:ext>
+                </a:extLst>
+              </p:cNvPr>
+              <p:cNvSpPr/>
+              <p:nvPr/>
+            </p:nvSpPr>
+            <p:spPr>
+              <a:xfrm>
+                <a:off x="3385825" y="267657"/>
+                <a:ext cx="5943600" cy="5943600"/>
+              </a:xfrm>
+              <a:prstGeom prst="roundRect">
+                <a:avLst/>
+              </a:prstGeom>
+              <a:solidFill>
+                <a:srgbClr val="FFB207"/>
+              </a:solidFill>
+              <a:ln>
+                <a:noFill/>
+              </a:ln>
+            </p:spPr>
+            <p:style>
+              <a:lnRef idx="2">
+                <a:schemeClr val="accent1">
+                  <a:shade val="15000"/>
+                </a:schemeClr>
+              </a:lnRef>
+              <a:fillRef idx="1">
+                <a:schemeClr val="accent1"/>
+              </a:fillRef>
+              <a:effectRef idx="0">
+                <a:schemeClr val="accent1"/>
+              </a:effectRef>
+              <a:fontRef idx="minor">
+                <a:schemeClr val="lt1"/>
+              </a:fontRef>
+            </p:style>
+            <p:txBody>
+              <a:bodyPr rtlCol="0" anchor="ctr"/>
+              <a:lstStyle/>
+              <a:p>
+                <a:pPr algn="ctr"/>
+                <a:endParaRPr lang="en-US" dirty="0"/>
+              </a:p>
+            </p:txBody>
+          </p:sp>
+          <p:pic>
+            <p:nvPicPr>
+              <p:cNvPr id="4" name="Graphic 3" descr="Fish with solid fill">
+                <a:extLst>
+                  <a:ext uri="{FF2B5EF4-FFF2-40B4-BE49-F238E27FC236}">
+                    <a16:creationId xmlns:a16="http://schemas.microsoft.com/office/drawing/2014/main" id="{FFF689A3-0970-C931-9F1B-872B819B0CF6}"/>
+                  </a:ext>
+                </a:extLst>
+              </p:cNvPr>
+              <p:cNvPicPr>
+                <a:picLocks noChangeAspect="1"/>
+              </p:cNvPicPr>
+              <p:nvPr/>
+            </p:nvPicPr>
+            <p:blipFill>
+              <a:blip r:embed="rId2">
+                <a:extLst>
+                  <a:ext uri="{96DAC541-7B7A-43D3-8B79-37D633B846F1}">
+                    <asvg:svgBlip xmlns:asvg="http://schemas.microsoft.com/office/drawing/2016/SVG/main" r:embed="rId3"/>
+                  </a:ext>
+                </a:extLst>
+              </a:blip>
+              <a:stretch>
+                <a:fillRect/>
+              </a:stretch>
+            </p:blipFill>
+            <p:spPr>
+              <a:xfrm>
+                <a:off x="3614425" y="496257"/>
+                <a:ext cx="5486400" cy="5486400"/>
+              </a:xfrm>
+              <a:prstGeom prst="rect">
+                <a:avLst/>
+              </a:prstGeom>
+              <a:effectLst/>
+            </p:spPr>
+          </p:pic>
+        </p:grpSp>
+        <p:grpSp>
+          <p:nvGrpSpPr>
+            <p:cNvPr id="5" name="Group 4">
+              <a:extLst>
+                <a:ext uri="{FF2B5EF4-FFF2-40B4-BE49-F238E27FC236}">
+                  <a16:creationId xmlns:a16="http://schemas.microsoft.com/office/drawing/2014/main" id="{D6D77CF7-87F6-BB32-06EF-AB8C45BB0DE8}"/>
+                </a:ext>
+              </a:extLst>
+            </p:cNvPr>
+            <p:cNvGrpSpPr/>
+            <p:nvPr/>
+          </p:nvGrpSpPr>
+          <p:grpSpPr>
+            <a:xfrm>
+              <a:off x="2795851" y="2514598"/>
+              <a:ext cx="1828800" cy="1828800"/>
+              <a:chOff x="3385825" y="267657"/>
+              <a:chExt cx="5943600" cy="5943600"/>
+            </a:xfrm>
+          </p:grpSpPr>
+          <p:sp>
+            <p:nvSpPr>
+              <p:cNvPr id="6" name="Rectangle: Rounded Corners 5">
+                <a:extLst>
+                  <a:ext uri="{FF2B5EF4-FFF2-40B4-BE49-F238E27FC236}">
+                    <a16:creationId xmlns:a16="http://schemas.microsoft.com/office/drawing/2014/main" id="{6A2B6F49-2B6A-AD6A-C4B4-5C783BBA1894}"/>
+                  </a:ext>
+                </a:extLst>
+              </p:cNvPr>
+              <p:cNvSpPr/>
+              <p:nvPr/>
+            </p:nvSpPr>
+            <p:spPr>
+              <a:xfrm>
+                <a:off x="3385825" y="267657"/>
+                <a:ext cx="5943600" cy="5943600"/>
+              </a:xfrm>
+              <a:prstGeom prst="roundRect">
+                <a:avLst/>
+              </a:prstGeom>
+              <a:solidFill>
+                <a:srgbClr val="FFB207"/>
+              </a:solidFill>
+              <a:ln>
+                <a:noFill/>
+              </a:ln>
+            </p:spPr>
+            <p:style>
+              <a:lnRef idx="2">
+                <a:schemeClr val="accent1">
+                  <a:shade val="15000"/>
+                </a:schemeClr>
+              </a:lnRef>
+              <a:fillRef idx="1">
+                <a:schemeClr val="accent1"/>
+              </a:fillRef>
+              <a:effectRef idx="0">
+                <a:schemeClr val="accent1"/>
+              </a:effectRef>
+              <a:fontRef idx="minor">
+                <a:schemeClr val="lt1"/>
+              </a:fontRef>
+            </p:style>
+            <p:txBody>
+              <a:bodyPr rtlCol="0" anchor="ctr"/>
+              <a:lstStyle/>
+              <a:p>
+                <a:pPr algn="ctr"/>
+                <a:endParaRPr lang="en-US" dirty="0"/>
+              </a:p>
+            </p:txBody>
+          </p:sp>
+          <p:pic>
+            <p:nvPicPr>
+              <p:cNvPr id="7" name="Graphic 6" descr="Duck with solid fill">
+                <a:extLst>
+                  <a:ext uri="{FF2B5EF4-FFF2-40B4-BE49-F238E27FC236}">
+                    <a16:creationId xmlns:a16="http://schemas.microsoft.com/office/drawing/2014/main" id="{B4F1E42D-1EF6-0673-688D-54B3EE70AF60}"/>
+                  </a:ext>
+                </a:extLst>
+              </p:cNvPr>
+              <p:cNvPicPr>
+                <a:picLocks noChangeAspect="1"/>
+              </p:cNvPicPr>
+              <p:nvPr/>
+            </p:nvPicPr>
+            <p:blipFill>
+              <a:blip r:embed="rId4">
+                <a:extLst>
+                  <a:ext uri="{96DAC541-7B7A-43D3-8B79-37D633B846F1}">
+                    <asvg:svgBlip xmlns:asvg="http://schemas.microsoft.com/office/drawing/2016/SVG/main" r:embed="rId5"/>
+                  </a:ext>
+                </a:extLst>
+              </a:blip>
+              <a:stretch>
+                <a:fillRect/>
+              </a:stretch>
+            </p:blipFill>
+            <p:spPr>
+              <a:xfrm>
+                <a:off x="3614425" y="496257"/>
+                <a:ext cx="5486400" cy="5486400"/>
+              </a:xfrm>
+              <a:prstGeom prst="rect">
+                <a:avLst/>
+              </a:prstGeom>
+              <a:effectLst/>
+            </p:spPr>
+          </p:pic>
+        </p:grpSp>
+        <p:grpSp>
+          <p:nvGrpSpPr>
+            <p:cNvPr id="8" name="Group 7">
+              <a:extLst>
+                <a:ext uri="{FF2B5EF4-FFF2-40B4-BE49-F238E27FC236}">
+                  <a16:creationId xmlns:a16="http://schemas.microsoft.com/office/drawing/2014/main" id="{360EA0B4-6C24-5EF3-0473-B826915B24E8}"/>
+                </a:ext>
+              </a:extLst>
+            </p:cNvPr>
+            <p:cNvGrpSpPr/>
+            <p:nvPr/>
+          </p:nvGrpSpPr>
+          <p:grpSpPr>
+            <a:xfrm>
+              <a:off x="4973464" y="2514598"/>
+              <a:ext cx="1828800" cy="1828800"/>
+              <a:chOff x="3385825" y="267657"/>
+              <a:chExt cx="5943600" cy="5943600"/>
+            </a:xfrm>
+          </p:grpSpPr>
+          <p:sp>
+            <p:nvSpPr>
+              <p:cNvPr id="9" name="Rectangle: Rounded Corners 8">
+                <a:extLst>
+                  <a:ext uri="{FF2B5EF4-FFF2-40B4-BE49-F238E27FC236}">
+                    <a16:creationId xmlns:a16="http://schemas.microsoft.com/office/drawing/2014/main" id="{F5B2BB39-0566-D830-E31C-182903837DFD}"/>
+                  </a:ext>
+                </a:extLst>
+              </p:cNvPr>
+              <p:cNvSpPr/>
+              <p:nvPr/>
+            </p:nvSpPr>
+            <p:spPr>
+              <a:xfrm>
+                <a:off x="3385825" y="267657"/>
+                <a:ext cx="5943600" cy="5943600"/>
+              </a:xfrm>
+              <a:prstGeom prst="roundRect">
+                <a:avLst/>
+              </a:prstGeom>
+              <a:solidFill>
+                <a:srgbClr val="FFB207"/>
+              </a:solidFill>
+              <a:ln>
+                <a:noFill/>
+              </a:ln>
+            </p:spPr>
+            <p:style>
+              <a:lnRef idx="2">
+                <a:schemeClr val="accent1">
+                  <a:shade val="15000"/>
+                </a:schemeClr>
+              </a:lnRef>
+              <a:fillRef idx="1">
+                <a:schemeClr val="accent1"/>
+              </a:fillRef>
+              <a:effectRef idx="0">
+                <a:schemeClr val="accent1"/>
+              </a:effectRef>
+              <a:fontRef idx="minor">
+                <a:schemeClr val="lt1"/>
+              </a:fontRef>
+            </p:style>
+            <p:txBody>
+              <a:bodyPr rtlCol="0" anchor="ctr"/>
+              <a:lstStyle/>
+              <a:p>
+                <a:pPr algn="ctr"/>
+                <a:endParaRPr lang="en-US" dirty="0"/>
+              </a:p>
+            </p:txBody>
+          </p:sp>
+          <p:pic>
+            <p:nvPicPr>
+              <p:cNvPr id="10" name="Graphic 9" descr="Elephant with solid fill">
+                <a:extLst>
+                  <a:ext uri="{FF2B5EF4-FFF2-40B4-BE49-F238E27FC236}">
+                    <a16:creationId xmlns:a16="http://schemas.microsoft.com/office/drawing/2014/main" id="{4938618C-6738-FD56-A54A-C341174020C6}"/>
+                  </a:ext>
+                </a:extLst>
+              </p:cNvPr>
+              <p:cNvPicPr>
+                <a:picLocks noChangeAspect="1"/>
+              </p:cNvPicPr>
+              <p:nvPr/>
+            </p:nvPicPr>
+            <p:blipFill>
+              <a:blip r:embed="rId6">
+                <a:extLst>
+                  <a:ext uri="{96DAC541-7B7A-43D3-8B79-37D633B846F1}">
+                    <asvg:svgBlip xmlns:asvg="http://schemas.microsoft.com/office/drawing/2016/SVG/main" r:embed="rId7"/>
+                  </a:ext>
+                </a:extLst>
+              </a:blip>
+              <a:stretch>
+                <a:fillRect/>
+              </a:stretch>
+            </p:blipFill>
+            <p:spPr>
+              <a:xfrm>
+                <a:off x="3614425" y="496257"/>
+                <a:ext cx="5486400" cy="5486400"/>
+              </a:xfrm>
+              <a:prstGeom prst="rect">
+                <a:avLst/>
+              </a:prstGeom>
+            </p:spPr>
+          </p:pic>
+        </p:grpSp>
+        <p:grpSp>
+          <p:nvGrpSpPr>
+            <p:cNvPr id="11" name="Group 10">
+              <a:extLst>
+                <a:ext uri="{FF2B5EF4-FFF2-40B4-BE49-F238E27FC236}">
+                  <a16:creationId xmlns:a16="http://schemas.microsoft.com/office/drawing/2014/main" id="{03EB0E4A-42E7-BB19-5DF2-52989FC3FCAA}"/>
+                </a:ext>
+              </a:extLst>
+            </p:cNvPr>
+            <p:cNvGrpSpPr/>
+            <p:nvPr/>
+          </p:nvGrpSpPr>
+          <p:grpSpPr>
+            <a:xfrm>
+              <a:off x="7151077" y="2514598"/>
+              <a:ext cx="1828800" cy="1828800"/>
+              <a:chOff x="3385825" y="267657"/>
+              <a:chExt cx="5943600" cy="5943600"/>
+            </a:xfrm>
+          </p:grpSpPr>
+          <p:sp>
+            <p:nvSpPr>
+              <p:cNvPr id="12" name="Rectangle: Rounded Corners 11">
+                <a:extLst>
+                  <a:ext uri="{FF2B5EF4-FFF2-40B4-BE49-F238E27FC236}">
+                    <a16:creationId xmlns:a16="http://schemas.microsoft.com/office/drawing/2014/main" id="{CED3CF60-DE21-E40F-9505-21367D1F4727}"/>
+                  </a:ext>
+                </a:extLst>
+              </p:cNvPr>
+              <p:cNvSpPr/>
+              <p:nvPr/>
+            </p:nvSpPr>
+            <p:spPr>
+              <a:xfrm>
+                <a:off x="3385825" y="267657"/>
+                <a:ext cx="5943600" cy="5943600"/>
+              </a:xfrm>
+              <a:prstGeom prst="roundRect">
+                <a:avLst/>
+              </a:prstGeom>
+              <a:solidFill>
+                <a:srgbClr val="FFB207"/>
+              </a:solidFill>
+              <a:ln>
+                <a:noFill/>
+              </a:ln>
+            </p:spPr>
+            <p:style>
+              <a:lnRef idx="2">
+                <a:schemeClr val="accent1">
+                  <a:shade val="15000"/>
+                </a:schemeClr>
+              </a:lnRef>
+              <a:fillRef idx="1">
+                <a:schemeClr val="accent1"/>
+              </a:fillRef>
+              <a:effectRef idx="0">
+                <a:schemeClr val="accent1"/>
+              </a:effectRef>
+              <a:fontRef idx="minor">
+                <a:schemeClr val="lt1"/>
+              </a:fontRef>
+            </p:style>
+            <p:txBody>
+              <a:bodyPr rtlCol="0" anchor="ctr"/>
+              <a:lstStyle/>
+              <a:p>
+                <a:pPr algn="ctr"/>
+                <a:endParaRPr lang="en-US" dirty="0"/>
+              </a:p>
+            </p:txBody>
+          </p:sp>
+          <p:pic>
+            <p:nvPicPr>
+              <p:cNvPr id="13" name="Graphic 12" descr="Hummingbird with solid fill">
+                <a:extLst>
+                  <a:ext uri="{FF2B5EF4-FFF2-40B4-BE49-F238E27FC236}">
+                    <a16:creationId xmlns:a16="http://schemas.microsoft.com/office/drawing/2014/main" id="{21410877-CA20-5E7C-A1F2-26B351DBA045}"/>
+                  </a:ext>
+                </a:extLst>
+              </p:cNvPr>
+              <p:cNvPicPr>
+                <a:picLocks noChangeAspect="1"/>
+              </p:cNvPicPr>
+              <p:nvPr/>
+            </p:nvPicPr>
+            <p:blipFill>
+              <a:blip r:embed="rId8">
+                <a:extLst>
+                  <a:ext uri="{96DAC541-7B7A-43D3-8B79-37D633B846F1}">
+                    <asvg:svgBlip xmlns:asvg="http://schemas.microsoft.com/office/drawing/2016/SVG/main" r:embed="rId9"/>
+                  </a:ext>
+                </a:extLst>
+              </a:blip>
+              <a:stretch>
+                <a:fillRect/>
+              </a:stretch>
+            </p:blipFill>
+            <p:spPr>
+              <a:xfrm>
+                <a:off x="3614425" y="496257"/>
+                <a:ext cx="5486400" cy="5486400"/>
+              </a:xfrm>
+              <a:prstGeom prst="rect">
+                <a:avLst/>
+              </a:prstGeom>
+            </p:spPr>
+          </p:pic>
+        </p:grpSp>
+        <p:grpSp>
+          <p:nvGrpSpPr>
+            <p:cNvPr id="14" name="Group 13">
+              <a:extLst>
+                <a:ext uri="{FF2B5EF4-FFF2-40B4-BE49-F238E27FC236}">
+                  <a16:creationId xmlns:a16="http://schemas.microsoft.com/office/drawing/2014/main" id="{6DD726BC-416F-5479-B434-3D0E7BCEA328}"/>
+                </a:ext>
+              </a:extLst>
+            </p:cNvPr>
+            <p:cNvGrpSpPr/>
+            <p:nvPr/>
+          </p:nvGrpSpPr>
+          <p:grpSpPr>
+            <a:xfrm>
+              <a:off x="9331775" y="2514597"/>
+              <a:ext cx="1828800" cy="1828800"/>
+              <a:chOff x="3385825" y="267657"/>
+              <a:chExt cx="5943600" cy="5943600"/>
+            </a:xfrm>
+          </p:grpSpPr>
+          <p:sp>
+            <p:nvSpPr>
+              <p:cNvPr id="15" name="Rectangle: Rounded Corners 14">
+                <a:extLst>
+                  <a:ext uri="{FF2B5EF4-FFF2-40B4-BE49-F238E27FC236}">
+                    <a16:creationId xmlns:a16="http://schemas.microsoft.com/office/drawing/2014/main" id="{224C2B51-201F-18F8-1725-646A5D42A53D}"/>
+                  </a:ext>
+                </a:extLst>
+              </p:cNvPr>
+              <p:cNvSpPr/>
+              <p:nvPr/>
+            </p:nvSpPr>
+            <p:spPr>
+              <a:xfrm>
+                <a:off x="3385825" y="267657"/>
+                <a:ext cx="5943600" cy="5943600"/>
+              </a:xfrm>
+              <a:prstGeom prst="roundRect">
+                <a:avLst/>
+              </a:prstGeom>
+              <a:solidFill>
+                <a:srgbClr val="FFB207"/>
+              </a:solidFill>
+              <a:ln>
+                <a:noFill/>
+              </a:ln>
+            </p:spPr>
+            <p:style>
+              <a:lnRef idx="2">
+                <a:schemeClr val="accent1">
+                  <a:shade val="15000"/>
+                </a:schemeClr>
+              </a:lnRef>
+              <a:fillRef idx="1">
+                <a:schemeClr val="accent1"/>
+              </a:fillRef>
+              <a:effectRef idx="0">
+                <a:schemeClr val="accent1"/>
+              </a:effectRef>
+              <a:fontRef idx="minor">
+                <a:schemeClr val="lt1"/>
+              </a:fontRef>
+            </p:style>
+            <p:txBody>
+              <a:bodyPr rtlCol="0" anchor="ctr"/>
+              <a:lstStyle/>
+              <a:p>
+                <a:pPr algn="ctr"/>
+                <a:endParaRPr lang="en-US" dirty="0"/>
+              </a:p>
+            </p:txBody>
+          </p:sp>
+          <p:pic>
+            <p:nvPicPr>
+              <p:cNvPr id="16" name="Graphic 15" descr="Turtle with solid fill">
+                <a:extLst>
+                  <a:ext uri="{FF2B5EF4-FFF2-40B4-BE49-F238E27FC236}">
+                    <a16:creationId xmlns:a16="http://schemas.microsoft.com/office/drawing/2014/main" id="{0F79D24B-E226-D533-4206-E5E50D105FBA}"/>
+                  </a:ext>
+                </a:extLst>
+              </p:cNvPr>
+              <p:cNvPicPr>
+                <a:picLocks noChangeAspect="1"/>
+              </p:cNvPicPr>
+              <p:nvPr/>
+            </p:nvPicPr>
+            <p:blipFill>
+              <a:blip r:embed="rId10">
+                <a:extLst>
+                  <a:ext uri="{96DAC541-7B7A-43D3-8B79-37D633B846F1}">
+                    <asvg:svgBlip xmlns:asvg="http://schemas.microsoft.com/office/drawing/2016/SVG/main" r:embed="rId11"/>
+                  </a:ext>
+                </a:extLst>
+              </a:blip>
+              <a:stretch>
+                <a:fillRect/>
+              </a:stretch>
+            </p:blipFill>
+            <p:spPr>
+              <a:xfrm>
+                <a:off x="3614425" y="496257"/>
+                <a:ext cx="5486400" cy="5486400"/>
+              </a:xfrm>
+              <a:prstGeom prst="rect">
+                <a:avLst/>
+              </a:prstGeom>
+            </p:spPr>
+          </p:pic>
+        </p:grpSp>
+      </p:grpSp>
+    </p:spTree>
+    <p:extLst>
+      <p:ext uri="{BB962C8B-B14F-4D97-AF65-F5344CB8AC3E}">
+        <p14:creationId xmlns:p14="http://schemas.microsoft.com/office/powerpoint/2010/main" val="2601054969"/>
+      </p:ext>
+    </p:extLst>
+  </p:cSld>
+  <p:clrMapOvr>
+    <a:masterClrMapping/>
+  </p:clrMapOvr>
+</p:sld>
+</file>
+
+<file path=ppt/slides/slide16.xml><?xml version="1.0" encoding="utf-8"?>
+<p:sld xmlns:a="http://schemas.openxmlformats.org/drawingml/2006/main" xmlns:r="http://schemas.openxmlformats.org/officeDocument/2006/relationships" xmlns:p="http://schemas.openxmlformats.org/presentationml/2006/main">
+  <p:cSld>
+    <p:spTree>
+      <p:nvGrpSpPr>
+        <p:cNvPr id="1" name=""/>
+        <p:cNvGrpSpPr/>
+        <p:nvPr/>
+      </p:nvGrpSpPr>
+      <p:grpSpPr>
+        <a:xfrm>
+          <a:off x="0" y="0"/>
+          <a:ext cx="0" cy="0"/>
+          <a:chOff x="0" y="0"/>
+          <a:chExt cx="0" cy="0"/>
+        </a:xfrm>
+      </p:grpSpPr>
+      <p:grpSp>
+        <p:nvGrpSpPr>
+          <p:cNvPr id="7" name="Group 6">
+            <a:extLst>
+              <a:ext uri="{FF2B5EF4-FFF2-40B4-BE49-F238E27FC236}">
+                <a16:creationId xmlns:a16="http://schemas.microsoft.com/office/drawing/2014/main" id="{0099BB70-8224-74D1-9270-8ADD1E30F6D8}"/>
+              </a:ext>
+            </a:extLst>
+          </p:cNvPr>
+          <p:cNvGrpSpPr/>
+          <p:nvPr/>
+        </p:nvGrpSpPr>
+        <p:grpSpPr>
+          <a:xfrm>
+            <a:off x="1969007" y="327947"/>
+            <a:ext cx="5943600" cy="5943600"/>
+            <a:chOff x="3385825" y="267657"/>
+            <a:chExt cx="5943600" cy="5943600"/>
+          </a:xfrm>
+        </p:grpSpPr>
+        <p:sp>
+          <p:nvSpPr>
+            <p:cNvPr id="2" name="Rectangle: Rounded Corners 1">
+              <a:extLst>
+                <a:ext uri="{FF2B5EF4-FFF2-40B4-BE49-F238E27FC236}">
+                  <a16:creationId xmlns:a16="http://schemas.microsoft.com/office/drawing/2014/main" id="{60A55EDD-17A6-8A8D-BF0A-A6C4D159F56F}"/>
+                </a:ext>
+              </a:extLst>
+            </p:cNvPr>
+            <p:cNvSpPr/>
+            <p:nvPr/>
+          </p:nvSpPr>
+          <p:spPr>
+            <a:xfrm>
+              <a:off x="3385825" y="267657"/>
+              <a:ext cx="5943600" cy="5943600"/>
+            </a:xfrm>
+            <a:prstGeom prst="roundRect">
+              <a:avLst/>
+            </a:prstGeom>
+            <a:solidFill>
+              <a:srgbClr val="FFB207"/>
+            </a:solidFill>
+            <a:ln>
+              <a:noFill/>
+            </a:ln>
+          </p:spPr>
+          <p:style>
+            <a:lnRef idx="2">
+              <a:schemeClr val="accent1">
+                <a:shade val="15000"/>
+              </a:schemeClr>
+            </a:lnRef>
+            <a:fillRef idx="1">
+              <a:schemeClr val="accent1"/>
+            </a:fillRef>
+            <a:effectRef idx="0">
+              <a:schemeClr val="accent1"/>
+            </a:effectRef>
+            <a:fontRef idx="minor">
+              <a:schemeClr val="lt1"/>
+            </a:fontRef>
+          </p:style>
+          <p:txBody>
+            <a:bodyPr rtlCol="0" anchor="ctr"/>
+            <a:lstStyle/>
+            <a:p>
+              <a:pPr algn="ctr"/>
+              <a:endParaRPr lang="en-US" dirty="0"/>
+            </a:p>
+          </p:txBody>
+        </p:sp>
+        <p:pic>
+          <p:nvPicPr>
+            <p:cNvPr id="4" name="Graphic 3" descr="Fish with solid fill">
+              <a:extLst>
+                <a:ext uri="{FF2B5EF4-FFF2-40B4-BE49-F238E27FC236}">
+                  <a16:creationId xmlns:a16="http://schemas.microsoft.com/office/drawing/2014/main" id="{776152F5-52AD-9767-0482-B408FBD1AABE}"/>
+                </a:ext>
+              </a:extLst>
+            </p:cNvPr>
+            <p:cNvPicPr>
+              <a:picLocks noChangeAspect="1"/>
+            </p:cNvPicPr>
+            <p:nvPr/>
+          </p:nvPicPr>
+          <p:blipFill>
+            <a:blip r:embed="rId2">
+              <a:extLst>
+                <a:ext uri="{96DAC541-7B7A-43D3-8B79-37D633B846F1}">
+                  <asvg:svgBlip xmlns:asvg="http://schemas.microsoft.com/office/drawing/2016/SVG/main" r:embed="rId3"/>
+                </a:ext>
+              </a:extLst>
+            </a:blip>
+            <a:stretch>
+              <a:fillRect/>
+            </a:stretch>
+          </p:blipFill>
+          <p:spPr>
+            <a:xfrm>
+              <a:off x="3614425" y="496257"/>
+              <a:ext cx="5486400" cy="5486400"/>
+            </a:xfrm>
+            <a:prstGeom prst="rect">
+              <a:avLst/>
+            </a:prstGeom>
+            <a:effectLst/>
+          </p:spPr>
+        </p:pic>
+      </p:grpSp>
+    </p:spTree>
+    <p:extLst>
+      <p:ext uri="{BB962C8B-B14F-4D97-AF65-F5344CB8AC3E}">
+        <p14:creationId xmlns:p14="http://schemas.microsoft.com/office/powerpoint/2010/main" val="158934958"/>
+      </p:ext>
+    </p:extLst>
+  </p:cSld>
+  <p:clrMapOvr>
+    <a:masterClrMapping/>
+  </p:clrMapOvr>
+</p:sld>
+</file>
+
+<file path=ppt/slides/slide17.xml><?xml version="1.0" encoding="utf-8"?>
+<p:sld xmlns:a="http://schemas.openxmlformats.org/drawingml/2006/main" xmlns:r="http://schemas.openxmlformats.org/officeDocument/2006/relationships" xmlns:p="http://schemas.openxmlformats.org/presentationml/2006/main">
+  <p:cSld>
+    <p:spTree>
+      <p:nvGrpSpPr>
+        <p:cNvPr id="1" name=""/>
+        <p:cNvGrpSpPr/>
+        <p:nvPr/>
+      </p:nvGrpSpPr>
+      <p:grpSpPr>
+        <a:xfrm>
+          <a:off x="0" y="0"/>
+          <a:ext cx="0" cy="0"/>
+          <a:chOff x="0" y="0"/>
+          <a:chExt cx="0" cy="0"/>
+        </a:xfrm>
+      </p:grpSpPr>
+      <p:grpSp>
+        <p:nvGrpSpPr>
+          <p:cNvPr id="3" name="Group 2">
+            <a:extLst>
+              <a:ext uri="{FF2B5EF4-FFF2-40B4-BE49-F238E27FC236}">
+                <a16:creationId xmlns:a16="http://schemas.microsoft.com/office/drawing/2014/main" id="{B0EAB49A-36EF-2FB3-2BA2-046C4D4BD2EF}"/>
+              </a:ext>
+            </a:extLst>
+          </p:cNvPr>
+          <p:cNvGrpSpPr/>
+          <p:nvPr/>
+        </p:nvGrpSpPr>
+        <p:grpSpPr>
+          <a:xfrm>
+            <a:off x="2280506" y="337995"/>
+            <a:ext cx="5943600" cy="5943600"/>
+            <a:chOff x="3385825" y="267657"/>
+            <a:chExt cx="5943600" cy="5943600"/>
+          </a:xfrm>
+        </p:grpSpPr>
+        <p:sp>
+          <p:nvSpPr>
+            <p:cNvPr id="2" name="Rectangle: Rounded Corners 1">
+              <a:extLst>
+                <a:ext uri="{FF2B5EF4-FFF2-40B4-BE49-F238E27FC236}">
+                  <a16:creationId xmlns:a16="http://schemas.microsoft.com/office/drawing/2014/main" id="{60A55EDD-17A6-8A8D-BF0A-A6C4D159F56F}"/>
+                </a:ext>
+              </a:extLst>
+            </p:cNvPr>
+            <p:cNvSpPr/>
+            <p:nvPr/>
+          </p:nvSpPr>
+          <p:spPr>
+            <a:xfrm>
+              <a:off x="3385825" y="267657"/>
+              <a:ext cx="5943600" cy="5943600"/>
+            </a:xfrm>
+            <a:prstGeom prst="roundRect">
+              <a:avLst/>
+            </a:prstGeom>
+            <a:solidFill>
+              <a:srgbClr val="FFB207"/>
+            </a:solidFill>
+            <a:ln>
+              <a:noFill/>
+            </a:ln>
+          </p:spPr>
+          <p:style>
+            <a:lnRef idx="2">
+              <a:schemeClr val="accent1">
+                <a:shade val="15000"/>
+              </a:schemeClr>
+            </a:lnRef>
+            <a:fillRef idx="1">
+              <a:schemeClr val="accent1"/>
+            </a:fillRef>
+            <a:effectRef idx="0">
+              <a:schemeClr val="accent1"/>
+            </a:effectRef>
+            <a:fontRef idx="minor">
+              <a:schemeClr val="lt1"/>
+            </a:fontRef>
+          </p:style>
+          <p:txBody>
+            <a:bodyPr rtlCol="0" anchor="ctr"/>
+            <a:lstStyle/>
+            <a:p>
+              <a:pPr algn="ctr"/>
+              <a:endParaRPr lang="en-US" dirty="0"/>
+            </a:p>
+          </p:txBody>
+        </p:sp>
+        <p:pic>
+          <p:nvPicPr>
+            <p:cNvPr id="6" name="Graphic 5" descr="Duck with solid fill">
+              <a:extLst>
+                <a:ext uri="{FF2B5EF4-FFF2-40B4-BE49-F238E27FC236}">
+                  <a16:creationId xmlns:a16="http://schemas.microsoft.com/office/drawing/2014/main" id="{82387986-5B99-C947-7C06-2E6A7A397B9F}"/>
+                </a:ext>
+              </a:extLst>
+            </p:cNvPr>
+            <p:cNvPicPr>
+              <a:picLocks noChangeAspect="1"/>
+            </p:cNvPicPr>
+            <p:nvPr/>
+          </p:nvPicPr>
+          <p:blipFill>
+            <a:blip r:embed="rId3">
+              <a:extLst>
+                <a:ext uri="{96DAC541-7B7A-43D3-8B79-37D633B846F1}">
+                  <asvg:svgBlip xmlns:asvg="http://schemas.microsoft.com/office/drawing/2016/SVG/main" r:embed="rId4"/>
+                </a:ext>
+              </a:extLst>
+            </a:blip>
+            <a:stretch>
+              <a:fillRect/>
+            </a:stretch>
+          </p:blipFill>
+          <p:spPr>
+            <a:xfrm>
+              <a:off x="3614425" y="496257"/>
+              <a:ext cx="5486400" cy="5486400"/>
+            </a:xfrm>
+            <a:prstGeom prst="rect">
+              <a:avLst/>
+            </a:prstGeom>
+            <a:effectLst/>
+          </p:spPr>
+        </p:pic>
+      </p:grpSp>
+    </p:spTree>
+    <p:extLst>
+      <p:ext uri="{BB962C8B-B14F-4D97-AF65-F5344CB8AC3E}">
+        <p14:creationId xmlns:p14="http://schemas.microsoft.com/office/powerpoint/2010/main" val="2931800283"/>
+      </p:ext>
+    </p:extLst>
+  </p:cSld>
+  <p:clrMapOvr>
+    <a:masterClrMapping/>
+  </p:clrMapOvr>
+</p:sld>
+</file>
+
+<file path=ppt/slides/slide18.xml><?xml version="1.0" encoding="utf-8"?>
+<p:sld xmlns:a="http://schemas.openxmlformats.org/drawingml/2006/main" xmlns:r="http://schemas.openxmlformats.org/officeDocument/2006/relationships" xmlns:p="http://schemas.openxmlformats.org/presentationml/2006/main">
+  <p:cSld>
+    <p:spTree>
+      <p:nvGrpSpPr>
+        <p:cNvPr id="1" name=""/>
+        <p:cNvGrpSpPr/>
+        <p:nvPr/>
+      </p:nvGrpSpPr>
+      <p:grpSpPr>
+        <a:xfrm>
+          <a:off x="0" y="0"/>
+          <a:ext cx="0" cy="0"/>
+          <a:chOff x="0" y="0"/>
+          <a:chExt cx="0" cy="0"/>
+        </a:xfrm>
+      </p:grpSpPr>
+      <p:grpSp>
+        <p:nvGrpSpPr>
+          <p:cNvPr id="11" name="Group 10">
+            <a:extLst>
+              <a:ext uri="{FF2B5EF4-FFF2-40B4-BE49-F238E27FC236}">
+                <a16:creationId xmlns:a16="http://schemas.microsoft.com/office/drawing/2014/main" id="{AF6A4EFA-F66E-145E-9CC3-E8D7765C3FF4}"/>
+              </a:ext>
+            </a:extLst>
+          </p:cNvPr>
+          <p:cNvGrpSpPr/>
+          <p:nvPr/>
+        </p:nvGrpSpPr>
+        <p:grpSpPr>
+          <a:xfrm>
+            <a:off x="3385825" y="267657"/>
+            <a:ext cx="5943600" cy="5943600"/>
+            <a:chOff x="3385825" y="267657"/>
+            <a:chExt cx="5943600" cy="5943600"/>
+          </a:xfrm>
+        </p:grpSpPr>
+        <p:sp>
+          <p:nvSpPr>
+            <p:cNvPr id="2" name="Rectangle: Rounded Corners 1">
+              <a:extLst>
+                <a:ext uri="{FF2B5EF4-FFF2-40B4-BE49-F238E27FC236}">
+                  <a16:creationId xmlns:a16="http://schemas.microsoft.com/office/drawing/2014/main" id="{709902AA-4369-593F-7A01-CCA159F9A5B7}"/>
+                </a:ext>
+              </a:extLst>
+            </p:cNvPr>
+            <p:cNvSpPr/>
+            <p:nvPr/>
+          </p:nvSpPr>
+          <p:spPr>
+            <a:xfrm>
+              <a:off x="3385825" y="267657"/>
+              <a:ext cx="5943600" cy="5943600"/>
+            </a:xfrm>
+            <a:prstGeom prst="roundRect">
+              <a:avLst/>
+            </a:prstGeom>
+            <a:solidFill>
+              <a:srgbClr val="FFB207"/>
+            </a:solidFill>
+            <a:ln>
+              <a:noFill/>
+            </a:ln>
+          </p:spPr>
+          <p:style>
+            <a:lnRef idx="2">
+              <a:schemeClr val="accent1">
+                <a:shade val="15000"/>
+              </a:schemeClr>
+            </a:lnRef>
+            <a:fillRef idx="1">
+              <a:schemeClr val="accent1"/>
+            </a:fillRef>
+            <a:effectRef idx="0">
+              <a:schemeClr val="accent1"/>
+            </a:effectRef>
+            <a:fontRef idx="minor">
+              <a:schemeClr val="lt1"/>
+            </a:fontRef>
+          </p:style>
+          <p:txBody>
+            <a:bodyPr rtlCol="0" anchor="ctr"/>
+            <a:lstStyle/>
+            <a:p>
+              <a:pPr algn="ctr"/>
+              <a:endParaRPr lang="en-US" dirty="0"/>
+            </a:p>
+          </p:txBody>
+        </p:sp>
+        <p:pic>
+          <p:nvPicPr>
+            <p:cNvPr id="6" name="Graphic 5" descr="Elephant with solid fill">
+              <a:extLst>
+                <a:ext uri="{FF2B5EF4-FFF2-40B4-BE49-F238E27FC236}">
+                  <a16:creationId xmlns:a16="http://schemas.microsoft.com/office/drawing/2014/main" id="{8DB8275E-0763-6ECC-4EE8-6D1646629947}"/>
+                </a:ext>
+              </a:extLst>
+            </p:cNvPr>
+            <p:cNvPicPr>
+              <a:picLocks noChangeAspect="1"/>
+            </p:cNvPicPr>
+            <p:nvPr/>
+          </p:nvPicPr>
+          <p:blipFill>
+            <a:blip r:embed="rId2">
+              <a:extLst>
+                <a:ext uri="{96DAC541-7B7A-43D3-8B79-37D633B846F1}">
+                  <asvg:svgBlip xmlns:asvg="http://schemas.microsoft.com/office/drawing/2016/SVG/main" r:embed="rId3"/>
+                </a:ext>
+              </a:extLst>
+            </a:blip>
+            <a:stretch>
+              <a:fillRect/>
+            </a:stretch>
+          </p:blipFill>
+          <p:spPr>
+            <a:xfrm>
+              <a:off x="3614425" y="496257"/>
+              <a:ext cx="5486400" cy="5486400"/>
+            </a:xfrm>
+            <a:prstGeom prst="rect">
+              <a:avLst/>
+            </a:prstGeom>
+          </p:spPr>
+        </p:pic>
+      </p:grpSp>
+    </p:spTree>
+    <p:extLst>
+      <p:ext uri="{BB962C8B-B14F-4D97-AF65-F5344CB8AC3E}">
+        <p14:creationId xmlns:p14="http://schemas.microsoft.com/office/powerpoint/2010/main" val="1884107718"/>
+      </p:ext>
+    </p:extLst>
+  </p:cSld>
+  <p:clrMapOvr>
+    <a:masterClrMapping/>
+  </p:clrMapOvr>
+</p:sld>
+</file>
+
+<file path=ppt/slides/slide19.xml><?xml version="1.0" encoding="utf-8"?>
+<p:sld xmlns:a="http://schemas.openxmlformats.org/drawingml/2006/main" xmlns:r="http://schemas.openxmlformats.org/officeDocument/2006/relationships" xmlns:p="http://schemas.openxmlformats.org/presentationml/2006/main">
+  <p:cSld>
+    <p:spTree>
+      <p:nvGrpSpPr>
+        <p:cNvPr id="1" name=""/>
+        <p:cNvGrpSpPr/>
+        <p:nvPr/>
+      </p:nvGrpSpPr>
+      <p:grpSpPr>
+        <a:xfrm>
+          <a:off x="0" y="0"/>
+          <a:ext cx="0" cy="0"/>
+          <a:chOff x="0" y="0"/>
+          <a:chExt cx="0" cy="0"/>
+        </a:xfrm>
+      </p:grpSpPr>
+      <p:grpSp>
+        <p:nvGrpSpPr>
+          <p:cNvPr id="3" name="Group 2">
+            <a:extLst>
+              <a:ext uri="{FF2B5EF4-FFF2-40B4-BE49-F238E27FC236}">
+                <a16:creationId xmlns:a16="http://schemas.microsoft.com/office/drawing/2014/main" id="{BE061B02-F15C-2687-A38F-552AA5697721}"/>
+              </a:ext>
+            </a:extLst>
+          </p:cNvPr>
+          <p:cNvGrpSpPr/>
+          <p:nvPr/>
+        </p:nvGrpSpPr>
+        <p:grpSpPr>
+          <a:xfrm>
+            <a:off x="3385825" y="267657"/>
+            <a:ext cx="5943600" cy="5943600"/>
+            <a:chOff x="3385825" y="267657"/>
+            <a:chExt cx="5943600" cy="5943600"/>
+          </a:xfrm>
+        </p:grpSpPr>
+        <p:sp>
+          <p:nvSpPr>
+            <p:cNvPr id="2" name="Rectangle: Rounded Corners 1">
+              <a:extLst>
+                <a:ext uri="{FF2B5EF4-FFF2-40B4-BE49-F238E27FC236}">
+                  <a16:creationId xmlns:a16="http://schemas.microsoft.com/office/drawing/2014/main" id="{8C1B9E0A-C95B-709F-BF77-349DFA911E8D}"/>
+                </a:ext>
+              </a:extLst>
+            </p:cNvPr>
+            <p:cNvSpPr/>
+            <p:nvPr/>
+          </p:nvSpPr>
+          <p:spPr>
+            <a:xfrm>
+              <a:off x="3385825" y="267657"/>
+              <a:ext cx="5943600" cy="5943600"/>
+            </a:xfrm>
+            <a:prstGeom prst="roundRect">
+              <a:avLst/>
+            </a:prstGeom>
+            <a:solidFill>
+              <a:srgbClr val="FFB207"/>
+            </a:solidFill>
+            <a:ln>
+              <a:noFill/>
+            </a:ln>
+          </p:spPr>
+          <p:style>
+            <a:lnRef idx="2">
+              <a:schemeClr val="accent1">
+                <a:shade val="15000"/>
+              </a:schemeClr>
+            </a:lnRef>
+            <a:fillRef idx="1">
+              <a:schemeClr val="accent1"/>
+            </a:fillRef>
+            <a:effectRef idx="0">
+              <a:schemeClr val="accent1"/>
+            </a:effectRef>
+            <a:fontRef idx="minor">
+              <a:schemeClr val="lt1"/>
+            </a:fontRef>
+          </p:style>
+          <p:txBody>
+            <a:bodyPr rtlCol="0" anchor="ctr"/>
+            <a:lstStyle/>
+            <a:p>
+              <a:pPr algn="ctr"/>
+              <a:endParaRPr lang="en-US" dirty="0"/>
+            </a:p>
+          </p:txBody>
+        </p:sp>
+        <p:pic>
+          <p:nvPicPr>
+            <p:cNvPr id="10" name="Graphic 9" descr="Hummingbird with solid fill">
+              <a:extLst>
+                <a:ext uri="{FF2B5EF4-FFF2-40B4-BE49-F238E27FC236}">
+                  <a16:creationId xmlns:a16="http://schemas.microsoft.com/office/drawing/2014/main" id="{E2F54C48-EC17-D0B2-4AD3-25F463700279}"/>
+                </a:ext>
+              </a:extLst>
+            </p:cNvPr>
+            <p:cNvPicPr>
+              <a:picLocks noChangeAspect="1"/>
+            </p:cNvPicPr>
+            <p:nvPr/>
+          </p:nvPicPr>
+          <p:blipFill>
+            <a:blip r:embed="rId2">
+              <a:extLst>
+                <a:ext uri="{96DAC541-7B7A-43D3-8B79-37D633B846F1}">
+                  <asvg:svgBlip xmlns:asvg="http://schemas.microsoft.com/office/drawing/2016/SVG/main" r:embed="rId3"/>
+                </a:ext>
+              </a:extLst>
+            </a:blip>
+            <a:stretch>
+              <a:fillRect/>
+            </a:stretch>
+          </p:blipFill>
+          <p:spPr>
+            <a:xfrm>
+              <a:off x="3614425" y="496257"/>
+              <a:ext cx="5486400" cy="5486400"/>
+            </a:xfrm>
+            <a:prstGeom prst="rect">
+              <a:avLst/>
+            </a:prstGeom>
+          </p:spPr>
+        </p:pic>
+      </p:grpSp>
+    </p:spTree>
+    <p:extLst>
+      <p:ext uri="{BB962C8B-B14F-4D97-AF65-F5344CB8AC3E}">
+        <p14:creationId xmlns:p14="http://schemas.microsoft.com/office/powerpoint/2010/main" val="1243659717"/>
       </p:ext>
     </p:extLst>
   </p:cSld>
@@ -23267,6 +27364,402 @@
     <p:extLst>
       <p:ext uri="{BB962C8B-B14F-4D97-AF65-F5344CB8AC3E}">
         <p14:creationId xmlns:p14="http://schemas.microsoft.com/office/powerpoint/2010/main" val="851253772"/>
+      </p:ext>
+    </p:extLst>
+  </p:cSld>
+  <p:clrMapOvr>
+    <a:masterClrMapping/>
+  </p:clrMapOvr>
+</p:sld>
+</file>
+
+<file path=ppt/slides/slide20.xml><?xml version="1.0" encoding="utf-8"?>
+<p:sld xmlns:a="http://schemas.openxmlformats.org/drawingml/2006/main" xmlns:r="http://schemas.openxmlformats.org/officeDocument/2006/relationships" xmlns:p="http://schemas.openxmlformats.org/presentationml/2006/main">
+  <p:cSld>
+    <p:spTree>
+      <p:nvGrpSpPr>
+        <p:cNvPr id="1" name=""/>
+        <p:cNvGrpSpPr/>
+        <p:nvPr/>
+      </p:nvGrpSpPr>
+      <p:grpSpPr>
+        <a:xfrm>
+          <a:off x="0" y="0"/>
+          <a:ext cx="0" cy="0"/>
+          <a:chOff x="0" y="0"/>
+          <a:chExt cx="0" cy="0"/>
+        </a:xfrm>
+      </p:grpSpPr>
+      <p:grpSp>
+        <p:nvGrpSpPr>
+          <p:cNvPr id="3" name="Group 2">
+            <a:extLst>
+              <a:ext uri="{FF2B5EF4-FFF2-40B4-BE49-F238E27FC236}">
+                <a16:creationId xmlns:a16="http://schemas.microsoft.com/office/drawing/2014/main" id="{F6B297EF-B7C8-1869-97F5-CCFB3490E1D1}"/>
+              </a:ext>
+            </a:extLst>
+          </p:cNvPr>
+          <p:cNvGrpSpPr/>
+          <p:nvPr/>
+        </p:nvGrpSpPr>
+        <p:grpSpPr>
+          <a:xfrm>
+            <a:off x="3385825" y="267657"/>
+            <a:ext cx="5943600" cy="5943600"/>
+            <a:chOff x="3385825" y="267657"/>
+            <a:chExt cx="5943600" cy="5943600"/>
+          </a:xfrm>
+        </p:grpSpPr>
+        <p:sp>
+          <p:nvSpPr>
+            <p:cNvPr id="2" name="Rectangle: Rounded Corners 1">
+              <a:extLst>
+                <a:ext uri="{FF2B5EF4-FFF2-40B4-BE49-F238E27FC236}">
+                  <a16:creationId xmlns:a16="http://schemas.microsoft.com/office/drawing/2014/main" id="{A15530EC-F7EB-0AB6-D6D2-81F3648543EE}"/>
+                </a:ext>
+              </a:extLst>
+            </p:cNvPr>
+            <p:cNvSpPr/>
+            <p:nvPr/>
+          </p:nvSpPr>
+          <p:spPr>
+            <a:xfrm>
+              <a:off x="3385825" y="267657"/>
+              <a:ext cx="5943600" cy="5943600"/>
+            </a:xfrm>
+            <a:prstGeom prst="roundRect">
+              <a:avLst/>
+            </a:prstGeom>
+            <a:solidFill>
+              <a:srgbClr val="FFB207"/>
+            </a:solidFill>
+            <a:ln>
+              <a:noFill/>
+            </a:ln>
+          </p:spPr>
+          <p:style>
+            <a:lnRef idx="2">
+              <a:schemeClr val="accent1">
+                <a:shade val="15000"/>
+              </a:schemeClr>
+            </a:lnRef>
+            <a:fillRef idx="1">
+              <a:schemeClr val="accent1"/>
+            </a:fillRef>
+            <a:effectRef idx="0">
+              <a:schemeClr val="accent1"/>
+            </a:effectRef>
+            <a:fontRef idx="minor">
+              <a:schemeClr val="lt1"/>
+            </a:fontRef>
+          </p:style>
+          <p:txBody>
+            <a:bodyPr rtlCol="0" anchor="ctr"/>
+            <a:lstStyle/>
+            <a:p>
+              <a:pPr algn="ctr"/>
+              <a:endParaRPr lang="en-US" dirty="0"/>
+            </a:p>
+          </p:txBody>
+        </p:sp>
+        <p:pic>
+          <p:nvPicPr>
+            <p:cNvPr id="8" name="Graphic 7" descr="Giraffe with solid fill">
+              <a:extLst>
+                <a:ext uri="{FF2B5EF4-FFF2-40B4-BE49-F238E27FC236}">
+                  <a16:creationId xmlns:a16="http://schemas.microsoft.com/office/drawing/2014/main" id="{AC7AB32F-89F4-6C40-0375-224A25FB5C03}"/>
+                </a:ext>
+              </a:extLst>
+            </p:cNvPr>
+            <p:cNvPicPr>
+              <a:picLocks noChangeAspect="1"/>
+            </p:cNvPicPr>
+            <p:nvPr/>
+          </p:nvPicPr>
+          <p:blipFill>
+            <a:blip r:embed="rId2">
+              <a:extLst>
+                <a:ext uri="{96DAC541-7B7A-43D3-8B79-37D633B846F1}">
+                  <asvg:svgBlip xmlns:asvg="http://schemas.microsoft.com/office/drawing/2016/SVG/main" r:embed="rId3"/>
+                </a:ext>
+              </a:extLst>
+            </a:blip>
+            <a:stretch>
+              <a:fillRect/>
+            </a:stretch>
+          </p:blipFill>
+          <p:spPr>
+            <a:xfrm>
+              <a:off x="3614425" y="424543"/>
+              <a:ext cx="5486400" cy="5486400"/>
+            </a:xfrm>
+            <a:prstGeom prst="rect">
+              <a:avLst/>
+            </a:prstGeom>
+          </p:spPr>
+        </p:pic>
+      </p:grpSp>
+    </p:spTree>
+    <p:extLst>
+      <p:ext uri="{BB962C8B-B14F-4D97-AF65-F5344CB8AC3E}">
+        <p14:creationId xmlns:p14="http://schemas.microsoft.com/office/powerpoint/2010/main" val="3474154895"/>
+      </p:ext>
+    </p:extLst>
+  </p:cSld>
+  <p:clrMapOvr>
+    <a:masterClrMapping/>
+  </p:clrMapOvr>
+</p:sld>
+</file>
+
+<file path=ppt/slides/slide21.xml><?xml version="1.0" encoding="utf-8"?>
+<p:sld xmlns:a="http://schemas.openxmlformats.org/drawingml/2006/main" xmlns:r="http://schemas.openxmlformats.org/officeDocument/2006/relationships" xmlns:p="http://schemas.openxmlformats.org/presentationml/2006/main">
+  <p:cSld>
+    <p:spTree>
+      <p:nvGrpSpPr>
+        <p:cNvPr id="1" name=""/>
+        <p:cNvGrpSpPr/>
+        <p:nvPr/>
+      </p:nvGrpSpPr>
+      <p:grpSpPr>
+        <a:xfrm>
+          <a:off x="0" y="0"/>
+          <a:ext cx="0" cy="0"/>
+          <a:chOff x="0" y="0"/>
+          <a:chExt cx="0" cy="0"/>
+        </a:xfrm>
+      </p:grpSpPr>
+      <p:grpSp>
+        <p:nvGrpSpPr>
+          <p:cNvPr id="3" name="Group 2">
+            <a:extLst>
+              <a:ext uri="{FF2B5EF4-FFF2-40B4-BE49-F238E27FC236}">
+                <a16:creationId xmlns:a16="http://schemas.microsoft.com/office/drawing/2014/main" id="{B4AF1015-3A3A-84C6-4711-0D5528717944}"/>
+              </a:ext>
+            </a:extLst>
+          </p:cNvPr>
+          <p:cNvGrpSpPr/>
+          <p:nvPr/>
+        </p:nvGrpSpPr>
+        <p:grpSpPr>
+          <a:xfrm>
+            <a:off x="3385825" y="267657"/>
+            <a:ext cx="5943600" cy="5943600"/>
+            <a:chOff x="3385825" y="267657"/>
+            <a:chExt cx="5943600" cy="5943600"/>
+          </a:xfrm>
+        </p:grpSpPr>
+        <p:sp>
+          <p:nvSpPr>
+            <p:cNvPr id="2" name="Rectangle: Rounded Corners 1">
+              <a:extLst>
+                <a:ext uri="{FF2B5EF4-FFF2-40B4-BE49-F238E27FC236}">
+                  <a16:creationId xmlns:a16="http://schemas.microsoft.com/office/drawing/2014/main" id="{1B2EF39F-9431-4EB9-84D8-F2AF4FABF28A}"/>
+                </a:ext>
+              </a:extLst>
+            </p:cNvPr>
+            <p:cNvSpPr/>
+            <p:nvPr/>
+          </p:nvSpPr>
+          <p:spPr>
+            <a:xfrm>
+              <a:off x="3385825" y="267657"/>
+              <a:ext cx="5943600" cy="5943600"/>
+            </a:xfrm>
+            <a:prstGeom prst="roundRect">
+              <a:avLst/>
+            </a:prstGeom>
+            <a:solidFill>
+              <a:srgbClr val="FFB207"/>
+            </a:solidFill>
+            <a:ln>
+              <a:noFill/>
+            </a:ln>
+          </p:spPr>
+          <p:style>
+            <a:lnRef idx="2">
+              <a:schemeClr val="accent1">
+                <a:shade val="15000"/>
+              </a:schemeClr>
+            </a:lnRef>
+            <a:fillRef idx="1">
+              <a:schemeClr val="accent1"/>
+            </a:fillRef>
+            <a:effectRef idx="0">
+              <a:schemeClr val="accent1"/>
+            </a:effectRef>
+            <a:fontRef idx="minor">
+              <a:schemeClr val="lt1"/>
+            </a:fontRef>
+          </p:style>
+          <p:txBody>
+            <a:bodyPr rtlCol="0" anchor="ctr"/>
+            <a:lstStyle/>
+            <a:p>
+              <a:pPr algn="ctr"/>
+              <a:endParaRPr lang="en-US" dirty="0"/>
+            </a:p>
+          </p:txBody>
+        </p:sp>
+        <p:pic>
+          <p:nvPicPr>
+            <p:cNvPr id="4" name="Graphic 3" descr="Turtle with solid fill">
+              <a:extLst>
+                <a:ext uri="{FF2B5EF4-FFF2-40B4-BE49-F238E27FC236}">
+                  <a16:creationId xmlns:a16="http://schemas.microsoft.com/office/drawing/2014/main" id="{61D9DC96-AC47-C664-5434-0DD8521245FE}"/>
+                </a:ext>
+              </a:extLst>
+            </p:cNvPr>
+            <p:cNvPicPr>
+              <a:picLocks noChangeAspect="1"/>
+            </p:cNvPicPr>
+            <p:nvPr/>
+          </p:nvPicPr>
+          <p:blipFill>
+            <a:blip r:embed="rId2">
+              <a:extLst>
+                <a:ext uri="{96DAC541-7B7A-43D3-8B79-37D633B846F1}">
+                  <asvg:svgBlip xmlns:asvg="http://schemas.microsoft.com/office/drawing/2016/SVG/main" r:embed="rId3"/>
+                </a:ext>
+              </a:extLst>
+            </a:blip>
+            <a:stretch>
+              <a:fillRect/>
+            </a:stretch>
+          </p:blipFill>
+          <p:spPr>
+            <a:xfrm>
+              <a:off x="3614425" y="496257"/>
+              <a:ext cx="5486400" cy="5486400"/>
+            </a:xfrm>
+            <a:prstGeom prst="rect">
+              <a:avLst/>
+            </a:prstGeom>
+          </p:spPr>
+        </p:pic>
+      </p:grpSp>
+    </p:spTree>
+    <p:extLst>
+      <p:ext uri="{BB962C8B-B14F-4D97-AF65-F5344CB8AC3E}">
+        <p14:creationId xmlns:p14="http://schemas.microsoft.com/office/powerpoint/2010/main" val="2757329112"/>
+      </p:ext>
+    </p:extLst>
+  </p:cSld>
+  <p:clrMapOvr>
+    <a:masterClrMapping/>
+  </p:clrMapOvr>
+</p:sld>
+</file>
+
+<file path=ppt/slides/slide22.xml><?xml version="1.0" encoding="utf-8"?>
+<p:sld xmlns:a="http://schemas.openxmlformats.org/drawingml/2006/main" xmlns:r="http://schemas.openxmlformats.org/officeDocument/2006/relationships" xmlns:p="http://schemas.openxmlformats.org/presentationml/2006/main">
+  <p:cSld>
+    <p:spTree>
+      <p:nvGrpSpPr>
+        <p:cNvPr id="1" name=""/>
+        <p:cNvGrpSpPr/>
+        <p:nvPr/>
+      </p:nvGrpSpPr>
+      <p:grpSpPr>
+        <a:xfrm>
+          <a:off x="0" y="0"/>
+          <a:ext cx="0" cy="0"/>
+          <a:chOff x="0" y="0"/>
+          <a:chExt cx="0" cy="0"/>
+        </a:xfrm>
+      </p:grpSpPr>
+      <p:sp>
+        <p:nvSpPr>
+          <p:cNvPr id="2" name="Rectangle: Rounded Corners 1">
+            <a:extLst>
+              <a:ext uri="{FF2B5EF4-FFF2-40B4-BE49-F238E27FC236}">
+                <a16:creationId xmlns:a16="http://schemas.microsoft.com/office/drawing/2014/main" id="{552E8FE8-C3A1-6799-11FC-02DFAC78F7AD}"/>
+              </a:ext>
+            </a:extLst>
+          </p:cNvPr>
+          <p:cNvSpPr/>
+          <p:nvPr/>
+        </p:nvSpPr>
+        <p:spPr>
+          <a:xfrm>
+            <a:off x="3385825" y="267657"/>
+            <a:ext cx="5943600" cy="5943600"/>
+          </a:xfrm>
+          <a:prstGeom prst="roundRect">
+            <a:avLst/>
+          </a:prstGeom>
+          <a:solidFill>
+            <a:srgbClr val="FFB207"/>
+          </a:solidFill>
+          <a:ln>
+            <a:noFill/>
+          </a:ln>
+        </p:spPr>
+        <p:style>
+          <a:lnRef idx="2">
+            <a:schemeClr val="accent1">
+              <a:shade val="15000"/>
+            </a:schemeClr>
+          </a:lnRef>
+          <a:fillRef idx="1">
+            <a:schemeClr val="accent1"/>
+          </a:fillRef>
+          <a:effectRef idx="0">
+            <a:schemeClr val="accent1"/>
+          </a:effectRef>
+          <a:fontRef idx="minor">
+            <a:schemeClr val="lt1"/>
+          </a:fontRef>
+        </p:style>
+        <p:txBody>
+          <a:bodyPr rtlCol="0" anchor="ctr"/>
+          <a:lstStyle/>
+          <a:p>
+            <a:pPr algn="ctr"/>
+            <a:endParaRPr lang="en-US" dirty="0"/>
+          </a:p>
+        </p:txBody>
+      </p:sp>
+      <p:pic>
+        <p:nvPicPr>
+          <p:cNvPr id="4" name="Graphic 3" descr="Cat with solid fill">
+            <a:extLst>
+              <a:ext uri="{FF2B5EF4-FFF2-40B4-BE49-F238E27FC236}">
+                <a16:creationId xmlns:a16="http://schemas.microsoft.com/office/drawing/2014/main" id="{46C2A6DD-6472-134A-D0AF-D17382F41CCA}"/>
+              </a:ext>
+            </a:extLst>
+          </p:cNvPr>
+          <p:cNvPicPr>
+            <a:picLocks noChangeAspect="1"/>
+          </p:cNvPicPr>
+          <p:nvPr/>
+        </p:nvPicPr>
+        <p:blipFill>
+          <a:blip r:embed="rId2">
+            <a:extLst>
+              <a:ext uri="{96DAC541-7B7A-43D3-8B79-37D633B846F1}">
+                <asvg:svgBlip xmlns:asvg="http://schemas.microsoft.com/office/drawing/2016/SVG/main" r:embed="rId3"/>
+              </a:ext>
+            </a:extLst>
+          </a:blip>
+          <a:stretch>
+            <a:fillRect/>
+          </a:stretch>
+        </p:blipFill>
+        <p:spPr>
+          <a:xfrm>
+            <a:off x="3385825" y="267657"/>
+            <a:ext cx="5943600" cy="5943600"/>
+          </a:xfrm>
+          <a:prstGeom prst="rect">
+            <a:avLst/>
+          </a:prstGeom>
+        </p:spPr>
+      </p:pic>
+    </p:spTree>
+    <p:extLst>
+      <p:ext uri="{BB962C8B-B14F-4D97-AF65-F5344CB8AC3E}">
+        <p14:creationId xmlns:p14="http://schemas.microsoft.com/office/powerpoint/2010/main" val="3002816324"/>
       </p:ext>
     </p:extLst>
   </p:cSld>
@@ -24904,4 +29397,299 @@
     </a:ext>
   </a:extLst>
 </a:theme>
+</file>
+
+<file path=ppt/theme/theme2.xml><?xml version="1.0" encoding="utf-8"?>
+<a:theme xmlns:a="http://schemas.openxmlformats.org/drawingml/2006/main" name="Office Theme">
+  <a:themeElements>
+    <a:clrScheme name="Office">
+      <a:dk1>
+        <a:sysClr val="windowText" lastClr="000000"/>
+      </a:dk1>
+      <a:lt1>
+        <a:sysClr val="window" lastClr="FFFFFF"/>
+      </a:lt1>
+      <a:dk2>
+        <a:srgbClr val="44546A"/>
+      </a:dk2>
+      <a:lt2>
+        <a:srgbClr val="E7E6E6"/>
+      </a:lt2>
+      <a:accent1>
+        <a:srgbClr val="4472C4"/>
+      </a:accent1>
+      <a:accent2>
+        <a:srgbClr val="ED7D31"/>
+      </a:accent2>
+      <a:accent3>
+        <a:srgbClr val="A5A5A5"/>
+      </a:accent3>
+      <a:accent4>
+        <a:srgbClr val="FFC000"/>
+      </a:accent4>
+      <a:accent5>
+        <a:srgbClr val="5B9BD5"/>
+      </a:accent5>
+      <a:accent6>
+        <a:srgbClr val="70AD47"/>
+      </a:accent6>
+      <a:hlink>
+        <a:srgbClr val="0563C1"/>
+      </a:hlink>
+      <a:folHlink>
+        <a:srgbClr val="954F72"/>
+      </a:folHlink>
+    </a:clrScheme>
+    <a:fontScheme name="Office">
+      <a:majorFont>
+        <a:latin typeface="Calibri Light" panose="020F0302020204030204"/>
+        <a:ea typeface=""/>
+        <a:cs typeface=""/>
+        <a:font script="Jpan" typeface="游ゴシック Light"/>
+        <a:font script="Hang" typeface="맑은 고딕"/>
+        <a:font script="Hans" typeface="等线 Light"/>
+        <a:font script="Hant" typeface="新細明體"/>
+        <a:font script="Arab" typeface="Times New Roman"/>
+        <a:font script="Hebr" typeface="Times New Roman"/>
+        <a:font script="Thai" typeface="Angsana New"/>
+        <a:font script="Ethi" typeface="Nyala"/>
+        <a:font script="Beng" typeface="Vrinda"/>
+        <a:font script="Gujr" typeface="Shruti"/>
+        <a:font script="Khmr" typeface="MoolBoran"/>
+        <a:font script="Knda" typeface="Tunga"/>
+        <a:font script="Guru" typeface="Raavi"/>
+        <a:font script="Cans" typeface="Euphemia"/>
+        <a:font script="Cher" typeface="Plantagenet Cherokee"/>
+        <a:font script="Yiii" typeface="Microsoft Yi Baiti"/>
+        <a:font script="Tibt" typeface="Microsoft Himalaya"/>
+        <a:font script="Thaa" typeface="MV Boli"/>
+        <a:font script="Deva" typeface="Mangal"/>
+        <a:font script="Telu" typeface="Gautami"/>
+        <a:font script="Taml" typeface="Latha"/>
+        <a:font script="Syrc" typeface="Estrangelo Edessa"/>
+        <a:font script="Orya" typeface="Kalinga"/>
+        <a:font script="Mlym" typeface="Kartika"/>
+        <a:font script="Laoo" typeface="DokChampa"/>
+        <a:font script="Sinh" typeface="Iskoola Pota"/>
+        <a:font script="Mong" typeface="Mongolian Baiti"/>
+        <a:font script="Viet" typeface="Times New Roman"/>
+        <a:font script="Uigh" typeface="Microsoft Uighur"/>
+        <a:font script="Geor" typeface="Sylfaen"/>
+        <a:font script="Armn" typeface="Arial"/>
+        <a:font script="Bugi" typeface="Leelawadee UI"/>
+        <a:font script="Bopo" typeface="Microsoft JhengHei"/>
+        <a:font script="Java" typeface="Javanese Text"/>
+        <a:font script="Lisu" typeface="Segoe UI"/>
+        <a:font script="Mymr" typeface="Myanmar Text"/>
+        <a:font script="Nkoo" typeface="Ebrima"/>
+        <a:font script="Olck" typeface="Nirmala UI"/>
+        <a:font script="Osma" typeface="Ebrima"/>
+        <a:font script="Phag" typeface="Phagspa"/>
+        <a:font script="Syrn" typeface="Estrangelo Edessa"/>
+        <a:font script="Syrj" typeface="Estrangelo Edessa"/>
+        <a:font script="Syre" typeface="Estrangelo Edessa"/>
+        <a:font script="Sora" typeface="Nirmala UI"/>
+        <a:font script="Tale" typeface="Microsoft Tai Le"/>
+        <a:font script="Talu" typeface="Microsoft New Tai Lue"/>
+        <a:font script="Tfng" typeface="Ebrima"/>
+      </a:majorFont>
+      <a:minorFont>
+        <a:latin typeface="Calibri" panose="020F0502020204030204"/>
+        <a:ea typeface=""/>
+        <a:cs typeface=""/>
+        <a:font script="Jpan" typeface="游ゴシック"/>
+        <a:font script="Hang" typeface="맑은 고딕"/>
+        <a:font script="Hans" typeface="等线"/>
+        <a:font script="Hant" typeface="新細明體"/>
+        <a:font script="Arab" typeface="Arial"/>
+        <a:font script="Hebr" typeface="Arial"/>
+        <a:font script="Thai" typeface="Cordia New"/>
+        <a:font script="Ethi" typeface="Nyala"/>
+        <a:font script="Beng" typeface="Vrinda"/>
+        <a:font script="Gujr" typeface="Shruti"/>
+        <a:font script="Khmr" typeface="DaunPenh"/>
+        <a:font script="Knda" typeface="Tunga"/>
+        <a:font script="Guru" typeface="Raavi"/>
+        <a:font script="Cans" typeface="Euphemia"/>
+        <a:font script="Cher" typeface="Plantagenet Cherokee"/>
+        <a:font script="Yiii" typeface="Microsoft Yi Baiti"/>
+        <a:font script="Tibt" typeface="Microsoft Himalaya"/>
+        <a:font script="Thaa" typeface="MV Boli"/>
+        <a:font script="Deva" typeface="Mangal"/>
+        <a:font script="Telu" typeface="Gautami"/>
+        <a:font script="Taml" typeface="Latha"/>
+        <a:font script="Syrc" typeface="Estrangelo Edessa"/>
+        <a:font script="Orya" typeface="Kalinga"/>
+        <a:font script="Mlym" typeface="Kartika"/>
+        <a:font script="Laoo" typeface="DokChampa"/>
+        <a:font script="Sinh" typeface="Iskoola Pota"/>
+        <a:font script="Mong" typeface="Mongolian Baiti"/>
+        <a:font script="Viet" typeface="Arial"/>
+        <a:font script="Uigh" typeface="Microsoft Uighur"/>
+        <a:font script="Geor" typeface="Sylfaen"/>
+        <a:font script="Armn" typeface="Arial"/>
+        <a:font script="Bugi" typeface="Leelawadee UI"/>
+        <a:font script="Bopo" typeface="Microsoft JhengHei"/>
+        <a:font script="Java" typeface="Javanese Text"/>
+        <a:font script="Lisu" typeface="Segoe UI"/>
+        <a:font script="Mymr" typeface="Myanmar Text"/>
+        <a:font script="Nkoo" typeface="Ebrima"/>
+        <a:font script="Olck" typeface="Nirmala UI"/>
+        <a:font script="Osma" typeface="Ebrima"/>
+        <a:font script="Phag" typeface="Phagspa"/>
+        <a:font script="Syrn" typeface="Estrangelo Edessa"/>
+        <a:font script="Syrj" typeface="Estrangelo Edessa"/>
+        <a:font script="Syre" typeface="Estrangelo Edessa"/>
+        <a:font script="Sora" typeface="Nirmala UI"/>
+        <a:font script="Tale" typeface="Microsoft Tai Le"/>
+        <a:font script="Talu" typeface="Microsoft New Tai Lue"/>
+        <a:font script="Tfng" typeface="Ebrima"/>
+      </a:minorFont>
+    </a:fontScheme>
+    <a:fmtScheme name="Office">
+      <a:fillStyleLst>
+        <a:solidFill>
+          <a:schemeClr val="phClr"/>
+        </a:solidFill>
+        <a:gradFill rotWithShape="1">
+          <a:gsLst>
+            <a:gs pos="0">
+              <a:schemeClr val="phClr">
+                <a:lumMod val="110000"/>
+                <a:satMod val="105000"/>
+                <a:tint val="67000"/>
+              </a:schemeClr>
+            </a:gs>
+            <a:gs pos="50000">
+              <a:schemeClr val="phClr">
+                <a:lumMod val="105000"/>
+                <a:satMod val="103000"/>
+                <a:tint val="73000"/>
+              </a:schemeClr>
+            </a:gs>
+            <a:gs pos="100000">
+              <a:schemeClr val="phClr">
+                <a:lumMod val="105000"/>
+                <a:satMod val="109000"/>
+                <a:tint val="81000"/>
+              </a:schemeClr>
+            </a:gs>
+          </a:gsLst>
+          <a:lin ang="5400000" scaled="0"/>
+        </a:gradFill>
+        <a:gradFill rotWithShape="1">
+          <a:gsLst>
+            <a:gs pos="0">
+              <a:schemeClr val="phClr">
+                <a:satMod val="103000"/>
+                <a:lumMod val="102000"/>
+                <a:tint val="94000"/>
+              </a:schemeClr>
+            </a:gs>
+            <a:gs pos="50000">
+              <a:schemeClr val="phClr">
+                <a:satMod val="110000"/>
+                <a:lumMod val="100000"/>
+                <a:shade val="100000"/>
+              </a:schemeClr>
+            </a:gs>
+            <a:gs pos="100000">
+              <a:schemeClr val="phClr">
+                <a:lumMod val="99000"/>
+                <a:satMod val="120000"/>
+                <a:shade val="78000"/>
+              </a:schemeClr>
+            </a:gs>
+          </a:gsLst>
+          <a:lin ang="5400000" scaled="0"/>
+        </a:gradFill>
+      </a:fillStyleLst>
+      <a:lnStyleLst>
+        <a:ln w="6350" cap="flat" cmpd="sng" algn="ctr">
+          <a:solidFill>
+            <a:schemeClr val="phClr"/>
+          </a:solidFill>
+          <a:prstDash val="solid"/>
+          <a:miter lim="800000"/>
+        </a:ln>
+        <a:ln w="12700" cap="flat" cmpd="sng" algn="ctr">
+          <a:solidFill>
+            <a:schemeClr val="phClr"/>
+          </a:solidFill>
+          <a:prstDash val="solid"/>
+          <a:miter lim="800000"/>
+        </a:ln>
+        <a:ln w="19050" cap="flat" cmpd="sng" algn="ctr">
+          <a:solidFill>
+            <a:schemeClr val="phClr"/>
+          </a:solidFill>
+          <a:prstDash val="solid"/>
+          <a:miter lim="800000"/>
+        </a:ln>
+      </a:lnStyleLst>
+      <a:effectStyleLst>
+        <a:effectStyle>
+          <a:effectLst/>
+        </a:effectStyle>
+        <a:effectStyle>
+          <a:effectLst/>
+        </a:effectStyle>
+        <a:effectStyle>
+          <a:effectLst>
+            <a:outerShdw blurRad="57150" dist="19050" dir="5400000" algn="ctr" rotWithShape="0">
+              <a:srgbClr val="000000">
+                <a:alpha val="63000"/>
+              </a:srgbClr>
+            </a:outerShdw>
+          </a:effectLst>
+        </a:effectStyle>
+      </a:effectStyleLst>
+      <a:bgFillStyleLst>
+        <a:solidFill>
+          <a:schemeClr val="phClr"/>
+        </a:solidFill>
+        <a:solidFill>
+          <a:schemeClr val="phClr">
+            <a:tint val="95000"/>
+            <a:satMod val="170000"/>
+          </a:schemeClr>
+        </a:solidFill>
+        <a:gradFill rotWithShape="1">
+          <a:gsLst>
+            <a:gs pos="0">
+              <a:schemeClr val="phClr">
+                <a:tint val="93000"/>
+                <a:satMod val="150000"/>
+                <a:shade val="98000"/>
+                <a:lumMod val="102000"/>
+              </a:schemeClr>
+            </a:gs>
+            <a:gs pos="50000">
+              <a:schemeClr val="phClr">
+                <a:tint val="98000"/>
+                <a:satMod val="130000"/>
+                <a:shade val="90000"/>
+                <a:lumMod val="103000"/>
+              </a:schemeClr>
+            </a:gs>
+            <a:gs pos="100000">
+              <a:schemeClr val="phClr">
+                <a:shade val="63000"/>
+                <a:satMod val="120000"/>
+              </a:schemeClr>
+            </a:gs>
+          </a:gsLst>
+          <a:lin ang="5400000" scaled="0"/>
+        </a:gradFill>
+      </a:bgFillStyleLst>
+    </a:fmtScheme>
+  </a:themeElements>
+  <a:objectDefaults/>
+  <a:extraClrSchemeLst/>
+  <a:extLst>
+    <a:ext uri="{05A4C25C-085E-4340-85A3-A5531E510DB2}">
+      <thm15:themeFamily xmlns:thm15="http://schemas.microsoft.com/office/thememl/2012/main" name="Office Theme" id="{62F939B6-93AF-4DB8-9C6B-D6C7DFDC589F}" vid="{4A3C46E8-61CC-4603-A589-7422A47A8E4A}"/>
+    </a:ext>
+  </a:extLst>
+</a:theme>
 </file>
</xml_diff>

<commit_message>
added teaching choice, made overall improvement, updated images, finished almost everything except teaching demonstration trials
</commit_message>
<xml_diff>
--- a/assets/Symbols.pptx
+++ b/assets/Symbols.pptx
@@ -5,7 +5,7 @@
     <p:sldMasterId id="2147483648" r:id="rId1"/>
   </p:sldMasterIdLst>
   <p:notesMasterIdLst>
-    <p:notesMasterId r:id="rId24"/>
+    <p:notesMasterId r:id="rId28"/>
   </p:notesMasterIdLst>
   <p:sldIdLst>
     <p:sldId id="256" r:id="rId2"/>
@@ -30,6 +30,10 @@
     <p:sldId id="273" r:id="rId21"/>
     <p:sldId id="274" r:id="rId22"/>
     <p:sldId id="276" r:id="rId23"/>
+    <p:sldId id="278" r:id="rId24"/>
+    <p:sldId id="279" r:id="rId25"/>
+    <p:sldId id="280" r:id="rId26"/>
+    <p:sldId id="281" r:id="rId27"/>
   </p:sldIdLst>
   <p:sldSz cx="12192000" cy="6858000"/>
   <p:notesSz cx="6858000" cy="9144000"/>
@@ -163,6 +167,14 @@
             <p14:sldId id="273"/>
             <p14:sldId id="274"/>
             <p14:sldId id="276"/>
+            <p14:sldId id="278"/>
+            <p14:sldId id="279"/>
+            <p14:sldId id="280"/>
+          </p14:sldIdLst>
+        </p14:section>
+        <p14:section name="teaching" id="{574305F8-BBA4-41A2-A7BE-244E75D0167E}">
+          <p14:sldIdLst>
+            <p14:sldId id="281"/>
           </p14:sldIdLst>
         </p14:section>
       </p14:sectionLst>
@@ -256,7 +268,7 @@
           <a:p>
             <a:fld id="{4CE80203-1554-4B47-9518-27150A8A6789}" type="datetimeFigureOut">
               <a:rPr lang="en-US" smtClean="0"/>
-              <a:t>10/29/2024</a:t>
+              <a:t>11/4/2024</a:t>
             </a:fld>
             <a:endParaRPr lang="en-US"/>
           </a:p>
@@ -754,7 +766,7 @@
           <a:p>
             <a:fld id="{573B54DB-A8B2-4954-9DC1-E1741E23BC56}" type="datetimeFigureOut">
               <a:rPr lang="en-US" smtClean="0"/>
-              <a:t>10/29/2024</a:t>
+              <a:t>11/4/2024</a:t>
             </a:fld>
             <a:endParaRPr lang="en-US"/>
           </a:p>
@@ -952,7 +964,7 @@
           <a:p>
             <a:fld id="{573B54DB-A8B2-4954-9DC1-E1741E23BC56}" type="datetimeFigureOut">
               <a:rPr lang="en-US" smtClean="0"/>
-              <a:t>10/29/2024</a:t>
+              <a:t>11/4/2024</a:t>
             </a:fld>
             <a:endParaRPr lang="en-US"/>
           </a:p>
@@ -1160,7 +1172,7 @@
           <a:p>
             <a:fld id="{573B54DB-A8B2-4954-9DC1-E1741E23BC56}" type="datetimeFigureOut">
               <a:rPr lang="en-US" smtClean="0"/>
-              <a:t>10/29/2024</a:t>
+              <a:t>11/4/2024</a:t>
             </a:fld>
             <a:endParaRPr lang="en-US"/>
           </a:p>
@@ -1358,7 +1370,7 @@
           <a:p>
             <a:fld id="{573B54DB-A8B2-4954-9DC1-E1741E23BC56}" type="datetimeFigureOut">
               <a:rPr lang="en-US" smtClean="0"/>
-              <a:t>10/29/2024</a:t>
+              <a:t>11/4/2024</a:t>
             </a:fld>
             <a:endParaRPr lang="en-US"/>
           </a:p>
@@ -1633,7 +1645,7 @@
           <a:p>
             <a:fld id="{573B54DB-A8B2-4954-9DC1-E1741E23BC56}" type="datetimeFigureOut">
               <a:rPr lang="en-US" smtClean="0"/>
-              <a:t>10/29/2024</a:t>
+              <a:t>11/4/2024</a:t>
             </a:fld>
             <a:endParaRPr lang="en-US"/>
           </a:p>
@@ -1898,7 +1910,7 @@
           <a:p>
             <a:fld id="{573B54DB-A8B2-4954-9DC1-E1741E23BC56}" type="datetimeFigureOut">
               <a:rPr lang="en-US" smtClean="0"/>
-              <a:t>10/29/2024</a:t>
+              <a:t>11/4/2024</a:t>
             </a:fld>
             <a:endParaRPr lang="en-US"/>
           </a:p>
@@ -2310,7 +2322,7 @@
           <a:p>
             <a:fld id="{573B54DB-A8B2-4954-9DC1-E1741E23BC56}" type="datetimeFigureOut">
               <a:rPr lang="en-US" smtClean="0"/>
-              <a:t>10/29/2024</a:t>
+              <a:t>11/4/2024</a:t>
             </a:fld>
             <a:endParaRPr lang="en-US"/>
           </a:p>
@@ -2451,7 +2463,7 @@
           <a:p>
             <a:fld id="{573B54DB-A8B2-4954-9DC1-E1741E23BC56}" type="datetimeFigureOut">
               <a:rPr lang="en-US" smtClean="0"/>
-              <a:t>10/29/2024</a:t>
+              <a:t>11/4/2024</a:t>
             </a:fld>
             <a:endParaRPr lang="en-US"/>
           </a:p>
@@ -2564,7 +2576,7 @@
           <a:p>
             <a:fld id="{573B54DB-A8B2-4954-9DC1-E1741E23BC56}" type="datetimeFigureOut">
               <a:rPr lang="en-US" smtClean="0"/>
-              <a:t>10/29/2024</a:t>
+              <a:t>11/4/2024</a:t>
             </a:fld>
             <a:endParaRPr lang="en-US"/>
           </a:p>
@@ -2875,7 +2887,7 @@
           <a:p>
             <a:fld id="{573B54DB-A8B2-4954-9DC1-E1741E23BC56}" type="datetimeFigureOut">
               <a:rPr lang="en-US" smtClean="0"/>
-              <a:t>10/29/2024</a:t>
+              <a:t>11/4/2024</a:t>
             </a:fld>
             <a:endParaRPr lang="en-US"/>
           </a:p>
@@ -3163,7 +3175,7 @@
           <a:p>
             <a:fld id="{573B54DB-A8B2-4954-9DC1-E1741E23BC56}" type="datetimeFigureOut">
               <a:rPr lang="en-US" smtClean="0"/>
-              <a:t>10/29/2024</a:t>
+              <a:t>11/4/2024</a:t>
             </a:fld>
             <a:endParaRPr lang="en-US"/>
           </a:p>
@@ -3404,7 +3416,7 @@
           <a:p>
             <a:fld id="{573B54DB-A8B2-4954-9DC1-E1741E23BC56}" type="datetimeFigureOut">
               <a:rPr lang="en-US" smtClean="0"/>
-              <a:t>10/29/2024</a:t>
+              <a:t>11/4/2024</a:t>
             </a:fld>
             <a:endParaRPr lang="en-US"/>
           </a:p>
@@ -27543,7 +27555,7 @@
         </p:nvGrpSpPr>
         <p:grpSpPr>
           <a:xfrm>
-            <a:off x="3385825" y="267657"/>
+            <a:off x="4842836" y="227463"/>
             <a:ext cx="5943600" cy="5943600"/>
             <a:chOff x="3385825" y="267657"/>
             <a:chExt cx="5943600" cy="5943600"/>
@@ -27668,12 +27680,568 @@
           <a:chExt cx="0" cy="0"/>
         </a:xfrm>
       </p:grpSpPr>
+      <p:grpSp>
+        <p:nvGrpSpPr>
+          <p:cNvPr id="3" name="Group 2">
+            <a:extLst>
+              <a:ext uri="{FF2B5EF4-FFF2-40B4-BE49-F238E27FC236}">
+                <a16:creationId xmlns:a16="http://schemas.microsoft.com/office/drawing/2014/main" id="{D37F0CC0-E215-5AB8-8EBF-DE0FF995D657}"/>
+              </a:ext>
+            </a:extLst>
+          </p:cNvPr>
+          <p:cNvGrpSpPr/>
+          <p:nvPr/>
+        </p:nvGrpSpPr>
+        <p:grpSpPr>
+          <a:xfrm>
+            <a:off x="3385825" y="267657"/>
+            <a:ext cx="5943600" cy="5943600"/>
+            <a:chOff x="3385825" y="267657"/>
+            <a:chExt cx="5943600" cy="5943600"/>
+          </a:xfrm>
+        </p:grpSpPr>
+        <p:sp>
+          <p:nvSpPr>
+            <p:cNvPr id="2" name="Rectangle: Rounded Corners 1">
+              <a:extLst>
+                <a:ext uri="{FF2B5EF4-FFF2-40B4-BE49-F238E27FC236}">
+                  <a16:creationId xmlns:a16="http://schemas.microsoft.com/office/drawing/2014/main" id="{552E8FE8-C3A1-6799-11FC-02DFAC78F7AD}"/>
+                </a:ext>
+              </a:extLst>
+            </p:cNvPr>
+            <p:cNvSpPr/>
+            <p:nvPr/>
+          </p:nvSpPr>
+          <p:spPr>
+            <a:xfrm>
+              <a:off x="3385825" y="267657"/>
+              <a:ext cx="5943600" cy="5943600"/>
+            </a:xfrm>
+            <a:prstGeom prst="roundRect">
+              <a:avLst/>
+            </a:prstGeom>
+            <a:solidFill>
+              <a:srgbClr val="FFB207"/>
+            </a:solidFill>
+            <a:ln>
+              <a:noFill/>
+            </a:ln>
+          </p:spPr>
+          <p:style>
+            <a:lnRef idx="2">
+              <a:schemeClr val="accent1">
+                <a:shade val="15000"/>
+              </a:schemeClr>
+            </a:lnRef>
+            <a:fillRef idx="1">
+              <a:schemeClr val="accent1"/>
+            </a:fillRef>
+            <a:effectRef idx="0">
+              <a:schemeClr val="accent1"/>
+            </a:effectRef>
+            <a:fontRef idx="minor">
+              <a:schemeClr val="lt1"/>
+            </a:fontRef>
+          </p:style>
+          <p:txBody>
+            <a:bodyPr rtlCol="0" anchor="ctr"/>
+            <a:lstStyle/>
+            <a:p>
+              <a:pPr algn="ctr"/>
+              <a:endParaRPr lang="en-US" dirty="0"/>
+            </a:p>
+          </p:txBody>
+        </p:sp>
+        <p:pic>
+          <p:nvPicPr>
+            <p:cNvPr id="4" name="Graphic 3" descr="Cat with solid fill">
+              <a:extLst>
+                <a:ext uri="{FF2B5EF4-FFF2-40B4-BE49-F238E27FC236}">
+                  <a16:creationId xmlns:a16="http://schemas.microsoft.com/office/drawing/2014/main" id="{46C2A6DD-6472-134A-D0AF-D17382F41CCA}"/>
+                </a:ext>
+              </a:extLst>
+            </p:cNvPr>
+            <p:cNvPicPr>
+              <a:picLocks noChangeAspect="1"/>
+            </p:cNvPicPr>
+            <p:nvPr/>
+          </p:nvPicPr>
+          <p:blipFill>
+            <a:blip r:embed="rId2">
+              <a:extLst>
+                <a:ext uri="{96DAC541-7B7A-43D3-8B79-37D633B846F1}">
+                  <asvg:svgBlip xmlns:asvg="http://schemas.microsoft.com/office/drawing/2016/SVG/main" r:embed="rId3"/>
+                </a:ext>
+              </a:extLst>
+            </a:blip>
+            <a:stretch>
+              <a:fillRect/>
+            </a:stretch>
+          </p:blipFill>
+          <p:spPr>
+            <a:xfrm>
+              <a:off x="3385825" y="267657"/>
+              <a:ext cx="5943600" cy="5943600"/>
+            </a:xfrm>
+            <a:prstGeom prst="rect">
+              <a:avLst/>
+            </a:prstGeom>
+          </p:spPr>
+        </p:pic>
+      </p:grpSp>
+    </p:spTree>
+    <p:extLst>
+      <p:ext uri="{BB962C8B-B14F-4D97-AF65-F5344CB8AC3E}">
+        <p14:creationId xmlns:p14="http://schemas.microsoft.com/office/powerpoint/2010/main" val="3002816324"/>
+      </p:ext>
+    </p:extLst>
+  </p:cSld>
+  <p:clrMapOvr>
+    <a:masterClrMapping/>
+  </p:clrMapOvr>
+</p:sld>
+</file>
+
+<file path=ppt/slides/slide23.xml><?xml version="1.0" encoding="utf-8"?>
+<p:sld xmlns:a="http://schemas.openxmlformats.org/drawingml/2006/main" xmlns:r="http://schemas.openxmlformats.org/officeDocument/2006/relationships" xmlns:p="http://schemas.openxmlformats.org/presentationml/2006/main">
+  <p:cSld>
+    <p:spTree>
+      <p:nvGrpSpPr>
+        <p:cNvPr id="1" name=""/>
+        <p:cNvGrpSpPr/>
+        <p:nvPr/>
+      </p:nvGrpSpPr>
+      <p:grpSpPr>
+        <a:xfrm>
+          <a:off x="0" y="0"/>
+          <a:ext cx="0" cy="0"/>
+          <a:chOff x="0" y="0"/>
+          <a:chExt cx="0" cy="0"/>
+        </a:xfrm>
+      </p:grpSpPr>
+      <p:grpSp>
+        <p:nvGrpSpPr>
+          <p:cNvPr id="6" name="Group 5">
+            <a:extLst>
+              <a:ext uri="{FF2B5EF4-FFF2-40B4-BE49-F238E27FC236}">
+                <a16:creationId xmlns:a16="http://schemas.microsoft.com/office/drawing/2014/main" id="{0E2B155F-E4B1-B902-D901-D63D5CEE850F}"/>
+              </a:ext>
+            </a:extLst>
+          </p:cNvPr>
+          <p:cNvGrpSpPr/>
+          <p:nvPr/>
+        </p:nvGrpSpPr>
+        <p:grpSpPr>
+          <a:xfrm>
+            <a:off x="3385824" y="267656"/>
+            <a:ext cx="5943601" cy="5943601"/>
+            <a:chOff x="3385824" y="267656"/>
+            <a:chExt cx="5943601" cy="5943601"/>
+          </a:xfrm>
+        </p:grpSpPr>
+        <p:sp>
+          <p:nvSpPr>
+            <p:cNvPr id="2" name="Rectangle: Rounded Corners 1">
+              <a:extLst>
+                <a:ext uri="{FF2B5EF4-FFF2-40B4-BE49-F238E27FC236}">
+                  <a16:creationId xmlns:a16="http://schemas.microsoft.com/office/drawing/2014/main" id="{9E6DF338-6B6C-94B8-8D4C-CE8D12F57AAD}"/>
+                </a:ext>
+              </a:extLst>
+            </p:cNvPr>
+            <p:cNvSpPr/>
+            <p:nvPr/>
+          </p:nvSpPr>
+          <p:spPr>
+            <a:xfrm>
+              <a:off x="3385825" y="267657"/>
+              <a:ext cx="5943600" cy="5943600"/>
+            </a:xfrm>
+            <a:prstGeom prst="roundRect">
+              <a:avLst/>
+            </a:prstGeom>
+            <a:solidFill>
+              <a:srgbClr val="FFB207"/>
+            </a:solidFill>
+            <a:ln>
+              <a:noFill/>
+            </a:ln>
+          </p:spPr>
+          <p:style>
+            <a:lnRef idx="2">
+              <a:schemeClr val="accent1">
+                <a:shade val="15000"/>
+              </a:schemeClr>
+            </a:lnRef>
+            <a:fillRef idx="1">
+              <a:schemeClr val="accent1"/>
+            </a:fillRef>
+            <a:effectRef idx="0">
+              <a:schemeClr val="accent1"/>
+            </a:effectRef>
+            <a:fontRef idx="minor">
+              <a:schemeClr val="lt1"/>
+            </a:fontRef>
+          </p:style>
+          <p:txBody>
+            <a:bodyPr rtlCol="0" anchor="ctr"/>
+            <a:lstStyle/>
+            <a:p>
+              <a:pPr algn="ctr"/>
+              <a:endParaRPr lang="en-US" dirty="0"/>
+            </a:p>
+          </p:txBody>
+        </p:sp>
+        <p:pic>
+          <p:nvPicPr>
+            <p:cNvPr id="4" name="Graphic 3" descr="Crab with solid fill">
+              <a:extLst>
+                <a:ext uri="{FF2B5EF4-FFF2-40B4-BE49-F238E27FC236}">
+                  <a16:creationId xmlns:a16="http://schemas.microsoft.com/office/drawing/2014/main" id="{EA636336-E8B2-E248-BA42-F4B161ACF9C4}"/>
+                </a:ext>
+              </a:extLst>
+            </p:cNvPr>
+            <p:cNvPicPr>
+              <a:picLocks noChangeAspect="1"/>
+            </p:cNvPicPr>
+            <p:nvPr/>
+          </p:nvPicPr>
+          <p:blipFill>
+            <a:blip r:embed="rId2">
+              <a:extLst>
+                <a:ext uri="{96DAC541-7B7A-43D3-8B79-37D633B846F1}">
+                  <asvg:svgBlip xmlns:asvg="http://schemas.microsoft.com/office/drawing/2016/SVG/main" r:embed="rId3"/>
+                </a:ext>
+              </a:extLst>
+            </a:blip>
+            <a:stretch>
+              <a:fillRect/>
+            </a:stretch>
+          </p:blipFill>
+          <p:spPr>
+            <a:xfrm>
+              <a:off x="3385824" y="267656"/>
+              <a:ext cx="5943599" cy="5943599"/>
+            </a:xfrm>
+            <a:prstGeom prst="rect">
+              <a:avLst/>
+            </a:prstGeom>
+          </p:spPr>
+        </p:pic>
+      </p:grpSp>
+    </p:spTree>
+    <p:extLst>
+      <p:ext uri="{BB962C8B-B14F-4D97-AF65-F5344CB8AC3E}">
+        <p14:creationId xmlns:p14="http://schemas.microsoft.com/office/powerpoint/2010/main" val="1279086691"/>
+      </p:ext>
+    </p:extLst>
+  </p:cSld>
+  <p:clrMapOvr>
+    <a:masterClrMapping/>
+  </p:clrMapOvr>
+</p:sld>
+</file>
+
+<file path=ppt/slides/slide24.xml><?xml version="1.0" encoding="utf-8"?>
+<p:sld xmlns:a="http://schemas.openxmlformats.org/drawingml/2006/main" xmlns:r="http://schemas.openxmlformats.org/officeDocument/2006/relationships" xmlns:p="http://schemas.openxmlformats.org/presentationml/2006/main">
+  <p:cSld>
+    <p:spTree>
+      <p:nvGrpSpPr>
+        <p:cNvPr id="1" name=""/>
+        <p:cNvGrpSpPr/>
+        <p:nvPr/>
+      </p:nvGrpSpPr>
+      <p:grpSpPr>
+        <a:xfrm>
+          <a:off x="0" y="0"/>
+          <a:ext cx="0" cy="0"/>
+          <a:chOff x="0" y="0"/>
+          <a:chExt cx="0" cy="0"/>
+        </a:xfrm>
+      </p:grpSpPr>
+      <p:grpSp>
+        <p:nvGrpSpPr>
+          <p:cNvPr id="5" name="Group 4">
+            <a:extLst>
+              <a:ext uri="{FF2B5EF4-FFF2-40B4-BE49-F238E27FC236}">
+                <a16:creationId xmlns:a16="http://schemas.microsoft.com/office/drawing/2014/main" id="{CB0CA300-8E9D-9EEC-9DD7-0AF1E847B383}"/>
+              </a:ext>
+            </a:extLst>
+          </p:cNvPr>
+          <p:cNvGrpSpPr/>
+          <p:nvPr/>
+        </p:nvGrpSpPr>
+        <p:grpSpPr>
+          <a:xfrm>
+            <a:off x="3385824" y="267656"/>
+            <a:ext cx="5943601" cy="5943601"/>
+            <a:chOff x="3385824" y="267656"/>
+            <a:chExt cx="5943601" cy="5943601"/>
+          </a:xfrm>
+        </p:grpSpPr>
+        <p:sp>
+          <p:nvSpPr>
+            <p:cNvPr id="2" name="Rectangle: Rounded Corners 1">
+              <a:extLst>
+                <a:ext uri="{FF2B5EF4-FFF2-40B4-BE49-F238E27FC236}">
+                  <a16:creationId xmlns:a16="http://schemas.microsoft.com/office/drawing/2014/main" id="{F86636AD-A74C-1B96-ADEC-CBA334C41DF7}"/>
+                </a:ext>
+              </a:extLst>
+            </p:cNvPr>
+            <p:cNvSpPr/>
+            <p:nvPr/>
+          </p:nvSpPr>
+          <p:spPr>
+            <a:xfrm>
+              <a:off x="3385825" y="267657"/>
+              <a:ext cx="5943600" cy="5943600"/>
+            </a:xfrm>
+            <a:prstGeom prst="roundRect">
+              <a:avLst/>
+            </a:prstGeom>
+            <a:solidFill>
+              <a:srgbClr val="FFB207"/>
+            </a:solidFill>
+            <a:ln>
+              <a:noFill/>
+            </a:ln>
+          </p:spPr>
+          <p:style>
+            <a:lnRef idx="2">
+              <a:schemeClr val="accent1">
+                <a:shade val="15000"/>
+              </a:schemeClr>
+            </a:lnRef>
+            <a:fillRef idx="1">
+              <a:schemeClr val="accent1"/>
+            </a:fillRef>
+            <a:effectRef idx="0">
+              <a:schemeClr val="accent1"/>
+            </a:effectRef>
+            <a:fontRef idx="minor">
+              <a:schemeClr val="lt1"/>
+            </a:fontRef>
+          </p:style>
+          <p:txBody>
+            <a:bodyPr rtlCol="0" anchor="ctr"/>
+            <a:lstStyle/>
+            <a:p>
+              <a:pPr algn="ctr"/>
+              <a:endParaRPr lang="en-US" dirty="0"/>
+            </a:p>
+          </p:txBody>
+        </p:sp>
+        <p:pic>
+          <p:nvPicPr>
+            <p:cNvPr id="4" name="Graphic 3" descr="Owl with solid fill">
+              <a:extLst>
+                <a:ext uri="{FF2B5EF4-FFF2-40B4-BE49-F238E27FC236}">
+                  <a16:creationId xmlns:a16="http://schemas.microsoft.com/office/drawing/2014/main" id="{71E88952-35ED-CADC-0F65-6979EB699C19}"/>
+                </a:ext>
+              </a:extLst>
+            </p:cNvPr>
+            <p:cNvPicPr>
+              <a:picLocks noChangeAspect="1"/>
+            </p:cNvPicPr>
+            <p:nvPr/>
+          </p:nvPicPr>
+          <p:blipFill>
+            <a:blip r:embed="rId2">
+              <a:extLst>
+                <a:ext uri="{96DAC541-7B7A-43D3-8B79-37D633B846F1}">
+                  <asvg:svgBlip xmlns:asvg="http://schemas.microsoft.com/office/drawing/2016/SVG/main" r:embed="rId3"/>
+                </a:ext>
+              </a:extLst>
+            </a:blip>
+            <a:stretch>
+              <a:fillRect/>
+            </a:stretch>
+          </p:blipFill>
+          <p:spPr>
+            <a:xfrm>
+              <a:off x="3385824" y="267656"/>
+              <a:ext cx="5943599" cy="5943599"/>
+            </a:xfrm>
+            <a:prstGeom prst="rect">
+              <a:avLst/>
+            </a:prstGeom>
+          </p:spPr>
+        </p:pic>
+      </p:grpSp>
+    </p:spTree>
+    <p:extLst>
+      <p:ext uri="{BB962C8B-B14F-4D97-AF65-F5344CB8AC3E}">
+        <p14:creationId xmlns:p14="http://schemas.microsoft.com/office/powerpoint/2010/main" val="1576588560"/>
+      </p:ext>
+    </p:extLst>
+  </p:cSld>
+  <p:clrMapOvr>
+    <a:masterClrMapping/>
+  </p:clrMapOvr>
+</p:sld>
+</file>
+
+<file path=ppt/slides/slide25.xml><?xml version="1.0" encoding="utf-8"?>
+<p:sld xmlns:a="http://schemas.openxmlformats.org/drawingml/2006/main" xmlns:r="http://schemas.openxmlformats.org/officeDocument/2006/relationships" xmlns:p="http://schemas.openxmlformats.org/presentationml/2006/main">
+  <p:cSld>
+    <p:spTree>
+      <p:nvGrpSpPr>
+        <p:cNvPr id="1" name=""/>
+        <p:cNvGrpSpPr/>
+        <p:nvPr/>
+      </p:nvGrpSpPr>
+      <p:grpSpPr>
+        <a:xfrm>
+          <a:off x="0" y="0"/>
+          <a:ext cx="0" cy="0"/>
+          <a:chOff x="0" y="0"/>
+          <a:chExt cx="0" cy="0"/>
+        </a:xfrm>
+      </p:grpSpPr>
+      <p:grpSp>
+        <p:nvGrpSpPr>
+          <p:cNvPr id="5" name="Group 4">
+            <a:extLst>
+              <a:ext uri="{FF2B5EF4-FFF2-40B4-BE49-F238E27FC236}">
+                <a16:creationId xmlns:a16="http://schemas.microsoft.com/office/drawing/2014/main" id="{48AF5DAD-F82D-D556-852C-74C9D0EFB724}"/>
+              </a:ext>
+            </a:extLst>
+          </p:cNvPr>
+          <p:cNvGrpSpPr/>
+          <p:nvPr/>
+        </p:nvGrpSpPr>
+        <p:grpSpPr>
+          <a:xfrm>
+            <a:off x="3385824" y="267656"/>
+            <a:ext cx="5943601" cy="5943601"/>
+            <a:chOff x="3385824" y="267656"/>
+            <a:chExt cx="5943601" cy="5943601"/>
+          </a:xfrm>
+        </p:grpSpPr>
+        <p:sp>
+          <p:nvSpPr>
+            <p:cNvPr id="2" name="Rectangle: Rounded Corners 1">
+              <a:extLst>
+                <a:ext uri="{FF2B5EF4-FFF2-40B4-BE49-F238E27FC236}">
+                  <a16:creationId xmlns:a16="http://schemas.microsoft.com/office/drawing/2014/main" id="{71B80B56-C2BF-5D39-0F5B-FAD6BBEF0513}"/>
+                </a:ext>
+              </a:extLst>
+            </p:cNvPr>
+            <p:cNvSpPr/>
+            <p:nvPr/>
+          </p:nvSpPr>
+          <p:spPr>
+            <a:xfrm>
+              <a:off x="3385825" y="267657"/>
+              <a:ext cx="5943600" cy="5943600"/>
+            </a:xfrm>
+            <a:prstGeom prst="roundRect">
+              <a:avLst/>
+            </a:prstGeom>
+            <a:solidFill>
+              <a:srgbClr val="FFB207"/>
+            </a:solidFill>
+            <a:ln>
+              <a:noFill/>
+            </a:ln>
+          </p:spPr>
+          <p:style>
+            <a:lnRef idx="2">
+              <a:schemeClr val="accent1">
+                <a:shade val="15000"/>
+              </a:schemeClr>
+            </a:lnRef>
+            <a:fillRef idx="1">
+              <a:schemeClr val="accent1"/>
+            </a:fillRef>
+            <a:effectRef idx="0">
+              <a:schemeClr val="accent1"/>
+            </a:effectRef>
+            <a:fontRef idx="minor">
+              <a:schemeClr val="lt1"/>
+            </a:fontRef>
+          </p:style>
+          <p:txBody>
+            <a:bodyPr rtlCol="0" anchor="ctr"/>
+            <a:lstStyle/>
+            <a:p>
+              <a:pPr algn="ctr"/>
+              <a:endParaRPr lang="en-US" dirty="0"/>
+            </a:p>
+          </p:txBody>
+        </p:sp>
+        <p:pic>
+          <p:nvPicPr>
+            <p:cNvPr id="4" name="Graphic 3" descr="Butterfly with solid fill">
+              <a:extLst>
+                <a:ext uri="{FF2B5EF4-FFF2-40B4-BE49-F238E27FC236}">
+                  <a16:creationId xmlns:a16="http://schemas.microsoft.com/office/drawing/2014/main" id="{442C6020-46E2-F92E-CEE3-6F98D1FB04B6}"/>
+                </a:ext>
+              </a:extLst>
+            </p:cNvPr>
+            <p:cNvPicPr>
+              <a:picLocks noChangeAspect="1"/>
+            </p:cNvPicPr>
+            <p:nvPr/>
+          </p:nvPicPr>
+          <p:blipFill>
+            <a:blip r:embed="rId2">
+              <a:extLst>
+                <a:ext uri="{96DAC541-7B7A-43D3-8B79-37D633B846F1}">
+                  <asvg:svgBlip xmlns:asvg="http://schemas.microsoft.com/office/drawing/2016/SVG/main" r:embed="rId3"/>
+                </a:ext>
+              </a:extLst>
+            </a:blip>
+            <a:stretch>
+              <a:fillRect/>
+            </a:stretch>
+          </p:blipFill>
+          <p:spPr>
+            <a:xfrm>
+              <a:off x="3385824" y="267656"/>
+              <a:ext cx="5943599" cy="5943599"/>
+            </a:xfrm>
+            <a:prstGeom prst="rect">
+              <a:avLst/>
+            </a:prstGeom>
+          </p:spPr>
+        </p:pic>
+      </p:grpSp>
+    </p:spTree>
+    <p:extLst>
+      <p:ext uri="{BB962C8B-B14F-4D97-AF65-F5344CB8AC3E}">
+        <p14:creationId xmlns:p14="http://schemas.microsoft.com/office/powerpoint/2010/main" val="4243369362"/>
+      </p:ext>
+    </p:extLst>
+  </p:cSld>
+  <p:clrMapOvr>
+    <a:masterClrMapping/>
+  </p:clrMapOvr>
+</p:sld>
+</file>
+
+<file path=ppt/slides/slide26.xml><?xml version="1.0" encoding="utf-8"?>
+<p:sld xmlns:a="http://schemas.openxmlformats.org/drawingml/2006/main" xmlns:r="http://schemas.openxmlformats.org/officeDocument/2006/relationships" xmlns:p="http://schemas.openxmlformats.org/presentationml/2006/main">
+  <p:cSld>
+    <p:spTree>
+      <p:nvGrpSpPr>
+        <p:cNvPr id="1" name=""/>
+        <p:cNvGrpSpPr/>
+        <p:nvPr/>
+      </p:nvGrpSpPr>
+      <p:grpSpPr>
+        <a:xfrm>
+          <a:off x="0" y="0"/>
+          <a:ext cx="0" cy="0"/>
+          <a:chOff x="0" y="0"/>
+          <a:chExt cx="0" cy="0"/>
+        </a:xfrm>
+      </p:grpSpPr>
       <p:sp>
         <p:nvSpPr>
-          <p:cNvPr id="2" name="Rectangle: Rounded Corners 1">
+          <p:cNvPr id="16" name="Rectangle 15">
             <a:extLst>
               <a:ext uri="{FF2B5EF4-FFF2-40B4-BE49-F238E27FC236}">
-                <a16:creationId xmlns:a16="http://schemas.microsoft.com/office/drawing/2014/main" id="{552E8FE8-C3A1-6799-11FC-02DFAC78F7AD}"/>
+                <a16:creationId xmlns:a16="http://schemas.microsoft.com/office/drawing/2014/main" id="{2B9ED766-6A0E-4BD8-9A1A-6F52BE664EBE}"/>
               </a:ext>
             </a:extLst>
           </p:cNvPr>
@@ -27682,18 +28250,12 @@
         </p:nvSpPr>
         <p:spPr>
           <a:xfrm>
-            <a:off x="3385825" y="267657"/>
-            <a:ext cx="5943600" cy="5943600"/>
+            <a:off x="9407567" y="770431"/>
+            <a:ext cx="1828800" cy="452176"/>
           </a:xfrm>
-          <a:prstGeom prst="roundRect">
+          <a:prstGeom prst="rect">
             <a:avLst/>
           </a:prstGeom>
-          <a:solidFill>
-            <a:srgbClr val="FFB207"/>
-          </a:solidFill>
-          <a:ln>
-            <a:noFill/>
-          </a:ln>
         </p:spPr>
         <p:style>
           <a:lnRef idx="2">
@@ -27716,50 +28278,476 @@
           <a:lstStyle/>
           <a:p>
             <a:pPr algn="ctr"/>
-            <a:endParaRPr lang="en-US" dirty="0"/>
+            <a:endParaRPr lang="en-US"/>
           </a:p>
         </p:txBody>
       </p:sp>
-      <p:pic>
-        <p:nvPicPr>
-          <p:cNvPr id="4" name="Graphic 3" descr="Cat with solid fill">
+      <p:grpSp>
+        <p:nvGrpSpPr>
+          <p:cNvPr id="18" name="Group 17">
             <a:extLst>
               <a:ext uri="{FF2B5EF4-FFF2-40B4-BE49-F238E27FC236}">
-                <a16:creationId xmlns:a16="http://schemas.microsoft.com/office/drawing/2014/main" id="{46C2A6DD-6472-134A-D0AF-D17382F41CCA}"/>
+                <a16:creationId xmlns:a16="http://schemas.microsoft.com/office/drawing/2014/main" id="{4335836D-195A-0A3D-394B-91A796EE4AD5}"/>
               </a:ext>
             </a:extLst>
           </p:cNvPr>
-          <p:cNvPicPr>
-            <a:picLocks noChangeAspect="1"/>
-          </p:cNvPicPr>
+          <p:cNvGrpSpPr/>
           <p:nvPr/>
-        </p:nvPicPr>
-        <p:blipFill>
-          <a:blip r:embed="rId2">
-            <a:extLst>
-              <a:ext uri="{96DAC541-7B7A-43D3-8B79-37D633B846F1}">
-                <asvg:svgBlip xmlns:asvg="http://schemas.microsoft.com/office/drawing/2016/SVG/main" r:embed="rId3"/>
-              </a:ext>
-            </a:extLst>
-          </a:blip>
-          <a:stretch>
-            <a:fillRect/>
-          </a:stretch>
-        </p:blipFill>
-        <p:spPr>
+        </p:nvGrpSpPr>
+        <p:grpSpPr>
           <a:xfrm>
-            <a:off x="3385825" y="267657"/>
-            <a:ext cx="5943600" cy="5943600"/>
+            <a:off x="1831729" y="1688962"/>
+            <a:ext cx="6160192" cy="1841860"/>
+            <a:chOff x="1831729" y="1688962"/>
+            <a:chExt cx="6160192" cy="1841860"/>
           </a:xfrm>
-          <a:prstGeom prst="rect">
-            <a:avLst/>
-          </a:prstGeom>
-        </p:spPr>
-      </p:pic>
+        </p:grpSpPr>
+        <p:sp>
+          <p:nvSpPr>
+            <p:cNvPr id="3" name="Flowchart: Alternate Process 2">
+              <a:extLst>
+                <a:ext uri="{FF2B5EF4-FFF2-40B4-BE49-F238E27FC236}">
+                  <a16:creationId xmlns:a16="http://schemas.microsoft.com/office/drawing/2014/main" id="{9CB08B62-6E8F-E774-6E85-C77961F75D23}"/>
+                </a:ext>
+              </a:extLst>
+            </p:cNvPr>
+            <p:cNvSpPr/>
+            <p:nvPr/>
+          </p:nvSpPr>
+          <p:spPr>
+            <a:xfrm>
+              <a:off x="2170443" y="2682910"/>
+              <a:ext cx="5486400" cy="274320"/>
+            </a:xfrm>
+            <a:prstGeom prst="flowChartAlternateProcess">
+              <a:avLst/>
+            </a:prstGeom>
+            <a:solidFill>
+              <a:schemeClr val="accent4">
+                <a:lumMod val="60000"/>
+                <a:lumOff val="40000"/>
+              </a:schemeClr>
+            </a:solidFill>
+            <a:ln>
+              <a:noFill/>
+            </a:ln>
+          </p:spPr>
+          <p:style>
+            <a:lnRef idx="2">
+              <a:schemeClr val="accent4">
+                <a:shade val="15000"/>
+              </a:schemeClr>
+            </a:lnRef>
+            <a:fillRef idx="1">
+              <a:schemeClr val="accent4"/>
+            </a:fillRef>
+            <a:effectRef idx="0">
+              <a:schemeClr val="accent4"/>
+            </a:effectRef>
+            <a:fontRef idx="minor">
+              <a:schemeClr val="lt1"/>
+            </a:fontRef>
+          </p:style>
+          <p:txBody>
+            <a:bodyPr rtlCol="0" anchor="ctr"/>
+            <a:lstStyle/>
+            <a:p>
+              <a:pPr algn="ctr"/>
+              <a:endParaRPr lang="en-US"/>
+            </a:p>
+          </p:txBody>
+        </p:sp>
+        <p:sp>
+          <p:nvSpPr>
+            <p:cNvPr id="4" name="TextBox 3">
+              <a:extLst>
+                <a:ext uri="{FF2B5EF4-FFF2-40B4-BE49-F238E27FC236}">
+                  <a16:creationId xmlns:a16="http://schemas.microsoft.com/office/drawing/2014/main" id="{24621168-D725-AC34-F2E0-DA6AE905990D}"/>
+                </a:ext>
+              </a:extLst>
+            </p:cNvPr>
+            <p:cNvSpPr txBox="1"/>
+            <p:nvPr/>
+          </p:nvSpPr>
+          <p:spPr>
+            <a:xfrm>
+              <a:off x="1831729" y="3133077"/>
+              <a:ext cx="680636" cy="369332"/>
+            </a:xfrm>
+            <a:prstGeom prst="rect">
+              <a:avLst/>
+            </a:prstGeom>
+            <a:noFill/>
+          </p:spPr>
+          <p:txBody>
+            <a:bodyPr wrap="none" rtlCol="0">
+              <a:spAutoFit/>
+            </a:bodyPr>
+            <a:lstStyle/>
+            <a:p>
+              <a:r>
+                <a:rPr lang="en-US" b="1" dirty="0"/>
+                <a:t>Least</a:t>
+              </a:r>
+            </a:p>
+          </p:txBody>
+        </p:sp>
+        <p:cxnSp>
+          <p:nvCxnSpPr>
+            <p:cNvPr id="7" name="Straight Connector 6">
+              <a:extLst>
+                <a:ext uri="{FF2B5EF4-FFF2-40B4-BE49-F238E27FC236}">
+                  <a16:creationId xmlns:a16="http://schemas.microsoft.com/office/drawing/2014/main" id="{DA77D504-D32D-5464-1716-2EA5D05B8DC3}"/>
+                </a:ext>
+              </a:extLst>
+            </p:cNvPr>
+            <p:cNvCxnSpPr/>
+            <p:nvPr/>
+          </p:nvCxnSpPr>
+          <p:spPr>
+            <a:xfrm>
+              <a:off x="2170443" y="2481943"/>
+              <a:ext cx="0" cy="592853"/>
+            </a:xfrm>
+            <a:prstGeom prst="line">
+              <a:avLst/>
+            </a:prstGeom>
+            <a:ln w="28575"/>
+          </p:spPr>
+          <p:style>
+            <a:lnRef idx="1">
+              <a:schemeClr val="dk1"/>
+            </a:lnRef>
+            <a:fillRef idx="0">
+              <a:schemeClr val="dk1"/>
+            </a:fillRef>
+            <a:effectRef idx="0">
+              <a:schemeClr val="dk1"/>
+            </a:effectRef>
+            <a:fontRef idx="minor">
+              <a:schemeClr val="tx1"/>
+            </a:fontRef>
+          </p:style>
+        </p:cxnSp>
+        <p:grpSp>
+          <p:nvGrpSpPr>
+            <p:cNvPr id="9" name="Group 8">
+              <a:extLst>
+                <a:ext uri="{FF2B5EF4-FFF2-40B4-BE49-F238E27FC236}">
+                  <a16:creationId xmlns:a16="http://schemas.microsoft.com/office/drawing/2014/main" id="{B8ED0AF5-C6E5-A181-FC71-C6F3649F9D21}"/>
+                </a:ext>
+              </a:extLst>
+            </p:cNvPr>
+            <p:cNvGrpSpPr/>
+            <p:nvPr/>
+          </p:nvGrpSpPr>
+          <p:grpSpPr>
+            <a:xfrm>
+              <a:off x="5494137" y="2481943"/>
+              <a:ext cx="700961" cy="1023759"/>
+              <a:chOff x="9451418" y="2507063"/>
+              <a:chExt cx="700961" cy="1023759"/>
+            </a:xfrm>
+          </p:grpSpPr>
+          <p:sp>
+            <p:nvSpPr>
+              <p:cNvPr id="5" name="TextBox 4">
+                <a:extLst>
+                  <a:ext uri="{FF2B5EF4-FFF2-40B4-BE49-F238E27FC236}">
+                    <a16:creationId xmlns:a16="http://schemas.microsoft.com/office/drawing/2014/main" id="{431D8D67-812F-FEB8-F3FF-81CD1D4DEDE2}"/>
+                  </a:ext>
+                </a:extLst>
+              </p:cNvPr>
+              <p:cNvSpPr txBox="1"/>
+              <p:nvPr/>
+            </p:nvSpPr>
+            <p:spPr>
+              <a:xfrm>
+                <a:off x="9451418" y="3161490"/>
+                <a:ext cx="700961" cy="369332"/>
+              </a:xfrm>
+              <a:prstGeom prst="rect">
+                <a:avLst/>
+              </a:prstGeom>
+              <a:noFill/>
+            </p:spPr>
+            <p:txBody>
+              <a:bodyPr wrap="none" rtlCol="0">
+                <a:spAutoFit/>
+              </a:bodyPr>
+              <a:lstStyle/>
+              <a:p>
+                <a:r>
+                  <a:rPr lang="en-US" b="1" dirty="0"/>
+                  <a:t>Fairly</a:t>
+                </a:r>
+              </a:p>
+            </p:txBody>
+          </p:sp>
+          <p:cxnSp>
+            <p:nvCxnSpPr>
+              <p:cNvPr id="8" name="Straight Connector 7">
+                <a:extLst>
+                  <a:ext uri="{FF2B5EF4-FFF2-40B4-BE49-F238E27FC236}">
+                    <a16:creationId xmlns:a16="http://schemas.microsoft.com/office/drawing/2014/main" id="{B6EA61A2-A115-E277-18CF-7F4717E4C38F}"/>
+                  </a:ext>
+                </a:extLst>
+              </p:cNvPr>
+              <p:cNvCxnSpPr/>
+              <p:nvPr/>
+            </p:nvCxnSpPr>
+            <p:spPr>
+              <a:xfrm>
+                <a:off x="9785324" y="2507063"/>
+                <a:ext cx="0" cy="592853"/>
+              </a:xfrm>
+              <a:prstGeom prst="line">
+                <a:avLst/>
+              </a:prstGeom>
+              <a:ln w="28575"/>
+            </p:spPr>
+            <p:style>
+              <a:lnRef idx="1">
+                <a:schemeClr val="dk1"/>
+              </a:lnRef>
+              <a:fillRef idx="0">
+                <a:schemeClr val="dk1"/>
+              </a:fillRef>
+              <a:effectRef idx="0">
+                <a:schemeClr val="dk1"/>
+              </a:effectRef>
+              <a:fontRef idx="minor">
+                <a:schemeClr val="tx1"/>
+              </a:fontRef>
+            </p:style>
+          </p:cxnSp>
+        </p:grpSp>
+        <p:grpSp>
+          <p:nvGrpSpPr>
+            <p:cNvPr id="10" name="Group 9">
+              <a:extLst>
+                <a:ext uri="{FF2B5EF4-FFF2-40B4-BE49-F238E27FC236}">
+                  <a16:creationId xmlns:a16="http://schemas.microsoft.com/office/drawing/2014/main" id="{936AF8CF-98FC-DE4A-BEF8-177B57934CBB}"/>
+                </a:ext>
+              </a:extLst>
+            </p:cNvPr>
+            <p:cNvGrpSpPr/>
+            <p:nvPr/>
+          </p:nvGrpSpPr>
+          <p:grpSpPr>
+            <a:xfrm>
+              <a:off x="3439282" y="2481943"/>
+              <a:ext cx="1138004" cy="1020466"/>
+              <a:chOff x="9225363" y="2507063"/>
+              <a:chExt cx="1138004" cy="1020466"/>
+            </a:xfrm>
+          </p:grpSpPr>
+          <p:sp>
+            <p:nvSpPr>
+              <p:cNvPr id="11" name="TextBox 10">
+                <a:extLst>
+                  <a:ext uri="{FF2B5EF4-FFF2-40B4-BE49-F238E27FC236}">
+                    <a16:creationId xmlns:a16="http://schemas.microsoft.com/office/drawing/2014/main" id="{8D95FDE3-4916-8036-AD57-C1E4358A63D1}"/>
+                  </a:ext>
+                </a:extLst>
+              </p:cNvPr>
+              <p:cNvSpPr txBox="1"/>
+              <p:nvPr/>
+            </p:nvSpPr>
+            <p:spPr>
+              <a:xfrm>
+                <a:off x="9225363" y="3158197"/>
+                <a:ext cx="1138004" cy="369332"/>
+              </a:xfrm>
+              <a:prstGeom prst="rect">
+                <a:avLst/>
+              </a:prstGeom>
+              <a:noFill/>
+            </p:spPr>
+            <p:txBody>
+              <a:bodyPr wrap="none" rtlCol="0">
+                <a:spAutoFit/>
+              </a:bodyPr>
+              <a:lstStyle/>
+              <a:p>
+                <a:r>
+                  <a:rPr lang="en-US" b="1" dirty="0"/>
+                  <a:t>Somehow</a:t>
+                </a:r>
+              </a:p>
+            </p:txBody>
+          </p:sp>
+          <p:cxnSp>
+            <p:nvCxnSpPr>
+              <p:cNvPr id="12" name="Straight Connector 11">
+                <a:extLst>
+                  <a:ext uri="{FF2B5EF4-FFF2-40B4-BE49-F238E27FC236}">
+                    <a16:creationId xmlns:a16="http://schemas.microsoft.com/office/drawing/2014/main" id="{70B2F553-1EF5-0772-BAE7-04D3FDA25DF1}"/>
+                  </a:ext>
+                </a:extLst>
+              </p:cNvPr>
+              <p:cNvCxnSpPr/>
+              <p:nvPr/>
+            </p:nvCxnSpPr>
+            <p:spPr>
+              <a:xfrm>
+                <a:off x="9785324" y="2507063"/>
+                <a:ext cx="0" cy="592853"/>
+              </a:xfrm>
+              <a:prstGeom prst="line">
+                <a:avLst/>
+              </a:prstGeom>
+              <a:ln w="28575"/>
+            </p:spPr>
+            <p:style>
+              <a:lnRef idx="1">
+                <a:schemeClr val="dk1"/>
+              </a:lnRef>
+              <a:fillRef idx="0">
+                <a:schemeClr val="dk1"/>
+              </a:fillRef>
+              <a:effectRef idx="0">
+                <a:schemeClr val="dk1"/>
+              </a:effectRef>
+              <a:fontRef idx="minor">
+                <a:schemeClr val="tx1"/>
+              </a:fontRef>
+            </p:style>
+          </p:cxnSp>
+        </p:grpSp>
+        <p:grpSp>
+          <p:nvGrpSpPr>
+            <p:cNvPr id="13" name="Group 12">
+              <a:extLst>
+                <a:ext uri="{FF2B5EF4-FFF2-40B4-BE49-F238E27FC236}">
+                  <a16:creationId xmlns:a16="http://schemas.microsoft.com/office/drawing/2014/main" id="{D5B53119-6D32-E25E-ED12-37DAC8BF327F}"/>
+                </a:ext>
+              </a:extLst>
+            </p:cNvPr>
+            <p:cNvGrpSpPr/>
+            <p:nvPr/>
+          </p:nvGrpSpPr>
+          <p:grpSpPr>
+            <a:xfrm>
+              <a:off x="7312889" y="2507063"/>
+              <a:ext cx="679032" cy="1023759"/>
+              <a:chOff x="9451418" y="2507063"/>
+              <a:chExt cx="679032" cy="1023759"/>
+            </a:xfrm>
+          </p:grpSpPr>
+          <p:sp>
+            <p:nvSpPr>
+              <p:cNvPr id="14" name="TextBox 13">
+                <a:extLst>
+                  <a:ext uri="{FF2B5EF4-FFF2-40B4-BE49-F238E27FC236}">
+                    <a16:creationId xmlns:a16="http://schemas.microsoft.com/office/drawing/2014/main" id="{B0CBA9CC-52BE-B635-4FB7-D696EFFE6BE2}"/>
+                  </a:ext>
+                </a:extLst>
+              </p:cNvPr>
+              <p:cNvSpPr txBox="1"/>
+              <p:nvPr/>
+            </p:nvSpPr>
+            <p:spPr>
+              <a:xfrm>
+                <a:off x="9451418" y="3161490"/>
+                <a:ext cx="679032" cy="369332"/>
+              </a:xfrm>
+              <a:prstGeom prst="rect">
+                <a:avLst/>
+              </a:prstGeom>
+              <a:noFill/>
+            </p:spPr>
+            <p:txBody>
+              <a:bodyPr wrap="none" rtlCol="0">
+                <a:spAutoFit/>
+              </a:bodyPr>
+              <a:lstStyle/>
+              <a:p>
+                <a:r>
+                  <a:rPr lang="en-US" b="1" dirty="0"/>
+                  <a:t>Most</a:t>
+                </a:r>
+              </a:p>
+            </p:txBody>
+          </p:sp>
+          <p:cxnSp>
+            <p:nvCxnSpPr>
+              <p:cNvPr id="15" name="Straight Connector 14">
+                <a:extLst>
+                  <a:ext uri="{FF2B5EF4-FFF2-40B4-BE49-F238E27FC236}">
+                    <a16:creationId xmlns:a16="http://schemas.microsoft.com/office/drawing/2014/main" id="{E4E3B1A4-AB93-2EE0-A207-0A6C9A9C3181}"/>
+                  </a:ext>
+                </a:extLst>
+              </p:cNvPr>
+              <p:cNvCxnSpPr/>
+              <p:nvPr/>
+            </p:nvCxnSpPr>
+            <p:spPr>
+              <a:xfrm>
+                <a:off x="9785324" y="2507063"/>
+                <a:ext cx="0" cy="592853"/>
+              </a:xfrm>
+              <a:prstGeom prst="line">
+                <a:avLst/>
+              </a:prstGeom>
+              <a:ln w="28575"/>
+            </p:spPr>
+            <p:style>
+              <a:lnRef idx="1">
+                <a:schemeClr val="dk1"/>
+              </a:lnRef>
+              <a:fillRef idx="0">
+                <a:schemeClr val="dk1"/>
+              </a:fillRef>
+              <a:effectRef idx="0">
+                <a:schemeClr val="dk1"/>
+              </a:effectRef>
+              <a:fontRef idx="minor">
+                <a:schemeClr val="tx1"/>
+              </a:fontRef>
+            </p:style>
+          </p:cxnSp>
+        </p:grpSp>
+        <p:sp>
+          <p:nvSpPr>
+            <p:cNvPr id="17" name="TextBox 16">
+              <a:extLst>
+                <a:ext uri="{FF2B5EF4-FFF2-40B4-BE49-F238E27FC236}">
+                  <a16:creationId xmlns:a16="http://schemas.microsoft.com/office/drawing/2014/main" id="{AE8F9DC2-DF25-A894-13CD-DDB6AC3E36EC}"/>
+                </a:ext>
+              </a:extLst>
+            </p:cNvPr>
+            <p:cNvSpPr txBox="1"/>
+            <p:nvPr/>
+          </p:nvSpPr>
+          <p:spPr>
+            <a:xfrm>
+              <a:off x="3241103" y="1688962"/>
+              <a:ext cx="3513719" cy="461665"/>
+            </a:xfrm>
+            <a:prstGeom prst="rect">
+              <a:avLst/>
+            </a:prstGeom>
+            <a:noFill/>
+          </p:spPr>
+          <p:txBody>
+            <a:bodyPr wrap="none" rtlCol="0">
+              <a:spAutoFit/>
+            </a:bodyPr>
+            <a:lstStyle/>
+            <a:p>
+              <a:r>
+                <a:rPr lang="en-US" sz="2400" dirty="0"/>
+                <a:t>Scale of Out-of-Order-ness</a:t>
+              </a:r>
+            </a:p>
+          </p:txBody>
+        </p:sp>
+      </p:grpSp>
     </p:spTree>
     <p:extLst>
       <p:ext uri="{BB962C8B-B14F-4D97-AF65-F5344CB8AC3E}">
-        <p14:creationId xmlns:p14="http://schemas.microsoft.com/office/powerpoint/2010/main" val="3002816324"/>
+        <p14:creationId xmlns:p14="http://schemas.microsoft.com/office/powerpoint/2010/main" val="3926318059"/>
       </p:ext>
     </p:extLst>
   </p:cSld>

</xml_diff>

<commit_message>
still working on the highlight
</commit_message>
<xml_diff>
--- a/assets/Symbols.pptx
+++ b/assets/Symbols.pptx
@@ -5,7 +5,7 @@
     <p:sldMasterId id="2147483648" r:id="rId1"/>
   </p:sldMasterIdLst>
   <p:notesMasterIdLst>
-    <p:notesMasterId r:id="rId28"/>
+    <p:notesMasterId r:id="rId29"/>
   </p:notesMasterIdLst>
   <p:sldIdLst>
     <p:sldId id="256" r:id="rId2"/>
@@ -34,6 +34,7 @@
     <p:sldId id="279" r:id="rId25"/>
     <p:sldId id="280" r:id="rId26"/>
     <p:sldId id="281" r:id="rId27"/>
+    <p:sldId id="282" r:id="rId28"/>
   </p:sldIdLst>
   <p:sldSz cx="12192000" cy="6858000"/>
   <p:notesSz cx="6858000" cy="9144000"/>
@@ -175,6 +176,7 @@
         <p14:section name="teaching" id="{574305F8-BBA4-41A2-A7BE-244E75D0167E}">
           <p14:sldIdLst>
             <p14:sldId id="281"/>
+            <p14:sldId id="282"/>
           </p14:sldIdLst>
         </p14:section>
       </p14:sectionLst>
@@ -268,7 +270,7 @@
           <a:p>
             <a:fld id="{4CE80203-1554-4B47-9518-27150A8A6789}" type="datetimeFigureOut">
               <a:rPr lang="en-US" smtClean="0"/>
-              <a:t>11/4/2024</a:t>
+              <a:t>12/7/2024</a:t>
             </a:fld>
             <a:endParaRPr lang="en-US"/>
           </a:p>
@@ -619,6 +621,90 @@
 </p:notes>
 </file>
 
+<file path=ppt/notesSlides/notesSlide2.xml><?xml version="1.0" encoding="utf-8"?>
+<p:notes xmlns:a="http://schemas.openxmlformats.org/drawingml/2006/main" xmlns:r="http://schemas.openxmlformats.org/officeDocument/2006/relationships" xmlns:p="http://schemas.openxmlformats.org/presentationml/2006/main">
+  <p:cSld>
+    <p:spTree>
+      <p:nvGrpSpPr>
+        <p:cNvPr id="1" name=""/>
+        <p:cNvGrpSpPr/>
+        <p:nvPr/>
+      </p:nvGrpSpPr>
+      <p:grpSpPr>
+        <a:xfrm>
+          <a:off x="0" y="0"/>
+          <a:ext cx="0" cy="0"/>
+          <a:chOff x="0" y="0"/>
+          <a:chExt cx="0" cy="0"/>
+        </a:xfrm>
+      </p:grpSpPr>
+      <p:sp>
+        <p:nvSpPr>
+          <p:cNvPr id="2" name="Slide Image Placeholder 1"/>
+          <p:cNvSpPr>
+            <a:spLocks noGrp="1" noRot="1" noChangeAspect="1"/>
+          </p:cNvSpPr>
+          <p:nvPr>
+            <p:ph type="sldImg"/>
+          </p:nvPr>
+        </p:nvSpPr>
+        <p:spPr/>
+      </p:sp>
+      <p:sp>
+        <p:nvSpPr>
+          <p:cNvPr id="3" name="Notes Placeholder 2"/>
+          <p:cNvSpPr>
+            <a:spLocks noGrp="1"/>
+          </p:cNvSpPr>
+          <p:nvPr>
+            <p:ph type="body" idx="1"/>
+          </p:nvPr>
+        </p:nvSpPr>
+        <p:spPr/>
+        <p:txBody>
+          <a:bodyPr/>
+          <a:lstStyle/>
+          <a:p>
+            <a:endParaRPr lang="en-US" dirty="0"/>
+          </a:p>
+        </p:txBody>
+      </p:sp>
+      <p:sp>
+        <p:nvSpPr>
+          <p:cNvPr id="4" name="Slide Number Placeholder 3"/>
+          <p:cNvSpPr>
+            <a:spLocks noGrp="1"/>
+          </p:cNvSpPr>
+          <p:nvPr>
+            <p:ph type="sldNum" sz="quarter" idx="5"/>
+          </p:nvPr>
+        </p:nvSpPr>
+        <p:spPr/>
+        <p:txBody>
+          <a:bodyPr/>
+          <a:lstStyle/>
+          <a:p>
+            <a:fld id="{81F5EC15-3DE6-4FF5-A1BC-711E74F64827}" type="slidenum">
+              <a:rPr lang="en-US" smtClean="0"/>
+              <a:t>27</a:t>
+            </a:fld>
+            <a:endParaRPr lang="en-US"/>
+          </a:p>
+        </p:txBody>
+      </p:sp>
+    </p:spTree>
+    <p:extLst>
+      <p:ext uri="{BB962C8B-B14F-4D97-AF65-F5344CB8AC3E}">
+        <p14:creationId xmlns:p14="http://schemas.microsoft.com/office/powerpoint/2010/main" val="2689391870"/>
+      </p:ext>
+    </p:extLst>
+  </p:cSld>
+  <p:clrMapOvr>
+    <a:masterClrMapping/>
+  </p:clrMapOvr>
+</p:notes>
+</file>
+
 <file path=ppt/slideLayouts/slideLayout1.xml><?xml version="1.0" encoding="utf-8"?>
 <p:sldLayout xmlns:a="http://schemas.openxmlformats.org/drawingml/2006/main" xmlns:r="http://schemas.openxmlformats.org/officeDocument/2006/relationships" xmlns:p="http://schemas.openxmlformats.org/presentationml/2006/main" type="title" preserve="1">
   <p:cSld name="Title Slide">
@@ -766,7 +852,7 @@
           <a:p>
             <a:fld id="{573B54DB-A8B2-4954-9DC1-E1741E23BC56}" type="datetimeFigureOut">
               <a:rPr lang="en-US" smtClean="0"/>
-              <a:t>11/4/2024</a:t>
+              <a:t>12/7/2024</a:t>
             </a:fld>
             <a:endParaRPr lang="en-US"/>
           </a:p>
@@ -964,7 +1050,7 @@
           <a:p>
             <a:fld id="{573B54DB-A8B2-4954-9DC1-E1741E23BC56}" type="datetimeFigureOut">
               <a:rPr lang="en-US" smtClean="0"/>
-              <a:t>11/4/2024</a:t>
+              <a:t>12/7/2024</a:t>
             </a:fld>
             <a:endParaRPr lang="en-US"/>
           </a:p>
@@ -1172,7 +1258,7 @@
           <a:p>
             <a:fld id="{573B54DB-A8B2-4954-9DC1-E1741E23BC56}" type="datetimeFigureOut">
               <a:rPr lang="en-US" smtClean="0"/>
-              <a:t>11/4/2024</a:t>
+              <a:t>12/7/2024</a:t>
             </a:fld>
             <a:endParaRPr lang="en-US"/>
           </a:p>
@@ -1370,7 +1456,7 @@
           <a:p>
             <a:fld id="{573B54DB-A8B2-4954-9DC1-E1741E23BC56}" type="datetimeFigureOut">
               <a:rPr lang="en-US" smtClean="0"/>
-              <a:t>11/4/2024</a:t>
+              <a:t>12/7/2024</a:t>
             </a:fld>
             <a:endParaRPr lang="en-US"/>
           </a:p>
@@ -1645,7 +1731,7 @@
           <a:p>
             <a:fld id="{573B54DB-A8B2-4954-9DC1-E1741E23BC56}" type="datetimeFigureOut">
               <a:rPr lang="en-US" smtClean="0"/>
-              <a:t>11/4/2024</a:t>
+              <a:t>12/7/2024</a:t>
             </a:fld>
             <a:endParaRPr lang="en-US"/>
           </a:p>
@@ -1910,7 +1996,7 @@
           <a:p>
             <a:fld id="{573B54DB-A8B2-4954-9DC1-E1741E23BC56}" type="datetimeFigureOut">
               <a:rPr lang="en-US" smtClean="0"/>
-              <a:t>11/4/2024</a:t>
+              <a:t>12/7/2024</a:t>
             </a:fld>
             <a:endParaRPr lang="en-US"/>
           </a:p>
@@ -2322,7 +2408,7 @@
           <a:p>
             <a:fld id="{573B54DB-A8B2-4954-9DC1-E1741E23BC56}" type="datetimeFigureOut">
               <a:rPr lang="en-US" smtClean="0"/>
-              <a:t>11/4/2024</a:t>
+              <a:t>12/7/2024</a:t>
             </a:fld>
             <a:endParaRPr lang="en-US"/>
           </a:p>
@@ -2463,7 +2549,7 @@
           <a:p>
             <a:fld id="{573B54DB-A8B2-4954-9DC1-E1741E23BC56}" type="datetimeFigureOut">
               <a:rPr lang="en-US" smtClean="0"/>
-              <a:t>11/4/2024</a:t>
+              <a:t>12/7/2024</a:t>
             </a:fld>
             <a:endParaRPr lang="en-US"/>
           </a:p>
@@ -2576,7 +2662,7 @@
           <a:p>
             <a:fld id="{573B54DB-A8B2-4954-9DC1-E1741E23BC56}" type="datetimeFigureOut">
               <a:rPr lang="en-US" smtClean="0"/>
-              <a:t>11/4/2024</a:t>
+              <a:t>12/7/2024</a:t>
             </a:fld>
             <a:endParaRPr lang="en-US"/>
           </a:p>
@@ -2887,7 +2973,7 @@
           <a:p>
             <a:fld id="{573B54DB-A8B2-4954-9DC1-E1741E23BC56}" type="datetimeFigureOut">
               <a:rPr lang="en-US" smtClean="0"/>
-              <a:t>11/4/2024</a:t>
+              <a:t>12/7/2024</a:t>
             </a:fld>
             <a:endParaRPr lang="en-US"/>
           </a:p>
@@ -3175,7 +3261,7 @@
           <a:p>
             <a:fld id="{573B54DB-A8B2-4954-9DC1-E1741E23BC56}" type="datetimeFigureOut">
               <a:rPr lang="en-US" smtClean="0"/>
-              <a:t>11/4/2024</a:t>
+              <a:t>12/7/2024</a:t>
             </a:fld>
             <a:endParaRPr lang="en-US"/>
           </a:p>
@@ -3416,7 +3502,7 @@
           <a:p>
             <a:fld id="{573B54DB-A8B2-4954-9DC1-E1741E23BC56}" type="datetimeFigureOut">
               <a:rPr lang="en-US" smtClean="0"/>
-              <a:t>11/4/2024</a:t>
+              <a:t>12/7/2024</a:t>
             </a:fld>
             <a:endParaRPr lang="en-US"/>
           </a:p>
@@ -28757,6 +28843,233 @@
 </p:sld>
 </file>
 
+<file path=ppt/slides/slide27.xml><?xml version="1.0" encoding="utf-8"?>
+<p:sld xmlns:a="http://schemas.openxmlformats.org/drawingml/2006/main" xmlns:r="http://schemas.openxmlformats.org/officeDocument/2006/relationships" xmlns:p="http://schemas.openxmlformats.org/presentationml/2006/main">
+  <p:cSld>
+    <p:bg>
+      <p:bgPr>
+        <a:solidFill>
+          <a:schemeClr val="bg1"/>
+        </a:solidFill>
+        <a:effectLst/>
+      </p:bgPr>
+    </p:bg>
+    <p:spTree>
+      <p:nvGrpSpPr>
+        <p:cNvPr id="1" name=""/>
+        <p:cNvGrpSpPr/>
+        <p:nvPr/>
+      </p:nvGrpSpPr>
+      <p:grpSpPr>
+        <a:xfrm>
+          <a:off x="0" y="0"/>
+          <a:ext cx="0" cy="0"/>
+          <a:chOff x="0" y="0"/>
+          <a:chExt cx="0" cy="0"/>
+        </a:xfrm>
+      </p:grpSpPr>
+      <p:grpSp>
+        <p:nvGrpSpPr>
+          <p:cNvPr id="12" name="Group 11">
+            <a:extLst>
+              <a:ext uri="{FF2B5EF4-FFF2-40B4-BE49-F238E27FC236}">
+                <a16:creationId xmlns:a16="http://schemas.microsoft.com/office/drawing/2014/main" id="{EA9E0CAA-F9CB-C1BD-9753-49190C247020}"/>
+              </a:ext>
+            </a:extLst>
+          </p:cNvPr>
+          <p:cNvGrpSpPr/>
+          <p:nvPr/>
+        </p:nvGrpSpPr>
+        <p:grpSpPr>
+          <a:xfrm>
+            <a:off x="2777064" y="706965"/>
+            <a:ext cx="5943600" cy="5943600"/>
+            <a:chOff x="2853264" y="-118535"/>
+            <a:chExt cx="5943600" cy="5943600"/>
+          </a:xfrm>
+        </p:grpSpPr>
+        <p:sp>
+          <p:nvSpPr>
+            <p:cNvPr id="11" name="Rectangle: Rounded Corners 10">
+              <a:extLst>
+                <a:ext uri="{FF2B5EF4-FFF2-40B4-BE49-F238E27FC236}">
+                  <a16:creationId xmlns:a16="http://schemas.microsoft.com/office/drawing/2014/main" id="{2F57EAEE-8633-8F5C-9BD8-EA66516899E5}"/>
+                </a:ext>
+              </a:extLst>
+            </p:cNvPr>
+            <p:cNvSpPr/>
+            <p:nvPr/>
+          </p:nvSpPr>
+          <p:spPr>
+            <a:xfrm flipH="1">
+              <a:off x="6891025" y="2058357"/>
+              <a:ext cx="1371600" cy="1371600"/>
+            </a:xfrm>
+            <a:prstGeom prst="roundRect">
+              <a:avLst>
+                <a:gd name="adj" fmla="val 25926"/>
+              </a:avLst>
+            </a:prstGeom>
+            <a:solidFill>
+              <a:srgbClr val="FFB207"/>
+            </a:solidFill>
+            <a:ln w="34925">
+              <a:noFill/>
+            </a:ln>
+            <a:effectLst/>
+            <a:scene3d>
+              <a:camera prst="orthographicFront">
+                <a:rot lat="0" lon="0" rev="0"/>
+              </a:camera>
+              <a:lightRig rig="contrasting" dir="t">
+                <a:rot lat="0" lon="0" rev="7800000"/>
+              </a:lightRig>
+            </a:scene3d>
+            <a:sp3d>
+              <a:bevelT w="139700" h="139700" prst="angle"/>
+            </a:sp3d>
+          </p:spPr>
+          <p:style>
+            <a:lnRef idx="2">
+              <a:schemeClr val="accent1">
+                <a:shade val="15000"/>
+              </a:schemeClr>
+            </a:lnRef>
+            <a:fillRef idx="1">
+              <a:schemeClr val="accent1"/>
+            </a:fillRef>
+            <a:effectRef idx="0">
+              <a:schemeClr val="accent1"/>
+            </a:effectRef>
+            <a:fontRef idx="minor">
+              <a:schemeClr val="lt1"/>
+            </a:fontRef>
+          </p:style>
+          <p:txBody>
+            <a:bodyPr rtlCol="0" anchor="ctr"/>
+            <a:lstStyle/>
+            <a:p>
+              <a:pPr algn="ctr"/>
+              <a:endParaRPr lang="en-US" dirty="0"/>
+            </a:p>
+          </p:txBody>
+        </p:sp>
+        <p:sp>
+          <p:nvSpPr>
+            <p:cNvPr id="7" name="Rectangle: Rounded Corners 6">
+              <a:extLst>
+                <a:ext uri="{FF2B5EF4-FFF2-40B4-BE49-F238E27FC236}">
+                  <a16:creationId xmlns:a16="http://schemas.microsoft.com/office/drawing/2014/main" id="{B726AF2D-DEC7-5B1A-099F-55E1312560C9}"/>
+                </a:ext>
+              </a:extLst>
+            </p:cNvPr>
+            <p:cNvSpPr/>
+            <p:nvPr/>
+          </p:nvSpPr>
+          <p:spPr>
+            <a:xfrm flipH="1">
+              <a:off x="3385825" y="2058357"/>
+              <a:ext cx="1371600" cy="1371600"/>
+            </a:xfrm>
+            <a:prstGeom prst="roundRect">
+              <a:avLst>
+                <a:gd name="adj" fmla="val 25926"/>
+              </a:avLst>
+            </a:prstGeom>
+            <a:solidFill>
+              <a:srgbClr val="FFB207"/>
+            </a:solidFill>
+            <a:ln w="34925">
+              <a:noFill/>
+            </a:ln>
+            <a:effectLst/>
+            <a:scene3d>
+              <a:camera prst="orthographicFront">
+                <a:rot lat="0" lon="0" rev="0"/>
+              </a:camera>
+              <a:lightRig rig="contrasting" dir="t">
+                <a:rot lat="0" lon="0" rev="7800000"/>
+              </a:lightRig>
+            </a:scene3d>
+            <a:sp3d>
+              <a:bevelT w="139700" h="139700" prst="angle"/>
+            </a:sp3d>
+          </p:spPr>
+          <p:style>
+            <a:lnRef idx="2">
+              <a:schemeClr val="accent1">
+                <a:shade val="15000"/>
+              </a:schemeClr>
+            </a:lnRef>
+            <a:fillRef idx="1">
+              <a:schemeClr val="accent1"/>
+            </a:fillRef>
+            <a:effectRef idx="0">
+              <a:schemeClr val="accent1"/>
+            </a:effectRef>
+            <a:fontRef idx="minor">
+              <a:schemeClr val="lt1"/>
+            </a:fontRef>
+          </p:style>
+          <p:txBody>
+            <a:bodyPr rtlCol="0" anchor="ctr"/>
+            <a:lstStyle/>
+            <a:p>
+              <a:pPr algn="ctr"/>
+              <a:endParaRPr lang="en-US" dirty="0"/>
+            </a:p>
+          </p:txBody>
+        </p:sp>
+        <p:pic>
+          <p:nvPicPr>
+            <p:cNvPr id="5" name="Graphic 4" descr="Scales of justice outline">
+              <a:extLst>
+                <a:ext uri="{FF2B5EF4-FFF2-40B4-BE49-F238E27FC236}">
+                  <a16:creationId xmlns:a16="http://schemas.microsoft.com/office/drawing/2014/main" id="{65608E58-CBEF-D9D3-94A0-894534BE47D8}"/>
+                </a:ext>
+              </a:extLst>
+            </p:cNvPr>
+            <p:cNvPicPr>
+              <a:picLocks noChangeAspect="1"/>
+            </p:cNvPicPr>
+            <p:nvPr/>
+          </p:nvPicPr>
+          <p:blipFill>
+            <a:blip r:embed="rId3">
+              <a:extLst>
+                <a:ext uri="{96DAC541-7B7A-43D3-8B79-37D633B846F1}">
+                  <asvg:svgBlip xmlns:asvg="http://schemas.microsoft.com/office/drawing/2016/SVG/main" r:embed="rId4"/>
+                </a:ext>
+              </a:extLst>
+            </a:blip>
+            <a:stretch>
+              <a:fillRect/>
+            </a:stretch>
+          </p:blipFill>
+          <p:spPr>
+            <a:xfrm>
+              <a:off x="2853264" y="-118535"/>
+              <a:ext cx="5943600" cy="5943600"/>
+            </a:xfrm>
+            <a:prstGeom prst="rect">
+              <a:avLst/>
+            </a:prstGeom>
+          </p:spPr>
+        </p:pic>
+      </p:grpSp>
+    </p:spTree>
+    <p:extLst>
+      <p:ext uri="{BB962C8B-B14F-4D97-AF65-F5344CB8AC3E}">
+        <p14:creationId xmlns:p14="http://schemas.microsoft.com/office/powerpoint/2010/main" val="2618901074"/>
+      </p:ext>
+    </p:extLst>
+  </p:cSld>
+  <p:clrMapOvr>
+    <a:masterClrMapping/>
+  </p:clrMapOvr>
+</p:sld>
+</file>
+
 <file path=ppt/slides/slide3.xml><?xml version="1.0" encoding="utf-8"?>
 <p:sld xmlns:a="http://schemas.openxmlformats.org/drawingml/2006/main" xmlns:r="http://schemas.openxmlformats.org/officeDocument/2006/relationships" xmlns:p="http://schemas.openxmlformats.org/presentationml/2006/main">
   <p:cSld>

</xml_diff>

<commit_message>
finished imitation highlighting, alternative outoforderness
</commit_message>
<xml_diff>
--- a/assets/Symbols.pptx
+++ b/assets/Symbols.pptx
@@ -270,7 +270,7 @@
           <a:p>
             <a:fld id="{4CE80203-1554-4B47-9518-27150A8A6789}" type="datetimeFigureOut">
               <a:rPr lang="en-US" smtClean="0"/>
-              <a:t>12/7/2024</a:t>
+              <a:t>12/8/2024</a:t>
             </a:fld>
             <a:endParaRPr lang="en-US"/>
           </a:p>
@@ -852,7 +852,7 @@
           <a:p>
             <a:fld id="{573B54DB-A8B2-4954-9DC1-E1741E23BC56}" type="datetimeFigureOut">
               <a:rPr lang="en-US" smtClean="0"/>
-              <a:t>12/7/2024</a:t>
+              <a:t>12/8/2024</a:t>
             </a:fld>
             <a:endParaRPr lang="en-US"/>
           </a:p>
@@ -1050,7 +1050,7 @@
           <a:p>
             <a:fld id="{573B54DB-A8B2-4954-9DC1-E1741E23BC56}" type="datetimeFigureOut">
               <a:rPr lang="en-US" smtClean="0"/>
-              <a:t>12/7/2024</a:t>
+              <a:t>12/8/2024</a:t>
             </a:fld>
             <a:endParaRPr lang="en-US"/>
           </a:p>
@@ -1258,7 +1258,7 @@
           <a:p>
             <a:fld id="{573B54DB-A8B2-4954-9DC1-E1741E23BC56}" type="datetimeFigureOut">
               <a:rPr lang="en-US" smtClean="0"/>
-              <a:t>12/7/2024</a:t>
+              <a:t>12/8/2024</a:t>
             </a:fld>
             <a:endParaRPr lang="en-US"/>
           </a:p>
@@ -1456,7 +1456,7 @@
           <a:p>
             <a:fld id="{573B54DB-A8B2-4954-9DC1-E1741E23BC56}" type="datetimeFigureOut">
               <a:rPr lang="en-US" smtClean="0"/>
-              <a:t>12/7/2024</a:t>
+              <a:t>12/8/2024</a:t>
             </a:fld>
             <a:endParaRPr lang="en-US"/>
           </a:p>
@@ -1731,7 +1731,7 @@
           <a:p>
             <a:fld id="{573B54DB-A8B2-4954-9DC1-E1741E23BC56}" type="datetimeFigureOut">
               <a:rPr lang="en-US" smtClean="0"/>
-              <a:t>12/7/2024</a:t>
+              <a:t>12/8/2024</a:t>
             </a:fld>
             <a:endParaRPr lang="en-US"/>
           </a:p>
@@ -1996,7 +1996,7 @@
           <a:p>
             <a:fld id="{573B54DB-A8B2-4954-9DC1-E1741E23BC56}" type="datetimeFigureOut">
               <a:rPr lang="en-US" smtClean="0"/>
-              <a:t>12/7/2024</a:t>
+              <a:t>12/8/2024</a:t>
             </a:fld>
             <a:endParaRPr lang="en-US"/>
           </a:p>
@@ -2408,7 +2408,7 @@
           <a:p>
             <a:fld id="{573B54DB-A8B2-4954-9DC1-E1741E23BC56}" type="datetimeFigureOut">
               <a:rPr lang="en-US" smtClean="0"/>
-              <a:t>12/7/2024</a:t>
+              <a:t>12/8/2024</a:t>
             </a:fld>
             <a:endParaRPr lang="en-US"/>
           </a:p>
@@ -2549,7 +2549,7 @@
           <a:p>
             <a:fld id="{573B54DB-A8B2-4954-9DC1-E1741E23BC56}" type="datetimeFigureOut">
               <a:rPr lang="en-US" smtClean="0"/>
-              <a:t>12/7/2024</a:t>
+              <a:t>12/8/2024</a:t>
             </a:fld>
             <a:endParaRPr lang="en-US"/>
           </a:p>
@@ -2662,7 +2662,7 @@
           <a:p>
             <a:fld id="{573B54DB-A8B2-4954-9DC1-E1741E23BC56}" type="datetimeFigureOut">
               <a:rPr lang="en-US" smtClean="0"/>
-              <a:t>12/7/2024</a:t>
+              <a:t>12/8/2024</a:t>
             </a:fld>
             <a:endParaRPr lang="en-US"/>
           </a:p>
@@ -2973,7 +2973,7 @@
           <a:p>
             <a:fld id="{573B54DB-A8B2-4954-9DC1-E1741E23BC56}" type="datetimeFigureOut">
               <a:rPr lang="en-US" smtClean="0"/>
-              <a:t>12/7/2024</a:t>
+              <a:t>12/8/2024</a:t>
             </a:fld>
             <a:endParaRPr lang="en-US"/>
           </a:p>
@@ -3261,7 +3261,7 @@
           <a:p>
             <a:fld id="{573B54DB-A8B2-4954-9DC1-E1741E23BC56}" type="datetimeFigureOut">
               <a:rPr lang="en-US" smtClean="0"/>
-              <a:t>12/7/2024</a:t>
+              <a:t>12/8/2024</a:t>
             </a:fld>
             <a:endParaRPr lang="en-US"/>
           </a:p>
@@ -3502,7 +3502,7 @@
           <a:p>
             <a:fld id="{573B54DB-A8B2-4954-9DC1-E1741E23BC56}" type="datetimeFigureOut">
               <a:rPr lang="en-US" smtClean="0"/>
-              <a:t>12/7/2024</a:t>
+              <a:t>12/8/2024</a:t>
             </a:fld>
             <a:endParaRPr lang="en-US"/>
           </a:p>
@@ -28882,7 +28882,7 @@
         </p:nvGrpSpPr>
         <p:grpSpPr>
           <a:xfrm>
-            <a:off x="2777064" y="706965"/>
+            <a:off x="4525477" y="717013"/>
             <a:ext cx="5943600" cy="5943600"/>
             <a:chOff x="2853264" y="-118535"/>
             <a:chExt cx="5943600" cy="5943600"/>

</xml_diff>